<commit_message>
80% effectué du cdc
</commit_message>
<xml_diff>
--- a/CDC/L_artiste.pptx
+++ b/CDC/L_artiste.pptx
@@ -5,7 +5,7 @@
     <p:sldMasterId id="2147483648" r:id="rId1"/>
   </p:sldMasterIdLst>
   <p:notesMasterIdLst>
-    <p:notesMasterId r:id="rId7"/>
+    <p:notesMasterId r:id="rId12"/>
   </p:notesMasterIdLst>
   <p:sldIdLst>
     <p:sldId id="256" r:id="rId2"/>
@@ -13,6 +13,11 @@
     <p:sldId id="258" r:id="rId4"/>
     <p:sldId id="259" r:id="rId5"/>
     <p:sldId id="260" r:id="rId6"/>
+    <p:sldId id="261" r:id="rId7"/>
+    <p:sldId id="262" r:id="rId8"/>
+    <p:sldId id="263" r:id="rId9"/>
+    <p:sldId id="264" r:id="rId10"/>
+    <p:sldId id="265" r:id="rId11"/>
   </p:sldIdLst>
   <p:sldSz cx="12192000" cy="6858000"/>
   <p:notesSz cx="6858000" cy="9144000"/>
@@ -121,12 +126,20 @@
             <p14:sldId id="258"/>
             <p14:sldId id="259"/>
             <p14:sldId id="260"/>
+            <p14:sldId id="261"/>
+            <p14:sldId id="262"/>
+            <p14:sldId id="263"/>
+            <p14:sldId id="264"/>
+            <p14:sldId id="265"/>
           </p14:sldIdLst>
         </p14:section>
       </p14:sectionLst>
     </p:ext>
     <p:ext uri="{EFAFB233-063F-42B5-8137-9DF3F51BA10A}">
       <p15:sldGuideLst xmlns:p15="http://schemas.microsoft.com/office/powerpoint/2012/main"/>
+    </p:ext>
+    <p:ext uri="{2D200454-40CA-4A62-9FC3-DE9A4176ACB9}">
+      <p15:notesGuideLst xmlns:p15="http://schemas.microsoft.com/office/powerpoint/2012/main"/>
     </p:ext>
   </p:extLst>
 </p:presentation>
@@ -214,7 +227,7 @@
           <a:p>
             <a:fld id="{CE3F9B10-F744-47E1-871E-98B3AC9B3E4F}" type="datetimeFigureOut">
               <a:rPr lang="fr-FR" smtClean="0"/>
-              <a:t>23/12/2022</a:t>
+              <a:t>02/01/2023</a:t>
             </a:fld>
             <a:endParaRPr lang="fr-FR"/>
           </a:p>
@@ -222,7 +235,48 @@
       </p:sp>
       <p:sp>
         <p:nvSpPr>
-          <p:cNvPr id="4" name="Espace réservé de l'image des diapositives 3"/>
+          <p:cNvPr id="7" name="Espace réservé du numéro de diapositive 6"/>
+          <p:cNvSpPr>
+            <a:spLocks noGrp="1"/>
+          </p:cNvSpPr>
+          <p:nvPr>
+            <p:ph type="sldNum" sz="quarter" idx="5"/>
+          </p:nvPr>
+        </p:nvSpPr>
+        <p:spPr>
+          <a:xfrm>
+            <a:off x="3884613" y="8685213"/>
+            <a:ext cx="2971800" cy="458787"/>
+          </a:xfrm>
+          <a:prstGeom prst="rect">
+            <a:avLst/>
+          </a:prstGeom>
+        </p:spPr>
+        <p:txBody>
+          <a:bodyPr vert="horz" lIns="91440" tIns="45720" rIns="91440" bIns="45720" rtlCol="0" anchor="b"/>
+          <a:lstStyle>
+            <a:lvl1pPr algn="r">
+              <a:defRPr sz="1200"/>
+            </a:lvl1pPr>
+          </a:lstStyle>
+          <a:p>
+            <a:fld id="{76E71219-A99D-471B-86CD-CA487E081E23}" type="slidenum">
+              <a:rPr lang="fr-FR" smtClean="0"/>
+              <a:t>‹N°›</a:t>
+            </a:fld>
+            <a:endParaRPr lang="fr-FR"/>
+          </a:p>
+        </p:txBody>
+      </p:sp>
+      <p:sp>
+        <p:nvSpPr>
+          <p:cNvPr id="8" name="Espace réservé de l'image des diapositives 7">
+            <a:extLst>
+              <a:ext uri="{FF2B5EF4-FFF2-40B4-BE49-F238E27FC236}">
+                <a16:creationId xmlns:a16="http://schemas.microsoft.com/office/drawing/2014/main" id="{1EE99F21-CC01-5859-DC52-055D6D5FAD22}"/>
+              </a:ext>
+            </a:extLst>
+          </p:cNvPr>
           <p:cNvSpPr>
             <a:spLocks noGrp="1" noRot="1" noChangeAspect="1"/>
           </p:cNvSpPr>
@@ -255,66 +309,13 @@
       </p:sp>
       <p:sp>
         <p:nvSpPr>
-          <p:cNvPr id="5" name="Espace réservé des notes 4"/>
-          <p:cNvSpPr>
-            <a:spLocks noGrp="1"/>
-          </p:cNvSpPr>
-          <p:nvPr>
-            <p:ph type="body" sz="quarter" idx="3"/>
-          </p:nvPr>
-        </p:nvSpPr>
-        <p:spPr>
-          <a:xfrm>
-            <a:off x="685800" y="4400550"/>
-            <a:ext cx="5486400" cy="3600450"/>
-          </a:xfrm>
-          <a:prstGeom prst="rect">
-            <a:avLst/>
-          </a:prstGeom>
-        </p:spPr>
-        <p:txBody>
-          <a:bodyPr vert="horz" lIns="91440" tIns="45720" rIns="91440" bIns="45720" rtlCol="0"/>
-          <a:lstStyle/>
-          <a:p>
-            <a:pPr lvl="0"/>
-            <a:r>
-              <a:rPr lang="fr-FR"/>
-              <a:t>Cliquez pour modifier les styles du texte du masque</a:t>
-            </a:r>
-          </a:p>
-          <a:p>
-            <a:pPr lvl="1"/>
-            <a:r>
-              <a:rPr lang="fr-FR"/>
-              <a:t>Deuxième niveau</a:t>
-            </a:r>
-          </a:p>
-          <a:p>
-            <a:pPr lvl="2"/>
-            <a:r>
-              <a:rPr lang="fr-FR"/>
-              <a:t>Troisième niveau</a:t>
-            </a:r>
-          </a:p>
-          <a:p>
-            <a:pPr lvl="3"/>
-            <a:r>
-              <a:rPr lang="fr-FR"/>
-              <a:t>Quatrième niveau</a:t>
-            </a:r>
-          </a:p>
-          <a:p>
-            <a:pPr lvl="4"/>
-            <a:r>
-              <a:rPr lang="fr-FR"/>
-              <a:t>Cinquième niveau</a:t>
-            </a:r>
-          </a:p>
-        </p:txBody>
-      </p:sp>
-      <p:sp>
-        <p:nvSpPr>
-          <p:cNvPr id="6" name="Espace réservé du pied de page 5"/>
+          <p:cNvPr id="9" name="Espace réservé du pied de page 8">
+            <a:extLst>
+              <a:ext uri="{FF2B5EF4-FFF2-40B4-BE49-F238E27FC236}">
+                <a16:creationId xmlns:a16="http://schemas.microsoft.com/office/drawing/2014/main" id="{076719D7-6FD1-4985-AF55-4CC5ADC1D928}"/>
+              </a:ext>
+            </a:extLst>
+          </p:cNvPr>
           <p:cNvSpPr>
             <a:spLocks noGrp="1"/>
           </p:cNvSpPr>
@@ -339,41 +340,6 @@
             </a:lvl1pPr>
           </a:lstStyle>
           <a:p>
-            <a:endParaRPr lang="fr-FR"/>
-          </a:p>
-        </p:txBody>
-      </p:sp>
-      <p:sp>
-        <p:nvSpPr>
-          <p:cNvPr id="7" name="Espace réservé du numéro de diapositive 6"/>
-          <p:cNvSpPr>
-            <a:spLocks noGrp="1"/>
-          </p:cNvSpPr>
-          <p:nvPr>
-            <p:ph type="sldNum" sz="quarter" idx="5"/>
-          </p:nvPr>
-        </p:nvSpPr>
-        <p:spPr>
-          <a:xfrm>
-            <a:off x="3884613" y="8685213"/>
-            <a:ext cx="2971800" cy="458787"/>
-          </a:xfrm>
-          <a:prstGeom prst="rect">
-            <a:avLst/>
-          </a:prstGeom>
-        </p:spPr>
-        <p:txBody>
-          <a:bodyPr vert="horz" lIns="91440" tIns="45720" rIns="91440" bIns="45720" rtlCol="0" anchor="b"/>
-          <a:lstStyle>
-            <a:lvl1pPr algn="r">
-              <a:defRPr sz="1200"/>
-            </a:lvl1pPr>
-          </a:lstStyle>
-          <a:p>
-            <a:fld id="{76E71219-A99D-471B-86CD-CA487E081E23}" type="slidenum">
-              <a:rPr lang="fr-FR" smtClean="0"/>
-              <a:t>‹N°›</a:t>
-            </a:fld>
             <a:endParaRPr lang="fr-FR"/>
           </a:p>
         </p:txBody>
@@ -673,7 +639,7 @@
             <a:fld id="{B61BEF0D-F0BB-DE4B-95CE-6DB70DBA9567}" type="datetimeFigureOut">
               <a:rPr lang="en-US" dirty="0"/>
               <a:pPr/>
-              <a:t>12/23/2022</a:t>
+              <a:t>1/2/2023</a:t>
             </a:fld>
             <a:endParaRPr lang="en-US" dirty="0"/>
           </a:p>
@@ -1106,7 +1072,7 @@
             <a:fld id="{B61BEF0D-F0BB-DE4B-95CE-6DB70DBA9567}" type="datetimeFigureOut">
               <a:rPr lang="en-US" dirty="0"/>
               <a:pPr/>
-              <a:t>12/23/2022</a:t>
+              <a:t>1/2/2023</a:t>
             </a:fld>
             <a:endParaRPr lang="en-US" dirty="0"/>
           </a:p>
@@ -1353,7 +1319,7 @@
             <a:fld id="{B61BEF0D-F0BB-DE4B-95CE-6DB70DBA9567}" type="datetimeFigureOut">
               <a:rPr lang="en-US" dirty="0"/>
               <a:pPr/>
-              <a:t>12/23/2022</a:t>
+              <a:t>1/2/2023</a:t>
             </a:fld>
             <a:endParaRPr lang="en-US" dirty="0"/>
           </a:p>
@@ -1658,7 +1624,7 @@
             <a:fld id="{B61BEF0D-F0BB-DE4B-95CE-6DB70DBA9567}" type="datetimeFigureOut">
               <a:rPr lang="en-US" dirty="0"/>
               <a:pPr/>
-              <a:t>12/23/2022</a:t>
+              <a:t>1/2/2023</a:t>
             </a:fld>
             <a:endParaRPr lang="en-US" dirty="0"/>
           </a:p>
@@ -1973,7 +1939,7 @@
             <a:fld id="{B61BEF0D-F0BB-DE4B-95CE-6DB70DBA9567}" type="datetimeFigureOut">
               <a:rPr lang="en-US" dirty="0"/>
               <a:pPr/>
-              <a:t>12/23/2022</a:t>
+              <a:t>1/2/2023</a:t>
             </a:fld>
             <a:endParaRPr lang="en-US" dirty="0"/>
           </a:p>
@@ -2272,7 +2238,7 @@
             <a:fld id="{B61BEF0D-F0BB-DE4B-95CE-6DB70DBA9567}" type="datetimeFigureOut">
               <a:rPr lang="en-US" dirty="0"/>
               <a:pPr/>
-              <a:t>12/23/2022</a:t>
+              <a:t>1/2/2023</a:t>
             </a:fld>
             <a:endParaRPr lang="en-US" dirty="0"/>
           </a:p>
@@ -2636,7 +2602,7 @@
             <a:fld id="{B61BEF0D-F0BB-DE4B-95CE-6DB70DBA9567}" type="datetimeFigureOut">
               <a:rPr lang="en-US" dirty="0"/>
               <a:pPr/>
-              <a:t>12/23/2022</a:t>
+              <a:t>1/2/2023</a:t>
             </a:fld>
             <a:endParaRPr lang="en-US" dirty="0"/>
           </a:p>
@@ -2807,7 +2773,7 @@
             <a:fld id="{B61BEF0D-F0BB-DE4B-95CE-6DB70DBA9567}" type="datetimeFigureOut">
               <a:rPr lang="en-US" dirty="0"/>
               <a:pPr/>
-              <a:t>12/23/2022</a:t>
+              <a:t>1/2/2023</a:t>
             </a:fld>
             <a:endParaRPr lang="en-US" dirty="0"/>
           </a:p>
@@ -2984,7 +2950,7 @@
             <a:fld id="{B61BEF0D-F0BB-DE4B-95CE-6DB70DBA9567}" type="datetimeFigureOut">
               <a:rPr lang="en-US" dirty="0"/>
               <a:pPr/>
-              <a:t>12/23/2022</a:t>
+              <a:t>1/2/2023</a:t>
             </a:fld>
             <a:endParaRPr lang="en-US" dirty="0"/>
           </a:p>
@@ -3151,7 +3117,7 @@
             <a:fld id="{B61BEF0D-F0BB-DE4B-95CE-6DB70DBA9567}" type="datetimeFigureOut">
               <a:rPr lang="en-US" dirty="0"/>
               <a:pPr/>
-              <a:t>12/23/2022</a:t>
+              <a:t>1/2/2023</a:t>
             </a:fld>
             <a:endParaRPr lang="en-US" dirty="0"/>
           </a:p>
@@ -3398,7 +3364,7 @@
             <a:fld id="{B61BEF0D-F0BB-DE4B-95CE-6DB70DBA9567}" type="datetimeFigureOut">
               <a:rPr lang="en-US" dirty="0"/>
               <a:pPr/>
-              <a:t>12/23/2022</a:t>
+              <a:t>1/2/2023</a:t>
             </a:fld>
             <a:endParaRPr lang="en-US" dirty="0"/>
           </a:p>
@@ -3631,7 +3597,7 @@
             <a:fld id="{B61BEF0D-F0BB-DE4B-95CE-6DB70DBA9567}" type="datetimeFigureOut">
               <a:rPr lang="en-US" dirty="0"/>
               <a:pPr/>
-              <a:t>12/23/2022</a:t>
+              <a:t>1/2/2023</a:t>
             </a:fld>
             <a:endParaRPr lang="en-US" dirty="0"/>
           </a:p>
@@ -4010,7 +3976,7 @@
             <a:fld id="{B61BEF0D-F0BB-DE4B-95CE-6DB70DBA9567}" type="datetimeFigureOut">
               <a:rPr lang="en-US" dirty="0"/>
               <a:pPr/>
-              <a:t>12/23/2022</a:t>
+              <a:t>1/2/2023</a:t>
             </a:fld>
             <a:endParaRPr lang="en-US" dirty="0"/>
           </a:p>
@@ -4125,7 +4091,7 @@
             <a:fld id="{B61BEF0D-F0BB-DE4B-95CE-6DB70DBA9567}" type="datetimeFigureOut">
               <a:rPr lang="en-US" dirty="0"/>
               <a:pPr/>
-              <a:t>12/23/2022</a:t>
+              <a:t>1/2/2023</a:t>
             </a:fld>
             <a:endParaRPr lang="en-US" dirty="0"/>
           </a:p>
@@ -4217,7 +4183,7 @@
             <a:fld id="{B61BEF0D-F0BB-DE4B-95CE-6DB70DBA9567}" type="datetimeFigureOut">
               <a:rPr lang="en-US" dirty="0"/>
               <a:pPr/>
-              <a:t>12/23/2022</a:t>
+              <a:t>1/2/2023</a:t>
             </a:fld>
             <a:endParaRPr lang="en-US" dirty="0"/>
           </a:p>
@@ -4469,7 +4435,7 @@
             <a:fld id="{B61BEF0D-F0BB-DE4B-95CE-6DB70DBA9567}" type="datetimeFigureOut">
               <a:rPr lang="en-US" dirty="0"/>
               <a:pPr/>
-              <a:t>12/23/2022</a:t>
+              <a:t>1/2/2023</a:t>
             </a:fld>
             <a:endParaRPr lang="en-US" dirty="0"/>
           </a:p>
@@ -4749,7 +4715,7 @@
             <a:fld id="{B61BEF0D-F0BB-DE4B-95CE-6DB70DBA9567}" type="datetimeFigureOut">
               <a:rPr lang="en-US" dirty="0"/>
               <a:pPr/>
-              <a:t>12/23/2022</a:t>
+              <a:t>1/2/2023</a:t>
             </a:fld>
             <a:endParaRPr lang="en-US" dirty="0"/>
           </a:p>
@@ -5152,7 +5118,7 @@
             <a:fld id="{B61BEF0D-F0BB-DE4B-95CE-6DB70DBA9567}" type="datetimeFigureOut">
               <a:rPr lang="en-US" dirty="0"/>
               <a:pPr/>
-              <a:t>12/23/2022</a:t>
+              <a:t>1/2/2023</a:t>
             </a:fld>
             <a:endParaRPr lang="en-US" dirty="0"/>
           </a:p>
@@ -5840,6 +5806,128 @@
 </p:sld>
 </file>
 
+<file path=ppt/slides/slide10.xml><?xml version="1.0" encoding="utf-8"?>
+<p:sld xmlns:a="http://schemas.openxmlformats.org/drawingml/2006/main" xmlns:r="http://schemas.openxmlformats.org/officeDocument/2006/relationships" xmlns:p="http://schemas.openxmlformats.org/presentationml/2006/main">
+  <p:cSld>
+    <p:spTree>
+      <p:nvGrpSpPr>
+        <p:cNvPr id="1" name=""/>
+        <p:cNvGrpSpPr/>
+        <p:nvPr/>
+      </p:nvGrpSpPr>
+      <p:grpSpPr>
+        <a:xfrm>
+          <a:off x="0" y="0"/>
+          <a:ext cx="0" cy="0"/>
+          <a:chOff x="0" y="0"/>
+          <a:chExt cx="0" cy="0"/>
+        </a:xfrm>
+      </p:grpSpPr>
+      <p:sp>
+        <p:nvSpPr>
+          <p:cNvPr id="3" name="Espace réservé du contenu 2">
+            <a:extLst>
+              <a:ext uri="{FF2B5EF4-FFF2-40B4-BE49-F238E27FC236}">
+                <a16:creationId xmlns:a16="http://schemas.microsoft.com/office/drawing/2014/main" id="{E209249B-AB26-E703-4BF8-BDB15EA80F2B}"/>
+              </a:ext>
+            </a:extLst>
+          </p:cNvPr>
+          <p:cNvSpPr>
+            <a:spLocks noGrp="1"/>
+          </p:cNvSpPr>
+          <p:nvPr>
+            <p:ph idx="1"/>
+          </p:nvPr>
+        </p:nvSpPr>
+        <p:spPr>
+          <a:xfrm>
+            <a:off x="684212" y="685800"/>
+            <a:ext cx="9053554" cy="2431473"/>
+          </a:xfrm>
+        </p:spPr>
+        <p:txBody>
+          <a:bodyPr/>
+          <a:lstStyle/>
+          <a:p>
+            <a:pPr marL="0" indent="0">
+              <a:buNone/>
+            </a:pPr>
+            <a:r>
+              <a:rPr lang="fr-FR" b="1" u="sng" dirty="0">
+                <a:solidFill>
+                  <a:srgbClr val="751515"/>
+                </a:solidFill>
+              </a:rPr>
+              <a:t>Récapitulatif:</a:t>
+            </a:r>
+          </a:p>
+          <a:p>
+            <a:pPr marL="457200" lvl="1" indent="0">
+              <a:buNone/>
+            </a:pPr>
+            <a:r>
+              <a:rPr lang="fr-FR" dirty="0"/>
+              <a:t>Nous livrons un site internet début juillet de style galerie, comprenant un nouveau logo, une page d’accueil contenant une bio  les dernières peintures et des commentaires, une page galerie contenant les peintures du client, une page de contact.	</a:t>
+            </a:r>
+          </a:p>
+          <a:p>
+            <a:pPr lvl="1"/>
+            <a:endParaRPr lang="fr-FR" dirty="0"/>
+          </a:p>
+        </p:txBody>
+      </p:sp>
+      <p:sp>
+        <p:nvSpPr>
+          <p:cNvPr id="4" name="ZoneTexte 3">
+            <a:extLst>
+              <a:ext uri="{FF2B5EF4-FFF2-40B4-BE49-F238E27FC236}">
+                <a16:creationId xmlns:a16="http://schemas.microsoft.com/office/drawing/2014/main" id="{1AA1E146-9A4F-14A2-2B40-E8F24963E609}"/>
+              </a:ext>
+            </a:extLst>
+          </p:cNvPr>
+          <p:cNvSpPr txBox="1"/>
+          <p:nvPr/>
+        </p:nvSpPr>
+        <p:spPr>
+          <a:xfrm>
+            <a:off x="684212" y="2850079"/>
+            <a:ext cx="1646712" cy="369332"/>
+          </a:xfrm>
+          <a:prstGeom prst="rect">
+            <a:avLst/>
+          </a:prstGeom>
+          <a:noFill/>
+        </p:spPr>
+        <p:txBody>
+          <a:bodyPr wrap="square" rtlCol="0">
+            <a:spAutoFit/>
+          </a:bodyPr>
+          <a:lstStyle/>
+          <a:p>
+            <a:r>
+              <a:rPr lang="fr-FR" b="1" u="sng" dirty="0">
+                <a:solidFill>
+                  <a:srgbClr val="751515"/>
+                </a:solidFill>
+              </a:rPr>
+              <a:t>Planning:</a:t>
+            </a:r>
+          </a:p>
+        </p:txBody>
+      </p:sp>
+    </p:spTree>
+    <p:extLst>
+      <p:ext uri="{BB962C8B-B14F-4D97-AF65-F5344CB8AC3E}">
+        <p14:creationId xmlns:p14="http://schemas.microsoft.com/office/powerpoint/2010/main" val="3690427952"/>
+      </p:ext>
+    </p:extLst>
+  </p:cSld>
+  <p:clrMapOvr>
+    <a:masterClrMapping/>
+  </p:clrMapOvr>
+</p:sld>
+</file>
+
 <file path=ppt/slides/slide2.xml><?xml version="1.0" encoding="utf-8"?>
 <p:sld xmlns:a="http://schemas.openxmlformats.org/drawingml/2006/main" xmlns:r="http://schemas.openxmlformats.org/officeDocument/2006/relationships" xmlns:p="http://schemas.openxmlformats.org/presentationml/2006/main">
   <p:cSld>
@@ -5884,31 +5972,6 @@
       </p:grpSpPr>
       <p:sp>
         <p:nvSpPr>
-          <p:cNvPr id="5" name="Titre 4">
-            <a:extLst>
-              <a:ext uri="{FF2B5EF4-FFF2-40B4-BE49-F238E27FC236}">
-                <a16:creationId xmlns:a16="http://schemas.microsoft.com/office/drawing/2014/main" id="{D5551ABD-6FAB-93DD-EEED-18CCA669329D}"/>
-              </a:ext>
-            </a:extLst>
-          </p:cNvPr>
-          <p:cNvSpPr>
-            <a:spLocks noGrp="1"/>
-          </p:cNvSpPr>
-          <p:nvPr>
-            <p:ph type="title"/>
-          </p:nvPr>
-        </p:nvSpPr>
-        <p:spPr/>
-        <p:txBody>
-          <a:bodyPr/>
-          <a:lstStyle/>
-          <a:p>
-            <a:endParaRPr lang="fr-FR" dirty="0"/>
-          </a:p>
-        </p:txBody>
-      </p:sp>
-      <p:sp>
-        <p:nvSpPr>
           <p:cNvPr id="3" name="Espace réservé du contenu 2">
             <a:extLst>
               <a:ext uri="{FF2B5EF4-FFF2-40B4-BE49-F238E27FC236}">
@@ -5925,8 +5988,8 @@
         </p:nvSpPr>
         <p:spPr>
           <a:xfrm>
-            <a:off x="684212" y="685800"/>
-            <a:ext cx="10823576" cy="6172200"/>
+            <a:off x="457200" y="685800"/>
+            <a:ext cx="11050587" cy="6029696"/>
           </a:xfrm>
         </p:spPr>
         <p:txBody>
@@ -6091,31 +6154,6 @@
           <a:chExt cx="0" cy="0"/>
         </a:xfrm>
       </p:grpSpPr>
-      <p:sp>
-        <p:nvSpPr>
-          <p:cNvPr id="2" name="Titre 1">
-            <a:extLst>
-              <a:ext uri="{FF2B5EF4-FFF2-40B4-BE49-F238E27FC236}">
-                <a16:creationId xmlns:a16="http://schemas.microsoft.com/office/drawing/2014/main" id="{2B299893-F9CD-D377-D0BD-A4BF2EA6F80F}"/>
-              </a:ext>
-            </a:extLst>
-          </p:cNvPr>
-          <p:cNvSpPr>
-            <a:spLocks noGrp="1"/>
-          </p:cNvSpPr>
-          <p:nvPr>
-            <p:ph type="title"/>
-          </p:nvPr>
-        </p:nvSpPr>
-        <p:spPr/>
-        <p:txBody>
-          <a:bodyPr/>
-          <a:lstStyle/>
-          <a:p>
-            <a:endParaRPr lang="fr-FR" dirty="0"/>
-          </a:p>
-        </p:txBody>
-      </p:sp>
       <p:sp>
         <p:nvSpPr>
           <p:cNvPr id="3" name="Espace réservé du contenu 2">
@@ -6515,7 +6553,7 @@
                   <a:srgbClr val="751515"/>
                 </a:solidFill>
               </a:rPr>
-              <a:t>Des ventes grâce a une plus grande accessibilité.</a:t>
+              <a:t>ventes grâce a une plus grande accessibilité.</a:t>
             </a:r>
           </a:p>
         </p:txBody>
@@ -6601,31 +6639,6 @@
       </p:grpSpPr>
       <p:sp>
         <p:nvSpPr>
-          <p:cNvPr id="2" name="Titre 1">
-            <a:extLst>
-              <a:ext uri="{FF2B5EF4-FFF2-40B4-BE49-F238E27FC236}">
-                <a16:creationId xmlns:a16="http://schemas.microsoft.com/office/drawing/2014/main" id="{F044AA3D-1A24-09FC-7BEA-EC3F7796BF1C}"/>
-              </a:ext>
-            </a:extLst>
-          </p:cNvPr>
-          <p:cNvSpPr>
-            <a:spLocks noGrp="1"/>
-          </p:cNvSpPr>
-          <p:nvPr>
-            <p:ph type="title"/>
-          </p:nvPr>
-        </p:nvSpPr>
-        <p:spPr/>
-        <p:txBody>
-          <a:bodyPr/>
-          <a:lstStyle/>
-          <a:p>
-            <a:endParaRPr lang="fr-FR"/>
-          </a:p>
-        </p:txBody>
-      </p:sp>
-      <p:sp>
-        <p:nvSpPr>
           <p:cNvPr id="3" name="Espace réservé du contenu 2">
             <a:extLst>
               <a:ext uri="{FF2B5EF4-FFF2-40B4-BE49-F238E27FC236}">
@@ -6741,46 +6754,14 @@
               <a:buNone/>
             </a:pPr>
             <a:r>
-              <a:rPr lang="fr-FR" b="1" u="sng" dirty="0">
-                <a:solidFill>
-                  <a:srgbClr val="751515"/>
-                </a:solidFill>
-              </a:rPr>
-              <a:t>Site exemple : </a:t>
+              <a:rPr lang="fr-FR" dirty="0"/>
+              <a:t>	Le slogan : Le peintre passionné.</a:t>
             </a:r>
           </a:p>
           <a:p>
             <a:pPr marL="0" indent="0">
               <a:buNone/>
             </a:pPr>
-            <a:r>
-              <a:rPr lang="fr-FR" dirty="0"/>
-              <a:t>			    - </a:t>
-            </a:r>
-            <a:r>
-              <a:rPr lang="fr-FR" dirty="0">
-                <a:hlinkClick r:id="rId2"/>
-              </a:rPr>
-              <a:t>https://jcocheril.wixsite.com/jacquescocheril</a:t>
-            </a:r>
-            <a:endParaRPr lang="fr-FR" dirty="0"/>
-          </a:p>
-          <a:p>
-            <a:pPr marL="0" indent="0">
-              <a:buNone/>
-            </a:pPr>
-            <a:r>
-              <a:rPr lang="fr-FR"/>
-              <a:t>                        - </a:t>
-            </a:r>
-            <a:r>
-              <a:rPr lang="fr-FR" dirty="0"/>
-              <a:t>http://www.joannaflatau-leblog</a:t>
-            </a:r>
-            <a:r>
-              <a:rPr lang="fr-FR"/>
-              <a:t>.com</a:t>
-            </a:r>
             <a:endParaRPr lang="fr-FR" dirty="0"/>
           </a:p>
         </p:txBody>
@@ -6791,6 +6772,318 @@
             <a:extLst>
               <a:ext uri="{FF2B5EF4-FFF2-40B4-BE49-F238E27FC236}">
                 <a16:creationId xmlns:a16="http://schemas.microsoft.com/office/drawing/2014/main" id="{125F0144-20A3-CC92-7FE4-2DDD63E9C0EC}"/>
+              </a:ext>
+            </a:extLst>
+          </p:cNvPr>
+          <p:cNvPicPr>
+            <a:picLocks noChangeAspect="1"/>
+          </p:cNvPicPr>
+          <p:nvPr/>
+        </p:nvPicPr>
+        <p:blipFill>
+          <a:blip r:embed="rId2"/>
+          <a:stretch>
+            <a:fillRect/>
+          </a:stretch>
+        </p:blipFill>
+        <p:spPr>
+          <a:xfrm>
+            <a:off x="4561692" y="1500874"/>
+            <a:ext cx="3500637" cy="815536"/>
+          </a:xfrm>
+          <a:prstGeom prst="rect">
+            <a:avLst/>
+          </a:prstGeom>
+        </p:spPr>
+      </p:pic>
+      <p:sp>
+        <p:nvSpPr>
+          <p:cNvPr id="4" name="ZoneTexte 3">
+            <a:extLst>
+              <a:ext uri="{FF2B5EF4-FFF2-40B4-BE49-F238E27FC236}">
+                <a16:creationId xmlns:a16="http://schemas.microsoft.com/office/drawing/2014/main" id="{F99CA914-1A8C-4C5E-E0D8-5022F803FD62}"/>
+              </a:ext>
+            </a:extLst>
+          </p:cNvPr>
+          <p:cNvSpPr txBox="1"/>
+          <p:nvPr/>
+        </p:nvSpPr>
+        <p:spPr>
+          <a:xfrm>
+            <a:off x="7479908" y="2100966"/>
+            <a:ext cx="587829" cy="215444"/>
+          </a:xfrm>
+          <a:prstGeom prst="rect">
+            <a:avLst/>
+          </a:prstGeom>
+          <a:noFill/>
+        </p:spPr>
+        <p:txBody>
+          <a:bodyPr wrap="square" rtlCol="0">
+            <a:spAutoFit/>
+          </a:bodyPr>
+          <a:lstStyle/>
+          <a:p>
+            <a:r>
+              <a:rPr lang="fr-FR" sz="800" dirty="0">
+                <a:solidFill>
+                  <a:schemeClr val="bg1"/>
+                </a:solidFill>
+              </a:rPr>
+              <a:t>#ceeff4</a:t>
+            </a:r>
+          </a:p>
+        </p:txBody>
+      </p:sp>
+      <p:sp>
+        <p:nvSpPr>
+          <p:cNvPr id="6" name="ZoneTexte 5">
+            <a:extLst>
+              <a:ext uri="{FF2B5EF4-FFF2-40B4-BE49-F238E27FC236}">
+                <a16:creationId xmlns:a16="http://schemas.microsoft.com/office/drawing/2014/main" id="{A466705A-B05E-F515-1739-101FDA6762E0}"/>
+              </a:ext>
+            </a:extLst>
+          </p:cNvPr>
+          <p:cNvSpPr txBox="1"/>
+          <p:nvPr/>
+        </p:nvSpPr>
+        <p:spPr>
+          <a:xfrm>
+            <a:off x="6769993" y="2100966"/>
+            <a:ext cx="587829" cy="215444"/>
+          </a:xfrm>
+          <a:prstGeom prst="rect">
+            <a:avLst/>
+          </a:prstGeom>
+          <a:noFill/>
+        </p:spPr>
+        <p:txBody>
+          <a:bodyPr wrap="square" rtlCol="0">
+            <a:spAutoFit/>
+          </a:bodyPr>
+          <a:lstStyle/>
+          <a:p>
+            <a:r>
+              <a:rPr lang="fr-FR" sz="800" dirty="0">
+                <a:solidFill>
+                  <a:schemeClr val="bg1"/>
+                </a:solidFill>
+              </a:rPr>
+              <a:t>#f59fbd</a:t>
+            </a:r>
+          </a:p>
+        </p:txBody>
+      </p:sp>
+      <p:sp>
+        <p:nvSpPr>
+          <p:cNvPr id="7" name="ZoneTexte 6">
+            <a:extLst>
+              <a:ext uri="{FF2B5EF4-FFF2-40B4-BE49-F238E27FC236}">
+                <a16:creationId xmlns:a16="http://schemas.microsoft.com/office/drawing/2014/main" id="{8B41E3E6-C2B7-F494-5C1E-43AEE6586EE7}"/>
+              </a:ext>
+            </a:extLst>
+          </p:cNvPr>
+          <p:cNvSpPr txBox="1"/>
+          <p:nvPr/>
+        </p:nvSpPr>
+        <p:spPr>
+          <a:xfrm>
+            <a:off x="6018095" y="2100966"/>
+            <a:ext cx="587829" cy="215444"/>
+          </a:xfrm>
+          <a:prstGeom prst="rect">
+            <a:avLst/>
+          </a:prstGeom>
+          <a:noFill/>
+        </p:spPr>
+        <p:txBody>
+          <a:bodyPr wrap="square" rtlCol="0">
+            <a:spAutoFit/>
+          </a:bodyPr>
+          <a:lstStyle/>
+          <a:p>
+            <a:r>
+              <a:rPr lang="fr-FR" sz="800" dirty="0">
+                <a:solidFill>
+                  <a:schemeClr val="bg1"/>
+                </a:solidFill>
+              </a:rPr>
+              <a:t>#f36d8f</a:t>
+            </a:r>
+          </a:p>
+        </p:txBody>
+      </p:sp>
+      <p:sp>
+        <p:nvSpPr>
+          <p:cNvPr id="8" name="ZoneTexte 7">
+            <a:extLst>
+              <a:ext uri="{FF2B5EF4-FFF2-40B4-BE49-F238E27FC236}">
+                <a16:creationId xmlns:a16="http://schemas.microsoft.com/office/drawing/2014/main" id="{1907888D-D91D-EF52-40D9-2D06AD1198A9}"/>
+              </a:ext>
+            </a:extLst>
+          </p:cNvPr>
+          <p:cNvSpPr txBox="1"/>
+          <p:nvPr/>
+        </p:nvSpPr>
+        <p:spPr>
+          <a:xfrm>
+            <a:off x="5294883" y="2100966"/>
+            <a:ext cx="641178" cy="215444"/>
+          </a:xfrm>
+          <a:prstGeom prst="rect">
+            <a:avLst/>
+          </a:prstGeom>
+          <a:noFill/>
+        </p:spPr>
+        <p:txBody>
+          <a:bodyPr wrap="square" rtlCol="0">
+            <a:spAutoFit/>
+          </a:bodyPr>
+          <a:lstStyle/>
+          <a:p>
+            <a:r>
+              <a:rPr lang="fr-FR" sz="800" dirty="0"/>
+              <a:t>#de2e4b</a:t>
+            </a:r>
+          </a:p>
+        </p:txBody>
+      </p:sp>
+      <p:sp>
+        <p:nvSpPr>
+          <p:cNvPr id="9" name="ZoneTexte 8">
+            <a:extLst>
+              <a:ext uri="{FF2B5EF4-FFF2-40B4-BE49-F238E27FC236}">
+                <a16:creationId xmlns:a16="http://schemas.microsoft.com/office/drawing/2014/main" id="{6502D781-8239-C6EB-BAF8-B6E39D0A4D39}"/>
+              </a:ext>
+            </a:extLst>
+          </p:cNvPr>
+          <p:cNvSpPr txBox="1"/>
+          <p:nvPr/>
+        </p:nvSpPr>
+        <p:spPr>
+          <a:xfrm>
+            <a:off x="4571999" y="2100966"/>
+            <a:ext cx="640849" cy="215444"/>
+          </a:xfrm>
+          <a:prstGeom prst="rect">
+            <a:avLst/>
+          </a:prstGeom>
+          <a:noFill/>
+        </p:spPr>
+        <p:txBody>
+          <a:bodyPr wrap="square" rtlCol="0">
+            <a:spAutoFit/>
+          </a:bodyPr>
+          <a:lstStyle/>
+          <a:p>
+            <a:r>
+              <a:rPr lang="fr-FR" sz="800" dirty="0"/>
+              <a:t>#650900</a:t>
+            </a:r>
+          </a:p>
+        </p:txBody>
+      </p:sp>
+    </p:spTree>
+    <p:extLst>
+      <p:ext uri="{BB962C8B-B14F-4D97-AF65-F5344CB8AC3E}">
+        <p14:creationId xmlns:p14="http://schemas.microsoft.com/office/powerpoint/2010/main" val="728227095"/>
+      </p:ext>
+    </p:extLst>
+  </p:cSld>
+  <p:clrMapOvr>
+    <a:masterClrMapping/>
+  </p:clrMapOvr>
+</p:sld>
+</file>
+
+<file path=ppt/slides/slide6.xml><?xml version="1.0" encoding="utf-8"?>
+<p:sld xmlns:a="http://schemas.openxmlformats.org/drawingml/2006/main" xmlns:r="http://schemas.openxmlformats.org/officeDocument/2006/relationships" xmlns:p="http://schemas.openxmlformats.org/presentationml/2006/main">
+  <p:cSld>
+    <p:spTree>
+      <p:nvGrpSpPr>
+        <p:cNvPr id="1" name=""/>
+        <p:cNvGrpSpPr/>
+        <p:nvPr/>
+      </p:nvGrpSpPr>
+      <p:grpSpPr>
+        <a:xfrm>
+          <a:off x="0" y="0"/>
+          <a:ext cx="0" cy="0"/>
+          <a:chOff x="0" y="0"/>
+          <a:chExt cx="0" cy="0"/>
+        </a:xfrm>
+      </p:grpSpPr>
+      <p:sp>
+        <p:nvSpPr>
+          <p:cNvPr id="3" name="Espace réservé du contenu 2">
+            <a:extLst>
+              <a:ext uri="{FF2B5EF4-FFF2-40B4-BE49-F238E27FC236}">
+                <a16:creationId xmlns:a16="http://schemas.microsoft.com/office/drawing/2014/main" id="{56C74CC0-09F7-DCA3-28E2-6B6EF2A5D4AD}"/>
+              </a:ext>
+            </a:extLst>
+          </p:cNvPr>
+          <p:cNvSpPr>
+            <a:spLocks noGrp="1"/>
+          </p:cNvSpPr>
+          <p:nvPr>
+            <p:ph idx="1"/>
+          </p:nvPr>
+        </p:nvSpPr>
+        <p:spPr>
+          <a:xfrm>
+            <a:off x="731713" y="-944033"/>
+            <a:ext cx="8534400" cy="3615267"/>
+          </a:xfrm>
+        </p:spPr>
+        <p:txBody>
+          <a:bodyPr/>
+          <a:lstStyle/>
+          <a:p>
+            <a:pPr marL="0" indent="0">
+              <a:buNone/>
+            </a:pPr>
+            <a:r>
+              <a:rPr lang="fr-FR" b="1" u="sng" dirty="0">
+                <a:solidFill>
+                  <a:srgbClr val="751515"/>
+                </a:solidFill>
+              </a:rPr>
+              <a:t>Site exemple: </a:t>
+            </a:r>
+          </a:p>
+          <a:p>
+            <a:pPr marL="0" indent="0">
+              <a:buNone/>
+            </a:pPr>
+            <a:r>
+              <a:rPr lang="fr-FR" dirty="0"/>
+              <a:t>			    - </a:t>
+            </a:r>
+            <a:r>
+              <a:rPr lang="fr-FR" dirty="0">
+                <a:hlinkClick r:id="rId2"/>
+              </a:rPr>
+              <a:t>https://jcocheril.wixsite.com/jacquescocheril</a:t>
+            </a:r>
+            <a:endParaRPr lang="fr-FR" dirty="0"/>
+          </a:p>
+          <a:p>
+            <a:pPr marL="0" indent="0">
+              <a:buNone/>
+            </a:pPr>
+            <a:r>
+              <a:rPr lang="fr-FR" dirty="0"/>
+              <a:t>			    - http://www.joannaflatau-leblog.com</a:t>
+            </a:r>
+          </a:p>
+        </p:txBody>
+      </p:sp>
+      <p:pic>
+        <p:nvPicPr>
+          <p:cNvPr id="4" name="Image 3">
+            <a:extLst>
+              <a:ext uri="{FF2B5EF4-FFF2-40B4-BE49-F238E27FC236}">
+                <a16:creationId xmlns:a16="http://schemas.microsoft.com/office/drawing/2014/main" id="{80EE0126-9534-3082-E0E5-1E5692A5F5C5}"/>
               </a:ext>
             </a:extLst>
           </p:cNvPr>
@@ -6807,8 +7100,38 @@
         </p:blipFill>
         <p:spPr>
           <a:xfrm>
-            <a:off x="4561692" y="1500874"/>
-            <a:ext cx="3500637" cy="815536"/>
+            <a:off x="1799110" y="2054121"/>
+            <a:ext cx="2968536" cy="3360715"/>
+          </a:xfrm>
+          <a:prstGeom prst="rect">
+            <a:avLst/>
+          </a:prstGeom>
+        </p:spPr>
+      </p:pic>
+      <p:pic>
+        <p:nvPicPr>
+          <p:cNvPr id="6" name="Image 5">
+            <a:extLst>
+              <a:ext uri="{FF2B5EF4-FFF2-40B4-BE49-F238E27FC236}">
+                <a16:creationId xmlns:a16="http://schemas.microsoft.com/office/drawing/2014/main" id="{34F6DB7B-F8E2-424A-A393-5A62181BC917}"/>
+              </a:ext>
+            </a:extLst>
+          </p:cNvPr>
+          <p:cNvPicPr>
+            <a:picLocks noChangeAspect="1"/>
+          </p:cNvPicPr>
+          <p:nvPr/>
+        </p:nvPicPr>
+        <p:blipFill>
+          <a:blip r:embed="rId4"/>
+          <a:stretch>
+            <a:fillRect/>
+          </a:stretch>
+        </p:blipFill>
+        <p:spPr>
+          <a:xfrm>
+            <a:off x="5985164" y="2095995"/>
+            <a:ext cx="3019774" cy="3360716"/>
           </a:xfrm>
           <a:prstGeom prst="rect">
             <a:avLst/>
@@ -6818,7 +7141,1395 @@
     </p:spTree>
     <p:extLst>
       <p:ext uri="{BB962C8B-B14F-4D97-AF65-F5344CB8AC3E}">
-        <p14:creationId xmlns:p14="http://schemas.microsoft.com/office/powerpoint/2010/main" val="728227095"/>
+        <p14:creationId xmlns:p14="http://schemas.microsoft.com/office/powerpoint/2010/main" val="1651569058"/>
+      </p:ext>
+    </p:extLst>
+  </p:cSld>
+  <p:clrMapOvr>
+    <a:masterClrMapping/>
+  </p:clrMapOvr>
+</p:sld>
+</file>
+
+<file path=ppt/slides/slide7.xml><?xml version="1.0" encoding="utf-8"?>
+<p:sld xmlns:a="http://schemas.openxmlformats.org/drawingml/2006/main" xmlns:r="http://schemas.openxmlformats.org/officeDocument/2006/relationships" xmlns:p="http://schemas.openxmlformats.org/presentationml/2006/main">
+  <p:cSld>
+    <p:spTree>
+      <p:nvGrpSpPr>
+        <p:cNvPr id="1" name=""/>
+        <p:cNvGrpSpPr/>
+        <p:nvPr/>
+      </p:nvGrpSpPr>
+      <p:grpSpPr>
+        <a:xfrm>
+          <a:off x="0" y="0"/>
+          <a:ext cx="0" cy="0"/>
+          <a:chOff x="0" y="0"/>
+          <a:chExt cx="0" cy="0"/>
+        </a:xfrm>
+      </p:grpSpPr>
+      <p:sp>
+        <p:nvSpPr>
+          <p:cNvPr id="3" name="Espace réservé du contenu 2">
+            <a:extLst>
+              <a:ext uri="{FF2B5EF4-FFF2-40B4-BE49-F238E27FC236}">
+                <a16:creationId xmlns:a16="http://schemas.microsoft.com/office/drawing/2014/main" id="{2F4828E4-7313-5F64-2274-5E5DC1C0E42B}"/>
+              </a:ext>
+            </a:extLst>
+          </p:cNvPr>
+          <p:cNvSpPr>
+            <a:spLocks noGrp="1"/>
+          </p:cNvSpPr>
+          <p:nvPr>
+            <p:ph idx="1"/>
+          </p:nvPr>
+        </p:nvSpPr>
+        <p:spPr/>
+        <p:txBody>
+          <a:bodyPr/>
+          <a:lstStyle/>
+          <a:p>
+            <a:r>
+              <a:rPr lang="fr-FR" b="1" u="sng" dirty="0">
+                <a:solidFill>
+                  <a:srgbClr val="751515"/>
+                </a:solidFill>
+              </a:rPr>
+              <a:t>Maquettage:</a:t>
+            </a:r>
+          </a:p>
+        </p:txBody>
+      </p:sp>
+    </p:spTree>
+    <p:extLst>
+      <p:ext uri="{BB962C8B-B14F-4D97-AF65-F5344CB8AC3E}">
+        <p14:creationId xmlns:p14="http://schemas.microsoft.com/office/powerpoint/2010/main" val="2417484879"/>
+      </p:ext>
+    </p:extLst>
+  </p:cSld>
+  <p:clrMapOvr>
+    <a:masterClrMapping/>
+  </p:clrMapOvr>
+</p:sld>
+</file>
+
+<file path=ppt/slides/slide8.xml><?xml version="1.0" encoding="utf-8"?>
+<p:sld xmlns:a="http://schemas.openxmlformats.org/drawingml/2006/main" xmlns:r="http://schemas.openxmlformats.org/officeDocument/2006/relationships" xmlns:p="http://schemas.openxmlformats.org/presentationml/2006/main">
+  <p:cSld>
+    <p:spTree>
+      <p:nvGrpSpPr>
+        <p:cNvPr id="1" name=""/>
+        <p:cNvGrpSpPr/>
+        <p:nvPr/>
+      </p:nvGrpSpPr>
+      <p:grpSpPr>
+        <a:xfrm>
+          <a:off x="0" y="0"/>
+          <a:ext cx="0" cy="0"/>
+          <a:chOff x="0" y="0"/>
+          <a:chExt cx="0" cy="0"/>
+        </a:xfrm>
+      </p:grpSpPr>
+      <p:sp>
+        <p:nvSpPr>
+          <p:cNvPr id="3" name="Espace réservé du contenu 2">
+            <a:extLst>
+              <a:ext uri="{FF2B5EF4-FFF2-40B4-BE49-F238E27FC236}">
+                <a16:creationId xmlns:a16="http://schemas.microsoft.com/office/drawing/2014/main" id="{B590736F-5B47-A1FD-002D-3878E229EC56}"/>
+              </a:ext>
+            </a:extLst>
+          </p:cNvPr>
+          <p:cNvSpPr>
+            <a:spLocks noGrp="1"/>
+          </p:cNvSpPr>
+          <p:nvPr>
+            <p:ph idx="1"/>
+          </p:nvPr>
+        </p:nvSpPr>
+        <p:spPr>
+          <a:xfrm>
+            <a:off x="387329" y="117318"/>
+            <a:ext cx="8534400" cy="3615267"/>
+          </a:xfrm>
+        </p:spPr>
+        <p:txBody>
+          <a:bodyPr/>
+          <a:lstStyle/>
+          <a:p>
+            <a:pPr marL="0" indent="0">
+              <a:buNone/>
+            </a:pPr>
+            <a:r>
+              <a:rPr lang="fr-FR" b="1" u="sng" dirty="0">
+                <a:solidFill>
+                  <a:srgbClr val="751515"/>
+                </a:solidFill>
+              </a:rPr>
+              <a:t>Les besoins:</a:t>
+            </a:r>
+          </a:p>
+          <a:p>
+            <a:pPr marL="457200" lvl="1" indent="0">
+              <a:buNone/>
+            </a:pPr>
+            <a:r>
+              <a:rPr lang="fr-FR" dirty="0"/>
+              <a:t>- Utilisation de Facebook pour l’instant.</a:t>
+            </a:r>
+          </a:p>
+          <a:p>
+            <a:pPr marL="457200" lvl="1" indent="0">
+              <a:buNone/>
+            </a:pPr>
+            <a:r>
+              <a:rPr lang="fr-FR" dirty="0"/>
+              <a:t>- Création d’un site type galerie de 3 pages: accueil, galerie, contact. </a:t>
+            </a:r>
+          </a:p>
+          <a:p>
+            <a:pPr marL="457200" lvl="1" indent="0">
+              <a:buNone/>
+            </a:pPr>
+            <a:r>
+              <a:rPr lang="fr-FR" dirty="0"/>
+              <a:t>- Sans Payments, pas de boutique.</a:t>
+            </a:r>
+          </a:p>
+          <a:p>
+            <a:pPr marL="457200" lvl="1" indent="0">
+              <a:buNone/>
+            </a:pPr>
+            <a:r>
+              <a:rPr lang="fr-FR" dirty="0"/>
+              <a:t>- pas de multilingue pour le moment.</a:t>
+            </a:r>
+          </a:p>
+          <a:p>
+            <a:pPr marL="457200" lvl="1" indent="0">
+              <a:buNone/>
+            </a:pPr>
+            <a:r>
+              <a:rPr lang="fr-FR" dirty="0"/>
+              <a:t>- le site doit pouvoir être utilisé sur smartphone.</a:t>
+            </a:r>
+          </a:p>
+          <a:p>
+            <a:pPr marL="457200" lvl="1" indent="0">
+              <a:buNone/>
+            </a:pPr>
+            <a:r>
+              <a:rPr lang="fr-FR" dirty="0"/>
+              <a:t>- mise en place de commentaires.</a:t>
+            </a:r>
+          </a:p>
+          <a:p>
+            <a:pPr lvl="1"/>
+            <a:endParaRPr lang="fr-FR" dirty="0"/>
+          </a:p>
+        </p:txBody>
+      </p:sp>
+      <p:grpSp>
+        <p:nvGrpSpPr>
+          <p:cNvPr id="18" name="Groupe 17">
+            <a:extLst>
+              <a:ext uri="{FF2B5EF4-FFF2-40B4-BE49-F238E27FC236}">
+                <a16:creationId xmlns:a16="http://schemas.microsoft.com/office/drawing/2014/main" id="{22AECB13-E3F0-645F-067C-7BF9DFEC2068}"/>
+              </a:ext>
+            </a:extLst>
+          </p:cNvPr>
+          <p:cNvGrpSpPr/>
+          <p:nvPr/>
+        </p:nvGrpSpPr>
+        <p:grpSpPr>
+          <a:xfrm>
+            <a:off x="3344285" y="3984171"/>
+            <a:ext cx="4568641" cy="2371106"/>
+            <a:chOff x="684212" y="4114800"/>
+            <a:chExt cx="4568641" cy="2371106"/>
+          </a:xfrm>
+        </p:grpSpPr>
+        <p:sp>
+          <p:nvSpPr>
+            <p:cNvPr id="4" name="Ellipse 3">
+              <a:extLst>
+                <a:ext uri="{FF2B5EF4-FFF2-40B4-BE49-F238E27FC236}">
+                  <a16:creationId xmlns:a16="http://schemas.microsoft.com/office/drawing/2014/main" id="{A04CAAF7-BCB3-E57F-F9EE-B7A82F382C87}"/>
+                </a:ext>
+              </a:extLst>
+            </p:cNvPr>
+            <p:cNvSpPr/>
+            <p:nvPr/>
+          </p:nvSpPr>
+          <p:spPr>
+            <a:xfrm>
+              <a:off x="684212" y="4114800"/>
+              <a:ext cx="1572100" cy="659081"/>
+            </a:xfrm>
+            <a:prstGeom prst="ellipse">
+              <a:avLst/>
+            </a:prstGeom>
+            <a:solidFill>
+              <a:schemeClr val="tx1"/>
+            </a:solidFill>
+          </p:spPr>
+          <p:style>
+            <a:lnRef idx="2">
+              <a:schemeClr val="accent1">
+                <a:shade val="50000"/>
+              </a:schemeClr>
+            </a:lnRef>
+            <a:fillRef idx="1">
+              <a:schemeClr val="accent1"/>
+            </a:fillRef>
+            <a:effectRef idx="0">
+              <a:schemeClr val="accent1"/>
+            </a:effectRef>
+            <a:fontRef idx="minor">
+              <a:schemeClr val="lt1"/>
+            </a:fontRef>
+          </p:style>
+          <p:txBody>
+            <a:bodyPr rtlCol="0" anchor="ctr"/>
+            <a:lstStyle/>
+            <a:p>
+              <a:pPr algn="ctr"/>
+              <a:r>
+                <a:rPr lang="fr-FR" sz="1600" dirty="0">
+                  <a:solidFill>
+                    <a:srgbClr val="751515"/>
+                  </a:solidFill>
+                </a:rPr>
+                <a:t>utilisateur</a:t>
+              </a:r>
+            </a:p>
+          </p:txBody>
+        </p:sp>
+        <p:sp>
+          <p:nvSpPr>
+            <p:cNvPr id="7" name="Ellipse 6">
+              <a:extLst>
+                <a:ext uri="{FF2B5EF4-FFF2-40B4-BE49-F238E27FC236}">
+                  <a16:creationId xmlns:a16="http://schemas.microsoft.com/office/drawing/2014/main" id="{6ECCEA1E-4866-6DF3-A533-F40A9A75F3C6}"/>
+                </a:ext>
+              </a:extLst>
+            </p:cNvPr>
+            <p:cNvSpPr/>
+            <p:nvPr/>
+          </p:nvSpPr>
+          <p:spPr>
+            <a:xfrm>
+              <a:off x="3680753" y="4127665"/>
+              <a:ext cx="1572100" cy="659081"/>
+            </a:xfrm>
+            <a:prstGeom prst="ellipse">
+              <a:avLst/>
+            </a:prstGeom>
+            <a:solidFill>
+              <a:schemeClr val="tx1"/>
+            </a:solidFill>
+          </p:spPr>
+          <p:style>
+            <a:lnRef idx="2">
+              <a:schemeClr val="accent1">
+                <a:shade val="50000"/>
+              </a:schemeClr>
+            </a:lnRef>
+            <a:fillRef idx="1">
+              <a:schemeClr val="accent1"/>
+            </a:fillRef>
+            <a:effectRef idx="0">
+              <a:schemeClr val="accent1"/>
+            </a:effectRef>
+            <a:fontRef idx="minor">
+              <a:schemeClr val="lt1"/>
+            </a:fontRef>
+          </p:style>
+          <p:txBody>
+            <a:bodyPr rtlCol="0" anchor="ctr"/>
+            <a:lstStyle/>
+            <a:p>
+              <a:pPr algn="ctr"/>
+              <a:endParaRPr lang="fr-FR"/>
+            </a:p>
+          </p:txBody>
+        </p:sp>
+        <p:sp>
+          <p:nvSpPr>
+            <p:cNvPr id="8" name="Ellipse 7">
+              <a:extLst>
+                <a:ext uri="{FF2B5EF4-FFF2-40B4-BE49-F238E27FC236}">
+                  <a16:creationId xmlns:a16="http://schemas.microsoft.com/office/drawing/2014/main" id="{FBB5C5F5-0972-9D07-F90C-0F9F98AAE31C}"/>
+                </a:ext>
+              </a:extLst>
+            </p:cNvPr>
+            <p:cNvSpPr/>
+            <p:nvPr/>
+          </p:nvSpPr>
+          <p:spPr>
+            <a:xfrm>
+              <a:off x="2036020" y="5021283"/>
+              <a:ext cx="1572100" cy="659081"/>
+            </a:xfrm>
+            <a:prstGeom prst="ellipse">
+              <a:avLst/>
+            </a:prstGeom>
+            <a:solidFill>
+              <a:schemeClr val="tx1"/>
+            </a:solidFill>
+          </p:spPr>
+          <p:style>
+            <a:lnRef idx="2">
+              <a:schemeClr val="accent1">
+                <a:shade val="50000"/>
+              </a:schemeClr>
+            </a:lnRef>
+            <a:fillRef idx="1">
+              <a:schemeClr val="accent1"/>
+            </a:fillRef>
+            <a:effectRef idx="0">
+              <a:schemeClr val="accent1"/>
+            </a:effectRef>
+            <a:fontRef idx="minor">
+              <a:schemeClr val="lt1"/>
+            </a:fontRef>
+          </p:style>
+          <p:txBody>
+            <a:bodyPr rtlCol="0" anchor="ctr"/>
+            <a:lstStyle/>
+            <a:p>
+              <a:pPr algn="ctr"/>
+              <a:endParaRPr lang="fr-FR"/>
+            </a:p>
+          </p:txBody>
+        </p:sp>
+        <p:sp>
+          <p:nvSpPr>
+            <p:cNvPr id="9" name="Organigramme : Terminateur 8">
+              <a:extLst>
+                <a:ext uri="{FF2B5EF4-FFF2-40B4-BE49-F238E27FC236}">
+                  <a16:creationId xmlns:a16="http://schemas.microsoft.com/office/drawing/2014/main" id="{CC83AE3F-FB84-2CDC-6343-12AED17BF5CF}"/>
+                </a:ext>
+              </a:extLst>
+            </p:cNvPr>
+            <p:cNvSpPr/>
+            <p:nvPr/>
+          </p:nvSpPr>
+          <p:spPr>
+            <a:xfrm>
+              <a:off x="1876301" y="5993080"/>
+              <a:ext cx="2020486" cy="492826"/>
+            </a:xfrm>
+            <a:prstGeom prst="flowChartTerminator">
+              <a:avLst/>
+            </a:prstGeom>
+            <a:solidFill>
+              <a:schemeClr val="tx1"/>
+            </a:solidFill>
+          </p:spPr>
+          <p:style>
+            <a:lnRef idx="2">
+              <a:schemeClr val="accent1">
+                <a:shade val="50000"/>
+              </a:schemeClr>
+            </a:lnRef>
+            <a:fillRef idx="1">
+              <a:schemeClr val="accent1"/>
+            </a:fillRef>
+            <a:effectRef idx="0">
+              <a:schemeClr val="accent1"/>
+            </a:effectRef>
+            <a:fontRef idx="minor">
+              <a:schemeClr val="lt1"/>
+            </a:fontRef>
+          </p:style>
+          <p:txBody>
+            <a:bodyPr rtlCol="0" anchor="ctr"/>
+            <a:lstStyle/>
+            <a:p>
+              <a:pPr algn="ctr"/>
+              <a:endParaRPr lang="fr-FR"/>
+            </a:p>
+          </p:txBody>
+        </p:sp>
+        <p:sp>
+          <p:nvSpPr>
+            <p:cNvPr id="12" name="Forme libre : forme 11">
+              <a:extLst>
+                <a:ext uri="{FF2B5EF4-FFF2-40B4-BE49-F238E27FC236}">
+                  <a16:creationId xmlns:a16="http://schemas.microsoft.com/office/drawing/2014/main" id="{F3A0C2CF-6930-6FEE-D286-3B52B90089F3}"/>
+                </a:ext>
+              </a:extLst>
+            </p:cNvPr>
+            <p:cNvSpPr/>
+            <p:nvPr/>
+          </p:nvSpPr>
+          <p:spPr>
+            <a:xfrm>
+              <a:off x="1787236" y="4756068"/>
+              <a:ext cx="2327564" cy="446852"/>
+            </a:xfrm>
+            <a:custGeom>
+              <a:avLst/>
+              <a:gdLst>
+                <a:gd name="connsiteX0" fmla="*/ 0 w 2327564"/>
+                <a:gd name="connsiteY0" fmla="*/ 0 h 446852"/>
+                <a:gd name="connsiteX1" fmla="*/ 11876 w 2327564"/>
+                <a:gd name="connsiteY1" fmla="*/ 95002 h 446852"/>
+                <a:gd name="connsiteX2" fmla="*/ 17813 w 2327564"/>
+                <a:gd name="connsiteY2" fmla="*/ 112815 h 446852"/>
+                <a:gd name="connsiteX3" fmla="*/ 35626 w 2327564"/>
+                <a:gd name="connsiteY3" fmla="*/ 142503 h 446852"/>
+                <a:gd name="connsiteX4" fmla="*/ 41564 w 2327564"/>
+                <a:gd name="connsiteY4" fmla="*/ 160316 h 446852"/>
+                <a:gd name="connsiteX5" fmla="*/ 53439 w 2327564"/>
+                <a:gd name="connsiteY5" fmla="*/ 172192 h 446852"/>
+                <a:gd name="connsiteX6" fmla="*/ 65315 w 2327564"/>
+                <a:gd name="connsiteY6" fmla="*/ 195942 h 446852"/>
+                <a:gd name="connsiteX7" fmla="*/ 118754 w 2327564"/>
+                <a:gd name="connsiteY7" fmla="*/ 261257 h 446852"/>
+                <a:gd name="connsiteX8" fmla="*/ 219694 w 2327564"/>
+                <a:gd name="connsiteY8" fmla="*/ 326571 h 446852"/>
+                <a:gd name="connsiteX9" fmla="*/ 391886 w 2327564"/>
+                <a:gd name="connsiteY9" fmla="*/ 380010 h 446852"/>
+                <a:gd name="connsiteX10" fmla="*/ 415637 w 2327564"/>
+                <a:gd name="connsiteY10" fmla="*/ 385948 h 446852"/>
+                <a:gd name="connsiteX11" fmla="*/ 486889 w 2327564"/>
+                <a:gd name="connsiteY11" fmla="*/ 397823 h 446852"/>
+                <a:gd name="connsiteX12" fmla="*/ 587829 w 2327564"/>
+                <a:gd name="connsiteY12" fmla="*/ 409698 h 446852"/>
+                <a:gd name="connsiteX13" fmla="*/ 831273 w 2327564"/>
+                <a:gd name="connsiteY13" fmla="*/ 421574 h 446852"/>
+                <a:gd name="connsiteX14" fmla="*/ 932213 w 2327564"/>
+                <a:gd name="connsiteY14" fmla="*/ 427511 h 446852"/>
+                <a:gd name="connsiteX15" fmla="*/ 1383476 w 2327564"/>
+                <a:gd name="connsiteY15" fmla="*/ 433449 h 446852"/>
+                <a:gd name="connsiteX16" fmla="*/ 1436915 w 2327564"/>
+                <a:gd name="connsiteY16" fmla="*/ 421574 h 446852"/>
+                <a:gd name="connsiteX17" fmla="*/ 1502229 w 2327564"/>
+                <a:gd name="connsiteY17" fmla="*/ 409698 h 446852"/>
+                <a:gd name="connsiteX18" fmla="*/ 1644733 w 2327564"/>
+                <a:gd name="connsiteY18" fmla="*/ 362197 h 446852"/>
+                <a:gd name="connsiteX19" fmla="*/ 1692234 w 2327564"/>
+                <a:gd name="connsiteY19" fmla="*/ 350322 h 446852"/>
+                <a:gd name="connsiteX20" fmla="*/ 1769424 w 2327564"/>
+                <a:gd name="connsiteY20" fmla="*/ 320633 h 446852"/>
+                <a:gd name="connsiteX21" fmla="*/ 1900052 w 2327564"/>
+                <a:gd name="connsiteY21" fmla="*/ 290945 h 446852"/>
+                <a:gd name="connsiteX22" fmla="*/ 1947554 w 2327564"/>
+                <a:gd name="connsiteY22" fmla="*/ 285007 h 446852"/>
+                <a:gd name="connsiteX23" fmla="*/ 2072245 w 2327564"/>
+                <a:gd name="connsiteY23" fmla="*/ 231568 h 446852"/>
+                <a:gd name="connsiteX24" fmla="*/ 2125683 w 2327564"/>
+                <a:gd name="connsiteY24" fmla="*/ 207818 h 446852"/>
+                <a:gd name="connsiteX25" fmla="*/ 2208811 w 2327564"/>
+                <a:gd name="connsiteY25" fmla="*/ 154379 h 446852"/>
+                <a:gd name="connsiteX26" fmla="*/ 2238499 w 2327564"/>
+                <a:gd name="connsiteY26" fmla="*/ 118753 h 446852"/>
+                <a:gd name="connsiteX27" fmla="*/ 2250374 w 2327564"/>
+                <a:gd name="connsiteY27" fmla="*/ 106877 h 446852"/>
+                <a:gd name="connsiteX28" fmla="*/ 2262250 w 2327564"/>
+                <a:gd name="connsiteY28" fmla="*/ 89064 h 446852"/>
+                <a:gd name="connsiteX29" fmla="*/ 2280063 w 2327564"/>
+                <a:gd name="connsiteY29" fmla="*/ 77189 h 446852"/>
+                <a:gd name="connsiteX30" fmla="*/ 2297876 w 2327564"/>
+                <a:gd name="connsiteY30" fmla="*/ 59376 h 446852"/>
+                <a:gd name="connsiteX31" fmla="*/ 2315689 w 2327564"/>
+                <a:gd name="connsiteY31" fmla="*/ 29688 h 446852"/>
+                <a:gd name="connsiteX32" fmla="*/ 2327564 w 2327564"/>
+                <a:gd name="connsiteY32" fmla="*/ 5937 h 446852"/>
+              </a:gdLst>
+              <a:ahLst/>
+              <a:cxnLst>
+                <a:cxn ang="0">
+                  <a:pos x="connsiteX0" y="connsiteY0"/>
+                </a:cxn>
+                <a:cxn ang="0">
+                  <a:pos x="connsiteX1" y="connsiteY1"/>
+                </a:cxn>
+                <a:cxn ang="0">
+                  <a:pos x="connsiteX2" y="connsiteY2"/>
+                </a:cxn>
+                <a:cxn ang="0">
+                  <a:pos x="connsiteX3" y="connsiteY3"/>
+                </a:cxn>
+                <a:cxn ang="0">
+                  <a:pos x="connsiteX4" y="connsiteY4"/>
+                </a:cxn>
+                <a:cxn ang="0">
+                  <a:pos x="connsiteX5" y="connsiteY5"/>
+                </a:cxn>
+                <a:cxn ang="0">
+                  <a:pos x="connsiteX6" y="connsiteY6"/>
+                </a:cxn>
+                <a:cxn ang="0">
+                  <a:pos x="connsiteX7" y="connsiteY7"/>
+                </a:cxn>
+                <a:cxn ang="0">
+                  <a:pos x="connsiteX8" y="connsiteY8"/>
+                </a:cxn>
+                <a:cxn ang="0">
+                  <a:pos x="connsiteX9" y="connsiteY9"/>
+                </a:cxn>
+                <a:cxn ang="0">
+                  <a:pos x="connsiteX10" y="connsiteY10"/>
+                </a:cxn>
+                <a:cxn ang="0">
+                  <a:pos x="connsiteX11" y="connsiteY11"/>
+                </a:cxn>
+                <a:cxn ang="0">
+                  <a:pos x="connsiteX12" y="connsiteY12"/>
+                </a:cxn>
+                <a:cxn ang="0">
+                  <a:pos x="connsiteX13" y="connsiteY13"/>
+                </a:cxn>
+                <a:cxn ang="0">
+                  <a:pos x="connsiteX14" y="connsiteY14"/>
+                </a:cxn>
+                <a:cxn ang="0">
+                  <a:pos x="connsiteX15" y="connsiteY15"/>
+                </a:cxn>
+                <a:cxn ang="0">
+                  <a:pos x="connsiteX16" y="connsiteY16"/>
+                </a:cxn>
+                <a:cxn ang="0">
+                  <a:pos x="connsiteX17" y="connsiteY17"/>
+                </a:cxn>
+                <a:cxn ang="0">
+                  <a:pos x="connsiteX18" y="connsiteY18"/>
+                </a:cxn>
+                <a:cxn ang="0">
+                  <a:pos x="connsiteX19" y="connsiteY19"/>
+                </a:cxn>
+                <a:cxn ang="0">
+                  <a:pos x="connsiteX20" y="connsiteY20"/>
+                </a:cxn>
+                <a:cxn ang="0">
+                  <a:pos x="connsiteX21" y="connsiteY21"/>
+                </a:cxn>
+                <a:cxn ang="0">
+                  <a:pos x="connsiteX22" y="connsiteY22"/>
+                </a:cxn>
+                <a:cxn ang="0">
+                  <a:pos x="connsiteX23" y="connsiteY23"/>
+                </a:cxn>
+                <a:cxn ang="0">
+                  <a:pos x="connsiteX24" y="connsiteY24"/>
+                </a:cxn>
+                <a:cxn ang="0">
+                  <a:pos x="connsiteX25" y="connsiteY25"/>
+                </a:cxn>
+                <a:cxn ang="0">
+                  <a:pos x="connsiteX26" y="connsiteY26"/>
+                </a:cxn>
+                <a:cxn ang="0">
+                  <a:pos x="connsiteX27" y="connsiteY27"/>
+                </a:cxn>
+                <a:cxn ang="0">
+                  <a:pos x="connsiteX28" y="connsiteY28"/>
+                </a:cxn>
+                <a:cxn ang="0">
+                  <a:pos x="connsiteX29" y="connsiteY29"/>
+                </a:cxn>
+                <a:cxn ang="0">
+                  <a:pos x="connsiteX30" y="connsiteY30"/>
+                </a:cxn>
+                <a:cxn ang="0">
+                  <a:pos x="connsiteX31" y="connsiteY31"/>
+                </a:cxn>
+                <a:cxn ang="0">
+                  <a:pos x="connsiteX32" y="connsiteY32"/>
+                </a:cxn>
+              </a:cxnLst>
+              <a:rect l="l" t="t" r="r" b="b"/>
+              <a:pathLst>
+                <a:path w="2327564" h="446852">
+                  <a:moveTo>
+                    <a:pt x="0" y="0"/>
+                  </a:moveTo>
+                  <a:cubicBezTo>
+                    <a:pt x="3959" y="31667"/>
+                    <a:pt x="6899" y="63479"/>
+                    <a:pt x="11876" y="95002"/>
+                  </a:cubicBezTo>
+                  <a:cubicBezTo>
+                    <a:pt x="12852" y="101184"/>
+                    <a:pt x="15014" y="107217"/>
+                    <a:pt x="17813" y="112815"/>
+                  </a:cubicBezTo>
+                  <a:cubicBezTo>
+                    <a:pt x="22974" y="123137"/>
+                    <a:pt x="30465" y="132181"/>
+                    <a:pt x="35626" y="142503"/>
+                  </a:cubicBezTo>
+                  <a:cubicBezTo>
+                    <a:pt x="38425" y="148101"/>
+                    <a:pt x="38344" y="154949"/>
+                    <a:pt x="41564" y="160316"/>
+                  </a:cubicBezTo>
+                  <a:cubicBezTo>
+                    <a:pt x="44444" y="165116"/>
+                    <a:pt x="50334" y="167534"/>
+                    <a:pt x="53439" y="172192"/>
+                  </a:cubicBezTo>
+                  <a:cubicBezTo>
+                    <a:pt x="58349" y="179557"/>
+                    <a:pt x="60405" y="188577"/>
+                    <a:pt x="65315" y="195942"/>
+                  </a:cubicBezTo>
+                  <a:cubicBezTo>
+                    <a:pt x="74878" y="210286"/>
+                    <a:pt x="100141" y="246366"/>
+                    <a:pt x="118754" y="261257"/>
+                  </a:cubicBezTo>
+                  <a:cubicBezTo>
+                    <a:pt x="136835" y="275722"/>
+                    <a:pt x="203015" y="321011"/>
+                    <a:pt x="219694" y="326571"/>
+                  </a:cubicBezTo>
+                  <a:cubicBezTo>
+                    <a:pt x="449958" y="403325"/>
+                    <a:pt x="297341" y="358999"/>
+                    <a:pt x="391886" y="380010"/>
+                  </a:cubicBezTo>
+                  <a:cubicBezTo>
+                    <a:pt x="399852" y="381780"/>
+                    <a:pt x="407616" y="384444"/>
+                    <a:pt x="415637" y="385948"/>
+                  </a:cubicBezTo>
+                  <a:cubicBezTo>
+                    <a:pt x="439303" y="390385"/>
+                    <a:pt x="463105" y="394068"/>
+                    <a:pt x="486889" y="397823"/>
+                  </a:cubicBezTo>
+                  <a:cubicBezTo>
+                    <a:pt x="517422" y="402644"/>
+                    <a:pt x="558190" y="407955"/>
+                    <a:pt x="587829" y="409698"/>
+                  </a:cubicBezTo>
+                  <a:cubicBezTo>
+                    <a:pt x="668933" y="414469"/>
+                    <a:pt x="750137" y="417377"/>
+                    <a:pt x="831273" y="421574"/>
+                  </a:cubicBezTo>
+                  <a:lnTo>
+                    <a:pt x="932213" y="427511"/>
+                  </a:lnTo>
+                  <a:cubicBezTo>
+                    <a:pt x="1121641" y="456655"/>
+                    <a:pt x="1036154" y="447921"/>
+                    <a:pt x="1383476" y="433449"/>
+                  </a:cubicBezTo>
+                  <a:cubicBezTo>
+                    <a:pt x="1401708" y="432689"/>
+                    <a:pt x="1419022" y="425153"/>
+                    <a:pt x="1436915" y="421574"/>
+                  </a:cubicBezTo>
+                  <a:cubicBezTo>
+                    <a:pt x="1458614" y="417234"/>
+                    <a:pt x="1480458" y="413657"/>
+                    <a:pt x="1502229" y="409698"/>
+                  </a:cubicBezTo>
+                  <a:cubicBezTo>
+                    <a:pt x="1563775" y="383321"/>
+                    <a:pt x="1557845" y="383919"/>
+                    <a:pt x="1644733" y="362197"/>
+                  </a:cubicBezTo>
+                  <a:cubicBezTo>
+                    <a:pt x="1660567" y="358239"/>
+                    <a:pt x="1676751" y="355483"/>
+                    <a:pt x="1692234" y="350322"/>
+                  </a:cubicBezTo>
+                  <a:cubicBezTo>
+                    <a:pt x="1718387" y="341604"/>
+                    <a:pt x="1742680" y="327319"/>
+                    <a:pt x="1769424" y="320633"/>
+                  </a:cubicBezTo>
+                  <a:cubicBezTo>
+                    <a:pt x="1817240" y="308679"/>
+                    <a:pt x="1848153" y="300381"/>
+                    <a:pt x="1900052" y="290945"/>
+                  </a:cubicBezTo>
+                  <a:cubicBezTo>
+                    <a:pt x="1915752" y="288090"/>
+                    <a:pt x="1931720" y="286986"/>
+                    <a:pt x="1947554" y="285007"/>
+                  </a:cubicBezTo>
+                  <a:cubicBezTo>
+                    <a:pt x="2126292" y="213512"/>
+                    <a:pt x="1975903" y="276527"/>
+                    <a:pt x="2072245" y="231568"/>
+                  </a:cubicBezTo>
+                  <a:cubicBezTo>
+                    <a:pt x="2089909" y="223325"/>
+                    <a:pt x="2108434" y="216897"/>
+                    <a:pt x="2125683" y="207818"/>
+                  </a:cubicBezTo>
+                  <a:cubicBezTo>
+                    <a:pt x="2150527" y="194742"/>
+                    <a:pt x="2185039" y="174189"/>
+                    <a:pt x="2208811" y="154379"/>
+                  </a:cubicBezTo>
+                  <a:cubicBezTo>
+                    <a:pt x="2223455" y="142175"/>
+                    <a:pt x="2224801" y="135191"/>
+                    <a:pt x="2238499" y="118753"/>
+                  </a:cubicBezTo>
+                  <a:cubicBezTo>
+                    <a:pt x="2242083" y="114452"/>
+                    <a:pt x="2246877" y="111248"/>
+                    <a:pt x="2250374" y="106877"/>
+                  </a:cubicBezTo>
+                  <a:cubicBezTo>
+                    <a:pt x="2254832" y="101304"/>
+                    <a:pt x="2257204" y="94110"/>
+                    <a:pt x="2262250" y="89064"/>
+                  </a:cubicBezTo>
+                  <a:cubicBezTo>
+                    <a:pt x="2267296" y="84018"/>
+                    <a:pt x="2274581" y="81757"/>
+                    <a:pt x="2280063" y="77189"/>
+                  </a:cubicBezTo>
+                  <a:cubicBezTo>
+                    <a:pt x="2286514" y="71813"/>
+                    <a:pt x="2291938" y="65314"/>
+                    <a:pt x="2297876" y="59376"/>
+                  </a:cubicBezTo>
+                  <a:cubicBezTo>
+                    <a:pt x="2311658" y="18027"/>
+                    <a:pt x="2293954" y="62290"/>
+                    <a:pt x="2315689" y="29688"/>
+                  </a:cubicBezTo>
+                  <a:cubicBezTo>
+                    <a:pt x="2320599" y="22323"/>
+                    <a:pt x="2327564" y="5937"/>
+                    <a:pt x="2327564" y="5937"/>
+                  </a:cubicBezTo>
+                </a:path>
+              </a:pathLst>
+            </a:custGeom>
+            <a:noFill/>
+          </p:spPr>
+          <p:style>
+            <a:lnRef idx="2">
+              <a:schemeClr val="accent1">
+                <a:shade val="50000"/>
+              </a:schemeClr>
+            </a:lnRef>
+            <a:fillRef idx="1">
+              <a:schemeClr val="accent1"/>
+            </a:fillRef>
+            <a:effectRef idx="0">
+              <a:schemeClr val="accent1"/>
+            </a:effectRef>
+            <a:fontRef idx="minor">
+              <a:schemeClr val="lt1"/>
+            </a:fontRef>
+          </p:style>
+          <p:txBody>
+            <a:bodyPr rtlCol="0" anchor="ctr"/>
+            <a:lstStyle/>
+            <a:p>
+              <a:pPr algn="ctr"/>
+              <a:endParaRPr lang="fr-FR" dirty="0"/>
+            </a:p>
+          </p:txBody>
+        </p:sp>
+        <p:sp>
+          <p:nvSpPr>
+            <p:cNvPr id="13" name="Forme libre : forme 12">
+              <a:extLst>
+                <a:ext uri="{FF2B5EF4-FFF2-40B4-BE49-F238E27FC236}">
+                  <a16:creationId xmlns:a16="http://schemas.microsoft.com/office/drawing/2014/main" id="{FA9FF1DE-4FE5-308E-0EDD-263FFC181F4A}"/>
+                </a:ext>
+              </a:extLst>
+            </p:cNvPr>
+            <p:cNvSpPr/>
+            <p:nvPr/>
+          </p:nvSpPr>
+          <p:spPr>
+            <a:xfrm>
+              <a:off x="3657600" y="5041075"/>
+              <a:ext cx="255319" cy="955964"/>
+            </a:xfrm>
+            <a:custGeom>
+              <a:avLst/>
+              <a:gdLst>
+                <a:gd name="connsiteX0" fmla="*/ 136566 w 255319"/>
+                <a:gd name="connsiteY0" fmla="*/ 0 h 955964"/>
+                <a:gd name="connsiteX1" fmla="*/ 178130 w 255319"/>
+                <a:gd name="connsiteY1" fmla="*/ 65315 h 955964"/>
+                <a:gd name="connsiteX2" fmla="*/ 190005 w 255319"/>
+                <a:gd name="connsiteY2" fmla="*/ 83128 h 955964"/>
+                <a:gd name="connsiteX3" fmla="*/ 225631 w 255319"/>
+                <a:gd name="connsiteY3" fmla="*/ 154380 h 955964"/>
+                <a:gd name="connsiteX4" fmla="*/ 237506 w 255319"/>
+                <a:gd name="connsiteY4" fmla="*/ 178130 h 955964"/>
+                <a:gd name="connsiteX5" fmla="*/ 255319 w 255319"/>
+                <a:gd name="connsiteY5" fmla="*/ 249382 h 955964"/>
+                <a:gd name="connsiteX6" fmla="*/ 243444 w 255319"/>
+                <a:gd name="connsiteY6" fmla="*/ 480951 h 955964"/>
+                <a:gd name="connsiteX7" fmla="*/ 243444 w 255319"/>
+                <a:gd name="connsiteY7" fmla="*/ 552203 h 955964"/>
+                <a:gd name="connsiteX8" fmla="*/ 195943 w 255319"/>
+                <a:gd name="connsiteY8" fmla="*/ 653143 h 955964"/>
+                <a:gd name="connsiteX9" fmla="*/ 178130 w 255319"/>
+                <a:gd name="connsiteY9" fmla="*/ 688769 h 955964"/>
+                <a:gd name="connsiteX10" fmla="*/ 166255 w 255319"/>
+                <a:gd name="connsiteY10" fmla="*/ 706582 h 955964"/>
+                <a:gd name="connsiteX11" fmla="*/ 154379 w 255319"/>
+                <a:gd name="connsiteY11" fmla="*/ 730333 h 955964"/>
+                <a:gd name="connsiteX12" fmla="*/ 130629 w 255319"/>
+                <a:gd name="connsiteY12" fmla="*/ 754083 h 955964"/>
+                <a:gd name="connsiteX13" fmla="*/ 106878 w 255319"/>
+                <a:gd name="connsiteY13" fmla="*/ 801585 h 955964"/>
+                <a:gd name="connsiteX14" fmla="*/ 95003 w 255319"/>
+                <a:gd name="connsiteY14" fmla="*/ 825335 h 955964"/>
+                <a:gd name="connsiteX15" fmla="*/ 71252 w 255319"/>
+                <a:gd name="connsiteY15" fmla="*/ 849086 h 955964"/>
+                <a:gd name="connsiteX16" fmla="*/ 35626 w 255319"/>
+                <a:gd name="connsiteY16" fmla="*/ 902525 h 955964"/>
+                <a:gd name="connsiteX17" fmla="*/ 29688 w 255319"/>
+                <a:gd name="connsiteY17" fmla="*/ 920338 h 955964"/>
+                <a:gd name="connsiteX18" fmla="*/ 0 w 255319"/>
+                <a:gd name="connsiteY18" fmla="*/ 955964 h 955964"/>
+              </a:gdLst>
+              <a:ahLst/>
+              <a:cxnLst>
+                <a:cxn ang="0">
+                  <a:pos x="connsiteX0" y="connsiteY0"/>
+                </a:cxn>
+                <a:cxn ang="0">
+                  <a:pos x="connsiteX1" y="connsiteY1"/>
+                </a:cxn>
+                <a:cxn ang="0">
+                  <a:pos x="connsiteX2" y="connsiteY2"/>
+                </a:cxn>
+                <a:cxn ang="0">
+                  <a:pos x="connsiteX3" y="connsiteY3"/>
+                </a:cxn>
+                <a:cxn ang="0">
+                  <a:pos x="connsiteX4" y="connsiteY4"/>
+                </a:cxn>
+                <a:cxn ang="0">
+                  <a:pos x="connsiteX5" y="connsiteY5"/>
+                </a:cxn>
+                <a:cxn ang="0">
+                  <a:pos x="connsiteX6" y="connsiteY6"/>
+                </a:cxn>
+                <a:cxn ang="0">
+                  <a:pos x="connsiteX7" y="connsiteY7"/>
+                </a:cxn>
+                <a:cxn ang="0">
+                  <a:pos x="connsiteX8" y="connsiteY8"/>
+                </a:cxn>
+                <a:cxn ang="0">
+                  <a:pos x="connsiteX9" y="connsiteY9"/>
+                </a:cxn>
+                <a:cxn ang="0">
+                  <a:pos x="connsiteX10" y="connsiteY10"/>
+                </a:cxn>
+                <a:cxn ang="0">
+                  <a:pos x="connsiteX11" y="connsiteY11"/>
+                </a:cxn>
+                <a:cxn ang="0">
+                  <a:pos x="connsiteX12" y="connsiteY12"/>
+                </a:cxn>
+                <a:cxn ang="0">
+                  <a:pos x="connsiteX13" y="connsiteY13"/>
+                </a:cxn>
+                <a:cxn ang="0">
+                  <a:pos x="connsiteX14" y="connsiteY14"/>
+                </a:cxn>
+                <a:cxn ang="0">
+                  <a:pos x="connsiteX15" y="connsiteY15"/>
+                </a:cxn>
+                <a:cxn ang="0">
+                  <a:pos x="connsiteX16" y="connsiteY16"/>
+                </a:cxn>
+                <a:cxn ang="0">
+                  <a:pos x="connsiteX17" y="connsiteY17"/>
+                </a:cxn>
+                <a:cxn ang="0">
+                  <a:pos x="connsiteX18" y="connsiteY18"/>
+                </a:cxn>
+              </a:cxnLst>
+              <a:rect l="l" t="t" r="r" b="b"/>
+              <a:pathLst>
+                <a:path w="255319" h="955964">
+                  <a:moveTo>
+                    <a:pt x="136566" y="0"/>
+                  </a:moveTo>
+                  <a:cubicBezTo>
+                    <a:pt x="186041" y="49475"/>
+                    <a:pt x="152049" y="6631"/>
+                    <a:pt x="178130" y="65315"/>
+                  </a:cubicBezTo>
+                  <a:cubicBezTo>
+                    <a:pt x="181028" y="71836"/>
+                    <a:pt x="186647" y="76831"/>
+                    <a:pt x="190005" y="83128"/>
+                  </a:cubicBezTo>
+                  <a:cubicBezTo>
+                    <a:pt x="202501" y="106558"/>
+                    <a:pt x="213756" y="130629"/>
+                    <a:pt x="225631" y="154380"/>
+                  </a:cubicBezTo>
+                  <a:cubicBezTo>
+                    <a:pt x="229589" y="162297"/>
+                    <a:pt x="235074" y="169619"/>
+                    <a:pt x="237506" y="178130"/>
+                  </a:cubicBezTo>
+                  <a:cubicBezTo>
+                    <a:pt x="252155" y="229398"/>
+                    <a:pt x="246556" y="205565"/>
+                    <a:pt x="255319" y="249382"/>
+                  </a:cubicBezTo>
+                  <a:cubicBezTo>
+                    <a:pt x="251361" y="326572"/>
+                    <a:pt x="248702" y="403839"/>
+                    <a:pt x="243444" y="480951"/>
+                  </a:cubicBezTo>
+                  <a:cubicBezTo>
+                    <a:pt x="238635" y="551480"/>
+                    <a:pt x="230706" y="463043"/>
+                    <a:pt x="243444" y="552203"/>
+                  </a:cubicBezTo>
+                  <a:cubicBezTo>
+                    <a:pt x="216914" y="614106"/>
+                    <a:pt x="232372" y="580285"/>
+                    <a:pt x="195943" y="653143"/>
+                  </a:cubicBezTo>
+                  <a:cubicBezTo>
+                    <a:pt x="190005" y="665018"/>
+                    <a:pt x="185495" y="677722"/>
+                    <a:pt x="178130" y="688769"/>
+                  </a:cubicBezTo>
+                  <a:cubicBezTo>
+                    <a:pt x="174172" y="694707"/>
+                    <a:pt x="169796" y="700386"/>
+                    <a:pt x="166255" y="706582"/>
+                  </a:cubicBezTo>
+                  <a:cubicBezTo>
+                    <a:pt x="161863" y="714267"/>
+                    <a:pt x="159690" y="723252"/>
+                    <a:pt x="154379" y="730333"/>
+                  </a:cubicBezTo>
+                  <a:cubicBezTo>
+                    <a:pt x="147661" y="739290"/>
+                    <a:pt x="138546" y="746166"/>
+                    <a:pt x="130629" y="754083"/>
+                  </a:cubicBezTo>
+                  <a:cubicBezTo>
+                    <a:pt x="119774" y="786647"/>
+                    <a:pt x="130248" y="759518"/>
+                    <a:pt x="106878" y="801585"/>
+                  </a:cubicBezTo>
+                  <a:cubicBezTo>
+                    <a:pt x="102580" y="809322"/>
+                    <a:pt x="100314" y="818254"/>
+                    <a:pt x="95003" y="825335"/>
+                  </a:cubicBezTo>
+                  <a:cubicBezTo>
+                    <a:pt x="88285" y="834292"/>
+                    <a:pt x="79169" y="841169"/>
+                    <a:pt x="71252" y="849086"/>
+                  </a:cubicBezTo>
+                  <a:cubicBezTo>
+                    <a:pt x="35822" y="919949"/>
+                    <a:pt x="90517" y="814701"/>
+                    <a:pt x="35626" y="902525"/>
+                  </a:cubicBezTo>
+                  <a:cubicBezTo>
+                    <a:pt x="32309" y="907832"/>
+                    <a:pt x="32793" y="914904"/>
+                    <a:pt x="29688" y="920338"/>
+                  </a:cubicBezTo>
+                  <a:cubicBezTo>
+                    <a:pt x="20278" y="936806"/>
+                    <a:pt x="12220" y="943744"/>
+                    <a:pt x="0" y="955964"/>
+                  </a:cubicBezTo>
+                </a:path>
+              </a:pathLst>
+            </a:custGeom>
+            <a:noFill/>
+          </p:spPr>
+          <p:style>
+            <a:lnRef idx="2">
+              <a:schemeClr val="accent1">
+                <a:shade val="50000"/>
+              </a:schemeClr>
+            </a:lnRef>
+            <a:fillRef idx="1">
+              <a:schemeClr val="accent1"/>
+            </a:fillRef>
+            <a:effectRef idx="0">
+              <a:schemeClr val="accent1"/>
+            </a:effectRef>
+            <a:fontRef idx="minor">
+              <a:schemeClr val="lt1"/>
+            </a:fontRef>
+          </p:style>
+          <p:txBody>
+            <a:bodyPr rtlCol="0" anchor="ctr"/>
+            <a:lstStyle/>
+            <a:p>
+              <a:pPr algn="ctr"/>
+              <a:endParaRPr lang="fr-FR"/>
+            </a:p>
+          </p:txBody>
+        </p:sp>
+        <p:sp>
+          <p:nvSpPr>
+            <p:cNvPr id="14" name="ZoneTexte 13">
+              <a:extLst>
+                <a:ext uri="{FF2B5EF4-FFF2-40B4-BE49-F238E27FC236}">
+                  <a16:creationId xmlns:a16="http://schemas.microsoft.com/office/drawing/2014/main" id="{5BC6BA37-D4BC-FDA3-077F-C30AF2F85E76}"/>
+                </a:ext>
+              </a:extLst>
+            </p:cNvPr>
+            <p:cNvSpPr txBox="1"/>
+            <p:nvPr/>
+          </p:nvSpPr>
+          <p:spPr>
+            <a:xfrm>
+              <a:off x="2352995" y="5241747"/>
+              <a:ext cx="2113808" cy="276999"/>
+            </a:xfrm>
+            <a:prstGeom prst="rect">
+              <a:avLst/>
+            </a:prstGeom>
+            <a:noFill/>
+          </p:spPr>
+          <p:txBody>
+            <a:bodyPr wrap="square" rtlCol="0">
+              <a:spAutoFit/>
+            </a:bodyPr>
+            <a:lstStyle/>
+            <a:p>
+              <a:r>
+                <a:rPr lang="fr-FR" sz="1200" dirty="0">
+                  <a:solidFill>
+                    <a:srgbClr val="751515"/>
+                  </a:solidFill>
+                </a:rPr>
+                <a:t>Site internet</a:t>
+              </a:r>
+            </a:p>
+          </p:txBody>
+        </p:sp>
+        <p:sp>
+          <p:nvSpPr>
+            <p:cNvPr id="16" name="ZoneTexte 15">
+              <a:extLst>
+                <a:ext uri="{FF2B5EF4-FFF2-40B4-BE49-F238E27FC236}">
+                  <a16:creationId xmlns:a16="http://schemas.microsoft.com/office/drawing/2014/main" id="{B30C8A59-DB3D-8126-CD45-A808EFD7B80E}"/>
+                </a:ext>
+              </a:extLst>
+            </p:cNvPr>
+            <p:cNvSpPr txBox="1"/>
+            <p:nvPr/>
+          </p:nvSpPr>
+          <p:spPr>
+            <a:xfrm>
+              <a:off x="2448688" y="6088778"/>
+              <a:ext cx="2464130" cy="276999"/>
+            </a:xfrm>
+            <a:prstGeom prst="rect">
+              <a:avLst/>
+            </a:prstGeom>
+            <a:noFill/>
+          </p:spPr>
+          <p:txBody>
+            <a:bodyPr wrap="square" rtlCol="0">
+              <a:spAutoFit/>
+            </a:bodyPr>
+            <a:lstStyle/>
+            <a:p>
+              <a:r>
+                <a:rPr lang="fr-FR" sz="1200" dirty="0">
+                  <a:solidFill>
+                    <a:srgbClr val="751515"/>
+                  </a:solidFill>
+                </a:rPr>
+                <a:t>Découvrir</a:t>
+              </a:r>
+            </a:p>
+          </p:txBody>
+        </p:sp>
+      </p:grpSp>
+      <p:sp>
+        <p:nvSpPr>
+          <p:cNvPr id="15" name="ZoneTexte 14">
+            <a:extLst>
+              <a:ext uri="{FF2B5EF4-FFF2-40B4-BE49-F238E27FC236}">
+                <a16:creationId xmlns:a16="http://schemas.microsoft.com/office/drawing/2014/main" id="{59B0855F-15E4-91F6-49B0-2C3682EC5764}"/>
+              </a:ext>
+            </a:extLst>
+          </p:cNvPr>
+          <p:cNvSpPr txBox="1"/>
+          <p:nvPr/>
+        </p:nvSpPr>
+        <p:spPr>
+          <a:xfrm>
+            <a:off x="6688777" y="4166306"/>
+            <a:ext cx="2048494" cy="276999"/>
+          </a:xfrm>
+          <a:prstGeom prst="rect">
+            <a:avLst/>
+          </a:prstGeom>
+          <a:noFill/>
+        </p:spPr>
+        <p:txBody>
+          <a:bodyPr wrap="square" rtlCol="0">
+            <a:spAutoFit/>
+          </a:bodyPr>
+          <a:lstStyle/>
+          <a:p>
+            <a:r>
+              <a:rPr lang="fr-FR" sz="1200" dirty="0">
+                <a:solidFill>
+                  <a:srgbClr val="751515"/>
+                </a:solidFill>
+              </a:rPr>
+              <a:t>Tableaux</a:t>
+            </a:r>
+          </a:p>
+        </p:txBody>
+      </p:sp>
+    </p:spTree>
+    <p:extLst>
+      <p:ext uri="{BB962C8B-B14F-4D97-AF65-F5344CB8AC3E}">
+        <p14:creationId xmlns:p14="http://schemas.microsoft.com/office/powerpoint/2010/main" val="1828321080"/>
+      </p:ext>
+    </p:extLst>
+  </p:cSld>
+  <p:clrMapOvr>
+    <a:masterClrMapping/>
+  </p:clrMapOvr>
+</p:sld>
+</file>
+
+<file path=ppt/slides/slide9.xml><?xml version="1.0" encoding="utf-8"?>
+<p:sld xmlns:a="http://schemas.openxmlformats.org/drawingml/2006/main" xmlns:r="http://schemas.openxmlformats.org/officeDocument/2006/relationships" xmlns:p="http://schemas.openxmlformats.org/presentationml/2006/main">
+  <p:cSld>
+    <p:spTree>
+      <p:nvGrpSpPr>
+        <p:cNvPr id="1" name=""/>
+        <p:cNvGrpSpPr/>
+        <p:nvPr/>
+      </p:nvGrpSpPr>
+      <p:grpSpPr>
+        <a:xfrm>
+          <a:off x="0" y="0"/>
+          <a:ext cx="0" cy="0"/>
+          <a:chOff x="0" y="0"/>
+          <a:chExt cx="0" cy="0"/>
+        </a:xfrm>
+      </p:grpSpPr>
+      <p:sp>
+        <p:nvSpPr>
+          <p:cNvPr id="6" name="ZoneTexte 5">
+            <a:extLst>
+              <a:ext uri="{FF2B5EF4-FFF2-40B4-BE49-F238E27FC236}">
+                <a16:creationId xmlns:a16="http://schemas.microsoft.com/office/drawing/2014/main" id="{C547E21B-BCB9-D52B-C5AB-7AC538003AD4}"/>
+              </a:ext>
+            </a:extLst>
+          </p:cNvPr>
+          <p:cNvSpPr txBox="1"/>
+          <p:nvPr/>
+        </p:nvSpPr>
+        <p:spPr>
+          <a:xfrm>
+            <a:off x="1050966" y="611579"/>
+            <a:ext cx="9429008" cy="2031325"/>
+          </a:xfrm>
+          <a:prstGeom prst="rect">
+            <a:avLst/>
+          </a:prstGeom>
+          <a:noFill/>
+        </p:spPr>
+        <p:txBody>
+          <a:bodyPr wrap="square" rtlCol="0">
+            <a:spAutoFit/>
+          </a:bodyPr>
+          <a:lstStyle/>
+          <a:p>
+            <a:r>
+              <a:rPr lang="fr-FR" b="1" u="sng" dirty="0">
+                <a:solidFill>
+                  <a:srgbClr val="751515"/>
+                </a:solidFill>
+              </a:rPr>
+              <a:t>Les contraintes:</a:t>
+            </a:r>
+          </a:p>
+          <a:p>
+            <a:pPr lvl="1"/>
+            <a:r>
+              <a:rPr lang="fr-FR" dirty="0"/>
+              <a:t>- Présence d’un </a:t>
+            </a:r>
+            <a:r>
+              <a:rPr lang="fr-FR" dirty="0" err="1"/>
+              <a:t>slider</a:t>
+            </a:r>
+            <a:r>
+              <a:rPr lang="fr-FR" dirty="0"/>
+              <a:t> pour visionner les tableaux.</a:t>
+            </a:r>
+          </a:p>
+          <a:p>
+            <a:pPr lvl="1"/>
+            <a:r>
+              <a:rPr lang="fr-FR" dirty="0"/>
+              <a:t>- Développer une base de données pour les commentaires et les tableaux.</a:t>
+            </a:r>
+          </a:p>
+          <a:p>
+            <a:pPr lvl="1"/>
+            <a:r>
+              <a:rPr lang="fr-FR" dirty="0"/>
+              <a:t>- Utilisation du HTML/CSS, JavaScript, MySQL.</a:t>
+            </a:r>
+          </a:p>
+          <a:p>
+            <a:pPr lvl="1"/>
+            <a:r>
+              <a:rPr lang="fr-FR" dirty="0"/>
+              <a:t>- Assurer la maintenance, l’hébergement du site.</a:t>
+            </a:r>
+          </a:p>
+          <a:p>
+            <a:pPr lvl="1"/>
+            <a:r>
+              <a:rPr lang="fr-FR" dirty="0"/>
+              <a:t>- Petite formation pour l’ajout des tableaux.</a:t>
+            </a:r>
+          </a:p>
+          <a:p>
+            <a:endParaRPr lang="fr-FR" dirty="0"/>
+          </a:p>
+        </p:txBody>
+      </p:sp>
+      <p:sp>
+        <p:nvSpPr>
+          <p:cNvPr id="7" name="ZoneTexte 6">
+            <a:extLst>
+              <a:ext uri="{FF2B5EF4-FFF2-40B4-BE49-F238E27FC236}">
+                <a16:creationId xmlns:a16="http://schemas.microsoft.com/office/drawing/2014/main" id="{57C6970D-45B3-E42A-42FC-07A833CD706F}"/>
+              </a:ext>
+            </a:extLst>
+          </p:cNvPr>
+          <p:cNvSpPr txBox="1"/>
+          <p:nvPr/>
+        </p:nvSpPr>
+        <p:spPr>
+          <a:xfrm>
+            <a:off x="1050966" y="2642904"/>
+            <a:ext cx="9619013" cy="1200329"/>
+          </a:xfrm>
+          <a:prstGeom prst="rect">
+            <a:avLst/>
+          </a:prstGeom>
+          <a:noFill/>
+        </p:spPr>
+        <p:txBody>
+          <a:bodyPr wrap="square" rtlCol="0">
+            <a:spAutoFit/>
+          </a:bodyPr>
+          <a:lstStyle/>
+          <a:p>
+            <a:r>
+              <a:rPr lang="fr-FR" b="1" u="sng" dirty="0">
+                <a:solidFill>
+                  <a:srgbClr val="751515"/>
+                </a:solidFill>
+              </a:rPr>
+              <a:t>Les contraintes légales:</a:t>
+            </a:r>
+          </a:p>
+          <a:p>
+            <a:r>
+              <a:rPr lang="fr-FR" dirty="0"/>
+              <a:t>	- Propriétaires du site Mr Soulier.</a:t>
+            </a:r>
+          </a:p>
+          <a:p>
+            <a:r>
+              <a:rPr lang="fr-FR" dirty="0"/>
+              <a:t>	- Maquettage, intégrations ainsi que le code source appartiennent à Mr Pierrot.</a:t>
+            </a:r>
+          </a:p>
+          <a:p>
+            <a:r>
+              <a:rPr lang="fr-FR" dirty="0"/>
+              <a:t>	</a:t>
+            </a:r>
+          </a:p>
+        </p:txBody>
+      </p:sp>
+      <p:sp>
+        <p:nvSpPr>
+          <p:cNvPr id="8" name="ZoneTexte 7">
+            <a:extLst>
+              <a:ext uri="{FF2B5EF4-FFF2-40B4-BE49-F238E27FC236}">
+                <a16:creationId xmlns:a16="http://schemas.microsoft.com/office/drawing/2014/main" id="{D50139A6-F1AF-17F1-F1DF-8CEF331330BB}"/>
+              </a:ext>
+            </a:extLst>
+          </p:cNvPr>
+          <p:cNvSpPr txBox="1"/>
+          <p:nvPr/>
+        </p:nvSpPr>
+        <p:spPr>
+          <a:xfrm>
+            <a:off x="1050966" y="4138551"/>
+            <a:ext cx="9909959" cy="1477328"/>
+          </a:xfrm>
+          <a:prstGeom prst="rect">
+            <a:avLst/>
+          </a:prstGeom>
+          <a:noFill/>
+        </p:spPr>
+        <p:txBody>
+          <a:bodyPr wrap="square" rtlCol="0">
+            <a:spAutoFit/>
+          </a:bodyPr>
+          <a:lstStyle/>
+          <a:p>
+            <a:r>
+              <a:rPr lang="fr-FR" b="1" u="sng" dirty="0">
+                <a:solidFill>
+                  <a:srgbClr val="751515"/>
+                </a:solidFill>
+              </a:rPr>
+              <a:t>Les coûts et délais:</a:t>
+            </a:r>
+          </a:p>
+          <a:p>
+            <a:r>
+              <a:rPr lang="fr-FR" dirty="0"/>
+              <a:t>	- Sites offert soit un gain de 150 euros/jour/développeur pour 10 jours.</a:t>
+            </a:r>
+          </a:p>
+          <a:p>
+            <a:r>
+              <a:rPr lang="fr-FR" dirty="0"/>
+              <a:t>	  comprenant le cahier des charges, le maquettage, la création d’un logo, la 	  	      	  création du site, la création de la base de données, la mise en ligne.</a:t>
+            </a:r>
+          </a:p>
+          <a:p>
+            <a:r>
+              <a:rPr lang="fr-FR" dirty="0"/>
+              <a:t>	- Livraisons prévu le 03 juillet 2023.</a:t>
+            </a:r>
+          </a:p>
+        </p:txBody>
+      </p:sp>
+    </p:spTree>
+    <p:extLst>
+      <p:ext uri="{BB962C8B-B14F-4D97-AF65-F5344CB8AC3E}">
+        <p14:creationId xmlns:p14="http://schemas.microsoft.com/office/powerpoint/2010/main" val="1279676495"/>
       </p:ext>
     </p:extLst>
   </p:cSld>

</xml_diff>

<commit_message>
fin du maquettage mis dans le CDC
</commit_message>
<xml_diff>
--- a/CDC/L_artiste.pptx
+++ b/CDC/L_artiste.pptx
@@ -5,7 +5,7 @@
     <p:sldMasterId id="2147483648" r:id="rId1"/>
   </p:sldMasterIdLst>
   <p:notesMasterIdLst>
-    <p:notesMasterId r:id="rId12"/>
+    <p:notesMasterId r:id="rId18"/>
   </p:notesMasterIdLst>
   <p:sldIdLst>
     <p:sldId id="256" r:id="rId2"/>
@@ -14,10 +14,16 @@
     <p:sldId id="259" r:id="rId5"/>
     <p:sldId id="260" r:id="rId6"/>
     <p:sldId id="261" r:id="rId7"/>
-    <p:sldId id="262" r:id="rId8"/>
-    <p:sldId id="263" r:id="rId9"/>
-    <p:sldId id="264" r:id="rId10"/>
-    <p:sldId id="265" r:id="rId11"/>
+    <p:sldId id="263" r:id="rId8"/>
+    <p:sldId id="262" r:id="rId9"/>
+    <p:sldId id="266" r:id="rId10"/>
+    <p:sldId id="267" r:id="rId11"/>
+    <p:sldId id="269" r:id="rId12"/>
+    <p:sldId id="268" r:id="rId13"/>
+    <p:sldId id="270" r:id="rId14"/>
+    <p:sldId id="272" r:id="rId15"/>
+    <p:sldId id="264" r:id="rId16"/>
+    <p:sldId id="265" r:id="rId17"/>
   </p:sldIdLst>
   <p:sldSz cx="12192000" cy="6858000"/>
   <p:notesSz cx="6858000" cy="9144000"/>
@@ -127,8 +133,14 @@
             <p14:sldId id="259"/>
             <p14:sldId id="260"/>
             <p14:sldId id="261"/>
+            <p14:sldId id="263"/>
             <p14:sldId id="262"/>
-            <p14:sldId id="263"/>
+            <p14:sldId id="266"/>
+            <p14:sldId id="267"/>
+            <p14:sldId id="269"/>
+            <p14:sldId id="268"/>
+            <p14:sldId id="270"/>
+            <p14:sldId id="272"/>
             <p14:sldId id="264"/>
             <p14:sldId id="265"/>
           </p14:sldIdLst>
@@ -227,7 +239,7 @@
           <a:p>
             <a:fld id="{CE3F9B10-F744-47E1-871E-98B3AC9B3E4F}" type="datetimeFigureOut">
               <a:rPr lang="fr-FR" smtClean="0"/>
-              <a:t>02/01/2023</a:t>
+              <a:t>31/01/2023</a:t>
             </a:fld>
             <a:endParaRPr lang="fr-FR"/>
           </a:p>
@@ -639,7 +651,7 @@
             <a:fld id="{B61BEF0D-F0BB-DE4B-95CE-6DB70DBA9567}" type="datetimeFigureOut">
               <a:rPr lang="en-US" dirty="0"/>
               <a:pPr/>
-              <a:t>1/2/2023</a:t>
+              <a:t>1/31/2023</a:t>
             </a:fld>
             <a:endParaRPr lang="en-US" dirty="0"/>
           </a:p>
@@ -1072,7 +1084,7 @@
             <a:fld id="{B61BEF0D-F0BB-DE4B-95CE-6DB70DBA9567}" type="datetimeFigureOut">
               <a:rPr lang="en-US" dirty="0"/>
               <a:pPr/>
-              <a:t>1/2/2023</a:t>
+              <a:t>1/31/2023</a:t>
             </a:fld>
             <a:endParaRPr lang="en-US" dirty="0"/>
           </a:p>
@@ -1319,7 +1331,7 @@
             <a:fld id="{B61BEF0D-F0BB-DE4B-95CE-6DB70DBA9567}" type="datetimeFigureOut">
               <a:rPr lang="en-US" dirty="0"/>
               <a:pPr/>
-              <a:t>1/2/2023</a:t>
+              <a:t>1/31/2023</a:t>
             </a:fld>
             <a:endParaRPr lang="en-US" dirty="0"/>
           </a:p>
@@ -1624,7 +1636,7 @@
             <a:fld id="{B61BEF0D-F0BB-DE4B-95CE-6DB70DBA9567}" type="datetimeFigureOut">
               <a:rPr lang="en-US" dirty="0"/>
               <a:pPr/>
-              <a:t>1/2/2023</a:t>
+              <a:t>1/31/2023</a:t>
             </a:fld>
             <a:endParaRPr lang="en-US" dirty="0"/>
           </a:p>
@@ -1939,7 +1951,7 @@
             <a:fld id="{B61BEF0D-F0BB-DE4B-95CE-6DB70DBA9567}" type="datetimeFigureOut">
               <a:rPr lang="en-US" dirty="0"/>
               <a:pPr/>
-              <a:t>1/2/2023</a:t>
+              <a:t>1/31/2023</a:t>
             </a:fld>
             <a:endParaRPr lang="en-US" dirty="0"/>
           </a:p>
@@ -2238,7 +2250,7 @@
             <a:fld id="{B61BEF0D-F0BB-DE4B-95CE-6DB70DBA9567}" type="datetimeFigureOut">
               <a:rPr lang="en-US" dirty="0"/>
               <a:pPr/>
-              <a:t>1/2/2023</a:t>
+              <a:t>1/31/2023</a:t>
             </a:fld>
             <a:endParaRPr lang="en-US" dirty="0"/>
           </a:p>
@@ -2602,7 +2614,7 @@
             <a:fld id="{B61BEF0D-F0BB-DE4B-95CE-6DB70DBA9567}" type="datetimeFigureOut">
               <a:rPr lang="en-US" dirty="0"/>
               <a:pPr/>
-              <a:t>1/2/2023</a:t>
+              <a:t>1/31/2023</a:t>
             </a:fld>
             <a:endParaRPr lang="en-US" dirty="0"/>
           </a:p>
@@ -2773,7 +2785,7 @@
             <a:fld id="{B61BEF0D-F0BB-DE4B-95CE-6DB70DBA9567}" type="datetimeFigureOut">
               <a:rPr lang="en-US" dirty="0"/>
               <a:pPr/>
-              <a:t>1/2/2023</a:t>
+              <a:t>1/31/2023</a:t>
             </a:fld>
             <a:endParaRPr lang="en-US" dirty="0"/>
           </a:p>
@@ -2950,7 +2962,7 @@
             <a:fld id="{B61BEF0D-F0BB-DE4B-95CE-6DB70DBA9567}" type="datetimeFigureOut">
               <a:rPr lang="en-US" dirty="0"/>
               <a:pPr/>
-              <a:t>1/2/2023</a:t>
+              <a:t>1/31/2023</a:t>
             </a:fld>
             <a:endParaRPr lang="en-US" dirty="0"/>
           </a:p>
@@ -3117,7 +3129,7 @@
             <a:fld id="{B61BEF0D-F0BB-DE4B-95CE-6DB70DBA9567}" type="datetimeFigureOut">
               <a:rPr lang="en-US" dirty="0"/>
               <a:pPr/>
-              <a:t>1/2/2023</a:t>
+              <a:t>1/31/2023</a:t>
             </a:fld>
             <a:endParaRPr lang="en-US" dirty="0"/>
           </a:p>
@@ -3364,7 +3376,7 @@
             <a:fld id="{B61BEF0D-F0BB-DE4B-95CE-6DB70DBA9567}" type="datetimeFigureOut">
               <a:rPr lang="en-US" dirty="0"/>
               <a:pPr/>
-              <a:t>1/2/2023</a:t>
+              <a:t>1/31/2023</a:t>
             </a:fld>
             <a:endParaRPr lang="en-US" dirty="0"/>
           </a:p>
@@ -3597,7 +3609,7 @@
             <a:fld id="{B61BEF0D-F0BB-DE4B-95CE-6DB70DBA9567}" type="datetimeFigureOut">
               <a:rPr lang="en-US" dirty="0"/>
               <a:pPr/>
-              <a:t>1/2/2023</a:t>
+              <a:t>1/31/2023</a:t>
             </a:fld>
             <a:endParaRPr lang="en-US" dirty="0"/>
           </a:p>
@@ -3976,7 +3988,7 @@
             <a:fld id="{B61BEF0D-F0BB-DE4B-95CE-6DB70DBA9567}" type="datetimeFigureOut">
               <a:rPr lang="en-US" dirty="0"/>
               <a:pPr/>
-              <a:t>1/2/2023</a:t>
+              <a:t>1/31/2023</a:t>
             </a:fld>
             <a:endParaRPr lang="en-US" dirty="0"/>
           </a:p>
@@ -4091,7 +4103,7 @@
             <a:fld id="{B61BEF0D-F0BB-DE4B-95CE-6DB70DBA9567}" type="datetimeFigureOut">
               <a:rPr lang="en-US" dirty="0"/>
               <a:pPr/>
-              <a:t>1/2/2023</a:t>
+              <a:t>1/31/2023</a:t>
             </a:fld>
             <a:endParaRPr lang="en-US" dirty="0"/>
           </a:p>
@@ -4183,7 +4195,7 @@
             <a:fld id="{B61BEF0D-F0BB-DE4B-95CE-6DB70DBA9567}" type="datetimeFigureOut">
               <a:rPr lang="en-US" dirty="0"/>
               <a:pPr/>
-              <a:t>1/2/2023</a:t>
+              <a:t>1/31/2023</a:t>
             </a:fld>
             <a:endParaRPr lang="en-US" dirty="0"/>
           </a:p>
@@ -4435,7 +4447,7 @@
             <a:fld id="{B61BEF0D-F0BB-DE4B-95CE-6DB70DBA9567}" type="datetimeFigureOut">
               <a:rPr lang="en-US" dirty="0"/>
               <a:pPr/>
-              <a:t>1/2/2023</a:t>
+              <a:t>1/31/2023</a:t>
             </a:fld>
             <a:endParaRPr lang="en-US" dirty="0"/>
           </a:p>
@@ -4715,7 +4727,7 @@
             <a:fld id="{B61BEF0D-F0BB-DE4B-95CE-6DB70DBA9567}" type="datetimeFigureOut">
               <a:rPr lang="en-US" dirty="0"/>
               <a:pPr/>
-              <a:t>1/2/2023</a:t>
+              <a:t>1/31/2023</a:t>
             </a:fld>
             <a:endParaRPr lang="en-US" dirty="0"/>
           </a:p>
@@ -5118,7 +5130,7 @@
             <a:fld id="{B61BEF0D-F0BB-DE4B-95CE-6DB70DBA9567}" type="datetimeFigureOut">
               <a:rPr lang="en-US" dirty="0"/>
               <a:pPr/>
-              <a:t>1/2/2023</a:t>
+              <a:t>1/31/2023</a:t>
             </a:fld>
             <a:endParaRPr lang="en-US" dirty="0"/>
           </a:p>
@@ -5803,10 +5815,890 @@
   <p:clrMapOvr>
     <a:masterClrMapping/>
   </p:clrMapOvr>
+  <p:timing>
+    <p:tnLst>
+      <p:par>
+        <p:cTn id="1" dur="indefinite" restart="never" nodeType="tmRoot">
+          <p:childTnLst>
+            <p:seq concurrent="1" nextAc="seek">
+              <p:cTn id="2" dur="indefinite" nodeType="mainSeq">
+                <p:childTnLst>
+                  <p:par>
+                    <p:cTn id="3" fill="hold">
+                      <p:stCondLst>
+                        <p:cond delay="indefinite"/>
+                      </p:stCondLst>
+                      <p:childTnLst>
+                        <p:par>
+                          <p:cTn id="4" fill="hold">
+                            <p:stCondLst>
+                              <p:cond delay="0"/>
+                            </p:stCondLst>
+                            <p:childTnLst>
+                              <p:par>
+                                <p:cTn id="5" presetID="2" presetClass="entr" presetSubtype="4" fill="hold" grpId="0" nodeType="clickEffect">
+                                  <p:stCondLst>
+                                    <p:cond delay="0"/>
+                                  </p:stCondLst>
+                                  <p:childTnLst>
+                                    <p:set>
+                                      <p:cBhvr>
+                                        <p:cTn id="6" dur="1" fill="hold">
+                                          <p:stCondLst>
+                                            <p:cond delay="0"/>
+                                          </p:stCondLst>
+                                        </p:cTn>
+                                        <p:tgtEl>
+                                          <p:spTgt spid="2"/>
+                                        </p:tgtEl>
+                                        <p:attrNameLst>
+                                          <p:attrName>style.visibility</p:attrName>
+                                        </p:attrNameLst>
+                                      </p:cBhvr>
+                                      <p:to>
+                                        <p:strVal val="visible"/>
+                                      </p:to>
+                                    </p:set>
+                                    <p:anim calcmode="lin" valueType="num">
+                                      <p:cBhvr additive="base">
+                                        <p:cTn id="7" dur="500" fill="hold"/>
+                                        <p:tgtEl>
+                                          <p:spTgt spid="2"/>
+                                        </p:tgtEl>
+                                        <p:attrNameLst>
+                                          <p:attrName>ppt_x</p:attrName>
+                                        </p:attrNameLst>
+                                      </p:cBhvr>
+                                      <p:tavLst>
+                                        <p:tav tm="0">
+                                          <p:val>
+                                            <p:strVal val="#ppt_x"/>
+                                          </p:val>
+                                        </p:tav>
+                                        <p:tav tm="100000">
+                                          <p:val>
+                                            <p:strVal val="#ppt_x"/>
+                                          </p:val>
+                                        </p:tav>
+                                      </p:tavLst>
+                                    </p:anim>
+                                    <p:anim calcmode="lin" valueType="num">
+                                      <p:cBhvr additive="base">
+                                        <p:cTn id="8" dur="500" fill="hold"/>
+                                        <p:tgtEl>
+                                          <p:spTgt spid="2"/>
+                                        </p:tgtEl>
+                                        <p:attrNameLst>
+                                          <p:attrName>ppt_y</p:attrName>
+                                        </p:attrNameLst>
+                                      </p:cBhvr>
+                                      <p:tavLst>
+                                        <p:tav tm="0">
+                                          <p:val>
+                                            <p:strVal val="1+#ppt_h/2"/>
+                                          </p:val>
+                                        </p:tav>
+                                        <p:tav tm="100000">
+                                          <p:val>
+                                            <p:strVal val="#ppt_y"/>
+                                          </p:val>
+                                        </p:tav>
+                                      </p:tavLst>
+                                    </p:anim>
+                                  </p:childTnLst>
+                                </p:cTn>
+                              </p:par>
+                            </p:childTnLst>
+                          </p:cTn>
+                        </p:par>
+                      </p:childTnLst>
+                    </p:cTn>
+                  </p:par>
+                </p:childTnLst>
+              </p:cTn>
+              <p:prevCondLst>
+                <p:cond evt="onPrev" delay="0">
+                  <p:tgtEl>
+                    <p:sldTgt/>
+                  </p:tgtEl>
+                </p:cond>
+              </p:prevCondLst>
+              <p:nextCondLst>
+                <p:cond evt="onNext" delay="0">
+                  <p:tgtEl>
+                    <p:sldTgt/>
+                  </p:tgtEl>
+                </p:cond>
+              </p:nextCondLst>
+            </p:seq>
+          </p:childTnLst>
+        </p:cTn>
+      </p:par>
+    </p:tnLst>
+    <p:bldLst>
+      <p:bldP spid="2" grpId="0"/>
+    </p:bldLst>
+  </p:timing>
 </p:sld>
 </file>
 
 <file path=ppt/slides/slide10.xml><?xml version="1.0" encoding="utf-8"?>
+<p:sld xmlns:a="http://schemas.openxmlformats.org/drawingml/2006/main" xmlns:r="http://schemas.openxmlformats.org/officeDocument/2006/relationships" xmlns:p="http://schemas.openxmlformats.org/presentationml/2006/main">
+  <p:cSld>
+    <p:spTree>
+      <p:nvGrpSpPr>
+        <p:cNvPr id="1" name=""/>
+        <p:cNvGrpSpPr/>
+        <p:nvPr/>
+      </p:nvGrpSpPr>
+      <p:grpSpPr>
+        <a:xfrm>
+          <a:off x="0" y="0"/>
+          <a:ext cx="0" cy="0"/>
+          <a:chOff x="0" y="0"/>
+          <a:chExt cx="0" cy="0"/>
+        </a:xfrm>
+      </p:grpSpPr>
+      <p:sp>
+        <p:nvSpPr>
+          <p:cNvPr id="4" name="ZoneTexte 3">
+            <a:extLst>
+              <a:ext uri="{FF2B5EF4-FFF2-40B4-BE49-F238E27FC236}">
+                <a16:creationId xmlns:a16="http://schemas.microsoft.com/office/drawing/2014/main" id="{BF487348-3258-C35F-0B1E-CAFCD6147FBB}"/>
+              </a:ext>
+            </a:extLst>
+          </p:cNvPr>
+          <p:cNvSpPr txBox="1"/>
+          <p:nvPr/>
+        </p:nvSpPr>
+        <p:spPr>
+          <a:xfrm>
+            <a:off x="457200" y="138223"/>
+            <a:ext cx="2445488" cy="400110"/>
+          </a:xfrm>
+          <a:prstGeom prst="rect">
+            <a:avLst/>
+          </a:prstGeom>
+          <a:noFill/>
+        </p:spPr>
+        <p:txBody>
+          <a:bodyPr wrap="square" rtlCol="0">
+            <a:spAutoFit/>
+          </a:bodyPr>
+          <a:lstStyle/>
+          <a:p>
+            <a:r>
+              <a:rPr lang="fr-FR" sz="2000" b="1" u="sng" dirty="0">
+                <a:solidFill>
+                  <a:srgbClr val="8F1919"/>
+                </a:solidFill>
+              </a:rPr>
+              <a:t>Wireframe:</a:t>
+            </a:r>
+          </a:p>
+        </p:txBody>
+      </p:sp>
+      <p:pic>
+        <p:nvPicPr>
+          <p:cNvPr id="6" name="Image 5">
+            <a:extLst>
+              <a:ext uri="{FF2B5EF4-FFF2-40B4-BE49-F238E27FC236}">
+                <a16:creationId xmlns:a16="http://schemas.microsoft.com/office/drawing/2014/main" id="{C114E8BF-6FCD-B5D3-AE95-0F2BF9E812C8}"/>
+              </a:ext>
+            </a:extLst>
+          </p:cNvPr>
+          <p:cNvPicPr>
+            <a:picLocks noChangeAspect="1"/>
+          </p:cNvPicPr>
+          <p:nvPr/>
+        </p:nvPicPr>
+        <p:blipFill>
+          <a:blip r:embed="rId2"/>
+          <a:stretch>
+            <a:fillRect/>
+          </a:stretch>
+        </p:blipFill>
+        <p:spPr>
+          <a:xfrm>
+            <a:off x="1127050" y="645062"/>
+            <a:ext cx="9803219" cy="5645434"/>
+          </a:xfrm>
+          <a:prstGeom prst="rect">
+            <a:avLst/>
+          </a:prstGeom>
+        </p:spPr>
+      </p:pic>
+    </p:spTree>
+    <p:extLst>
+      <p:ext uri="{BB962C8B-B14F-4D97-AF65-F5344CB8AC3E}">
+        <p14:creationId xmlns:p14="http://schemas.microsoft.com/office/powerpoint/2010/main" val="859062340"/>
+      </p:ext>
+    </p:extLst>
+  </p:cSld>
+  <p:clrMapOvr>
+    <a:masterClrMapping/>
+  </p:clrMapOvr>
+</p:sld>
+</file>
+
+<file path=ppt/slides/slide11.xml><?xml version="1.0" encoding="utf-8"?>
+<p:sld xmlns:a="http://schemas.openxmlformats.org/drawingml/2006/main" xmlns:r="http://schemas.openxmlformats.org/officeDocument/2006/relationships" xmlns:p="http://schemas.openxmlformats.org/presentationml/2006/main">
+  <p:cSld>
+    <p:spTree>
+      <p:nvGrpSpPr>
+        <p:cNvPr id="1" name=""/>
+        <p:cNvGrpSpPr/>
+        <p:nvPr/>
+      </p:nvGrpSpPr>
+      <p:grpSpPr>
+        <a:xfrm>
+          <a:off x="0" y="0"/>
+          <a:ext cx="0" cy="0"/>
+          <a:chOff x="0" y="0"/>
+          <a:chExt cx="0" cy="0"/>
+        </a:xfrm>
+      </p:grpSpPr>
+      <p:sp>
+        <p:nvSpPr>
+          <p:cNvPr id="4" name="ZoneTexte 3">
+            <a:extLst>
+              <a:ext uri="{FF2B5EF4-FFF2-40B4-BE49-F238E27FC236}">
+                <a16:creationId xmlns:a16="http://schemas.microsoft.com/office/drawing/2014/main" id="{BF487348-3258-C35F-0B1E-CAFCD6147FBB}"/>
+              </a:ext>
+            </a:extLst>
+          </p:cNvPr>
+          <p:cNvSpPr txBox="1"/>
+          <p:nvPr/>
+        </p:nvSpPr>
+        <p:spPr>
+          <a:xfrm>
+            <a:off x="457200" y="138223"/>
+            <a:ext cx="2445488" cy="400110"/>
+          </a:xfrm>
+          <a:prstGeom prst="rect">
+            <a:avLst/>
+          </a:prstGeom>
+          <a:noFill/>
+        </p:spPr>
+        <p:txBody>
+          <a:bodyPr wrap="square" rtlCol="0">
+            <a:spAutoFit/>
+          </a:bodyPr>
+          <a:lstStyle/>
+          <a:p>
+            <a:r>
+              <a:rPr lang="fr-FR" sz="2000" b="1" u="sng" dirty="0">
+                <a:solidFill>
+                  <a:srgbClr val="8F1919"/>
+                </a:solidFill>
+              </a:rPr>
+              <a:t>Wireframe:</a:t>
+            </a:r>
+          </a:p>
+        </p:txBody>
+      </p:sp>
+      <p:pic>
+        <p:nvPicPr>
+          <p:cNvPr id="3" name="Image 2">
+            <a:extLst>
+              <a:ext uri="{FF2B5EF4-FFF2-40B4-BE49-F238E27FC236}">
+                <a16:creationId xmlns:a16="http://schemas.microsoft.com/office/drawing/2014/main" id="{68D368DB-5EC4-832C-9746-3D5A7E7EC740}"/>
+              </a:ext>
+            </a:extLst>
+          </p:cNvPr>
+          <p:cNvPicPr>
+            <a:picLocks noChangeAspect="1"/>
+          </p:cNvPicPr>
+          <p:nvPr/>
+        </p:nvPicPr>
+        <p:blipFill>
+          <a:blip r:embed="rId2"/>
+          <a:stretch>
+            <a:fillRect/>
+          </a:stretch>
+        </p:blipFill>
+        <p:spPr>
+          <a:xfrm>
+            <a:off x="457200" y="792903"/>
+            <a:ext cx="11190989" cy="5736483"/>
+          </a:xfrm>
+          <a:prstGeom prst="rect">
+            <a:avLst/>
+          </a:prstGeom>
+        </p:spPr>
+      </p:pic>
+    </p:spTree>
+    <p:extLst>
+      <p:ext uri="{BB962C8B-B14F-4D97-AF65-F5344CB8AC3E}">
+        <p14:creationId xmlns:p14="http://schemas.microsoft.com/office/powerpoint/2010/main" val="2917187414"/>
+      </p:ext>
+    </p:extLst>
+  </p:cSld>
+  <p:clrMapOvr>
+    <a:masterClrMapping/>
+  </p:clrMapOvr>
+</p:sld>
+</file>
+
+<file path=ppt/slides/slide12.xml><?xml version="1.0" encoding="utf-8"?>
+<p:sld xmlns:a="http://schemas.openxmlformats.org/drawingml/2006/main" xmlns:r="http://schemas.openxmlformats.org/officeDocument/2006/relationships" xmlns:p="http://schemas.openxmlformats.org/presentationml/2006/main">
+  <p:cSld>
+    <p:spTree>
+      <p:nvGrpSpPr>
+        <p:cNvPr id="1" name=""/>
+        <p:cNvGrpSpPr/>
+        <p:nvPr/>
+      </p:nvGrpSpPr>
+      <p:grpSpPr>
+        <a:xfrm>
+          <a:off x="0" y="0"/>
+          <a:ext cx="0" cy="0"/>
+          <a:chOff x="0" y="0"/>
+          <a:chExt cx="0" cy="0"/>
+        </a:xfrm>
+      </p:grpSpPr>
+      <p:sp>
+        <p:nvSpPr>
+          <p:cNvPr id="4" name="ZoneTexte 3">
+            <a:extLst>
+              <a:ext uri="{FF2B5EF4-FFF2-40B4-BE49-F238E27FC236}">
+                <a16:creationId xmlns:a16="http://schemas.microsoft.com/office/drawing/2014/main" id="{57BA7665-741A-7068-6C9C-499DA6E224C0}"/>
+              </a:ext>
+            </a:extLst>
+          </p:cNvPr>
+          <p:cNvSpPr txBox="1"/>
+          <p:nvPr/>
+        </p:nvSpPr>
+        <p:spPr>
+          <a:xfrm>
+            <a:off x="499730" y="547576"/>
+            <a:ext cx="1408813" cy="400110"/>
+          </a:xfrm>
+          <a:prstGeom prst="rect">
+            <a:avLst/>
+          </a:prstGeom>
+          <a:noFill/>
+        </p:spPr>
+        <p:txBody>
+          <a:bodyPr wrap="square" rtlCol="0">
+            <a:spAutoFit/>
+          </a:bodyPr>
+          <a:lstStyle/>
+          <a:p>
+            <a:r>
+              <a:rPr lang="fr-FR" sz="2000" b="1" u="sng" dirty="0">
+                <a:solidFill>
+                  <a:srgbClr val="8F1919"/>
+                </a:solidFill>
+              </a:rPr>
+              <a:t>Style </a:t>
+            </a:r>
+            <a:r>
+              <a:rPr lang="fr-FR" sz="2000" b="1" u="sng" dirty="0" err="1">
+                <a:solidFill>
+                  <a:srgbClr val="8F1919"/>
+                </a:solidFill>
+              </a:rPr>
+              <a:t>Title</a:t>
+            </a:r>
+            <a:r>
+              <a:rPr lang="fr-FR" sz="2000" b="1" u="sng" dirty="0">
+                <a:solidFill>
+                  <a:srgbClr val="8F1919"/>
+                </a:solidFill>
+              </a:rPr>
+              <a:t>:</a:t>
+            </a:r>
+          </a:p>
+        </p:txBody>
+      </p:sp>
+      <p:pic>
+        <p:nvPicPr>
+          <p:cNvPr id="6" name="Image 5">
+            <a:extLst>
+              <a:ext uri="{FF2B5EF4-FFF2-40B4-BE49-F238E27FC236}">
+                <a16:creationId xmlns:a16="http://schemas.microsoft.com/office/drawing/2014/main" id="{B0316501-3225-594A-9B5D-54B52C36FBB8}"/>
+              </a:ext>
+            </a:extLst>
+          </p:cNvPr>
+          <p:cNvPicPr>
+            <a:picLocks noChangeAspect="1"/>
+          </p:cNvPicPr>
+          <p:nvPr/>
+        </p:nvPicPr>
+        <p:blipFill>
+          <a:blip r:embed="rId2"/>
+          <a:stretch>
+            <a:fillRect/>
+          </a:stretch>
+        </p:blipFill>
+        <p:spPr>
+          <a:xfrm>
+            <a:off x="2360428" y="1495425"/>
+            <a:ext cx="6645459" cy="4415804"/>
+          </a:xfrm>
+          <a:prstGeom prst="rect">
+            <a:avLst/>
+          </a:prstGeom>
+        </p:spPr>
+      </p:pic>
+    </p:spTree>
+    <p:extLst>
+      <p:ext uri="{BB962C8B-B14F-4D97-AF65-F5344CB8AC3E}">
+        <p14:creationId xmlns:p14="http://schemas.microsoft.com/office/powerpoint/2010/main" val="3316698786"/>
+      </p:ext>
+    </p:extLst>
+  </p:cSld>
+  <p:clrMapOvr>
+    <a:masterClrMapping/>
+  </p:clrMapOvr>
+</p:sld>
+</file>
+
+<file path=ppt/slides/slide13.xml><?xml version="1.0" encoding="utf-8"?>
+<p:sld xmlns:a="http://schemas.openxmlformats.org/drawingml/2006/main" xmlns:r="http://schemas.openxmlformats.org/officeDocument/2006/relationships" xmlns:p="http://schemas.openxmlformats.org/presentationml/2006/main">
+  <p:cSld>
+    <p:spTree>
+      <p:nvGrpSpPr>
+        <p:cNvPr id="1" name=""/>
+        <p:cNvGrpSpPr/>
+        <p:nvPr/>
+      </p:nvGrpSpPr>
+      <p:grpSpPr>
+        <a:xfrm>
+          <a:off x="0" y="0"/>
+          <a:ext cx="0" cy="0"/>
+          <a:chOff x="0" y="0"/>
+          <a:chExt cx="0" cy="0"/>
+        </a:xfrm>
+      </p:grpSpPr>
+      <p:sp>
+        <p:nvSpPr>
+          <p:cNvPr id="4" name="ZoneTexte 3">
+            <a:extLst>
+              <a:ext uri="{FF2B5EF4-FFF2-40B4-BE49-F238E27FC236}">
+                <a16:creationId xmlns:a16="http://schemas.microsoft.com/office/drawing/2014/main" id="{EA95159E-14B9-EA51-E760-8AD76EF08961}"/>
+              </a:ext>
+            </a:extLst>
+          </p:cNvPr>
+          <p:cNvSpPr txBox="1"/>
+          <p:nvPr/>
+        </p:nvSpPr>
+        <p:spPr>
+          <a:xfrm>
+            <a:off x="744279" y="616688"/>
+            <a:ext cx="2328530" cy="400110"/>
+          </a:xfrm>
+          <a:prstGeom prst="rect">
+            <a:avLst/>
+          </a:prstGeom>
+          <a:noFill/>
+        </p:spPr>
+        <p:txBody>
+          <a:bodyPr wrap="square" rtlCol="0">
+            <a:spAutoFit/>
+          </a:bodyPr>
+          <a:lstStyle/>
+          <a:p>
+            <a:r>
+              <a:rPr lang="fr-FR" sz="2000" b="1" u="sng" dirty="0" err="1">
+                <a:solidFill>
+                  <a:srgbClr val="8F1919"/>
+                </a:solidFill>
+              </a:rPr>
+              <a:t>Mockup</a:t>
+            </a:r>
+            <a:r>
+              <a:rPr lang="fr-FR" sz="2000" b="1" u="sng" dirty="0">
+                <a:solidFill>
+                  <a:srgbClr val="8F1919"/>
+                </a:solidFill>
+              </a:rPr>
+              <a:t>:</a:t>
+            </a:r>
+          </a:p>
+        </p:txBody>
+      </p:sp>
+      <p:pic>
+        <p:nvPicPr>
+          <p:cNvPr id="6" name="Image 5">
+            <a:extLst>
+              <a:ext uri="{FF2B5EF4-FFF2-40B4-BE49-F238E27FC236}">
+                <a16:creationId xmlns:a16="http://schemas.microsoft.com/office/drawing/2014/main" id="{9FB551D1-D1B1-B209-E8BF-60658D476CD6}"/>
+              </a:ext>
+            </a:extLst>
+          </p:cNvPr>
+          <p:cNvPicPr>
+            <a:picLocks noChangeAspect="1"/>
+          </p:cNvPicPr>
+          <p:nvPr/>
+        </p:nvPicPr>
+        <p:blipFill>
+          <a:blip r:embed="rId2"/>
+          <a:stretch>
+            <a:fillRect/>
+          </a:stretch>
+        </p:blipFill>
+        <p:spPr>
+          <a:xfrm>
+            <a:off x="3072809" y="625548"/>
+            <a:ext cx="6046384" cy="5606905"/>
+          </a:xfrm>
+          <a:prstGeom prst="rect">
+            <a:avLst/>
+          </a:prstGeom>
+        </p:spPr>
+      </p:pic>
+    </p:spTree>
+    <p:extLst>
+      <p:ext uri="{BB962C8B-B14F-4D97-AF65-F5344CB8AC3E}">
+        <p14:creationId xmlns:p14="http://schemas.microsoft.com/office/powerpoint/2010/main" val="1027061409"/>
+      </p:ext>
+    </p:extLst>
+  </p:cSld>
+  <p:clrMapOvr>
+    <a:masterClrMapping/>
+  </p:clrMapOvr>
+</p:sld>
+</file>
+
+<file path=ppt/slides/slide14.xml><?xml version="1.0" encoding="utf-8"?>
+<p:sld xmlns:a="http://schemas.openxmlformats.org/drawingml/2006/main" xmlns:r="http://schemas.openxmlformats.org/officeDocument/2006/relationships" xmlns:p="http://schemas.openxmlformats.org/presentationml/2006/main">
+  <p:cSld>
+    <p:spTree>
+      <p:nvGrpSpPr>
+        <p:cNvPr id="1" name=""/>
+        <p:cNvGrpSpPr/>
+        <p:nvPr/>
+      </p:nvGrpSpPr>
+      <p:grpSpPr>
+        <a:xfrm>
+          <a:off x="0" y="0"/>
+          <a:ext cx="0" cy="0"/>
+          <a:chOff x="0" y="0"/>
+          <a:chExt cx="0" cy="0"/>
+        </a:xfrm>
+      </p:grpSpPr>
+      <p:sp>
+        <p:nvSpPr>
+          <p:cNvPr id="4" name="ZoneTexte 3">
+            <a:extLst>
+              <a:ext uri="{FF2B5EF4-FFF2-40B4-BE49-F238E27FC236}">
+                <a16:creationId xmlns:a16="http://schemas.microsoft.com/office/drawing/2014/main" id="{EA95159E-14B9-EA51-E760-8AD76EF08961}"/>
+              </a:ext>
+            </a:extLst>
+          </p:cNvPr>
+          <p:cNvSpPr txBox="1"/>
+          <p:nvPr/>
+        </p:nvSpPr>
+        <p:spPr>
+          <a:xfrm>
+            <a:off x="744279" y="616688"/>
+            <a:ext cx="2328530" cy="400110"/>
+          </a:xfrm>
+          <a:prstGeom prst="rect">
+            <a:avLst/>
+          </a:prstGeom>
+          <a:noFill/>
+        </p:spPr>
+        <p:txBody>
+          <a:bodyPr wrap="square" rtlCol="0">
+            <a:spAutoFit/>
+          </a:bodyPr>
+          <a:lstStyle/>
+          <a:p>
+            <a:r>
+              <a:rPr lang="fr-FR" sz="2000" b="1" u="sng" dirty="0" err="1">
+                <a:solidFill>
+                  <a:srgbClr val="8F1919"/>
+                </a:solidFill>
+              </a:rPr>
+              <a:t>Mockup</a:t>
+            </a:r>
+            <a:r>
+              <a:rPr lang="fr-FR" sz="2000" b="1" u="sng" dirty="0">
+                <a:solidFill>
+                  <a:srgbClr val="8F1919"/>
+                </a:solidFill>
+              </a:rPr>
+              <a:t>:</a:t>
+            </a:r>
+          </a:p>
+        </p:txBody>
+      </p:sp>
+      <p:pic>
+        <p:nvPicPr>
+          <p:cNvPr id="3" name="Image 2">
+            <a:extLst>
+              <a:ext uri="{FF2B5EF4-FFF2-40B4-BE49-F238E27FC236}">
+                <a16:creationId xmlns:a16="http://schemas.microsoft.com/office/drawing/2014/main" id="{D61C898B-5A8D-7239-E984-EF216276A305}"/>
+              </a:ext>
+            </a:extLst>
+          </p:cNvPr>
+          <p:cNvPicPr>
+            <a:picLocks noChangeAspect="1"/>
+          </p:cNvPicPr>
+          <p:nvPr/>
+        </p:nvPicPr>
+        <p:blipFill>
+          <a:blip r:embed="rId2"/>
+          <a:stretch>
+            <a:fillRect/>
+          </a:stretch>
+        </p:blipFill>
+        <p:spPr>
+          <a:xfrm>
+            <a:off x="1807534" y="1082827"/>
+            <a:ext cx="9851065" cy="5389410"/>
+          </a:xfrm>
+          <a:prstGeom prst="rect">
+            <a:avLst/>
+          </a:prstGeom>
+        </p:spPr>
+      </p:pic>
+    </p:spTree>
+    <p:extLst>
+      <p:ext uri="{BB962C8B-B14F-4D97-AF65-F5344CB8AC3E}">
+        <p14:creationId xmlns:p14="http://schemas.microsoft.com/office/powerpoint/2010/main" val="4053992554"/>
+      </p:ext>
+    </p:extLst>
+  </p:cSld>
+  <p:clrMapOvr>
+    <a:masterClrMapping/>
+  </p:clrMapOvr>
+</p:sld>
+</file>
+
+<file path=ppt/slides/slide15.xml><?xml version="1.0" encoding="utf-8"?>
+<p:sld xmlns:a="http://schemas.openxmlformats.org/drawingml/2006/main" xmlns:r="http://schemas.openxmlformats.org/officeDocument/2006/relationships" xmlns:p="http://schemas.openxmlformats.org/presentationml/2006/main">
+  <p:cSld>
+    <p:spTree>
+      <p:nvGrpSpPr>
+        <p:cNvPr id="1" name=""/>
+        <p:cNvGrpSpPr/>
+        <p:nvPr/>
+      </p:nvGrpSpPr>
+      <p:grpSpPr>
+        <a:xfrm>
+          <a:off x="0" y="0"/>
+          <a:ext cx="0" cy="0"/>
+          <a:chOff x="0" y="0"/>
+          <a:chExt cx="0" cy="0"/>
+        </a:xfrm>
+      </p:grpSpPr>
+      <p:sp>
+        <p:nvSpPr>
+          <p:cNvPr id="6" name="ZoneTexte 5">
+            <a:extLst>
+              <a:ext uri="{FF2B5EF4-FFF2-40B4-BE49-F238E27FC236}">
+                <a16:creationId xmlns:a16="http://schemas.microsoft.com/office/drawing/2014/main" id="{C547E21B-BCB9-D52B-C5AB-7AC538003AD4}"/>
+              </a:ext>
+            </a:extLst>
+          </p:cNvPr>
+          <p:cNvSpPr txBox="1"/>
+          <p:nvPr/>
+        </p:nvSpPr>
+        <p:spPr>
+          <a:xfrm>
+            <a:off x="1050966" y="611579"/>
+            <a:ext cx="9429008" cy="2031325"/>
+          </a:xfrm>
+          <a:prstGeom prst="rect">
+            <a:avLst/>
+          </a:prstGeom>
+          <a:noFill/>
+        </p:spPr>
+        <p:txBody>
+          <a:bodyPr wrap="square" rtlCol="0">
+            <a:spAutoFit/>
+          </a:bodyPr>
+          <a:lstStyle/>
+          <a:p>
+            <a:r>
+              <a:rPr lang="fr-FR" b="1" u="sng" dirty="0">
+                <a:solidFill>
+                  <a:srgbClr val="751515"/>
+                </a:solidFill>
+              </a:rPr>
+              <a:t>Les contraintes:</a:t>
+            </a:r>
+          </a:p>
+          <a:p>
+            <a:pPr lvl="1"/>
+            <a:r>
+              <a:rPr lang="fr-FR" dirty="0"/>
+              <a:t>- Présence d’un </a:t>
+            </a:r>
+            <a:r>
+              <a:rPr lang="fr-FR" dirty="0" err="1"/>
+              <a:t>slider</a:t>
+            </a:r>
+            <a:r>
+              <a:rPr lang="fr-FR" dirty="0"/>
+              <a:t> pour visionner les tableaux.</a:t>
+            </a:r>
+          </a:p>
+          <a:p>
+            <a:pPr lvl="1"/>
+            <a:r>
+              <a:rPr lang="fr-FR" dirty="0"/>
+              <a:t>- Développer une base de données pour les commentaires et les tableaux.</a:t>
+            </a:r>
+          </a:p>
+          <a:p>
+            <a:pPr lvl="1"/>
+            <a:r>
+              <a:rPr lang="fr-FR" dirty="0"/>
+              <a:t>- Utilisation du HTML/CSS, JavaScript, MySQL.</a:t>
+            </a:r>
+          </a:p>
+          <a:p>
+            <a:pPr lvl="1"/>
+            <a:r>
+              <a:rPr lang="fr-FR" dirty="0"/>
+              <a:t>- Assurer la maintenance, l’hébergement du site.</a:t>
+            </a:r>
+          </a:p>
+          <a:p>
+            <a:pPr lvl="1"/>
+            <a:r>
+              <a:rPr lang="fr-FR" dirty="0"/>
+              <a:t>- Petite formation pour l’ajout des tableaux.</a:t>
+            </a:r>
+          </a:p>
+          <a:p>
+            <a:endParaRPr lang="fr-FR" dirty="0"/>
+          </a:p>
+        </p:txBody>
+      </p:sp>
+      <p:sp>
+        <p:nvSpPr>
+          <p:cNvPr id="7" name="ZoneTexte 6">
+            <a:extLst>
+              <a:ext uri="{FF2B5EF4-FFF2-40B4-BE49-F238E27FC236}">
+                <a16:creationId xmlns:a16="http://schemas.microsoft.com/office/drawing/2014/main" id="{57C6970D-45B3-E42A-42FC-07A833CD706F}"/>
+              </a:ext>
+            </a:extLst>
+          </p:cNvPr>
+          <p:cNvSpPr txBox="1"/>
+          <p:nvPr/>
+        </p:nvSpPr>
+        <p:spPr>
+          <a:xfrm>
+            <a:off x="1050966" y="2642904"/>
+            <a:ext cx="9619013" cy="1200329"/>
+          </a:xfrm>
+          <a:prstGeom prst="rect">
+            <a:avLst/>
+          </a:prstGeom>
+          <a:noFill/>
+        </p:spPr>
+        <p:txBody>
+          <a:bodyPr wrap="square" rtlCol="0">
+            <a:spAutoFit/>
+          </a:bodyPr>
+          <a:lstStyle/>
+          <a:p>
+            <a:r>
+              <a:rPr lang="fr-FR" b="1" u="sng" dirty="0">
+                <a:solidFill>
+                  <a:srgbClr val="751515"/>
+                </a:solidFill>
+              </a:rPr>
+              <a:t>Les contraintes légales:</a:t>
+            </a:r>
+          </a:p>
+          <a:p>
+            <a:r>
+              <a:rPr lang="fr-FR" dirty="0"/>
+              <a:t>	- Propriétaires du site Mr Soulier.</a:t>
+            </a:r>
+          </a:p>
+          <a:p>
+            <a:r>
+              <a:rPr lang="fr-FR" dirty="0"/>
+              <a:t>	- Maquettage, intégrations ainsi que le code source appartiennent à Mr Pierrot.</a:t>
+            </a:r>
+          </a:p>
+          <a:p>
+            <a:r>
+              <a:rPr lang="fr-FR" dirty="0"/>
+              <a:t>	</a:t>
+            </a:r>
+          </a:p>
+        </p:txBody>
+      </p:sp>
+      <p:sp>
+        <p:nvSpPr>
+          <p:cNvPr id="8" name="ZoneTexte 7">
+            <a:extLst>
+              <a:ext uri="{FF2B5EF4-FFF2-40B4-BE49-F238E27FC236}">
+                <a16:creationId xmlns:a16="http://schemas.microsoft.com/office/drawing/2014/main" id="{D50139A6-F1AF-17F1-F1DF-8CEF331330BB}"/>
+              </a:ext>
+            </a:extLst>
+          </p:cNvPr>
+          <p:cNvSpPr txBox="1"/>
+          <p:nvPr/>
+        </p:nvSpPr>
+        <p:spPr>
+          <a:xfrm>
+            <a:off x="1050966" y="4138551"/>
+            <a:ext cx="9909959" cy="1477328"/>
+          </a:xfrm>
+          <a:prstGeom prst="rect">
+            <a:avLst/>
+          </a:prstGeom>
+          <a:noFill/>
+        </p:spPr>
+        <p:txBody>
+          <a:bodyPr wrap="square" rtlCol="0">
+            <a:spAutoFit/>
+          </a:bodyPr>
+          <a:lstStyle/>
+          <a:p>
+            <a:r>
+              <a:rPr lang="fr-FR" b="1" u="sng" dirty="0">
+                <a:solidFill>
+                  <a:srgbClr val="751515"/>
+                </a:solidFill>
+              </a:rPr>
+              <a:t>Les coûts et délais:</a:t>
+            </a:r>
+          </a:p>
+          <a:p>
+            <a:r>
+              <a:rPr lang="fr-FR" dirty="0"/>
+              <a:t>	- Sites offert soit un gain de 150 euros/jour/développeur pour 10 jours.</a:t>
+            </a:r>
+          </a:p>
+          <a:p>
+            <a:r>
+              <a:rPr lang="fr-FR" dirty="0"/>
+              <a:t>	  comprenant le cahier des charges, le maquettage, la création d’un logo, la 	  	      	  création du site, la création de la base de données, la mise en ligne.</a:t>
+            </a:r>
+          </a:p>
+          <a:p>
+            <a:r>
+              <a:rPr lang="fr-FR" dirty="0"/>
+              <a:t>	- Livraisons prévu le 03 juillet 2023.</a:t>
+            </a:r>
+          </a:p>
+        </p:txBody>
+      </p:sp>
+    </p:spTree>
+    <p:extLst>
+      <p:ext uri="{BB962C8B-B14F-4D97-AF65-F5344CB8AC3E}">
+        <p14:creationId xmlns:p14="http://schemas.microsoft.com/office/powerpoint/2010/main" val="1279676495"/>
+      </p:ext>
+    </p:extLst>
+  </p:cSld>
+  <p:clrMapOvr>
+    <a:masterClrMapping/>
+  </p:clrMapOvr>
+</p:sld>
+</file>
+
+<file path=ppt/slides/slide16.xml><?xml version="1.0" encoding="utf-8"?>
 <p:sld xmlns:a="http://schemas.openxmlformats.org/drawingml/2006/main" xmlns:r="http://schemas.openxmlformats.org/officeDocument/2006/relationships" xmlns:p="http://schemas.openxmlformats.org/presentationml/2006/main">
   <p:cSld>
     <p:spTree>
@@ -6134,6 +7026,1419 @@
   <p:clrMapOvr>
     <a:masterClrMapping/>
   </p:clrMapOvr>
+  <p:timing>
+    <p:tnLst>
+      <p:par>
+        <p:cTn id="1" dur="indefinite" restart="never" nodeType="tmRoot">
+          <p:childTnLst>
+            <p:seq concurrent="1" nextAc="seek">
+              <p:cTn id="2" dur="indefinite" nodeType="mainSeq">
+                <p:childTnLst>
+                  <p:par>
+                    <p:cTn id="3" fill="hold">
+                      <p:stCondLst>
+                        <p:cond delay="indefinite"/>
+                      </p:stCondLst>
+                      <p:childTnLst>
+                        <p:par>
+                          <p:cTn id="4" fill="hold">
+                            <p:stCondLst>
+                              <p:cond delay="0"/>
+                            </p:stCondLst>
+                            <p:childTnLst>
+                              <p:par>
+                                <p:cTn id="5" presetID="42" presetClass="entr" presetSubtype="0" fill="hold" grpId="0" nodeType="clickEffect">
+                                  <p:stCondLst>
+                                    <p:cond delay="0"/>
+                                  </p:stCondLst>
+                                  <p:childTnLst>
+                                    <p:set>
+                                      <p:cBhvr>
+                                        <p:cTn id="6" dur="1" fill="hold">
+                                          <p:stCondLst>
+                                            <p:cond delay="0"/>
+                                          </p:stCondLst>
+                                        </p:cTn>
+                                        <p:tgtEl>
+                                          <p:spTgt spid="3">
+                                            <p:txEl>
+                                              <p:pRg st="0" end="0"/>
+                                            </p:txEl>
+                                          </p:spTgt>
+                                        </p:tgtEl>
+                                        <p:attrNameLst>
+                                          <p:attrName>style.visibility</p:attrName>
+                                        </p:attrNameLst>
+                                      </p:cBhvr>
+                                      <p:to>
+                                        <p:strVal val="visible"/>
+                                      </p:to>
+                                    </p:set>
+                                    <p:animEffect transition="in" filter="fade">
+                                      <p:cBhvr>
+                                        <p:cTn id="7" dur="1000"/>
+                                        <p:tgtEl>
+                                          <p:spTgt spid="3">
+                                            <p:txEl>
+                                              <p:pRg st="0" end="0"/>
+                                            </p:txEl>
+                                          </p:spTgt>
+                                        </p:tgtEl>
+                                      </p:cBhvr>
+                                    </p:animEffect>
+                                    <p:anim calcmode="lin" valueType="num">
+                                      <p:cBhvr>
+                                        <p:cTn id="8" dur="1000" fill="hold"/>
+                                        <p:tgtEl>
+                                          <p:spTgt spid="3">
+                                            <p:txEl>
+                                              <p:pRg st="0" end="0"/>
+                                            </p:txEl>
+                                          </p:spTgt>
+                                        </p:tgtEl>
+                                        <p:attrNameLst>
+                                          <p:attrName>ppt_x</p:attrName>
+                                        </p:attrNameLst>
+                                      </p:cBhvr>
+                                      <p:tavLst>
+                                        <p:tav tm="0">
+                                          <p:val>
+                                            <p:strVal val="#ppt_x"/>
+                                          </p:val>
+                                        </p:tav>
+                                        <p:tav tm="100000">
+                                          <p:val>
+                                            <p:strVal val="#ppt_x"/>
+                                          </p:val>
+                                        </p:tav>
+                                      </p:tavLst>
+                                    </p:anim>
+                                    <p:anim calcmode="lin" valueType="num">
+                                      <p:cBhvr>
+                                        <p:cTn id="9" dur="1000" fill="hold"/>
+                                        <p:tgtEl>
+                                          <p:spTgt spid="3">
+                                            <p:txEl>
+                                              <p:pRg st="0" end="0"/>
+                                            </p:txEl>
+                                          </p:spTgt>
+                                        </p:tgtEl>
+                                        <p:attrNameLst>
+                                          <p:attrName>ppt_y</p:attrName>
+                                        </p:attrNameLst>
+                                      </p:cBhvr>
+                                      <p:tavLst>
+                                        <p:tav tm="0">
+                                          <p:val>
+                                            <p:strVal val="#ppt_y+.1"/>
+                                          </p:val>
+                                        </p:tav>
+                                        <p:tav tm="100000">
+                                          <p:val>
+                                            <p:strVal val="#ppt_y"/>
+                                          </p:val>
+                                        </p:tav>
+                                      </p:tavLst>
+                                    </p:anim>
+                                  </p:childTnLst>
+                                </p:cTn>
+                              </p:par>
+                            </p:childTnLst>
+                          </p:cTn>
+                        </p:par>
+                      </p:childTnLst>
+                    </p:cTn>
+                  </p:par>
+                  <p:par>
+                    <p:cTn id="10" fill="hold">
+                      <p:stCondLst>
+                        <p:cond delay="indefinite"/>
+                      </p:stCondLst>
+                      <p:childTnLst>
+                        <p:par>
+                          <p:cTn id="11" fill="hold">
+                            <p:stCondLst>
+                              <p:cond delay="0"/>
+                            </p:stCondLst>
+                            <p:childTnLst>
+                              <p:par>
+                                <p:cTn id="12" presetID="42" presetClass="entr" presetSubtype="0" fill="hold" grpId="0" nodeType="clickEffect">
+                                  <p:stCondLst>
+                                    <p:cond delay="0"/>
+                                  </p:stCondLst>
+                                  <p:childTnLst>
+                                    <p:set>
+                                      <p:cBhvr>
+                                        <p:cTn id="13" dur="1" fill="hold">
+                                          <p:stCondLst>
+                                            <p:cond delay="0"/>
+                                          </p:stCondLst>
+                                        </p:cTn>
+                                        <p:tgtEl>
+                                          <p:spTgt spid="3">
+                                            <p:txEl>
+                                              <p:pRg st="1" end="1"/>
+                                            </p:txEl>
+                                          </p:spTgt>
+                                        </p:tgtEl>
+                                        <p:attrNameLst>
+                                          <p:attrName>style.visibility</p:attrName>
+                                        </p:attrNameLst>
+                                      </p:cBhvr>
+                                      <p:to>
+                                        <p:strVal val="visible"/>
+                                      </p:to>
+                                    </p:set>
+                                    <p:animEffect transition="in" filter="fade">
+                                      <p:cBhvr>
+                                        <p:cTn id="14" dur="1000"/>
+                                        <p:tgtEl>
+                                          <p:spTgt spid="3">
+                                            <p:txEl>
+                                              <p:pRg st="1" end="1"/>
+                                            </p:txEl>
+                                          </p:spTgt>
+                                        </p:tgtEl>
+                                      </p:cBhvr>
+                                    </p:animEffect>
+                                    <p:anim calcmode="lin" valueType="num">
+                                      <p:cBhvr>
+                                        <p:cTn id="15" dur="1000" fill="hold"/>
+                                        <p:tgtEl>
+                                          <p:spTgt spid="3">
+                                            <p:txEl>
+                                              <p:pRg st="1" end="1"/>
+                                            </p:txEl>
+                                          </p:spTgt>
+                                        </p:tgtEl>
+                                        <p:attrNameLst>
+                                          <p:attrName>ppt_x</p:attrName>
+                                        </p:attrNameLst>
+                                      </p:cBhvr>
+                                      <p:tavLst>
+                                        <p:tav tm="0">
+                                          <p:val>
+                                            <p:strVal val="#ppt_x"/>
+                                          </p:val>
+                                        </p:tav>
+                                        <p:tav tm="100000">
+                                          <p:val>
+                                            <p:strVal val="#ppt_x"/>
+                                          </p:val>
+                                        </p:tav>
+                                      </p:tavLst>
+                                    </p:anim>
+                                    <p:anim calcmode="lin" valueType="num">
+                                      <p:cBhvr>
+                                        <p:cTn id="16" dur="1000" fill="hold"/>
+                                        <p:tgtEl>
+                                          <p:spTgt spid="3">
+                                            <p:txEl>
+                                              <p:pRg st="1" end="1"/>
+                                            </p:txEl>
+                                          </p:spTgt>
+                                        </p:tgtEl>
+                                        <p:attrNameLst>
+                                          <p:attrName>ppt_y</p:attrName>
+                                        </p:attrNameLst>
+                                      </p:cBhvr>
+                                      <p:tavLst>
+                                        <p:tav tm="0">
+                                          <p:val>
+                                            <p:strVal val="#ppt_y+.1"/>
+                                          </p:val>
+                                        </p:tav>
+                                        <p:tav tm="100000">
+                                          <p:val>
+                                            <p:strVal val="#ppt_y"/>
+                                          </p:val>
+                                        </p:tav>
+                                      </p:tavLst>
+                                    </p:anim>
+                                  </p:childTnLst>
+                                </p:cTn>
+                              </p:par>
+                            </p:childTnLst>
+                          </p:cTn>
+                        </p:par>
+                      </p:childTnLst>
+                    </p:cTn>
+                  </p:par>
+                  <p:par>
+                    <p:cTn id="17" fill="hold">
+                      <p:stCondLst>
+                        <p:cond delay="indefinite"/>
+                      </p:stCondLst>
+                      <p:childTnLst>
+                        <p:par>
+                          <p:cTn id="18" fill="hold">
+                            <p:stCondLst>
+                              <p:cond delay="0"/>
+                            </p:stCondLst>
+                            <p:childTnLst>
+                              <p:par>
+                                <p:cTn id="19" presetID="42" presetClass="entr" presetSubtype="0" fill="hold" grpId="0" nodeType="clickEffect">
+                                  <p:stCondLst>
+                                    <p:cond delay="0"/>
+                                  </p:stCondLst>
+                                  <p:childTnLst>
+                                    <p:set>
+                                      <p:cBhvr>
+                                        <p:cTn id="20" dur="1" fill="hold">
+                                          <p:stCondLst>
+                                            <p:cond delay="0"/>
+                                          </p:stCondLst>
+                                        </p:cTn>
+                                        <p:tgtEl>
+                                          <p:spTgt spid="3">
+                                            <p:txEl>
+                                              <p:pRg st="2" end="2"/>
+                                            </p:txEl>
+                                          </p:spTgt>
+                                        </p:tgtEl>
+                                        <p:attrNameLst>
+                                          <p:attrName>style.visibility</p:attrName>
+                                        </p:attrNameLst>
+                                      </p:cBhvr>
+                                      <p:to>
+                                        <p:strVal val="visible"/>
+                                      </p:to>
+                                    </p:set>
+                                    <p:animEffect transition="in" filter="fade">
+                                      <p:cBhvr>
+                                        <p:cTn id="21" dur="1000"/>
+                                        <p:tgtEl>
+                                          <p:spTgt spid="3">
+                                            <p:txEl>
+                                              <p:pRg st="2" end="2"/>
+                                            </p:txEl>
+                                          </p:spTgt>
+                                        </p:tgtEl>
+                                      </p:cBhvr>
+                                    </p:animEffect>
+                                    <p:anim calcmode="lin" valueType="num">
+                                      <p:cBhvr>
+                                        <p:cTn id="22" dur="1000" fill="hold"/>
+                                        <p:tgtEl>
+                                          <p:spTgt spid="3">
+                                            <p:txEl>
+                                              <p:pRg st="2" end="2"/>
+                                            </p:txEl>
+                                          </p:spTgt>
+                                        </p:tgtEl>
+                                        <p:attrNameLst>
+                                          <p:attrName>ppt_x</p:attrName>
+                                        </p:attrNameLst>
+                                      </p:cBhvr>
+                                      <p:tavLst>
+                                        <p:tav tm="0">
+                                          <p:val>
+                                            <p:strVal val="#ppt_x"/>
+                                          </p:val>
+                                        </p:tav>
+                                        <p:tav tm="100000">
+                                          <p:val>
+                                            <p:strVal val="#ppt_x"/>
+                                          </p:val>
+                                        </p:tav>
+                                      </p:tavLst>
+                                    </p:anim>
+                                    <p:anim calcmode="lin" valueType="num">
+                                      <p:cBhvr>
+                                        <p:cTn id="23" dur="1000" fill="hold"/>
+                                        <p:tgtEl>
+                                          <p:spTgt spid="3">
+                                            <p:txEl>
+                                              <p:pRg st="2" end="2"/>
+                                            </p:txEl>
+                                          </p:spTgt>
+                                        </p:tgtEl>
+                                        <p:attrNameLst>
+                                          <p:attrName>ppt_y</p:attrName>
+                                        </p:attrNameLst>
+                                      </p:cBhvr>
+                                      <p:tavLst>
+                                        <p:tav tm="0">
+                                          <p:val>
+                                            <p:strVal val="#ppt_y+.1"/>
+                                          </p:val>
+                                        </p:tav>
+                                        <p:tav tm="100000">
+                                          <p:val>
+                                            <p:strVal val="#ppt_y"/>
+                                          </p:val>
+                                        </p:tav>
+                                      </p:tavLst>
+                                    </p:anim>
+                                  </p:childTnLst>
+                                </p:cTn>
+                              </p:par>
+                            </p:childTnLst>
+                          </p:cTn>
+                        </p:par>
+                      </p:childTnLst>
+                    </p:cTn>
+                  </p:par>
+                  <p:par>
+                    <p:cTn id="24" fill="hold">
+                      <p:stCondLst>
+                        <p:cond delay="indefinite"/>
+                      </p:stCondLst>
+                      <p:childTnLst>
+                        <p:par>
+                          <p:cTn id="25" fill="hold">
+                            <p:stCondLst>
+                              <p:cond delay="0"/>
+                            </p:stCondLst>
+                            <p:childTnLst>
+                              <p:par>
+                                <p:cTn id="26" presetID="42" presetClass="entr" presetSubtype="0" fill="hold" grpId="0" nodeType="clickEffect">
+                                  <p:stCondLst>
+                                    <p:cond delay="0"/>
+                                  </p:stCondLst>
+                                  <p:childTnLst>
+                                    <p:set>
+                                      <p:cBhvr>
+                                        <p:cTn id="27" dur="1" fill="hold">
+                                          <p:stCondLst>
+                                            <p:cond delay="0"/>
+                                          </p:stCondLst>
+                                        </p:cTn>
+                                        <p:tgtEl>
+                                          <p:spTgt spid="3">
+                                            <p:txEl>
+                                              <p:pRg st="3" end="3"/>
+                                            </p:txEl>
+                                          </p:spTgt>
+                                        </p:tgtEl>
+                                        <p:attrNameLst>
+                                          <p:attrName>style.visibility</p:attrName>
+                                        </p:attrNameLst>
+                                      </p:cBhvr>
+                                      <p:to>
+                                        <p:strVal val="visible"/>
+                                      </p:to>
+                                    </p:set>
+                                    <p:animEffect transition="in" filter="fade">
+                                      <p:cBhvr>
+                                        <p:cTn id="28" dur="1000"/>
+                                        <p:tgtEl>
+                                          <p:spTgt spid="3">
+                                            <p:txEl>
+                                              <p:pRg st="3" end="3"/>
+                                            </p:txEl>
+                                          </p:spTgt>
+                                        </p:tgtEl>
+                                      </p:cBhvr>
+                                    </p:animEffect>
+                                    <p:anim calcmode="lin" valueType="num">
+                                      <p:cBhvr>
+                                        <p:cTn id="29" dur="1000" fill="hold"/>
+                                        <p:tgtEl>
+                                          <p:spTgt spid="3">
+                                            <p:txEl>
+                                              <p:pRg st="3" end="3"/>
+                                            </p:txEl>
+                                          </p:spTgt>
+                                        </p:tgtEl>
+                                        <p:attrNameLst>
+                                          <p:attrName>ppt_x</p:attrName>
+                                        </p:attrNameLst>
+                                      </p:cBhvr>
+                                      <p:tavLst>
+                                        <p:tav tm="0">
+                                          <p:val>
+                                            <p:strVal val="#ppt_x"/>
+                                          </p:val>
+                                        </p:tav>
+                                        <p:tav tm="100000">
+                                          <p:val>
+                                            <p:strVal val="#ppt_x"/>
+                                          </p:val>
+                                        </p:tav>
+                                      </p:tavLst>
+                                    </p:anim>
+                                    <p:anim calcmode="lin" valueType="num">
+                                      <p:cBhvr>
+                                        <p:cTn id="30" dur="1000" fill="hold"/>
+                                        <p:tgtEl>
+                                          <p:spTgt spid="3">
+                                            <p:txEl>
+                                              <p:pRg st="3" end="3"/>
+                                            </p:txEl>
+                                          </p:spTgt>
+                                        </p:tgtEl>
+                                        <p:attrNameLst>
+                                          <p:attrName>ppt_y</p:attrName>
+                                        </p:attrNameLst>
+                                      </p:cBhvr>
+                                      <p:tavLst>
+                                        <p:tav tm="0">
+                                          <p:val>
+                                            <p:strVal val="#ppt_y+.1"/>
+                                          </p:val>
+                                        </p:tav>
+                                        <p:tav tm="100000">
+                                          <p:val>
+                                            <p:strVal val="#ppt_y"/>
+                                          </p:val>
+                                        </p:tav>
+                                      </p:tavLst>
+                                    </p:anim>
+                                  </p:childTnLst>
+                                </p:cTn>
+                              </p:par>
+                            </p:childTnLst>
+                          </p:cTn>
+                        </p:par>
+                      </p:childTnLst>
+                    </p:cTn>
+                  </p:par>
+                  <p:par>
+                    <p:cTn id="31" fill="hold">
+                      <p:stCondLst>
+                        <p:cond delay="indefinite"/>
+                      </p:stCondLst>
+                      <p:childTnLst>
+                        <p:par>
+                          <p:cTn id="32" fill="hold">
+                            <p:stCondLst>
+                              <p:cond delay="0"/>
+                            </p:stCondLst>
+                            <p:childTnLst>
+                              <p:par>
+                                <p:cTn id="33" presetID="42" presetClass="entr" presetSubtype="0" fill="hold" grpId="0" nodeType="clickEffect">
+                                  <p:stCondLst>
+                                    <p:cond delay="0"/>
+                                  </p:stCondLst>
+                                  <p:childTnLst>
+                                    <p:set>
+                                      <p:cBhvr>
+                                        <p:cTn id="34" dur="1" fill="hold">
+                                          <p:stCondLst>
+                                            <p:cond delay="0"/>
+                                          </p:stCondLst>
+                                        </p:cTn>
+                                        <p:tgtEl>
+                                          <p:spTgt spid="3">
+                                            <p:txEl>
+                                              <p:pRg st="4" end="4"/>
+                                            </p:txEl>
+                                          </p:spTgt>
+                                        </p:tgtEl>
+                                        <p:attrNameLst>
+                                          <p:attrName>style.visibility</p:attrName>
+                                        </p:attrNameLst>
+                                      </p:cBhvr>
+                                      <p:to>
+                                        <p:strVal val="visible"/>
+                                      </p:to>
+                                    </p:set>
+                                    <p:animEffect transition="in" filter="fade">
+                                      <p:cBhvr>
+                                        <p:cTn id="35" dur="1000"/>
+                                        <p:tgtEl>
+                                          <p:spTgt spid="3">
+                                            <p:txEl>
+                                              <p:pRg st="4" end="4"/>
+                                            </p:txEl>
+                                          </p:spTgt>
+                                        </p:tgtEl>
+                                      </p:cBhvr>
+                                    </p:animEffect>
+                                    <p:anim calcmode="lin" valueType="num">
+                                      <p:cBhvr>
+                                        <p:cTn id="36" dur="1000" fill="hold"/>
+                                        <p:tgtEl>
+                                          <p:spTgt spid="3">
+                                            <p:txEl>
+                                              <p:pRg st="4" end="4"/>
+                                            </p:txEl>
+                                          </p:spTgt>
+                                        </p:tgtEl>
+                                        <p:attrNameLst>
+                                          <p:attrName>ppt_x</p:attrName>
+                                        </p:attrNameLst>
+                                      </p:cBhvr>
+                                      <p:tavLst>
+                                        <p:tav tm="0">
+                                          <p:val>
+                                            <p:strVal val="#ppt_x"/>
+                                          </p:val>
+                                        </p:tav>
+                                        <p:tav tm="100000">
+                                          <p:val>
+                                            <p:strVal val="#ppt_x"/>
+                                          </p:val>
+                                        </p:tav>
+                                      </p:tavLst>
+                                    </p:anim>
+                                    <p:anim calcmode="lin" valueType="num">
+                                      <p:cBhvr>
+                                        <p:cTn id="37" dur="1000" fill="hold"/>
+                                        <p:tgtEl>
+                                          <p:spTgt spid="3">
+                                            <p:txEl>
+                                              <p:pRg st="4" end="4"/>
+                                            </p:txEl>
+                                          </p:spTgt>
+                                        </p:tgtEl>
+                                        <p:attrNameLst>
+                                          <p:attrName>ppt_y</p:attrName>
+                                        </p:attrNameLst>
+                                      </p:cBhvr>
+                                      <p:tavLst>
+                                        <p:tav tm="0">
+                                          <p:val>
+                                            <p:strVal val="#ppt_y+.1"/>
+                                          </p:val>
+                                        </p:tav>
+                                        <p:tav tm="100000">
+                                          <p:val>
+                                            <p:strVal val="#ppt_y"/>
+                                          </p:val>
+                                        </p:tav>
+                                      </p:tavLst>
+                                    </p:anim>
+                                  </p:childTnLst>
+                                </p:cTn>
+                              </p:par>
+                            </p:childTnLst>
+                          </p:cTn>
+                        </p:par>
+                      </p:childTnLst>
+                    </p:cTn>
+                  </p:par>
+                  <p:par>
+                    <p:cTn id="38" fill="hold">
+                      <p:stCondLst>
+                        <p:cond delay="indefinite"/>
+                      </p:stCondLst>
+                      <p:childTnLst>
+                        <p:par>
+                          <p:cTn id="39" fill="hold">
+                            <p:stCondLst>
+                              <p:cond delay="0"/>
+                            </p:stCondLst>
+                            <p:childTnLst>
+                              <p:par>
+                                <p:cTn id="40" presetID="42" presetClass="entr" presetSubtype="0" fill="hold" grpId="0" nodeType="clickEffect">
+                                  <p:stCondLst>
+                                    <p:cond delay="0"/>
+                                  </p:stCondLst>
+                                  <p:childTnLst>
+                                    <p:set>
+                                      <p:cBhvr>
+                                        <p:cTn id="41" dur="1" fill="hold">
+                                          <p:stCondLst>
+                                            <p:cond delay="0"/>
+                                          </p:stCondLst>
+                                        </p:cTn>
+                                        <p:tgtEl>
+                                          <p:spTgt spid="3">
+                                            <p:txEl>
+                                              <p:pRg st="5" end="5"/>
+                                            </p:txEl>
+                                          </p:spTgt>
+                                        </p:tgtEl>
+                                        <p:attrNameLst>
+                                          <p:attrName>style.visibility</p:attrName>
+                                        </p:attrNameLst>
+                                      </p:cBhvr>
+                                      <p:to>
+                                        <p:strVal val="visible"/>
+                                      </p:to>
+                                    </p:set>
+                                    <p:animEffect transition="in" filter="fade">
+                                      <p:cBhvr>
+                                        <p:cTn id="42" dur="1000"/>
+                                        <p:tgtEl>
+                                          <p:spTgt spid="3">
+                                            <p:txEl>
+                                              <p:pRg st="5" end="5"/>
+                                            </p:txEl>
+                                          </p:spTgt>
+                                        </p:tgtEl>
+                                      </p:cBhvr>
+                                    </p:animEffect>
+                                    <p:anim calcmode="lin" valueType="num">
+                                      <p:cBhvr>
+                                        <p:cTn id="43" dur="1000" fill="hold"/>
+                                        <p:tgtEl>
+                                          <p:spTgt spid="3">
+                                            <p:txEl>
+                                              <p:pRg st="5" end="5"/>
+                                            </p:txEl>
+                                          </p:spTgt>
+                                        </p:tgtEl>
+                                        <p:attrNameLst>
+                                          <p:attrName>ppt_x</p:attrName>
+                                        </p:attrNameLst>
+                                      </p:cBhvr>
+                                      <p:tavLst>
+                                        <p:tav tm="0">
+                                          <p:val>
+                                            <p:strVal val="#ppt_x"/>
+                                          </p:val>
+                                        </p:tav>
+                                        <p:tav tm="100000">
+                                          <p:val>
+                                            <p:strVal val="#ppt_x"/>
+                                          </p:val>
+                                        </p:tav>
+                                      </p:tavLst>
+                                    </p:anim>
+                                    <p:anim calcmode="lin" valueType="num">
+                                      <p:cBhvr>
+                                        <p:cTn id="44" dur="1000" fill="hold"/>
+                                        <p:tgtEl>
+                                          <p:spTgt spid="3">
+                                            <p:txEl>
+                                              <p:pRg st="5" end="5"/>
+                                            </p:txEl>
+                                          </p:spTgt>
+                                        </p:tgtEl>
+                                        <p:attrNameLst>
+                                          <p:attrName>ppt_y</p:attrName>
+                                        </p:attrNameLst>
+                                      </p:cBhvr>
+                                      <p:tavLst>
+                                        <p:tav tm="0">
+                                          <p:val>
+                                            <p:strVal val="#ppt_y+.1"/>
+                                          </p:val>
+                                        </p:tav>
+                                        <p:tav tm="100000">
+                                          <p:val>
+                                            <p:strVal val="#ppt_y"/>
+                                          </p:val>
+                                        </p:tav>
+                                      </p:tavLst>
+                                    </p:anim>
+                                  </p:childTnLst>
+                                </p:cTn>
+                              </p:par>
+                            </p:childTnLst>
+                          </p:cTn>
+                        </p:par>
+                      </p:childTnLst>
+                    </p:cTn>
+                  </p:par>
+                  <p:par>
+                    <p:cTn id="45" fill="hold">
+                      <p:stCondLst>
+                        <p:cond delay="indefinite"/>
+                      </p:stCondLst>
+                      <p:childTnLst>
+                        <p:par>
+                          <p:cTn id="46" fill="hold">
+                            <p:stCondLst>
+                              <p:cond delay="0"/>
+                            </p:stCondLst>
+                            <p:childTnLst>
+                              <p:par>
+                                <p:cTn id="47" presetID="42" presetClass="entr" presetSubtype="0" fill="hold" grpId="0" nodeType="clickEffect">
+                                  <p:stCondLst>
+                                    <p:cond delay="0"/>
+                                  </p:stCondLst>
+                                  <p:childTnLst>
+                                    <p:set>
+                                      <p:cBhvr>
+                                        <p:cTn id="48" dur="1" fill="hold">
+                                          <p:stCondLst>
+                                            <p:cond delay="0"/>
+                                          </p:stCondLst>
+                                        </p:cTn>
+                                        <p:tgtEl>
+                                          <p:spTgt spid="3">
+                                            <p:txEl>
+                                              <p:pRg st="6" end="6"/>
+                                            </p:txEl>
+                                          </p:spTgt>
+                                        </p:tgtEl>
+                                        <p:attrNameLst>
+                                          <p:attrName>style.visibility</p:attrName>
+                                        </p:attrNameLst>
+                                      </p:cBhvr>
+                                      <p:to>
+                                        <p:strVal val="visible"/>
+                                      </p:to>
+                                    </p:set>
+                                    <p:animEffect transition="in" filter="fade">
+                                      <p:cBhvr>
+                                        <p:cTn id="49" dur="1000"/>
+                                        <p:tgtEl>
+                                          <p:spTgt spid="3">
+                                            <p:txEl>
+                                              <p:pRg st="6" end="6"/>
+                                            </p:txEl>
+                                          </p:spTgt>
+                                        </p:tgtEl>
+                                      </p:cBhvr>
+                                    </p:animEffect>
+                                    <p:anim calcmode="lin" valueType="num">
+                                      <p:cBhvr>
+                                        <p:cTn id="50" dur="1000" fill="hold"/>
+                                        <p:tgtEl>
+                                          <p:spTgt spid="3">
+                                            <p:txEl>
+                                              <p:pRg st="6" end="6"/>
+                                            </p:txEl>
+                                          </p:spTgt>
+                                        </p:tgtEl>
+                                        <p:attrNameLst>
+                                          <p:attrName>ppt_x</p:attrName>
+                                        </p:attrNameLst>
+                                      </p:cBhvr>
+                                      <p:tavLst>
+                                        <p:tav tm="0">
+                                          <p:val>
+                                            <p:strVal val="#ppt_x"/>
+                                          </p:val>
+                                        </p:tav>
+                                        <p:tav tm="100000">
+                                          <p:val>
+                                            <p:strVal val="#ppt_x"/>
+                                          </p:val>
+                                        </p:tav>
+                                      </p:tavLst>
+                                    </p:anim>
+                                    <p:anim calcmode="lin" valueType="num">
+                                      <p:cBhvr>
+                                        <p:cTn id="51" dur="1000" fill="hold"/>
+                                        <p:tgtEl>
+                                          <p:spTgt spid="3">
+                                            <p:txEl>
+                                              <p:pRg st="6" end="6"/>
+                                            </p:txEl>
+                                          </p:spTgt>
+                                        </p:tgtEl>
+                                        <p:attrNameLst>
+                                          <p:attrName>ppt_y</p:attrName>
+                                        </p:attrNameLst>
+                                      </p:cBhvr>
+                                      <p:tavLst>
+                                        <p:tav tm="0">
+                                          <p:val>
+                                            <p:strVal val="#ppt_y+.1"/>
+                                          </p:val>
+                                        </p:tav>
+                                        <p:tav tm="100000">
+                                          <p:val>
+                                            <p:strVal val="#ppt_y"/>
+                                          </p:val>
+                                        </p:tav>
+                                      </p:tavLst>
+                                    </p:anim>
+                                  </p:childTnLst>
+                                </p:cTn>
+                              </p:par>
+                            </p:childTnLst>
+                          </p:cTn>
+                        </p:par>
+                      </p:childTnLst>
+                    </p:cTn>
+                  </p:par>
+                  <p:par>
+                    <p:cTn id="52" fill="hold">
+                      <p:stCondLst>
+                        <p:cond delay="indefinite"/>
+                      </p:stCondLst>
+                      <p:childTnLst>
+                        <p:par>
+                          <p:cTn id="53" fill="hold">
+                            <p:stCondLst>
+                              <p:cond delay="0"/>
+                            </p:stCondLst>
+                            <p:childTnLst>
+                              <p:par>
+                                <p:cTn id="54" presetID="42" presetClass="entr" presetSubtype="0" fill="hold" grpId="0" nodeType="clickEffect">
+                                  <p:stCondLst>
+                                    <p:cond delay="0"/>
+                                  </p:stCondLst>
+                                  <p:childTnLst>
+                                    <p:set>
+                                      <p:cBhvr>
+                                        <p:cTn id="55" dur="1" fill="hold">
+                                          <p:stCondLst>
+                                            <p:cond delay="0"/>
+                                          </p:stCondLst>
+                                        </p:cTn>
+                                        <p:tgtEl>
+                                          <p:spTgt spid="3">
+                                            <p:txEl>
+                                              <p:pRg st="8" end="8"/>
+                                            </p:txEl>
+                                          </p:spTgt>
+                                        </p:tgtEl>
+                                        <p:attrNameLst>
+                                          <p:attrName>style.visibility</p:attrName>
+                                        </p:attrNameLst>
+                                      </p:cBhvr>
+                                      <p:to>
+                                        <p:strVal val="visible"/>
+                                      </p:to>
+                                    </p:set>
+                                    <p:animEffect transition="in" filter="fade">
+                                      <p:cBhvr>
+                                        <p:cTn id="56" dur="1000"/>
+                                        <p:tgtEl>
+                                          <p:spTgt spid="3">
+                                            <p:txEl>
+                                              <p:pRg st="8" end="8"/>
+                                            </p:txEl>
+                                          </p:spTgt>
+                                        </p:tgtEl>
+                                      </p:cBhvr>
+                                    </p:animEffect>
+                                    <p:anim calcmode="lin" valueType="num">
+                                      <p:cBhvr>
+                                        <p:cTn id="57" dur="1000" fill="hold"/>
+                                        <p:tgtEl>
+                                          <p:spTgt spid="3">
+                                            <p:txEl>
+                                              <p:pRg st="8" end="8"/>
+                                            </p:txEl>
+                                          </p:spTgt>
+                                        </p:tgtEl>
+                                        <p:attrNameLst>
+                                          <p:attrName>ppt_x</p:attrName>
+                                        </p:attrNameLst>
+                                      </p:cBhvr>
+                                      <p:tavLst>
+                                        <p:tav tm="0">
+                                          <p:val>
+                                            <p:strVal val="#ppt_x"/>
+                                          </p:val>
+                                        </p:tav>
+                                        <p:tav tm="100000">
+                                          <p:val>
+                                            <p:strVal val="#ppt_x"/>
+                                          </p:val>
+                                        </p:tav>
+                                      </p:tavLst>
+                                    </p:anim>
+                                    <p:anim calcmode="lin" valueType="num">
+                                      <p:cBhvr>
+                                        <p:cTn id="58" dur="1000" fill="hold"/>
+                                        <p:tgtEl>
+                                          <p:spTgt spid="3">
+                                            <p:txEl>
+                                              <p:pRg st="8" end="8"/>
+                                            </p:txEl>
+                                          </p:spTgt>
+                                        </p:tgtEl>
+                                        <p:attrNameLst>
+                                          <p:attrName>ppt_y</p:attrName>
+                                        </p:attrNameLst>
+                                      </p:cBhvr>
+                                      <p:tavLst>
+                                        <p:tav tm="0">
+                                          <p:val>
+                                            <p:strVal val="#ppt_y+.1"/>
+                                          </p:val>
+                                        </p:tav>
+                                        <p:tav tm="100000">
+                                          <p:val>
+                                            <p:strVal val="#ppt_y"/>
+                                          </p:val>
+                                        </p:tav>
+                                      </p:tavLst>
+                                    </p:anim>
+                                  </p:childTnLst>
+                                </p:cTn>
+                              </p:par>
+                            </p:childTnLst>
+                          </p:cTn>
+                        </p:par>
+                      </p:childTnLst>
+                    </p:cTn>
+                  </p:par>
+                  <p:par>
+                    <p:cTn id="59" fill="hold">
+                      <p:stCondLst>
+                        <p:cond delay="indefinite"/>
+                      </p:stCondLst>
+                      <p:childTnLst>
+                        <p:par>
+                          <p:cTn id="60" fill="hold">
+                            <p:stCondLst>
+                              <p:cond delay="0"/>
+                            </p:stCondLst>
+                            <p:childTnLst>
+                              <p:par>
+                                <p:cTn id="61" presetID="42" presetClass="entr" presetSubtype="0" fill="hold" grpId="0" nodeType="clickEffect">
+                                  <p:stCondLst>
+                                    <p:cond delay="0"/>
+                                  </p:stCondLst>
+                                  <p:childTnLst>
+                                    <p:set>
+                                      <p:cBhvr>
+                                        <p:cTn id="62" dur="1" fill="hold">
+                                          <p:stCondLst>
+                                            <p:cond delay="0"/>
+                                          </p:stCondLst>
+                                        </p:cTn>
+                                        <p:tgtEl>
+                                          <p:spTgt spid="3">
+                                            <p:txEl>
+                                              <p:pRg st="9" end="9"/>
+                                            </p:txEl>
+                                          </p:spTgt>
+                                        </p:tgtEl>
+                                        <p:attrNameLst>
+                                          <p:attrName>style.visibility</p:attrName>
+                                        </p:attrNameLst>
+                                      </p:cBhvr>
+                                      <p:to>
+                                        <p:strVal val="visible"/>
+                                      </p:to>
+                                    </p:set>
+                                    <p:animEffect transition="in" filter="fade">
+                                      <p:cBhvr>
+                                        <p:cTn id="63" dur="1000"/>
+                                        <p:tgtEl>
+                                          <p:spTgt spid="3">
+                                            <p:txEl>
+                                              <p:pRg st="9" end="9"/>
+                                            </p:txEl>
+                                          </p:spTgt>
+                                        </p:tgtEl>
+                                      </p:cBhvr>
+                                    </p:animEffect>
+                                    <p:anim calcmode="lin" valueType="num">
+                                      <p:cBhvr>
+                                        <p:cTn id="64" dur="1000" fill="hold"/>
+                                        <p:tgtEl>
+                                          <p:spTgt spid="3">
+                                            <p:txEl>
+                                              <p:pRg st="9" end="9"/>
+                                            </p:txEl>
+                                          </p:spTgt>
+                                        </p:tgtEl>
+                                        <p:attrNameLst>
+                                          <p:attrName>ppt_x</p:attrName>
+                                        </p:attrNameLst>
+                                      </p:cBhvr>
+                                      <p:tavLst>
+                                        <p:tav tm="0">
+                                          <p:val>
+                                            <p:strVal val="#ppt_x"/>
+                                          </p:val>
+                                        </p:tav>
+                                        <p:tav tm="100000">
+                                          <p:val>
+                                            <p:strVal val="#ppt_x"/>
+                                          </p:val>
+                                        </p:tav>
+                                      </p:tavLst>
+                                    </p:anim>
+                                    <p:anim calcmode="lin" valueType="num">
+                                      <p:cBhvr>
+                                        <p:cTn id="65" dur="1000" fill="hold"/>
+                                        <p:tgtEl>
+                                          <p:spTgt spid="3">
+                                            <p:txEl>
+                                              <p:pRg st="9" end="9"/>
+                                            </p:txEl>
+                                          </p:spTgt>
+                                        </p:tgtEl>
+                                        <p:attrNameLst>
+                                          <p:attrName>ppt_y</p:attrName>
+                                        </p:attrNameLst>
+                                      </p:cBhvr>
+                                      <p:tavLst>
+                                        <p:tav tm="0">
+                                          <p:val>
+                                            <p:strVal val="#ppt_y+.1"/>
+                                          </p:val>
+                                        </p:tav>
+                                        <p:tav tm="100000">
+                                          <p:val>
+                                            <p:strVal val="#ppt_y"/>
+                                          </p:val>
+                                        </p:tav>
+                                      </p:tavLst>
+                                    </p:anim>
+                                  </p:childTnLst>
+                                </p:cTn>
+                              </p:par>
+                            </p:childTnLst>
+                          </p:cTn>
+                        </p:par>
+                      </p:childTnLst>
+                    </p:cTn>
+                  </p:par>
+                  <p:par>
+                    <p:cTn id="66" fill="hold">
+                      <p:stCondLst>
+                        <p:cond delay="indefinite"/>
+                      </p:stCondLst>
+                      <p:childTnLst>
+                        <p:par>
+                          <p:cTn id="67" fill="hold">
+                            <p:stCondLst>
+                              <p:cond delay="0"/>
+                            </p:stCondLst>
+                            <p:childTnLst>
+                              <p:par>
+                                <p:cTn id="68" presetID="42" presetClass="entr" presetSubtype="0" fill="hold" grpId="0" nodeType="clickEffect">
+                                  <p:stCondLst>
+                                    <p:cond delay="0"/>
+                                  </p:stCondLst>
+                                  <p:childTnLst>
+                                    <p:set>
+                                      <p:cBhvr>
+                                        <p:cTn id="69" dur="1" fill="hold">
+                                          <p:stCondLst>
+                                            <p:cond delay="0"/>
+                                          </p:stCondLst>
+                                        </p:cTn>
+                                        <p:tgtEl>
+                                          <p:spTgt spid="3">
+                                            <p:txEl>
+                                              <p:pRg st="10" end="10"/>
+                                            </p:txEl>
+                                          </p:spTgt>
+                                        </p:tgtEl>
+                                        <p:attrNameLst>
+                                          <p:attrName>style.visibility</p:attrName>
+                                        </p:attrNameLst>
+                                      </p:cBhvr>
+                                      <p:to>
+                                        <p:strVal val="visible"/>
+                                      </p:to>
+                                    </p:set>
+                                    <p:animEffect transition="in" filter="fade">
+                                      <p:cBhvr>
+                                        <p:cTn id="70" dur="1000"/>
+                                        <p:tgtEl>
+                                          <p:spTgt spid="3">
+                                            <p:txEl>
+                                              <p:pRg st="10" end="10"/>
+                                            </p:txEl>
+                                          </p:spTgt>
+                                        </p:tgtEl>
+                                      </p:cBhvr>
+                                    </p:animEffect>
+                                    <p:anim calcmode="lin" valueType="num">
+                                      <p:cBhvr>
+                                        <p:cTn id="71" dur="1000" fill="hold"/>
+                                        <p:tgtEl>
+                                          <p:spTgt spid="3">
+                                            <p:txEl>
+                                              <p:pRg st="10" end="10"/>
+                                            </p:txEl>
+                                          </p:spTgt>
+                                        </p:tgtEl>
+                                        <p:attrNameLst>
+                                          <p:attrName>ppt_x</p:attrName>
+                                        </p:attrNameLst>
+                                      </p:cBhvr>
+                                      <p:tavLst>
+                                        <p:tav tm="0">
+                                          <p:val>
+                                            <p:strVal val="#ppt_x"/>
+                                          </p:val>
+                                        </p:tav>
+                                        <p:tav tm="100000">
+                                          <p:val>
+                                            <p:strVal val="#ppt_x"/>
+                                          </p:val>
+                                        </p:tav>
+                                      </p:tavLst>
+                                    </p:anim>
+                                    <p:anim calcmode="lin" valueType="num">
+                                      <p:cBhvr>
+                                        <p:cTn id="72" dur="1000" fill="hold"/>
+                                        <p:tgtEl>
+                                          <p:spTgt spid="3">
+                                            <p:txEl>
+                                              <p:pRg st="10" end="10"/>
+                                            </p:txEl>
+                                          </p:spTgt>
+                                        </p:tgtEl>
+                                        <p:attrNameLst>
+                                          <p:attrName>ppt_y</p:attrName>
+                                        </p:attrNameLst>
+                                      </p:cBhvr>
+                                      <p:tavLst>
+                                        <p:tav tm="0">
+                                          <p:val>
+                                            <p:strVal val="#ppt_y+.1"/>
+                                          </p:val>
+                                        </p:tav>
+                                        <p:tav tm="100000">
+                                          <p:val>
+                                            <p:strVal val="#ppt_y"/>
+                                          </p:val>
+                                        </p:tav>
+                                      </p:tavLst>
+                                    </p:anim>
+                                  </p:childTnLst>
+                                </p:cTn>
+                              </p:par>
+                            </p:childTnLst>
+                          </p:cTn>
+                        </p:par>
+                      </p:childTnLst>
+                    </p:cTn>
+                  </p:par>
+                  <p:par>
+                    <p:cTn id="73" fill="hold">
+                      <p:stCondLst>
+                        <p:cond delay="indefinite"/>
+                      </p:stCondLst>
+                      <p:childTnLst>
+                        <p:par>
+                          <p:cTn id="74" fill="hold">
+                            <p:stCondLst>
+                              <p:cond delay="0"/>
+                            </p:stCondLst>
+                            <p:childTnLst>
+                              <p:par>
+                                <p:cTn id="75" presetID="42" presetClass="entr" presetSubtype="0" fill="hold" grpId="0" nodeType="clickEffect">
+                                  <p:stCondLst>
+                                    <p:cond delay="0"/>
+                                  </p:stCondLst>
+                                  <p:childTnLst>
+                                    <p:set>
+                                      <p:cBhvr>
+                                        <p:cTn id="76" dur="1" fill="hold">
+                                          <p:stCondLst>
+                                            <p:cond delay="0"/>
+                                          </p:stCondLst>
+                                        </p:cTn>
+                                        <p:tgtEl>
+                                          <p:spTgt spid="3">
+                                            <p:txEl>
+                                              <p:pRg st="11" end="11"/>
+                                            </p:txEl>
+                                          </p:spTgt>
+                                        </p:tgtEl>
+                                        <p:attrNameLst>
+                                          <p:attrName>style.visibility</p:attrName>
+                                        </p:attrNameLst>
+                                      </p:cBhvr>
+                                      <p:to>
+                                        <p:strVal val="visible"/>
+                                      </p:to>
+                                    </p:set>
+                                    <p:animEffect transition="in" filter="fade">
+                                      <p:cBhvr>
+                                        <p:cTn id="77" dur="1000"/>
+                                        <p:tgtEl>
+                                          <p:spTgt spid="3">
+                                            <p:txEl>
+                                              <p:pRg st="11" end="11"/>
+                                            </p:txEl>
+                                          </p:spTgt>
+                                        </p:tgtEl>
+                                      </p:cBhvr>
+                                    </p:animEffect>
+                                    <p:anim calcmode="lin" valueType="num">
+                                      <p:cBhvr>
+                                        <p:cTn id="78" dur="1000" fill="hold"/>
+                                        <p:tgtEl>
+                                          <p:spTgt spid="3">
+                                            <p:txEl>
+                                              <p:pRg st="11" end="11"/>
+                                            </p:txEl>
+                                          </p:spTgt>
+                                        </p:tgtEl>
+                                        <p:attrNameLst>
+                                          <p:attrName>ppt_x</p:attrName>
+                                        </p:attrNameLst>
+                                      </p:cBhvr>
+                                      <p:tavLst>
+                                        <p:tav tm="0">
+                                          <p:val>
+                                            <p:strVal val="#ppt_x"/>
+                                          </p:val>
+                                        </p:tav>
+                                        <p:tav tm="100000">
+                                          <p:val>
+                                            <p:strVal val="#ppt_x"/>
+                                          </p:val>
+                                        </p:tav>
+                                      </p:tavLst>
+                                    </p:anim>
+                                    <p:anim calcmode="lin" valueType="num">
+                                      <p:cBhvr>
+                                        <p:cTn id="79" dur="1000" fill="hold"/>
+                                        <p:tgtEl>
+                                          <p:spTgt spid="3">
+                                            <p:txEl>
+                                              <p:pRg st="11" end="11"/>
+                                            </p:txEl>
+                                          </p:spTgt>
+                                        </p:tgtEl>
+                                        <p:attrNameLst>
+                                          <p:attrName>ppt_y</p:attrName>
+                                        </p:attrNameLst>
+                                      </p:cBhvr>
+                                      <p:tavLst>
+                                        <p:tav tm="0">
+                                          <p:val>
+                                            <p:strVal val="#ppt_y+.1"/>
+                                          </p:val>
+                                        </p:tav>
+                                        <p:tav tm="100000">
+                                          <p:val>
+                                            <p:strVal val="#ppt_y"/>
+                                          </p:val>
+                                        </p:tav>
+                                      </p:tavLst>
+                                    </p:anim>
+                                  </p:childTnLst>
+                                </p:cTn>
+                              </p:par>
+                            </p:childTnLst>
+                          </p:cTn>
+                        </p:par>
+                      </p:childTnLst>
+                    </p:cTn>
+                  </p:par>
+                  <p:par>
+                    <p:cTn id="80" fill="hold">
+                      <p:stCondLst>
+                        <p:cond delay="indefinite"/>
+                      </p:stCondLst>
+                      <p:childTnLst>
+                        <p:par>
+                          <p:cTn id="81" fill="hold">
+                            <p:stCondLst>
+                              <p:cond delay="0"/>
+                            </p:stCondLst>
+                            <p:childTnLst>
+                              <p:par>
+                                <p:cTn id="82" presetID="42" presetClass="entr" presetSubtype="0" fill="hold" grpId="0" nodeType="clickEffect">
+                                  <p:stCondLst>
+                                    <p:cond delay="0"/>
+                                  </p:stCondLst>
+                                  <p:childTnLst>
+                                    <p:set>
+                                      <p:cBhvr>
+                                        <p:cTn id="83" dur="1" fill="hold">
+                                          <p:stCondLst>
+                                            <p:cond delay="0"/>
+                                          </p:stCondLst>
+                                        </p:cTn>
+                                        <p:tgtEl>
+                                          <p:spTgt spid="3">
+                                            <p:txEl>
+                                              <p:pRg st="12" end="12"/>
+                                            </p:txEl>
+                                          </p:spTgt>
+                                        </p:tgtEl>
+                                        <p:attrNameLst>
+                                          <p:attrName>style.visibility</p:attrName>
+                                        </p:attrNameLst>
+                                      </p:cBhvr>
+                                      <p:to>
+                                        <p:strVal val="visible"/>
+                                      </p:to>
+                                    </p:set>
+                                    <p:animEffect transition="in" filter="fade">
+                                      <p:cBhvr>
+                                        <p:cTn id="84" dur="1000"/>
+                                        <p:tgtEl>
+                                          <p:spTgt spid="3">
+                                            <p:txEl>
+                                              <p:pRg st="12" end="12"/>
+                                            </p:txEl>
+                                          </p:spTgt>
+                                        </p:tgtEl>
+                                      </p:cBhvr>
+                                    </p:animEffect>
+                                    <p:anim calcmode="lin" valueType="num">
+                                      <p:cBhvr>
+                                        <p:cTn id="85" dur="1000" fill="hold"/>
+                                        <p:tgtEl>
+                                          <p:spTgt spid="3">
+                                            <p:txEl>
+                                              <p:pRg st="12" end="12"/>
+                                            </p:txEl>
+                                          </p:spTgt>
+                                        </p:tgtEl>
+                                        <p:attrNameLst>
+                                          <p:attrName>ppt_x</p:attrName>
+                                        </p:attrNameLst>
+                                      </p:cBhvr>
+                                      <p:tavLst>
+                                        <p:tav tm="0">
+                                          <p:val>
+                                            <p:strVal val="#ppt_x"/>
+                                          </p:val>
+                                        </p:tav>
+                                        <p:tav tm="100000">
+                                          <p:val>
+                                            <p:strVal val="#ppt_x"/>
+                                          </p:val>
+                                        </p:tav>
+                                      </p:tavLst>
+                                    </p:anim>
+                                    <p:anim calcmode="lin" valueType="num">
+                                      <p:cBhvr>
+                                        <p:cTn id="86" dur="1000" fill="hold"/>
+                                        <p:tgtEl>
+                                          <p:spTgt spid="3">
+                                            <p:txEl>
+                                              <p:pRg st="12" end="12"/>
+                                            </p:txEl>
+                                          </p:spTgt>
+                                        </p:tgtEl>
+                                        <p:attrNameLst>
+                                          <p:attrName>ppt_y</p:attrName>
+                                        </p:attrNameLst>
+                                      </p:cBhvr>
+                                      <p:tavLst>
+                                        <p:tav tm="0">
+                                          <p:val>
+                                            <p:strVal val="#ppt_y+.1"/>
+                                          </p:val>
+                                        </p:tav>
+                                        <p:tav tm="100000">
+                                          <p:val>
+                                            <p:strVal val="#ppt_y"/>
+                                          </p:val>
+                                        </p:tav>
+                                      </p:tavLst>
+                                    </p:anim>
+                                  </p:childTnLst>
+                                </p:cTn>
+                              </p:par>
+                            </p:childTnLst>
+                          </p:cTn>
+                        </p:par>
+                      </p:childTnLst>
+                    </p:cTn>
+                  </p:par>
+                </p:childTnLst>
+              </p:cTn>
+              <p:prevCondLst>
+                <p:cond evt="onPrev" delay="0">
+                  <p:tgtEl>
+                    <p:sldTgt/>
+                  </p:tgtEl>
+                </p:cond>
+              </p:prevCondLst>
+              <p:nextCondLst>
+                <p:cond evt="onNext" delay="0">
+                  <p:tgtEl>
+                    <p:sldTgt/>
+                  </p:tgtEl>
+                </p:cond>
+              </p:nextCondLst>
+            </p:seq>
+          </p:childTnLst>
+        </p:cTn>
+      </p:par>
+    </p:tnLst>
+    <p:bldLst>
+      <p:bldP spid="3" grpId="0" build="p"/>
+    </p:bldLst>
+  </p:timing>
 </p:sld>
 </file>
 
@@ -6409,7 +8714,7 @@
         </p:blipFill>
         <p:spPr>
           <a:xfrm>
-            <a:off x="679487" y="573515"/>
+            <a:off x="772509" y="662628"/>
             <a:ext cx="10824615" cy="5532744"/>
           </a:xfrm>
         </p:spPr>
@@ -6485,7 +8790,7 @@
         <p:spPr>
           <a:xfrm>
             <a:off x="3430576" y="3998025"/>
-            <a:ext cx="2566626" cy="369332"/>
+            <a:ext cx="2566626" cy="1200329"/>
           </a:xfrm>
           <a:prstGeom prst="rect">
             <a:avLst/>
@@ -6505,6 +8810,23 @@
                 </a:solidFill>
               </a:rPr>
               <a:t>Manque de visibilités.</a:t>
+            </a:r>
+          </a:p>
+          <a:p>
+            <a:endParaRPr lang="fr-FR" dirty="0">
+              <a:solidFill>
+                <a:srgbClr val="751515"/>
+              </a:solidFill>
+            </a:endParaRPr>
+          </a:p>
+          <a:p>
+            <a:r>
+              <a:rPr lang="fr-FR" dirty="0">
+                <a:solidFill>
+                  <a:srgbClr val="751515"/>
+                </a:solidFill>
+              </a:rPr>
+              <a:t>Un seul style de peinture.</a:t>
             </a:r>
           </a:p>
         </p:txBody>
@@ -6523,8 +8845,8 @@
         </p:nvSpPr>
         <p:spPr>
           <a:xfrm>
-            <a:off x="6280982" y="3887167"/>
-            <a:ext cx="2396359" cy="1200329"/>
+            <a:off x="6358172" y="4025667"/>
+            <a:ext cx="2396359" cy="923330"/>
           </a:xfrm>
           <a:prstGeom prst="rect">
             <a:avLst/>
@@ -6543,17 +8865,7 @@
                   <a:srgbClr val="751515"/>
                 </a:solidFill>
               </a:rPr>
-              <a:t>Augmentation des </a:t>
-            </a:r>
-          </a:p>
-          <a:p>
-            <a:r>
-              <a:rPr lang="fr-FR" dirty="0">
-                <a:solidFill>
-                  <a:srgbClr val="751515"/>
-                </a:solidFill>
-              </a:rPr>
-              <a:t>ventes grâce a une plus grande accessibilité.</a:t>
+              <a:t>Région qui fait la part belle au métier artistique.</a:t>
             </a:r>
           </a:p>
         </p:txBody>
@@ -6572,8 +8884,8 @@
         </p:nvSpPr>
         <p:spPr>
           <a:xfrm>
-            <a:off x="9005263" y="3887167"/>
-            <a:ext cx="2314910" cy="1200329"/>
+            <a:off x="9282214" y="3610169"/>
+            <a:ext cx="2314910" cy="1754326"/>
           </a:xfrm>
           <a:prstGeom prst="rect">
             <a:avLst/>
@@ -6586,14 +8898,11 @@
           </a:bodyPr>
           <a:lstStyle/>
           <a:p>
-            <a:r>
-              <a:rPr lang="fr-FR" dirty="0">
-                <a:solidFill>
-                  <a:srgbClr val="751515"/>
-                </a:solidFill>
-              </a:rPr>
-              <a:t>Couverture Médiatique faible.</a:t>
-            </a:r>
+            <a:endParaRPr lang="fr-FR" dirty="0">
+              <a:solidFill>
+                <a:srgbClr val="751515"/>
+              </a:solidFill>
+            </a:endParaRPr>
           </a:p>
           <a:p>
             <a:r>
@@ -6603,6 +8912,23 @@
                 </a:solidFill>
               </a:rPr>
               <a:t>De nombreux concurrents.</a:t>
+            </a:r>
+          </a:p>
+          <a:p>
+            <a:endParaRPr lang="fr-FR" dirty="0">
+              <a:solidFill>
+                <a:srgbClr val="751515"/>
+              </a:solidFill>
+            </a:endParaRPr>
+          </a:p>
+          <a:p>
+            <a:r>
+              <a:rPr lang="fr-FR" dirty="0">
+                <a:solidFill>
+                  <a:srgbClr val="751515"/>
+                </a:solidFill>
+              </a:rPr>
+              <a:t>Perte du pouvoir d’achat.</a:t>
             </a:r>
           </a:p>
         </p:txBody>
@@ -7173,68 +9499,6 @@
           <p:cNvPr id="3" name="Espace réservé du contenu 2">
             <a:extLst>
               <a:ext uri="{FF2B5EF4-FFF2-40B4-BE49-F238E27FC236}">
-                <a16:creationId xmlns:a16="http://schemas.microsoft.com/office/drawing/2014/main" id="{2F4828E4-7313-5F64-2274-5E5DC1C0E42B}"/>
-              </a:ext>
-            </a:extLst>
-          </p:cNvPr>
-          <p:cNvSpPr>
-            <a:spLocks noGrp="1"/>
-          </p:cNvSpPr>
-          <p:nvPr>
-            <p:ph idx="1"/>
-          </p:nvPr>
-        </p:nvSpPr>
-        <p:spPr/>
-        <p:txBody>
-          <a:bodyPr/>
-          <a:lstStyle/>
-          <a:p>
-            <a:r>
-              <a:rPr lang="fr-FR" b="1" u="sng" dirty="0">
-                <a:solidFill>
-                  <a:srgbClr val="751515"/>
-                </a:solidFill>
-              </a:rPr>
-              <a:t>Maquettage:</a:t>
-            </a:r>
-          </a:p>
-        </p:txBody>
-      </p:sp>
-    </p:spTree>
-    <p:extLst>
-      <p:ext uri="{BB962C8B-B14F-4D97-AF65-F5344CB8AC3E}">
-        <p14:creationId xmlns:p14="http://schemas.microsoft.com/office/powerpoint/2010/main" val="2417484879"/>
-      </p:ext>
-    </p:extLst>
-  </p:cSld>
-  <p:clrMapOvr>
-    <a:masterClrMapping/>
-  </p:clrMapOvr>
-</p:sld>
-</file>
-
-<file path=ppt/slides/slide8.xml><?xml version="1.0" encoding="utf-8"?>
-<p:sld xmlns:a="http://schemas.openxmlformats.org/drawingml/2006/main" xmlns:r="http://schemas.openxmlformats.org/officeDocument/2006/relationships" xmlns:p="http://schemas.openxmlformats.org/presentationml/2006/main">
-  <p:cSld>
-    <p:spTree>
-      <p:nvGrpSpPr>
-        <p:cNvPr id="1" name=""/>
-        <p:cNvGrpSpPr/>
-        <p:nvPr/>
-      </p:nvGrpSpPr>
-      <p:grpSpPr>
-        <a:xfrm>
-          <a:off x="0" y="0"/>
-          <a:ext cx="0" cy="0"/>
-          <a:chOff x="0" y="0"/>
-          <a:chExt cx="0" cy="0"/>
-        </a:xfrm>
-      </p:grpSpPr>
-      <p:sp>
-        <p:nvSpPr>
-          <p:cNvPr id="3" name="Espace réservé du contenu 2">
-            <a:extLst>
-              <a:ext uri="{FF2B5EF4-FFF2-40B4-BE49-F238E27FC236}">
                 <a16:creationId xmlns:a16="http://schemas.microsoft.com/office/drawing/2014/main" id="{B590736F-5B47-A1FD-002D-3878E229EC56}"/>
               </a:ext>
             </a:extLst>
@@ -7342,7 +9606,7 @@
         </p:nvGrpSpPr>
         <p:grpSpPr>
           <a:xfrm>
-            <a:off x="3344285" y="3984171"/>
+            <a:off x="3353413" y="3871084"/>
             <a:ext cx="4568641" cy="2371106"/>
             <a:chOff x="684212" y="4114800"/>
             <a:chExt cx="4568641" cy="2371106"/>
@@ -7553,634 +9817,6 @@
         </p:sp>
         <p:sp>
           <p:nvSpPr>
-            <p:cNvPr id="12" name="Forme libre : forme 11">
-              <a:extLst>
-                <a:ext uri="{FF2B5EF4-FFF2-40B4-BE49-F238E27FC236}">
-                  <a16:creationId xmlns:a16="http://schemas.microsoft.com/office/drawing/2014/main" id="{F3A0C2CF-6930-6FEE-D286-3B52B90089F3}"/>
-                </a:ext>
-              </a:extLst>
-            </p:cNvPr>
-            <p:cNvSpPr/>
-            <p:nvPr/>
-          </p:nvSpPr>
-          <p:spPr>
-            <a:xfrm>
-              <a:off x="1787236" y="4756068"/>
-              <a:ext cx="2327564" cy="446852"/>
-            </a:xfrm>
-            <a:custGeom>
-              <a:avLst/>
-              <a:gdLst>
-                <a:gd name="connsiteX0" fmla="*/ 0 w 2327564"/>
-                <a:gd name="connsiteY0" fmla="*/ 0 h 446852"/>
-                <a:gd name="connsiteX1" fmla="*/ 11876 w 2327564"/>
-                <a:gd name="connsiteY1" fmla="*/ 95002 h 446852"/>
-                <a:gd name="connsiteX2" fmla="*/ 17813 w 2327564"/>
-                <a:gd name="connsiteY2" fmla="*/ 112815 h 446852"/>
-                <a:gd name="connsiteX3" fmla="*/ 35626 w 2327564"/>
-                <a:gd name="connsiteY3" fmla="*/ 142503 h 446852"/>
-                <a:gd name="connsiteX4" fmla="*/ 41564 w 2327564"/>
-                <a:gd name="connsiteY4" fmla="*/ 160316 h 446852"/>
-                <a:gd name="connsiteX5" fmla="*/ 53439 w 2327564"/>
-                <a:gd name="connsiteY5" fmla="*/ 172192 h 446852"/>
-                <a:gd name="connsiteX6" fmla="*/ 65315 w 2327564"/>
-                <a:gd name="connsiteY6" fmla="*/ 195942 h 446852"/>
-                <a:gd name="connsiteX7" fmla="*/ 118754 w 2327564"/>
-                <a:gd name="connsiteY7" fmla="*/ 261257 h 446852"/>
-                <a:gd name="connsiteX8" fmla="*/ 219694 w 2327564"/>
-                <a:gd name="connsiteY8" fmla="*/ 326571 h 446852"/>
-                <a:gd name="connsiteX9" fmla="*/ 391886 w 2327564"/>
-                <a:gd name="connsiteY9" fmla="*/ 380010 h 446852"/>
-                <a:gd name="connsiteX10" fmla="*/ 415637 w 2327564"/>
-                <a:gd name="connsiteY10" fmla="*/ 385948 h 446852"/>
-                <a:gd name="connsiteX11" fmla="*/ 486889 w 2327564"/>
-                <a:gd name="connsiteY11" fmla="*/ 397823 h 446852"/>
-                <a:gd name="connsiteX12" fmla="*/ 587829 w 2327564"/>
-                <a:gd name="connsiteY12" fmla="*/ 409698 h 446852"/>
-                <a:gd name="connsiteX13" fmla="*/ 831273 w 2327564"/>
-                <a:gd name="connsiteY13" fmla="*/ 421574 h 446852"/>
-                <a:gd name="connsiteX14" fmla="*/ 932213 w 2327564"/>
-                <a:gd name="connsiteY14" fmla="*/ 427511 h 446852"/>
-                <a:gd name="connsiteX15" fmla="*/ 1383476 w 2327564"/>
-                <a:gd name="connsiteY15" fmla="*/ 433449 h 446852"/>
-                <a:gd name="connsiteX16" fmla="*/ 1436915 w 2327564"/>
-                <a:gd name="connsiteY16" fmla="*/ 421574 h 446852"/>
-                <a:gd name="connsiteX17" fmla="*/ 1502229 w 2327564"/>
-                <a:gd name="connsiteY17" fmla="*/ 409698 h 446852"/>
-                <a:gd name="connsiteX18" fmla="*/ 1644733 w 2327564"/>
-                <a:gd name="connsiteY18" fmla="*/ 362197 h 446852"/>
-                <a:gd name="connsiteX19" fmla="*/ 1692234 w 2327564"/>
-                <a:gd name="connsiteY19" fmla="*/ 350322 h 446852"/>
-                <a:gd name="connsiteX20" fmla="*/ 1769424 w 2327564"/>
-                <a:gd name="connsiteY20" fmla="*/ 320633 h 446852"/>
-                <a:gd name="connsiteX21" fmla="*/ 1900052 w 2327564"/>
-                <a:gd name="connsiteY21" fmla="*/ 290945 h 446852"/>
-                <a:gd name="connsiteX22" fmla="*/ 1947554 w 2327564"/>
-                <a:gd name="connsiteY22" fmla="*/ 285007 h 446852"/>
-                <a:gd name="connsiteX23" fmla="*/ 2072245 w 2327564"/>
-                <a:gd name="connsiteY23" fmla="*/ 231568 h 446852"/>
-                <a:gd name="connsiteX24" fmla="*/ 2125683 w 2327564"/>
-                <a:gd name="connsiteY24" fmla="*/ 207818 h 446852"/>
-                <a:gd name="connsiteX25" fmla="*/ 2208811 w 2327564"/>
-                <a:gd name="connsiteY25" fmla="*/ 154379 h 446852"/>
-                <a:gd name="connsiteX26" fmla="*/ 2238499 w 2327564"/>
-                <a:gd name="connsiteY26" fmla="*/ 118753 h 446852"/>
-                <a:gd name="connsiteX27" fmla="*/ 2250374 w 2327564"/>
-                <a:gd name="connsiteY27" fmla="*/ 106877 h 446852"/>
-                <a:gd name="connsiteX28" fmla="*/ 2262250 w 2327564"/>
-                <a:gd name="connsiteY28" fmla="*/ 89064 h 446852"/>
-                <a:gd name="connsiteX29" fmla="*/ 2280063 w 2327564"/>
-                <a:gd name="connsiteY29" fmla="*/ 77189 h 446852"/>
-                <a:gd name="connsiteX30" fmla="*/ 2297876 w 2327564"/>
-                <a:gd name="connsiteY30" fmla="*/ 59376 h 446852"/>
-                <a:gd name="connsiteX31" fmla="*/ 2315689 w 2327564"/>
-                <a:gd name="connsiteY31" fmla="*/ 29688 h 446852"/>
-                <a:gd name="connsiteX32" fmla="*/ 2327564 w 2327564"/>
-                <a:gd name="connsiteY32" fmla="*/ 5937 h 446852"/>
-              </a:gdLst>
-              <a:ahLst/>
-              <a:cxnLst>
-                <a:cxn ang="0">
-                  <a:pos x="connsiteX0" y="connsiteY0"/>
-                </a:cxn>
-                <a:cxn ang="0">
-                  <a:pos x="connsiteX1" y="connsiteY1"/>
-                </a:cxn>
-                <a:cxn ang="0">
-                  <a:pos x="connsiteX2" y="connsiteY2"/>
-                </a:cxn>
-                <a:cxn ang="0">
-                  <a:pos x="connsiteX3" y="connsiteY3"/>
-                </a:cxn>
-                <a:cxn ang="0">
-                  <a:pos x="connsiteX4" y="connsiteY4"/>
-                </a:cxn>
-                <a:cxn ang="0">
-                  <a:pos x="connsiteX5" y="connsiteY5"/>
-                </a:cxn>
-                <a:cxn ang="0">
-                  <a:pos x="connsiteX6" y="connsiteY6"/>
-                </a:cxn>
-                <a:cxn ang="0">
-                  <a:pos x="connsiteX7" y="connsiteY7"/>
-                </a:cxn>
-                <a:cxn ang="0">
-                  <a:pos x="connsiteX8" y="connsiteY8"/>
-                </a:cxn>
-                <a:cxn ang="0">
-                  <a:pos x="connsiteX9" y="connsiteY9"/>
-                </a:cxn>
-                <a:cxn ang="0">
-                  <a:pos x="connsiteX10" y="connsiteY10"/>
-                </a:cxn>
-                <a:cxn ang="0">
-                  <a:pos x="connsiteX11" y="connsiteY11"/>
-                </a:cxn>
-                <a:cxn ang="0">
-                  <a:pos x="connsiteX12" y="connsiteY12"/>
-                </a:cxn>
-                <a:cxn ang="0">
-                  <a:pos x="connsiteX13" y="connsiteY13"/>
-                </a:cxn>
-                <a:cxn ang="0">
-                  <a:pos x="connsiteX14" y="connsiteY14"/>
-                </a:cxn>
-                <a:cxn ang="0">
-                  <a:pos x="connsiteX15" y="connsiteY15"/>
-                </a:cxn>
-                <a:cxn ang="0">
-                  <a:pos x="connsiteX16" y="connsiteY16"/>
-                </a:cxn>
-                <a:cxn ang="0">
-                  <a:pos x="connsiteX17" y="connsiteY17"/>
-                </a:cxn>
-                <a:cxn ang="0">
-                  <a:pos x="connsiteX18" y="connsiteY18"/>
-                </a:cxn>
-                <a:cxn ang="0">
-                  <a:pos x="connsiteX19" y="connsiteY19"/>
-                </a:cxn>
-                <a:cxn ang="0">
-                  <a:pos x="connsiteX20" y="connsiteY20"/>
-                </a:cxn>
-                <a:cxn ang="0">
-                  <a:pos x="connsiteX21" y="connsiteY21"/>
-                </a:cxn>
-                <a:cxn ang="0">
-                  <a:pos x="connsiteX22" y="connsiteY22"/>
-                </a:cxn>
-                <a:cxn ang="0">
-                  <a:pos x="connsiteX23" y="connsiteY23"/>
-                </a:cxn>
-                <a:cxn ang="0">
-                  <a:pos x="connsiteX24" y="connsiteY24"/>
-                </a:cxn>
-                <a:cxn ang="0">
-                  <a:pos x="connsiteX25" y="connsiteY25"/>
-                </a:cxn>
-                <a:cxn ang="0">
-                  <a:pos x="connsiteX26" y="connsiteY26"/>
-                </a:cxn>
-                <a:cxn ang="0">
-                  <a:pos x="connsiteX27" y="connsiteY27"/>
-                </a:cxn>
-                <a:cxn ang="0">
-                  <a:pos x="connsiteX28" y="connsiteY28"/>
-                </a:cxn>
-                <a:cxn ang="0">
-                  <a:pos x="connsiteX29" y="connsiteY29"/>
-                </a:cxn>
-                <a:cxn ang="0">
-                  <a:pos x="connsiteX30" y="connsiteY30"/>
-                </a:cxn>
-                <a:cxn ang="0">
-                  <a:pos x="connsiteX31" y="connsiteY31"/>
-                </a:cxn>
-                <a:cxn ang="0">
-                  <a:pos x="connsiteX32" y="connsiteY32"/>
-                </a:cxn>
-              </a:cxnLst>
-              <a:rect l="l" t="t" r="r" b="b"/>
-              <a:pathLst>
-                <a:path w="2327564" h="446852">
-                  <a:moveTo>
-                    <a:pt x="0" y="0"/>
-                  </a:moveTo>
-                  <a:cubicBezTo>
-                    <a:pt x="3959" y="31667"/>
-                    <a:pt x="6899" y="63479"/>
-                    <a:pt x="11876" y="95002"/>
-                  </a:cubicBezTo>
-                  <a:cubicBezTo>
-                    <a:pt x="12852" y="101184"/>
-                    <a:pt x="15014" y="107217"/>
-                    <a:pt x="17813" y="112815"/>
-                  </a:cubicBezTo>
-                  <a:cubicBezTo>
-                    <a:pt x="22974" y="123137"/>
-                    <a:pt x="30465" y="132181"/>
-                    <a:pt x="35626" y="142503"/>
-                  </a:cubicBezTo>
-                  <a:cubicBezTo>
-                    <a:pt x="38425" y="148101"/>
-                    <a:pt x="38344" y="154949"/>
-                    <a:pt x="41564" y="160316"/>
-                  </a:cubicBezTo>
-                  <a:cubicBezTo>
-                    <a:pt x="44444" y="165116"/>
-                    <a:pt x="50334" y="167534"/>
-                    <a:pt x="53439" y="172192"/>
-                  </a:cubicBezTo>
-                  <a:cubicBezTo>
-                    <a:pt x="58349" y="179557"/>
-                    <a:pt x="60405" y="188577"/>
-                    <a:pt x="65315" y="195942"/>
-                  </a:cubicBezTo>
-                  <a:cubicBezTo>
-                    <a:pt x="74878" y="210286"/>
-                    <a:pt x="100141" y="246366"/>
-                    <a:pt x="118754" y="261257"/>
-                  </a:cubicBezTo>
-                  <a:cubicBezTo>
-                    <a:pt x="136835" y="275722"/>
-                    <a:pt x="203015" y="321011"/>
-                    <a:pt x="219694" y="326571"/>
-                  </a:cubicBezTo>
-                  <a:cubicBezTo>
-                    <a:pt x="449958" y="403325"/>
-                    <a:pt x="297341" y="358999"/>
-                    <a:pt x="391886" y="380010"/>
-                  </a:cubicBezTo>
-                  <a:cubicBezTo>
-                    <a:pt x="399852" y="381780"/>
-                    <a:pt x="407616" y="384444"/>
-                    <a:pt x="415637" y="385948"/>
-                  </a:cubicBezTo>
-                  <a:cubicBezTo>
-                    <a:pt x="439303" y="390385"/>
-                    <a:pt x="463105" y="394068"/>
-                    <a:pt x="486889" y="397823"/>
-                  </a:cubicBezTo>
-                  <a:cubicBezTo>
-                    <a:pt x="517422" y="402644"/>
-                    <a:pt x="558190" y="407955"/>
-                    <a:pt x="587829" y="409698"/>
-                  </a:cubicBezTo>
-                  <a:cubicBezTo>
-                    <a:pt x="668933" y="414469"/>
-                    <a:pt x="750137" y="417377"/>
-                    <a:pt x="831273" y="421574"/>
-                  </a:cubicBezTo>
-                  <a:lnTo>
-                    <a:pt x="932213" y="427511"/>
-                  </a:lnTo>
-                  <a:cubicBezTo>
-                    <a:pt x="1121641" y="456655"/>
-                    <a:pt x="1036154" y="447921"/>
-                    <a:pt x="1383476" y="433449"/>
-                  </a:cubicBezTo>
-                  <a:cubicBezTo>
-                    <a:pt x="1401708" y="432689"/>
-                    <a:pt x="1419022" y="425153"/>
-                    <a:pt x="1436915" y="421574"/>
-                  </a:cubicBezTo>
-                  <a:cubicBezTo>
-                    <a:pt x="1458614" y="417234"/>
-                    <a:pt x="1480458" y="413657"/>
-                    <a:pt x="1502229" y="409698"/>
-                  </a:cubicBezTo>
-                  <a:cubicBezTo>
-                    <a:pt x="1563775" y="383321"/>
-                    <a:pt x="1557845" y="383919"/>
-                    <a:pt x="1644733" y="362197"/>
-                  </a:cubicBezTo>
-                  <a:cubicBezTo>
-                    <a:pt x="1660567" y="358239"/>
-                    <a:pt x="1676751" y="355483"/>
-                    <a:pt x="1692234" y="350322"/>
-                  </a:cubicBezTo>
-                  <a:cubicBezTo>
-                    <a:pt x="1718387" y="341604"/>
-                    <a:pt x="1742680" y="327319"/>
-                    <a:pt x="1769424" y="320633"/>
-                  </a:cubicBezTo>
-                  <a:cubicBezTo>
-                    <a:pt x="1817240" y="308679"/>
-                    <a:pt x="1848153" y="300381"/>
-                    <a:pt x="1900052" y="290945"/>
-                  </a:cubicBezTo>
-                  <a:cubicBezTo>
-                    <a:pt x="1915752" y="288090"/>
-                    <a:pt x="1931720" y="286986"/>
-                    <a:pt x="1947554" y="285007"/>
-                  </a:cubicBezTo>
-                  <a:cubicBezTo>
-                    <a:pt x="2126292" y="213512"/>
-                    <a:pt x="1975903" y="276527"/>
-                    <a:pt x="2072245" y="231568"/>
-                  </a:cubicBezTo>
-                  <a:cubicBezTo>
-                    <a:pt x="2089909" y="223325"/>
-                    <a:pt x="2108434" y="216897"/>
-                    <a:pt x="2125683" y="207818"/>
-                  </a:cubicBezTo>
-                  <a:cubicBezTo>
-                    <a:pt x="2150527" y="194742"/>
-                    <a:pt x="2185039" y="174189"/>
-                    <a:pt x="2208811" y="154379"/>
-                  </a:cubicBezTo>
-                  <a:cubicBezTo>
-                    <a:pt x="2223455" y="142175"/>
-                    <a:pt x="2224801" y="135191"/>
-                    <a:pt x="2238499" y="118753"/>
-                  </a:cubicBezTo>
-                  <a:cubicBezTo>
-                    <a:pt x="2242083" y="114452"/>
-                    <a:pt x="2246877" y="111248"/>
-                    <a:pt x="2250374" y="106877"/>
-                  </a:cubicBezTo>
-                  <a:cubicBezTo>
-                    <a:pt x="2254832" y="101304"/>
-                    <a:pt x="2257204" y="94110"/>
-                    <a:pt x="2262250" y="89064"/>
-                  </a:cubicBezTo>
-                  <a:cubicBezTo>
-                    <a:pt x="2267296" y="84018"/>
-                    <a:pt x="2274581" y="81757"/>
-                    <a:pt x="2280063" y="77189"/>
-                  </a:cubicBezTo>
-                  <a:cubicBezTo>
-                    <a:pt x="2286514" y="71813"/>
-                    <a:pt x="2291938" y="65314"/>
-                    <a:pt x="2297876" y="59376"/>
-                  </a:cubicBezTo>
-                  <a:cubicBezTo>
-                    <a:pt x="2311658" y="18027"/>
-                    <a:pt x="2293954" y="62290"/>
-                    <a:pt x="2315689" y="29688"/>
-                  </a:cubicBezTo>
-                  <a:cubicBezTo>
-                    <a:pt x="2320599" y="22323"/>
-                    <a:pt x="2327564" y="5937"/>
-                    <a:pt x="2327564" y="5937"/>
-                  </a:cubicBezTo>
-                </a:path>
-              </a:pathLst>
-            </a:custGeom>
-            <a:noFill/>
-          </p:spPr>
-          <p:style>
-            <a:lnRef idx="2">
-              <a:schemeClr val="accent1">
-                <a:shade val="50000"/>
-              </a:schemeClr>
-            </a:lnRef>
-            <a:fillRef idx="1">
-              <a:schemeClr val="accent1"/>
-            </a:fillRef>
-            <a:effectRef idx="0">
-              <a:schemeClr val="accent1"/>
-            </a:effectRef>
-            <a:fontRef idx="minor">
-              <a:schemeClr val="lt1"/>
-            </a:fontRef>
-          </p:style>
-          <p:txBody>
-            <a:bodyPr rtlCol="0" anchor="ctr"/>
-            <a:lstStyle/>
-            <a:p>
-              <a:pPr algn="ctr"/>
-              <a:endParaRPr lang="fr-FR" dirty="0"/>
-            </a:p>
-          </p:txBody>
-        </p:sp>
-        <p:sp>
-          <p:nvSpPr>
-            <p:cNvPr id="13" name="Forme libre : forme 12">
-              <a:extLst>
-                <a:ext uri="{FF2B5EF4-FFF2-40B4-BE49-F238E27FC236}">
-                  <a16:creationId xmlns:a16="http://schemas.microsoft.com/office/drawing/2014/main" id="{FA9FF1DE-4FE5-308E-0EDD-263FFC181F4A}"/>
-                </a:ext>
-              </a:extLst>
-            </p:cNvPr>
-            <p:cNvSpPr/>
-            <p:nvPr/>
-          </p:nvSpPr>
-          <p:spPr>
-            <a:xfrm>
-              <a:off x="3657600" y="5041075"/>
-              <a:ext cx="255319" cy="955964"/>
-            </a:xfrm>
-            <a:custGeom>
-              <a:avLst/>
-              <a:gdLst>
-                <a:gd name="connsiteX0" fmla="*/ 136566 w 255319"/>
-                <a:gd name="connsiteY0" fmla="*/ 0 h 955964"/>
-                <a:gd name="connsiteX1" fmla="*/ 178130 w 255319"/>
-                <a:gd name="connsiteY1" fmla="*/ 65315 h 955964"/>
-                <a:gd name="connsiteX2" fmla="*/ 190005 w 255319"/>
-                <a:gd name="connsiteY2" fmla="*/ 83128 h 955964"/>
-                <a:gd name="connsiteX3" fmla="*/ 225631 w 255319"/>
-                <a:gd name="connsiteY3" fmla="*/ 154380 h 955964"/>
-                <a:gd name="connsiteX4" fmla="*/ 237506 w 255319"/>
-                <a:gd name="connsiteY4" fmla="*/ 178130 h 955964"/>
-                <a:gd name="connsiteX5" fmla="*/ 255319 w 255319"/>
-                <a:gd name="connsiteY5" fmla="*/ 249382 h 955964"/>
-                <a:gd name="connsiteX6" fmla="*/ 243444 w 255319"/>
-                <a:gd name="connsiteY6" fmla="*/ 480951 h 955964"/>
-                <a:gd name="connsiteX7" fmla="*/ 243444 w 255319"/>
-                <a:gd name="connsiteY7" fmla="*/ 552203 h 955964"/>
-                <a:gd name="connsiteX8" fmla="*/ 195943 w 255319"/>
-                <a:gd name="connsiteY8" fmla="*/ 653143 h 955964"/>
-                <a:gd name="connsiteX9" fmla="*/ 178130 w 255319"/>
-                <a:gd name="connsiteY9" fmla="*/ 688769 h 955964"/>
-                <a:gd name="connsiteX10" fmla="*/ 166255 w 255319"/>
-                <a:gd name="connsiteY10" fmla="*/ 706582 h 955964"/>
-                <a:gd name="connsiteX11" fmla="*/ 154379 w 255319"/>
-                <a:gd name="connsiteY11" fmla="*/ 730333 h 955964"/>
-                <a:gd name="connsiteX12" fmla="*/ 130629 w 255319"/>
-                <a:gd name="connsiteY12" fmla="*/ 754083 h 955964"/>
-                <a:gd name="connsiteX13" fmla="*/ 106878 w 255319"/>
-                <a:gd name="connsiteY13" fmla="*/ 801585 h 955964"/>
-                <a:gd name="connsiteX14" fmla="*/ 95003 w 255319"/>
-                <a:gd name="connsiteY14" fmla="*/ 825335 h 955964"/>
-                <a:gd name="connsiteX15" fmla="*/ 71252 w 255319"/>
-                <a:gd name="connsiteY15" fmla="*/ 849086 h 955964"/>
-                <a:gd name="connsiteX16" fmla="*/ 35626 w 255319"/>
-                <a:gd name="connsiteY16" fmla="*/ 902525 h 955964"/>
-                <a:gd name="connsiteX17" fmla="*/ 29688 w 255319"/>
-                <a:gd name="connsiteY17" fmla="*/ 920338 h 955964"/>
-                <a:gd name="connsiteX18" fmla="*/ 0 w 255319"/>
-                <a:gd name="connsiteY18" fmla="*/ 955964 h 955964"/>
-              </a:gdLst>
-              <a:ahLst/>
-              <a:cxnLst>
-                <a:cxn ang="0">
-                  <a:pos x="connsiteX0" y="connsiteY0"/>
-                </a:cxn>
-                <a:cxn ang="0">
-                  <a:pos x="connsiteX1" y="connsiteY1"/>
-                </a:cxn>
-                <a:cxn ang="0">
-                  <a:pos x="connsiteX2" y="connsiteY2"/>
-                </a:cxn>
-                <a:cxn ang="0">
-                  <a:pos x="connsiteX3" y="connsiteY3"/>
-                </a:cxn>
-                <a:cxn ang="0">
-                  <a:pos x="connsiteX4" y="connsiteY4"/>
-                </a:cxn>
-                <a:cxn ang="0">
-                  <a:pos x="connsiteX5" y="connsiteY5"/>
-                </a:cxn>
-                <a:cxn ang="0">
-                  <a:pos x="connsiteX6" y="connsiteY6"/>
-                </a:cxn>
-                <a:cxn ang="0">
-                  <a:pos x="connsiteX7" y="connsiteY7"/>
-                </a:cxn>
-                <a:cxn ang="0">
-                  <a:pos x="connsiteX8" y="connsiteY8"/>
-                </a:cxn>
-                <a:cxn ang="0">
-                  <a:pos x="connsiteX9" y="connsiteY9"/>
-                </a:cxn>
-                <a:cxn ang="0">
-                  <a:pos x="connsiteX10" y="connsiteY10"/>
-                </a:cxn>
-                <a:cxn ang="0">
-                  <a:pos x="connsiteX11" y="connsiteY11"/>
-                </a:cxn>
-                <a:cxn ang="0">
-                  <a:pos x="connsiteX12" y="connsiteY12"/>
-                </a:cxn>
-                <a:cxn ang="0">
-                  <a:pos x="connsiteX13" y="connsiteY13"/>
-                </a:cxn>
-                <a:cxn ang="0">
-                  <a:pos x="connsiteX14" y="connsiteY14"/>
-                </a:cxn>
-                <a:cxn ang="0">
-                  <a:pos x="connsiteX15" y="connsiteY15"/>
-                </a:cxn>
-                <a:cxn ang="0">
-                  <a:pos x="connsiteX16" y="connsiteY16"/>
-                </a:cxn>
-                <a:cxn ang="0">
-                  <a:pos x="connsiteX17" y="connsiteY17"/>
-                </a:cxn>
-                <a:cxn ang="0">
-                  <a:pos x="connsiteX18" y="connsiteY18"/>
-                </a:cxn>
-              </a:cxnLst>
-              <a:rect l="l" t="t" r="r" b="b"/>
-              <a:pathLst>
-                <a:path w="255319" h="955964">
-                  <a:moveTo>
-                    <a:pt x="136566" y="0"/>
-                  </a:moveTo>
-                  <a:cubicBezTo>
-                    <a:pt x="186041" y="49475"/>
-                    <a:pt x="152049" y="6631"/>
-                    <a:pt x="178130" y="65315"/>
-                  </a:cubicBezTo>
-                  <a:cubicBezTo>
-                    <a:pt x="181028" y="71836"/>
-                    <a:pt x="186647" y="76831"/>
-                    <a:pt x="190005" y="83128"/>
-                  </a:cubicBezTo>
-                  <a:cubicBezTo>
-                    <a:pt x="202501" y="106558"/>
-                    <a:pt x="213756" y="130629"/>
-                    <a:pt x="225631" y="154380"/>
-                  </a:cubicBezTo>
-                  <a:cubicBezTo>
-                    <a:pt x="229589" y="162297"/>
-                    <a:pt x="235074" y="169619"/>
-                    <a:pt x="237506" y="178130"/>
-                  </a:cubicBezTo>
-                  <a:cubicBezTo>
-                    <a:pt x="252155" y="229398"/>
-                    <a:pt x="246556" y="205565"/>
-                    <a:pt x="255319" y="249382"/>
-                  </a:cubicBezTo>
-                  <a:cubicBezTo>
-                    <a:pt x="251361" y="326572"/>
-                    <a:pt x="248702" y="403839"/>
-                    <a:pt x="243444" y="480951"/>
-                  </a:cubicBezTo>
-                  <a:cubicBezTo>
-                    <a:pt x="238635" y="551480"/>
-                    <a:pt x="230706" y="463043"/>
-                    <a:pt x="243444" y="552203"/>
-                  </a:cubicBezTo>
-                  <a:cubicBezTo>
-                    <a:pt x="216914" y="614106"/>
-                    <a:pt x="232372" y="580285"/>
-                    <a:pt x="195943" y="653143"/>
-                  </a:cubicBezTo>
-                  <a:cubicBezTo>
-                    <a:pt x="190005" y="665018"/>
-                    <a:pt x="185495" y="677722"/>
-                    <a:pt x="178130" y="688769"/>
-                  </a:cubicBezTo>
-                  <a:cubicBezTo>
-                    <a:pt x="174172" y="694707"/>
-                    <a:pt x="169796" y="700386"/>
-                    <a:pt x="166255" y="706582"/>
-                  </a:cubicBezTo>
-                  <a:cubicBezTo>
-                    <a:pt x="161863" y="714267"/>
-                    <a:pt x="159690" y="723252"/>
-                    <a:pt x="154379" y="730333"/>
-                  </a:cubicBezTo>
-                  <a:cubicBezTo>
-                    <a:pt x="147661" y="739290"/>
-                    <a:pt x="138546" y="746166"/>
-                    <a:pt x="130629" y="754083"/>
-                  </a:cubicBezTo>
-                  <a:cubicBezTo>
-                    <a:pt x="119774" y="786647"/>
-                    <a:pt x="130248" y="759518"/>
-                    <a:pt x="106878" y="801585"/>
-                  </a:cubicBezTo>
-                  <a:cubicBezTo>
-                    <a:pt x="102580" y="809322"/>
-                    <a:pt x="100314" y="818254"/>
-                    <a:pt x="95003" y="825335"/>
-                  </a:cubicBezTo>
-                  <a:cubicBezTo>
-                    <a:pt x="88285" y="834292"/>
-                    <a:pt x="79169" y="841169"/>
-                    <a:pt x="71252" y="849086"/>
-                  </a:cubicBezTo>
-                  <a:cubicBezTo>
-                    <a:pt x="35822" y="919949"/>
-                    <a:pt x="90517" y="814701"/>
-                    <a:pt x="35626" y="902525"/>
-                  </a:cubicBezTo>
-                  <a:cubicBezTo>
-                    <a:pt x="32309" y="907832"/>
-                    <a:pt x="32793" y="914904"/>
-                    <a:pt x="29688" y="920338"/>
-                  </a:cubicBezTo>
-                  <a:cubicBezTo>
-                    <a:pt x="20278" y="936806"/>
-                    <a:pt x="12220" y="943744"/>
-                    <a:pt x="0" y="955964"/>
-                  </a:cubicBezTo>
-                </a:path>
-              </a:pathLst>
-            </a:custGeom>
-            <a:noFill/>
-          </p:spPr>
-          <p:style>
-            <a:lnRef idx="2">
-              <a:schemeClr val="accent1">
-                <a:shade val="50000"/>
-              </a:schemeClr>
-            </a:lnRef>
-            <a:fillRef idx="1">
-              <a:schemeClr val="accent1"/>
-            </a:fillRef>
-            <a:effectRef idx="0">
-              <a:schemeClr val="accent1"/>
-            </a:effectRef>
-            <a:fontRef idx="minor">
-              <a:schemeClr val="lt1"/>
-            </a:fontRef>
-          </p:style>
-          <p:txBody>
-            <a:bodyPr rtlCol="0" anchor="ctr"/>
-            <a:lstStyle/>
-            <a:p>
-              <a:pPr algn="ctr"/>
-              <a:endParaRPr lang="fr-FR"/>
-            </a:p>
-          </p:txBody>
-        </p:sp>
-        <p:sp>
-          <p:nvSpPr>
             <p:cNvPr id="14" name="ZoneTexte 13">
               <a:extLst>
                 <a:ext uri="{FF2B5EF4-FFF2-40B4-BE49-F238E27FC236}">
@@ -8297,10 +9933,308 @@
           </a:p>
         </p:txBody>
       </p:sp>
+      <p:sp>
+        <p:nvSpPr>
+          <p:cNvPr id="11" name="Arc 10">
+            <a:extLst>
+              <a:ext uri="{FF2B5EF4-FFF2-40B4-BE49-F238E27FC236}">
+                <a16:creationId xmlns:a16="http://schemas.microsoft.com/office/drawing/2014/main" id="{AC1F743A-835E-2134-74F2-2C58CFFA500C}"/>
+              </a:ext>
+            </a:extLst>
+          </p:cNvPr>
+          <p:cNvSpPr/>
+          <p:nvPr/>
+        </p:nvSpPr>
+        <p:spPr>
+          <a:xfrm rot="10800000">
+            <a:off x="4526952" y="4075609"/>
+            <a:ext cx="2221565" cy="792000"/>
+          </a:xfrm>
+          <a:prstGeom prst="arc">
+            <a:avLst>
+              <a:gd name="adj1" fmla="val 10723134"/>
+              <a:gd name="adj2" fmla="val 0"/>
+            </a:avLst>
+          </a:prstGeom>
+          <a:ln w="19050">
+            <a:solidFill>
+              <a:schemeClr val="bg1">
+                <a:alpha val="60000"/>
+              </a:schemeClr>
+            </a:solidFill>
+          </a:ln>
+        </p:spPr>
+        <p:style>
+          <a:lnRef idx="1">
+            <a:schemeClr val="accent1"/>
+          </a:lnRef>
+          <a:fillRef idx="0">
+            <a:schemeClr val="accent1"/>
+          </a:fillRef>
+          <a:effectRef idx="0">
+            <a:schemeClr val="accent1"/>
+          </a:effectRef>
+          <a:fontRef idx="minor">
+            <a:schemeClr val="tx1"/>
+          </a:fontRef>
+        </p:style>
+        <p:txBody>
+          <a:bodyPr rtlCol="0" anchor="ctr"/>
+          <a:lstStyle/>
+          <a:p>
+            <a:pPr algn="ctr"/>
+            <a:endParaRPr lang="fr-FR"/>
+          </a:p>
+        </p:txBody>
+      </p:sp>
+      <p:sp>
+        <p:nvSpPr>
+          <p:cNvPr id="17" name="Triangle isocèle 16">
+            <a:extLst>
+              <a:ext uri="{FF2B5EF4-FFF2-40B4-BE49-F238E27FC236}">
+                <a16:creationId xmlns:a16="http://schemas.microsoft.com/office/drawing/2014/main" id="{123EE1A4-71F5-F431-94E4-63BD5EB97FAB}"/>
+              </a:ext>
+            </a:extLst>
+          </p:cNvPr>
+          <p:cNvSpPr/>
+          <p:nvPr/>
+        </p:nvSpPr>
+        <p:spPr>
+          <a:xfrm rot="1602194">
+            <a:off x="6678230" y="4427581"/>
+            <a:ext cx="140576" cy="151577"/>
+          </a:xfrm>
+          <a:prstGeom prst="triangle">
+            <a:avLst/>
+          </a:prstGeom>
+        </p:spPr>
+        <p:style>
+          <a:lnRef idx="2">
+            <a:schemeClr val="dk1">
+              <a:shade val="50000"/>
+            </a:schemeClr>
+          </a:lnRef>
+          <a:fillRef idx="1">
+            <a:schemeClr val="dk1"/>
+          </a:fillRef>
+          <a:effectRef idx="0">
+            <a:schemeClr val="dk1"/>
+          </a:effectRef>
+          <a:fontRef idx="minor">
+            <a:schemeClr val="lt1"/>
+          </a:fontRef>
+        </p:style>
+        <p:txBody>
+          <a:bodyPr rtlCol="0" anchor="ctr"/>
+          <a:lstStyle/>
+          <a:p>
+            <a:pPr algn="ctr"/>
+            <a:endParaRPr lang="fr-FR"/>
+          </a:p>
+        </p:txBody>
+      </p:sp>
+      <p:sp>
+        <p:nvSpPr>
+          <p:cNvPr id="19" name="Arc 18">
+            <a:extLst>
+              <a:ext uri="{FF2B5EF4-FFF2-40B4-BE49-F238E27FC236}">
+                <a16:creationId xmlns:a16="http://schemas.microsoft.com/office/drawing/2014/main" id="{E6AC596C-2A4D-7BFE-C911-7C1016D256CB}"/>
+              </a:ext>
+            </a:extLst>
+          </p:cNvPr>
+          <p:cNvSpPr/>
+          <p:nvPr/>
+        </p:nvSpPr>
+        <p:spPr>
+          <a:xfrm rot="2982496">
+            <a:off x="5238449" y="4382331"/>
+            <a:ext cx="1083378" cy="1899987"/>
+          </a:xfrm>
+          <a:prstGeom prst="arc">
+            <a:avLst/>
+          </a:prstGeom>
+          <a:noFill/>
+          <a:ln w="25400">
+            <a:solidFill>
+              <a:schemeClr val="bg1">
+                <a:alpha val="60000"/>
+              </a:schemeClr>
+            </a:solidFill>
+          </a:ln>
+        </p:spPr>
+        <p:style>
+          <a:lnRef idx="1">
+            <a:schemeClr val="accent1"/>
+          </a:lnRef>
+          <a:fillRef idx="0">
+            <a:schemeClr val="accent1"/>
+          </a:fillRef>
+          <a:effectRef idx="0">
+            <a:schemeClr val="accent1"/>
+          </a:effectRef>
+          <a:fontRef idx="minor">
+            <a:schemeClr val="tx1"/>
+          </a:fontRef>
+        </p:style>
+        <p:txBody>
+          <a:bodyPr rtlCol="0" anchor="ctr"/>
+          <a:lstStyle/>
+          <a:p>
+            <a:pPr algn="ctr"/>
+            <a:endParaRPr lang="fr-FR"/>
+          </a:p>
+        </p:txBody>
+      </p:sp>
+      <p:sp>
+        <p:nvSpPr>
+          <p:cNvPr id="20" name="Triangle isocèle 19">
+            <a:extLst>
+              <a:ext uri="{FF2B5EF4-FFF2-40B4-BE49-F238E27FC236}">
+                <a16:creationId xmlns:a16="http://schemas.microsoft.com/office/drawing/2014/main" id="{231A63F3-7C05-DA28-D1BE-4B83DB3C1B93}"/>
+              </a:ext>
+            </a:extLst>
+          </p:cNvPr>
+          <p:cNvSpPr/>
+          <p:nvPr/>
+        </p:nvSpPr>
+        <p:spPr>
+          <a:xfrm rot="13768093">
+            <a:off x="6042603" y="5697511"/>
+            <a:ext cx="106791" cy="126815"/>
+          </a:xfrm>
+          <a:prstGeom prst="triangle">
+            <a:avLst/>
+          </a:prstGeom>
+        </p:spPr>
+        <p:style>
+          <a:lnRef idx="2">
+            <a:schemeClr val="accent1">
+              <a:shade val="50000"/>
+            </a:schemeClr>
+          </a:lnRef>
+          <a:fillRef idx="1">
+            <a:schemeClr val="accent1"/>
+          </a:fillRef>
+          <a:effectRef idx="0">
+            <a:schemeClr val="accent1"/>
+          </a:effectRef>
+          <a:fontRef idx="minor">
+            <a:schemeClr val="lt1"/>
+          </a:fontRef>
+        </p:style>
+        <p:txBody>
+          <a:bodyPr rtlCol="0" anchor="ctr"/>
+          <a:lstStyle/>
+          <a:p>
+            <a:pPr algn="ctr"/>
+            <a:endParaRPr lang="fr-FR"/>
+          </a:p>
+        </p:txBody>
+      </p:sp>
     </p:spTree>
     <p:extLst>
       <p:ext uri="{BB962C8B-B14F-4D97-AF65-F5344CB8AC3E}">
         <p14:creationId xmlns:p14="http://schemas.microsoft.com/office/powerpoint/2010/main" val="1828321080"/>
+      </p:ext>
+    </p:extLst>
+  </p:cSld>
+  <p:clrMapOvr>
+    <a:masterClrMapping/>
+  </p:clrMapOvr>
+</p:sld>
+</file>
+
+<file path=ppt/slides/slide8.xml><?xml version="1.0" encoding="utf-8"?>
+<p:sld xmlns:a="http://schemas.openxmlformats.org/drawingml/2006/main" xmlns:r="http://schemas.openxmlformats.org/officeDocument/2006/relationships" xmlns:p="http://schemas.openxmlformats.org/presentationml/2006/main">
+  <p:cSld>
+    <p:spTree>
+      <p:nvGrpSpPr>
+        <p:cNvPr id="1" name=""/>
+        <p:cNvGrpSpPr/>
+        <p:nvPr/>
+      </p:nvGrpSpPr>
+      <p:grpSpPr>
+        <a:xfrm>
+          <a:off x="0" y="0"/>
+          <a:ext cx="0" cy="0"/>
+          <a:chOff x="0" y="0"/>
+          <a:chExt cx="0" cy="0"/>
+        </a:xfrm>
+      </p:grpSpPr>
+      <p:sp>
+        <p:nvSpPr>
+          <p:cNvPr id="3" name="Espace réservé du contenu 2">
+            <a:extLst>
+              <a:ext uri="{FF2B5EF4-FFF2-40B4-BE49-F238E27FC236}">
+                <a16:creationId xmlns:a16="http://schemas.microsoft.com/office/drawing/2014/main" id="{2F4828E4-7313-5F64-2274-5E5DC1C0E42B}"/>
+              </a:ext>
+            </a:extLst>
+          </p:cNvPr>
+          <p:cNvSpPr>
+            <a:spLocks noGrp="1"/>
+          </p:cNvSpPr>
+          <p:nvPr>
+            <p:ph idx="1"/>
+          </p:nvPr>
+        </p:nvSpPr>
+        <p:spPr>
+          <a:xfrm>
+            <a:off x="684212" y="685800"/>
+            <a:ext cx="2345182" cy="813391"/>
+          </a:xfrm>
+        </p:spPr>
+        <p:txBody>
+          <a:bodyPr/>
+          <a:lstStyle/>
+          <a:p>
+            <a:pPr marL="0" indent="0">
+              <a:buNone/>
+            </a:pPr>
+            <a:r>
+              <a:rPr lang="fr-FR" b="1" u="sng" dirty="0">
+                <a:solidFill>
+                  <a:srgbClr val="751515"/>
+                </a:solidFill>
+              </a:rPr>
+              <a:t>Maquettage:</a:t>
+            </a:r>
+          </a:p>
+        </p:txBody>
+      </p:sp>
+      <p:pic>
+        <p:nvPicPr>
+          <p:cNvPr id="6" name="Image 5">
+            <a:extLst>
+              <a:ext uri="{FF2B5EF4-FFF2-40B4-BE49-F238E27FC236}">
+                <a16:creationId xmlns:a16="http://schemas.microsoft.com/office/drawing/2014/main" id="{B4C03A27-D96A-548C-36FB-4BCF8E2D5090}"/>
+              </a:ext>
+            </a:extLst>
+          </p:cNvPr>
+          <p:cNvPicPr>
+            <a:picLocks noChangeAspect="1"/>
+          </p:cNvPicPr>
+          <p:nvPr/>
+        </p:nvPicPr>
+        <p:blipFill>
+          <a:blip r:embed="rId2"/>
+          <a:stretch>
+            <a:fillRect/>
+          </a:stretch>
+        </p:blipFill>
+        <p:spPr>
+          <a:xfrm>
+            <a:off x="3127633" y="1848018"/>
+            <a:ext cx="4985009" cy="3161963"/>
+          </a:xfrm>
+          <a:prstGeom prst="rect">
+            <a:avLst/>
+          </a:prstGeom>
+        </p:spPr>
+      </p:pic>
+    </p:spTree>
+    <p:extLst>
+      <p:ext uri="{BB962C8B-B14F-4D97-AF65-F5344CB8AC3E}">
+        <p14:creationId xmlns:p14="http://schemas.microsoft.com/office/powerpoint/2010/main" val="2417484879"/>
       </p:ext>
     </p:extLst>
   </p:cSld>
@@ -8329,10 +10263,10 @@
       </p:grpSpPr>
       <p:sp>
         <p:nvSpPr>
-          <p:cNvPr id="6" name="ZoneTexte 5">
+          <p:cNvPr id="4" name="ZoneTexte 3">
             <a:extLst>
               <a:ext uri="{FF2B5EF4-FFF2-40B4-BE49-F238E27FC236}">
-                <a16:creationId xmlns:a16="http://schemas.microsoft.com/office/drawing/2014/main" id="{C547E21B-BCB9-D52B-C5AB-7AC538003AD4}"/>
+                <a16:creationId xmlns:a16="http://schemas.microsoft.com/office/drawing/2014/main" id="{4621F259-1F04-9B5A-8812-4A8DDED1E49B}"/>
               </a:ext>
             </a:extLst>
           </p:cNvPr>
@@ -8341,8 +10275,8 @@
         </p:nvSpPr>
         <p:spPr>
           <a:xfrm>
-            <a:off x="1050966" y="611579"/>
-            <a:ext cx="9429008" cy="2031325"/>
+            <a:off x="691116" y="265814"/>
+            <a:ext cx="2392325" cy="400110"/>
           </a:xfrm>
           <a:prstGeom prst="rect">
             <a:avLst/>
@@ -8356,180 +10290,88 @@
           <a:lstStyle/>
           <a:p>
             <a:r>
+              <a:rPr lang="fr-FR" sz="2000" b="1" u="sng" dirty="0">
+                <a:solidFill>
+                  <a:srgbClr val="8F1919"/>
+                </a:solidFill>
+              </a:rPr>
+              <a:t>Zoning</a:t>
+            </a:r>
+            <a:r>
               <a:rPr lang="fr-FR" b="1" u="sng" dirty="0">
                 <a:solidFill>
-                  <a:srgbClr val="751515"/>
+                  <a:srgbClr val="8F1919"/>
                 </a:solidFill>
               </a:rPr>
-              <a:t>Les contraintes:</a:t>
-            </a:r>
-          </a:p>
-          <a:p>
-            <a:pPr lvl="1"/>
-            <a:r>
-              <a:rPr lang="fr-FR" dirty="0"/>
-              <a:t>- Présence d’un </a:t>
-            </a:r>
-            <a:r>
-              <a:rPr lang="fr-FR" dirty="0" err="1"/>
-              <a:t>slider</a:t>
-            </a:r>
-            <a:r>
-              <a:rPr lang="fr-FR" dirty="0"/>
-              <a:t> pour visionner les tableaux.</a:t>
-            </a:r>
-          </a:p>
-          <a:p>
-            <a:pPr lvl="1"/>
-            <a:r>
-              <a:rPr lang="fr-FR" dirty="0"/>
-              <a:t>- Développer une base de données pour les commentaires et les tableaux.</a:t>
-            </a:r>
-          </a:p>
-          <a:p>
-            <a:pPr lvl="1"/>
-            <a:r>
-              <a:rPr lang="fr-FR" dirty="0"/>
-              <a:t>- Utilisation du HTML/CSS, JavaScript, MySQL.</a:t>
-            </a:r>
-          </a:p>
-          <a:p>
-            <a:pPr lvl="1"/>
-            <a:r>
-              <a:rPr lang="fr-FR" dirty="0"/>
-              <a:t>- Assurer la maintenance, l’hébergement du site.</a:t>
-            </a:r>
-          </a:p>
-          <a:p>
-            <a:pPr lvl="1"/>
-            <a:r>
-              <a:rPr lang="fr-FR" dirty="0"/>
-              <a:t>- Petite formation pour l’ajout des tableaux.</a:t>
-            </a:r>
-          </a:p>
-          <a:p>
-            <a:endParaRPr lang="fr-FR" dirty="0"/>
-          </a:p>
-        </p:txBody>
-      </p:sp>
-      <p:sp>
-        <p:nvSpPr>
-          <p:cNvPr id="7" name="ZoneTexte 6">
+              <a:t>:</a:t>
+            </a:r>
+          </a:p>
+        </p:txBody>
+      </p:sp>
+      <p:pic>
+        <p:nvPicPr>
+          <p:cNvPr id="6" name="Image 5">
             <a:extLst>
               <a:ext uri="{FF2B5EF4-FFF2-40B4-BE49-F238E27FC236}">
-                <a16:creationId xmlns:a16="http://schemas.microsoft.com/office/drawing/2014/main" id="{57C6970D-45B3-E42A-42FC-07A833CD706F}"/>
+                <a16:creationId xmlns:a16="http://schemas.microsoft.com/office/drawing/2014/main" id="{29F5E604-492A-EDF3-526D-8A44DE1EFCA6}"/>
               </a:ext>
             </a:extLst>
           </p:cNvPr>
-          <p:cNvSpPr txBox="1"/>
+          <p:cNvPicPr>
+            <a:picLocks noChangeAspect="1"/>
+          </p:cNvPicPr>
           <p:nvPr/>
-        </p:nvSpPr>
+        </p:nvPicPr>
+        <p:blipFill>
+          <a:blip r:embed="rId2"/>
+          <a:stretch>
+            <a:fillRect/>
+          </a:stretch>
+        </p:blipFill>
         <p:spPr>
           <a:xfrm>
-            <a:off x="1050966" y="2642904"/>
-            <a:ext cx="9619013" cy="1200329"/>
+            <a:off x="344339" y="1071274"/>
+            <a:ext cx="5772084" cy="3926028"/>
           </a:xfrm>
           <a:prstGeom prst="rect">
             <a:avLst/>
           </a:prstGeom>
-          <a:noFill/>
         </p:spPr>
-        <p:txBody>
-          <a:bodyPr wrap="square" rtlCol="0">
-            <a:spAutoFit/>
-          </a:bodyPr>
-          <a:lstStyle/>
-          <a:p>
-            <a:r>
-              <a:rPr lang="fr-FR" b="1" u="sng" dirty="0">
-                <a:solidFill>
-                  <a:srgbClr val="751515"/>
-                </a:solidFill>
-              </a:rPr>
-              <a:t>Les contraintes légales:</a:t>
-            </a:r>
-          </a:p>
-          <a:p>
-            <a:r>
-              <a:rPr lang="fr-FR" dirty="0"/>
-              <a:t>	- Propriétaires du site Mr Soulier.</a:t>
-            </a:r>
-          </a:p>
-          <a:p>
-            <a:r>
-              <a:rPr lang="fr-FR" dirty="0"/>
-              <a:t>	- Maquettage, intégrations ainsi que le code source appartiennent à Mr Pierrot.</a:t>
-            </a:r>
-          </a:p>
-          <a:p>
-            <a:r>
-              <a:rPr lang="fr-FR" dirty="0"/>
-              <a:t>	</a:t>
-            </a:r>
-          </a:p>
-        </p:txBody>
-      </p:sp>
-      <p:sp>
-        <p:nvSpPr>
-          <p:cNvPr id="8" name="ZoneTexte 7">
+      </p:pic>
+      <p:pic>
+        <p:nvPicPr>
+          <p:cNvPr id="8" name="Image 7">
             <a:extLst>
               <a:ext uri="{FF2B5EF4-FFF2-40B4-BE49-F238E27FC236}">
-                <a16:creationId xmlns:a16="http://schemas.microsoft.com/office/drawing/2014/main" id="{D50139A6-F1AF-17F1-F1DF-8CEF331330BB}"/>
+                <a16:creationId xmlns:a16="http://schemas.microsoft.com/office/drawing/2014/main" id="{FFBFA800-E64C-3C3F-131C-0BD211A751BB}"/>
               </a:ext>
             </a:extLst>
           </p:cNvPr>
-          <p:cNvSpPr txBox="1"/>
+          <p:cNvPicPr>
+            <a:picLocks noChangeAspect="1"/>
+          </p:cNvPicPr>
           <p:nvPr/>
-        </p:nvSpPr>
+        </p:nvPicPr>
+        <p:blipFill>
+          <a:blip r:embed="rId3"/>
+          <a:stretch>
+            <a:fillRect/>
+          </a:stretch>
+        </p:blipFill>
         <p:spPr>
           <a:xfrm>
-            <a:off x="1050966" y="4138551"/>
-            <a:ext cx="9909959" cy="1477328"/>
+            <a:off x="6407016" y="1071274"/>
+            <a:ext cx="5751942" cy="3926028"/>
           </a:xfrm>
           <a:prstGeom prst="rect">
             <a:avLst/>
           </a:prstGeom>
-          <a:noFill/>
         </p:spPr>
-        <p:txBody>
-          <a:bodyPr wrap="square" rtlCol="0">
-            <a:spAutoFit/>
-          </a:bodyPr>
-          <a:lstStyle/>
-          <a:p>
-            <a:r>
-              <a:rPr lang="fr-FR" b="1" u="sng" dirty="0">
-                <a:solidFill>
-                  <a:srgbClr val="751515"/>
-                </a:solidFill>
-              </a:rPr>
-              <a:t>Les coûts et délais:</a:t>
-            </a:r>
-          </a:p>
-          <a:p>
-            <a:r>
-              <a:rPr lang="fr-FR" dirty="0"/>
-              <a:t>	- Sites offert soit un gain de 150 euros/jour/développeur pour 10 jours.</a:t>
-            </a:r>
-          </a:p>
-          <a:p>
-            <a:r>
-              <a:rPr lang="fr-FR" dirty="0"/>
-              <a:t>	  comprenant le cahier des charges, le maquettage, la création d’un logo, la 	  	      	  création du site, la création de la base de données, la mise en ligne.</a:t>
-            </a:r>
-          </a:p>
-          <a:p>
-            <a:r>
-              <a:rPr lang="fr-FR" dirty="0"/>
-              <a:t>	- Livraisons prévu le 03 juillet 2023.</a:t>
-            </a:r>
-          </a:p>
-        </p:txBody>
-      </p:sp>
+      </p:pic>
     </p:spTree>
     <p:extLst>
       <p:ext uri="{BB962C8B-B14F-4D97-AF65-F5344CB8AC3E}">
-        <p14:creationId xmlns:p14="http://schemas.microsoft.com/office/powerpoint/2010/main" val="1279676495"/>
+        <p14:creationId xmlns:p14="http://schemas.microsoft.com/office/powerpoint/2010/main" val="244449949"/>
       </p:ext>
     </p:extLst>
   </p:cSld>

</xml_diff>

<commit_message>
fin cdc power point
</commit_message>
<xml_diff>
--- a/CDC/L_artiste.pptx
+++ b/CDC/L_artiste.pptx
@@ -5,7 +5,7 @@
     <p:sldMasterId id="2147483648" r:id="rId1"/>
   </p:sldMasterIdLst>
   <p:notesMasterIdLst>
-    <p:notesMasterId r:id="rId18"/>
+    <p:notesMasterId r:id="rId19"/>
   </p:notesMasterIdLst>
   <p:sldIdLst>
     <p:sldId id="256" r:id="rId2"/>
@@ -24,6 +24,7 @@
     <p:sldId id="272" r:id="rId15"/>
     <p:sldId id="264" r:id="rId16"/>
     <p:sldId id="265" r:id="rId17"/>
+    <p:sldId id="273" r:id="rId18"/>
   </p:sldIdLst>
   <p:sldSz cx="12192000" cy="6858000"/>
   <p:notesSz cx="6858000" cy="9144000"/>
@@ -143,6 +144,7 @@
             <p14:sldId id="272"/>
             <p14:sldId id="264"/>
             <p14:sldId id="265"/>
+            <p14:sldId id="273"/>
           </p14:sldIdLst>
         </p14:section>
       </p14:sectionLst>
@@ -239,7 +241,7 @@
           <a:p>
             <a:fld id="{CE3F9B10-F744-47E1-871E-98B3AC9B3E4F}" type="datetimeFigureOut">
               <a:rPr lang="fr-FR" smtClean="0"/>
-              <a:t>31/01/2023</a:t>
+              <a:t>09/02/2023</a:t>
             </a:fld>
             <a:endParaRPr lang="fr-FR"/>
           </a:p>
@@ -651,7 +653,7 @@
             <a:fld id="{B61BEF0D-F0BB-DE4B-95CE-6DB70DBA9567}" type="datetimeFigureOut">
               <a:rPr lang="en-US" dirty="0"/>
               <a:pPr/>
-              <a:t>1/31/2023</a:t>
+              <a:t>2/9/2023</a:t>
             </a:fld>
             <a:endParaRPr lang="en-US" dirty="0"/>
           </a:p>
@@ -1084,7 +1086,7 @@
             <a:fld id="{B61BEF0D-F0BB-DE4B-95CE-6DB70DBA9567}" type="datetimeFigureOut">
               <a:rPr lang="en-US" dirty="0"/>
               <a:pPr/>
-              <a:t>1/31/2023</a:t>
+              <a:t>2/9/2023</a:t>
             </a:fld>
             <a:endParaRPr lang="en-US" dirty="0"/>
           </a:p>
@@ -1331,7 +1333,7 @@
             <a:fld id="{B61BEF0D-F0BB-DE4B-95CE-6DB70DBA9567}" type="datetimeFigureOut">
               <a:rPr lang="en-US" dirty="0"/>
               <a:pPr/>
-              <a:t>1/31/2023</a:t>
+              <a:t>2/9/2023</a:t>
             </a:fld>
             <a:endParaRPr lang="en-US" dirty="0"/>
           </a:p>
@@ -1636,7 +1638,7 @@
             <a:fld id="{B61BEF0D-F0BB-DE4B-95CE-6DB70DBA9567}" type="datetimeFigureOut">
               <a:rPr lang="en-US" dirty="0"/>
               <a:pPr/>
-              <a:t>1/31/2023</a:t>
+              <a:t>2/9/2023</a:t>
             </a:fld>
             <a:endParaRPr lang="en-US" dirty="0"/>
           </a:p>
@@ -1951,7 +1953,7 @@
             <a:fld id="{B61BEF0D-F0BB-DE4B-95CE-6DB70DBA9567}" type="datetimeFigureOut">
               <a:rPr lang="en-US" dirty="0"/>
               <a:pPr/>
-              <a:t>1/31/2023</a:t>
+              <a:t>2/9/2023</a:t>
             </a:fld>
             <a:endParaRPr lang="en-US" dirty="0"/>
           </a:p>
@@ -2250,7 +2252,7 @@
             <a:fld id="{B61BEF0D-F0BB-DE4B-95CE-6DB70DBA9567}" type="datetimeFigureOut">
               <a:rPr lang="en-US" dirty="0"/>
               <a:pPr/>
-              <a:t>1/31/2023</a:t>
+              <a:t>2/9/2023</a:t>
             </a:fld>
             <a:endParaRPr lang="en-US" dirty="0"/>
           </a:p>
@@ -2614,7 +2616,7 @@
             <a:fld id="{B61BEF0D-F0BB-DE4B-95CE-6DB70DBA9567}" type="datetimeFigureOut">
               <a:rPr lang="en-US" dirty="0"/>
               <a:pPr/>
-              <a:t>1/31/2023</a:t>
+              <a:t>2/9/2023</a:t>
             </a:fld>
             <a:endParaRPr lang="en-US" dirty="0"/>
           </a:p>
@@ -2785,7 +2787,7 @@
             <a:fld id="{B61BEF0D-F0BB-DE4B-95CE-6DB70DBA9567}" type="datetimeFigureOut">
               <a:rPr lang="en-US" dirty="0"/>
               <a:pPr/>
-              <a:t>1/31/2023</a:t>
+              <a:t>2/9/2023</a:t>
             </a:fld>
             <a:endParaRPr lang="en-US" dirty="0"/>
           </a:p>
@@ -2962,7 +2964,7 @@
             <a:fld id="{B61BEF0D-F0BB-DE4B-95CE-6DB70DBA9567}" type="datetimeFigureOut">
               <a:rPr lang="en-US" dirty="0"/>
               <a:pPr/>
-              <a:t>1/31/2023</a:t>
+              <a:t>2/9/2023</a:t>
             </a:fld>
             <a:endParaRPr lang="en-US" dirty="0"/>
           </a:p>
@@ -3129,7 +3131,7 @@
             <a:fld id="{B61BEF0D-F0BB-DE4B-95CE-6DB70DBA9567}" type="datetimeFigureOut">
               <a:rPr lang="en-US" dirty="0"/>
               <a:pPr/>
-              <a:t>1/31/2023</a:t>
+              <a:t>2/9/2023</a:t>
             </a:fld>
             <a:endParaRPr lang="en-US" dirty="0"/>
           </a:p>
@@ -3376,7 +3378,7 @@
             <a:fld id="{B61BEF0D-F0BB-DE4B-95CE-6DB70DBA9567}" type="datetimeFigureOut">
               <a:rPr lang="en-US" dirty="0"/>
               <a:pPr/>
-              <a:t>1/31/2023</a:t>
+              <a:t>2/9/2023</a:t>
             </a:fld>
             <a:endParaRPr lang="en-US" dirty="0"/>
           </a:p>
@@ -3609,7 +3611,7 @@
             <a:fld id="{B61BEF0D-F0BB-DE4B-95CE-6DB70DBA9567}" type="datetimeFigureOut">
               <a:rPr lang="en-US" dirty="0"/>
               <a:pPr/>
-              <a:t>1/31/2023</a:t>
+              <a:t>2/9/2023</a:t>
             </a:fld>
             <a:endParaRPr lang="en-US" dirty="0"/>
           </a:p>
@@ -3988,7 +3990,7 @@
             <a:fld id="{B61BEF0D-F0BB-DE4B-95CE-6DB70DBA9567}" type="datetimeFigureOut">
               <a:rPr lang="en-US" dirty="0"/>
               <a:pPr/>
-              <a:t>1/31/2023</a:t>
+              <a:t>2/9/2023</a:t>
             </a:fld>
             <a:endParaRPr lang="en-US" dirty="0"/>
           </a:p>
@@ -4103,7 +4105,7 @@
             <a:fld id="{B61BEF0D-F0BB-DE4B-95CE-6DB70DBA9567}" type="datetimeFigureOut">
               <a:rPr lang="en-US" dirty="0"/>
               <a:pPr/>
-              <a:t>1/31/2023</a:t>
+              <a:t>2/9/2023</a:t>
             </a:fld>
             <a:endParaRPr lang="en-US" dirty="0"/>
           </a:p>
@@ -4195,7 +4197,7 @@
             <a:fld id="{B61BEF0D-F0BB-DE4B-95CE-6DB70DBA9567}" type="datetimeFigureOut">
               <a:rPr lang="en-US" dirty="0"/>
               <a:pPr/>
-              <a:t>1/31/2023</a:t>
+              <a:t>2/9/2023</a:t>
             </a:fld>
             <a:endParaRPr lang="en-US" dirty="0"/>
           </a:p>
@@ -4447,7 +4449,7 @@
             <a:fld id="{B61BEF0D-F0BB-DE4B-95CE-6DB70DBA9567}" type="datetimeFigureOut">
               <a:rPr lang="en-US" dirty="0"/>
               <a:pPr/>
-              <a:t>1/31/2023</a:t>
+              <a:t>2/9/2023</a:t>
             </a:fld>
             <a:endParaRPr lang="en-US" dirty="0"/>
           </a:p>
@@ -4727,7 +4729,7 @@
             <a:fld id="{B61BEF0D-F0BB-DE4B-95CE-6DB70DBA9567}" type="datetimeFigureOut">
               <a:rPr lang="en-US" dirty="0"/>
               <a:pPr/>
-              <a:t>1/31/2023</a:t>
+              <a:t>2/9/2023</a:t>
             </a:fld>
             <a:endParaRPr lang="en-US" dirty="0"/>
           </a:p>
@@ -5130,7 +5132,7 @@
             <a:fld id="{B61BEF0D-F0BB-DE4B-95CE-6DB70DBA9567}" type="datetimeFigureOut">
               <a:rPr lang="en-US" dirty="0"/>
               <a:pPr/>
-              <a:t>1/31/2023</a:t>
+              <a:t>2/9/2023</a:t>
             </a:fld>
             <a:endParaRPr lang="en-US" dirty="0"/>
           </a:p>
@@ -6733,7 +6735,7 @@
         </p:nvSpPr>
         <p:spPr>
           <a:xfrm>
-            <a:off x="684212" y="685800"/>
+            <a:off x="1218602" y="2003961"/>
             <a:ext cx="9053554" cy="2431473"/>
           </a:xfrm>
         </p:spPr>
@@ -6759,7 +6761,7 @@
             </a:pPr>
             <a:r>
               <a:rPr lang="fr-FR" dirty="0"/>
-              <a:t>Nous livrons un site internet début juillet de style galerie, comprenant un nouveau logo, une page d’accueil contenant une bio  les dernières peintures et des commentaires, une page galerie contenant les peintures du client, une page de contact.	</a:t>
+              <a:t>Nous livrons un site internet début juillet de style galerie, comprenant un nouveau logo, une page d’accueil contenant une bio  la dernière peinture et des commentaires, une page galerie contenant les peintures du client, une page de contact, une page de gestion des tableaux.	</a:t>
             </a:r>
           </a:p>
           <a:p>
@@ -6768,12 +6770,42 @@
           </a:p>
         </p:txBody>
       </p:sp>
+    </p:spTree>
+    <p:extLst>
+      <p:ext uri="{BB962C8B-B14F-4D97-AF65-F5344CB8AC3E}">
+        <p14:creationId xmlns:p14="http://schemas.microsoft.com/office/powerpoint/2010/main" val="3690427952"/>
+      </p:ext>
+    </p:extLst>
+  </p:cSld>
+  <p:clrMapOvr>
+    <a:masterClrMapping/>
+  </p:clrMapOvr>
+</p:sld>
+</file>
+
+<file path=ppt/slides/slide17.xml><?xml version="1.0" encoding="utf-8"?>
+<p:sld xmlns:a="http://schemas.openxmlformats.org/drawingml/2006/main" xmlns:r="http://schemas.openxmlformats.org/officeDocument/2006/relationships" xmlns:p="http://schemas.openxmlformats.org/presentationml/2006/main">
+  <p:cSld>
+    <p:spTree>
+      <p:nvGrpSpPr>
+        <p:cNvPr id="1" name=""/>
+        <p:cNvGrpSpPr/>
+        <p:nvPr/>
+      </p:nvGrpSpPr>
+      <p:grpSpPr>
+        <a:xfrm>
+          <a:off x="0" y="0"/>
+          <a:ext cx="0" cy="0"/>
+          <a:chOff x="0" y="0"/>
+          <a:chExt cx="0" cy="0"/>
+        </a:xfrm>
+      </p:grpSpPr>
       <p:sp>
         <p:nvSpPr>
           <p:cNvPr id="4" name="ZoneTexte 3">
             <a:extLst>
               <a:ext uri="{FF2B5EF4-FFF2-40B4-BE49-F238E27FC236}">
-                <a16:creationId xmlns:a16="http://schemas.microsoft.com/office/drawing/2014/main" id="{1AA1E146-9A4F-14A2-2B40-E8F24963E609}"/>
+                <a16:creationId xmlns:a16="http://schemas.microsoft.com/office/drawing/2014/main" id="{2A66F914-04BA-DAC5-3CB8-39C1C8CBFE25}"/>
               </a:ext>
             </a:extLst>
           </p:cNvPr>
@@ -6782,8 +6814,8 @@
         </p:nvSpPr>
         <p:spPr>
           <a:xfrm>
-            <a:off x="684212" y="2850079"/>
-            <a:ext cx="1646712" cy="369332"/>
+            <a:off x="950026" y="528452"/>
+            <a:ext cx="2844140" cy="646331"/>
           </a:xfrm>
           <a:prstGeom prst="rect">
             <a:avLst/>
@@ -6805,12 +6837,45 @@
               <a:t>Planning:</a:t>
             </a:r>
           </a:p>
-        </p:txBody>
-      </p:sp>
+          <a:p>
+            <a:endParaRPr lang="fr-FR" dirty="0"/>
+          </a:p>
+        </p:txBody>
+      </p:sp>
+      <p:pic>
+        <p:nvPicPr>
+          <p:cNvPr id="6" name="Image 5">
+            <a:extLst>
+              <a:ext uri="{FF2B5EF4-FFF2-40B4-BE49-F238E27FC236}">
+                <a16:creationId xmlns:a16="http://schemas.microsoft.com/office/drawing/2014/main" id="{1E25515D-80E7-CBC6-C036-7660A343731E}"/>
+              </a:ext>
+            </a:extLst>
+          </p:cNvPr>
+          <p:cNvPicPr>
+            <a:picLocks noChangeAspect="1"/>
+          </p:cNvPicPr>
+          <p:nvPr/>
+        </p:nvPicPr>
+        <p:blipFill>
+          <a:blip r:embed="rId2"/>
+          <a:stretch>
+            <a:fillRect/>
+          </a:stretch>
+        </p:blipFill>
+        <p:spPr>
+          <a:xfrm>
+            <a:off x="2600696" y="876504"/>
+            <a:ext cx="8390279" cy="5877509"/>
+          </a:xfrm>
+          <a:prstGeom prst="rect">
+            <a:avLst/>
+          </a:prstGeom>
+        </p:spPr>
+      </p:pic>
     </p:spTree>
     <p:extLst>
       <p:ext uri="{BB962C8B-B14F-4D97-AF65-F5344CB8AC3E}">
-        <p14:creationId xmlns:p14="http://schemas.microsoft.com/office/powerpoint/2010/main" val="3690427952"/>
+        <p14:creationId xmlns:p14="http://schemas.microsoft.com/office/powerpoint/2010/main" val="2368108637"/>
       </p:ext>
     </p:extLst>
   </p:cSld>
@@ -8503,7 +8568,7 @@
             </a:pPr>
             <a:r>
               <a:rPr lang="fr-FR" dirty="0"/>
-              <a:t>	- Se faire connaitre.</a:t>
+              <a:t>	- Avoir une plus grande visibilité.</a:t>
             </a:r>
           </a:p>
           <a:p>
@@ -10001,7 +10066,7 @@
         </p:nvSpPr>
         <p:spPr>
           <a:xfrm rot="1602194">
-            <a:off x="6678230" y="4427581"/>
+            <a:off x="6678229" y="4417814"/>
             <a:ext cx="140576" cy="151577"/>
           </a:xfrm>
           <a:prstGeom prst="triangle">

</xml_diff>

<commit_message>
rajout sql dans le ppt
</commit_message>
<xml_diff>
--- a/CDC/L_artiste.pptx
+++ b/CDC/L_artiste.pptx
@@ -5,36 +5,39 @@
     <p:sldMasterId id="2147483648" r:id="rId1"/>
   </p:sldMasterIdLst>
   <p:notesMasterIdLst>
-    <p:notesMasterId r:id="rId29"/>
+    <p:notesMasterId r:id="rId32"/>
   </p:notesMasterIdLst>
   <p:sldIdLst>
     <p:sldId id="256" r:id="rId2"/>
     <p:sldId id="282" r:id="rId3"/>
-    <p:sldId id="257" r:id="rId4"/>
-    <p:sldId id="258" r:id="rId5"/>
-    <p:sldId id="259" r:id="rId6"/>
-    <p:sldId id="263" r:id="rId7"/>
-    <p:sldId id="264" r:id="rId8"/>
-    <p:sldId id="261" r:id="rId9"/>
-    <p:sldId id="274" r:id="rId10"/>
-    <p:sldId id="276" r:id="rId11"/>
-    <p:sldId id="277" r:id="rId12"/>
-    <p:sldId id="262" r:id="rId13"/>
-    <p:sldId id="260" r:id="rId14"/>
-    <p:sldId id="266" r:id="rId15"/>
-    <p:sldId id="267" r:id="rId16"/>
-    <p:sldId id="269" r:id="rId17"/>
-    <p:sldId id="268" r:id="rId18"/>
-    <p:sldId id="270" r:id="rId19"/>
-    <p:sldId id="272" r:id="rId20"/>
-    <p:sldId id="281" r:id="rId21"/>
-    <p:sldId id="283" r:id="rId22"/>
-    <p:sldId id="278" r:id="rId23"/>
-    <p:sldId id="279" r:id="rId24"/>
-    <p:sldId id="280" r:id="rId25"/>
-    <p:sldId id="265" r:id="rId26"/>
-    <p:sldId id="275" r:id="rId27"/>
-    <p:sldId id="273" r:id="rId28"/>
+    <p:sldId id="284" r:id="rId4"/>
+    <p:sldId id="257" r:id="rId5"/>
+    <p:sldId id="258" r:id="rId6"/>
+    <p:sldId id="259" r:id="rId7"/>
+    <p:sldId id="263" r:id="rId8"/>
+    <p:sldId id="264" r:id="rId9"/>
+    <p:sldId id="261" r:id="rId10"/>
+    <p:sldId id="285" r:id="rId11"/>
+    <p:sldId id="274" r:id="rId12"/>
+    <p:sldId id="276" r:id="rId13"/>
+    <p:sldId id="277" r:id="rId14"/>
+    <p:sldId id="286" r:id="rId15"/>
+    <p:sldId id="262" r:id="rId16"/>
+    <p:sldId id="260" r:id="rId17"/>
+    <p:sldId id="266" r:id="rId18"/>
+    <p:sldId id="267" r:id="rId19"/>
+    <p:sldId id="269" r:id="rId20"/>
+    <p:sldId id="268" r:id="rId21"/>
+    <p:sldId id="270" r:id="rId22"/>
+    <p:sldId id="272" r:id="rId23"/>
+    <p:sldId id="287" r:id="rId24"/>
+    <p:sldId id="281" r:id="rId25"/>
+    <p:sldId id="283" r:id="rId26"/>
+    <p:sldId id="288" r:id="rId27"/>
+    <p:sldId id="278" r:id="rId28"/>
+    <p:sldId id="279" r:id="rId29"/>
+    <p:sldId id="280" r:id="rId30"/>
+    <p:sldId id="265" r:id="rId31"/>
   </p:sldIdLst>
   <p:sldSz cx="12192000" cy="6858000"/>
   <p:notesSz cx="6858000" cy="9144000"/>
@@ -140,15 +143,18 @@
           <p14:sldIdLst>
             <p14:sldId id="256"/>
             <p14:sldId id="282"/>
+            <p14:sldId id="284"/>
             <p14:sldId id="257"/>
             <p14:sldId id="258"/>
             <p14:sldId id="259"/>
             <p14:sldId id="263"/>
             <p14:sldId id="264"/>
             <p14:sldId id="261"/>
+            <p14:sldId id="285"/>
             <p14:sldId id="274"/>
             <p14:sldId id="276"/>
             <p14:sldId id="277"/>
+            <p14:sldId id="286"/>
             <p14:sldId id="262"/>
             <p14:sldId id="260"/>
             <p14:sldId id="266"/>
@@ -157,14 +163,14 @@
             <p14:sldId id="268"/>
             <p14:sldId id="270"/>
             <p14:sldId id="272"/>
+            <p14:sldId id="287"/>
             <p14:sldId id="281"/>
             <p14:sldId id="283"/>
+            <p14:sldId id="288"/>
             <p14:sldId id="278"/>
             <p14:sldId id="279"/>
             <p14:sldId id="280"/>
             <p14:sldId id="265"/>
-            <p14:sldId id="275"/>
-            <p14:sldId id="273"/>
           </p14:sldIdLst>
         </p14:section>
       </p14:sectionLst>
@@ -261,7 +267,7 @@
           <a:p>
             <a:fld id="{CE3F9B10-F744-47E1-871E-98B3AC9B3E4F}" type="datetimeFigureOut">
               <a:rPr lang="fr-FR" smtClean="0"/>
-              <a:t>10/03/2023</a:t>
+              <a:t>20/03/2023</a:t>
             </a:fld>
             <a:endParaRPr lang="fr-FR"/>
           </a:p>
@@ -672,7 +678,7 @@
           <a:p>
             <a:fld id="{795B0F33-6398-43E2-B783-514E6293E97E}" type="datetime1">
               <a:rPr lang="en-US" smtClean="0"/>
-              <a:t>3/10/2023</a:t>
+              <a:t>3/20/2023</a:t>
             </a:fld>
             <a:endParaRPr lang="en-US" dirty="0"/>
           </a:p>
@@ -1104,7 +1110,7 @@
           <a:p>
             <a:fld id="{270AED2E-2550-4305-AD46-9177EE377B20}" type="datetime1">
               <a:rPr lang="en-US" smtClean="0"/>
-              <a:t>3/10/2023</a:t>
+              <a:t>3/20/2023</a:t>
             </a:fld>
             <a:endParaRPr lang="en-US" dirty="0"/>
           </a:p>
@@ -1350,7 +1356,7 @@
           <a:p>
             <a:fld id="{87A632E5-0FE5-4CA5-98B3-93A5B703C776}" type="datetime1">
               <a:rPr lang="en-US" smtClean="0"/>
-              <a:t>3/10/2023</a:t>
+              <a:t>3/20/2023</a:t>
             </a:fld>
             <a:endParaRPr lang="en-US" dirty="0"/>
           </a:p>
@@ -1654,7 +1660,7 @@
           <a:p>
             <a:fld id="{6563236B-D1A4-4B38-953C-CBE44AAFB604}" type="datetime1">
               <a:rPr lang="en-US" smtClean="0"/>
-              <a:t>3/10/2023</a:t>
+              <a:t>3/20/2023</a:t>
             </a:fld>
             <a:endParaRPr lang="en-US" dirty="0"/>
           </a:p>
@@ -1968,7 +1974,7 @@
           <a:p>
             <a:fld id="{AF12EEA3-159D-4F8A-9B05-5065548C93FE}" type="datetime1">
               <a:rPr lang="en-US" smtClean="0"/>
-              <a:t>3/10/2023</a:t>
+              <a:t>3/20/2023</a:t>
             </a:fld>
             <a:endParaRPr lang="en-US" dirty="0"/>
           </a:p>
@@ -2266,7 +2272,7 @@
           <a:p>
             <a:fld id="{5E6194DB-34B3-434A-9A89-27994F5036D6}" type="datetime1">
               <a:rPr lang="en-US" smtClean="0"/>
-              <a:t>3/10/2023</a:t>
+              <a:t>3/20/2023</a:t>
             </a:fld>
             <a:endParaRPr lang="en-US" dirty="0"/>
           </a:p>
@@ -2629,7 +2635,7 @@
           <a:p>
             <a:fld id="{D86AD7A5-28E1-4605-A305-D41C33CC9287}" type="datetime1">
               <a:rPr lang="en-US" smtClean="0"/>
-              <a:t>3/10/2023</a:t>
+              <a:t>3/20/2023</a:t>
             </a:fld>
             <a:endParaRPr lang="en-US" dirty="0"/>
           </a:p>
@@ -2799,7 +2805,7 @@
           <a:p>
             <a:fld id="{4E07EDF1-E9A2-491C-8826-19CBCA408BE7}" type="datetime1">
               <a:rPr lang="en-US" smtClean="0"/>
-              <a:t>3/10/2023</a:t>
+              <a:t>3/20/2023</a:t>
             </a:fld>
             <a:endParaRPr lang="en-US" dirty="0"/>
           </a:p>
@@ -2975,7 +2981,7 @@
           <a:p>
             <a:fld id="{8D992E7E-E44A-4B25-9BC1-A150740391BE}" type="datetime1">
               <a:rPr lang="en-US" smtClean="0"/>
-              <a:t>3/10/2023</a:t>
+              <a:t>3/20/2023</a:t>
             </a:fld>
             <a:endParaRPr lang="en-US" dirty="0"/>
           </a:p>
@@ -3141,7 +3147,7 @@
           <a:p>
             <a:fld id="{BAA9BD18-2FFD-4FD8-AC2D-AB11B750B8BB}" type="datetime1">
               <a:rPr lang="en-US" smtClean="0"/>
-              <a:t>3/10/2023</a:t>
+              <a:t>3/20/2023</a:t>
             </a:fld>
             <a:endParaRPr lang="en-US" dirty="0"/>
           </a:p>
@@ -3387,7 +3393,7 @@
           <a:p>
             <a:fld id="{501B211B-C5F7-4692-9103-D612D8C54866}" type="datetime1">
               <a:rPr lang="en-US" smtClean="0"/>
-              <a:t>3/10/2023</a:t>
+              <a:t>3/20/2023</a:t>
             </a:fld>
             <a:endParaRPr lang="en-US" dirty="0"/>
           </a:p>
@@ -3619,7 +3625,7 @@
           <a:p>
             <a:fld id="{A79DAFCD-D21F-45E6-8176-EA21AE5EA4A9}" type="datetime1">
               <a:rPr lang="en-US" smtClean="0"/>
-              <a:t>3/10/2023</a:t>
+              <a:t>3/20/2023</a:t>
             </a:fld>
             <a:endParaRPr lang="en-US" dirty="0"/>
           </a:p>
@@ -3997,7 +4003,7 @@
           <a:p>
             <a:fld id="{0678A836-37FA-43B4-8622-D2D43F13CF23}" type="datetime1">
               <a:rPr lang="en-US" smtClean="0"/>
-              <a:t>3/10/2023</a:t>
+              <a:t>3/20/2023</a:t>
             </a:fld>
             <a:endParaRPr lang="en-US" dirty="0"/>
           </a:p>
@@ -4111,7 +4117,7 @@
           <a:p>
             <a:fld id="{30C44C70-21C1-4E34-A740-6CA8CED8D3F7}" type="datetime1">
               <a:rPr lang="en-US" smtClean="0"/>
-              <a:t>3/10/2023</a:t>
+              <a:t>3/20/2023</a:t>
             </a:fld>
             <a:endParaRPr lang="en-US" dirty="0"/>
           </a:p>
@@ -4202,7 +4208,7 @@
           <a:p>
             <a:fld id="{0EDB3C2B-4C1D-416C-BC4D-A42C653629FD}" type="datetime1">
               <a:rPr lang="en-US" smtClean="0"/>
-              <a:t>3/10/2023</a:t>
+              <a:t>3/20/2023</a:t>
             </a:fld>
             <a:endParaRPr lang="en-US" dirty="0"/>
           </a:p>
@@ -4453,7 +4459,7 @@
           <a:p>
             <a:fld id="{08BA71F5-3ED0-4982-B390-04A96C5F3C52}" type="datetime1">
               <a:rPr lang="en-US" smtClean="0"/>
-              <a:t>3/10/2023</a:t>
+              <a:t>3/20/2023</a:t>
             </a:fld>
             <a:endParaRPr lang="en-US" dirty="0"/>
           </a:p>
@@ -4732,7 +4738,7 @@
           <a:p>
             <a:fld id="{0F6B8777-FBF0-4ACB-90E3-60548ABBEE49}" type="datetime1">
               <a:rPr lang="en-US" smtClean="0"/>
-              <a:t>3/10/2023</a:t>
+              <a:t>3/20/2023</a:t>
             </a:fld>
             <a:endParaRPr lang="en-US" dirty="0"/>
           </a:p>
@@ -5134,7 +5140,7 @@
           <a:p>
             <a:fld id="{AE768BA4-DD45-41F2-A6B6-61791039AE84}" type="datetime1">
               <a:rPr lang="en-US" smtClean="0"/>
-              <a:t>3/10/2023</a:t>
+              <a:t>3/20/2023</a:t>
             </a:fld>
             <a:endParaRPr lang="en-US" dirty="0"/>
           </a:p>
@@ -5988,6 +5994,576 @@
           <a:chExt cx="0" cy="0"/>
         </a:xfrm>
       </p:grpSpPr>
+      <p:sp>
+        <p:nvSpPr>
+          <p:cNvPr id="4" name="Espace réservé du numéro de diapositive 3">
+            <a:extLst>
+              <a:ext uri="{FF2B5EF4-FFF2-40B4-BE49-F238E27FC236}">
+                <a16:creationId xmlns:a16="http://schemas.microsoft.com/office/drawing/2014/main" id="{A31F6498-CC9B-E539-F93C-2B9FADDFB89B}"/>
+              </a:ext>
+            </a:extLst>
+          </p:cNvPr>
+          <p:cNvSpPr>
+            <a:spLocks noGrp="1"/>
+          </p:cNvSpPr>
+          <p:nvPr>
+            <p:ph type="sldNum" sz="quarter" idx="12"/>
+          </p:nvPr>
+        </p:nvSpPr>
+        <p:spPr/>
+        <p:txBody>
+          <a:bodyPr/>
+          <a:lstStyle/>
+          <a:p>
+            <a:fld id="{D57F1E4F-1CFF-5643-939E-217C01CDF565}" type="slidenum">
+              <a:rPr lang="en-US" smtClean="0"/>
+              <a:pPr/>
+              <a:t>10</a:t>
+            </a:fld>
+            <a:endParaRPr lang="en-US" dirty="0"/>
+          </a:p>
+        </p:txBody>
+      </p:sp>
+      <p:sp>
+        <p:nvSpPr>
+          <p:cNvPr id="5" name="ZoneTexte 4">
+            <a:extLst>
+              <a:ext uri="{FF2B5EF4-FFF2-40B4-BE49-F238E27FC236}">
+                <a16:creationId xmlns:a16="http://schemas.microsoft.com/office/drawing/2014/main" id="{DAD0C4BB-3E50-38BA-0BC7-FCBBF486C08E}"/>
+              </a:ext>
+            </a:extLst>
+          </p:cNvPr>
+          <p:cNvSpPr txBox="1"/>
+          <p:nvPr/>
+        </p:nvSpPr>
+        <p:spPr>
+          <a:xfrm>
+            <a:off x="565778" y="1270660"/>
+            <a:ext cx="9778639" cy="1754326"/>
+          </a:xfrm>
+          <a:prstGeom prst="rect">
+            <a:avLst/>
+          </a:prstGeom>
+          <a:noFill/>
+        </p:spPr>
+        <p:txBody>
+          <a:bodyPr wrap="none" rtlCol="0">
+            <a:spAutoFit/>
+          </a:bodyPr>
+          <a:lstStyle/>
+          <a:p>
+            <a:r>
+              <a:rPr lang="fr-FR" sz="1800" dirty="0">
+                <a:solidFill>
+                  <a:schemeClr val="bg1"/>
+                </a:solidFill>
+              </a:rPr>
+              <a:t>2. Spécifications fonctionnelles :</a:t>
+            </a:r>
+          </a:p>
+          <a:p>
+            <a:r>
+              <a:rPr lang="fr-FR" sz="1800" dirty="0">
+                <a:solidFill>
+                  <a:schemeClr val="bg1"/>
+                </a:solidFill>
+              </a:rPr>
+              <a:t>	a. Use case……………………………………………………………………………………11</a:t>
+            </a:r>
+          </a:p>
+          <a:p>
+            <a:r>
+              <a:rPr lang="fr-FR" sz="1800" dirty="0">
+                <a:solidFill>
+                  <a:schemeClr val="bg1"/>
+                </a:solidFill>
+              </a:rPr>
+              <a:t>	b. Diagramme d’activité…………………………………………………………………..12</a:t>
+            </a:r>
+          </a:p>
+          <a:p>
+            <a:r>
+              <a:rPr lang="fr-FR" sz="1800" dirty="0">
+                <a:solidFill>
+                  <a:schemeClr val="bg1"/>
+                </a:solidFill>
+              </a:rPr>
+              <a:t>	c. Diagramme de séquence……………………………………………………………...13</a:t>
+            </a:r>
+          </a:p>
+          <a:p>
+            <a:r>
+              <a:rPr lang="fr-FR" sz="1800" dirty="0">
+                <a:solidFill>
+                  <a:schemeClr val="bg1"/>
+                </a:solidFill>
+              </a:rPr>
+              <a:t>	e. Maquettage……………………………………………………………………...……….14</a:t>
+            </a:r>
+          </a:p>
+          <a:p>
+            <a:endParaRPr lang="fr-FR" dirty="0"/>
+          </a:p>
+        </p:txBody>
+      </p:sp>
+    </p:spTree>
+    <p:extLst>
+      <p:ext uri="{BB962C8B-B14F-4D97-AF65-F5344CB8AC3E}">
+        <p14:creationId xmlns:p14="http://schemas.microsoft.com/office/powerpoint/2010/main" val="4062242205"/>
+      </p:ext>
+    </p:extLst>
+  </p:cSld>
+  <p:clrMapOvr>
+    <a:masterClrMapping/>
+  </p:clrMapOvr>
+</p:sld>
+</file>
+
+<file path=ppt/slides/slide11.xml><?xml version="1.0" encoding="utf-8"?>
+<p:sld xmlns:a="http://schemas.openxmlformats.org/drawingml/2006/main" xmlns:r="http://schemas.openxmlformats.org/officeDocument/2006/relationships" xmlns:p="http://schemas.openxmlformats.org/presentationml/2006/main">
+  <p:cSld>
+    <p:spTree>
+      <p:nvGrpSpPr>
+        <p:cNvPr id="1" name=""/>
+        <p:cNvGrpSpPr/>
+        <p:nvPr/>
+      </p:nvGrpSpPr>
+      <p:grpSpPr>
+        <a:xfrm>
+          <a:off x="0" y="0"/>
+          <a:ext cx="0" cy="0"/>
+          <a:chOff x="0" y="0"/>
+          <a:chExt cx="0" cy="0"/>
+        </a:xfrm>
+      </p:grpSpPr>
+      <p:sp>
+        <p:nvSpPr>
+          <p:cNvPr id="6" name="ZoneTexte 5">
+            <a:extLst>
+              <a:ext uri="{FF2B5EF4-FFF2-40B4-BE49-F238E27FC236}">
+                <a16:creationId xmlns:a16="http://schemas.microsoft.com/office/drawing/2014/main" id="{59101B24-B94B-C392-C424-D95FDA322356}"/>
+              </a:ext>
+            </a:extLst>
+          </p:cNvPr>
+          <p:cNvSpPr txBox="1"/>
+          <p:nvPr/>
+        </p:nvSpPr>
+        <p:spPr>
+          <a:xfrm>
+            <a:off x="748145" y="154379"/>
+            <a:ext cx="4399808" cy="646331"/>
+          </a:xfrm>
+          <a:prstGeom prst="rect">
+            <a:avLst/>
+          </a:prstGeom>
+          <a:noFill/>
+        </p:spPr>
+        <p:txBody>
+          <a:bodyPr wrap="square" rtlCol="0">
+            <a:spAutoFit/>
+          </a:bodyPr>
+          <a:lstStyle/>
+          <a:p>
+            <a:r>
+              <a:rPr lang="fr-FR" b="1" u="sng" dirty="0" err="1">
+                <a:solidFill>
+                  <a:srgbClr val="8F1919"/>
+                </a:solidFill>
+              </a:rPr>
+              <a:t>Usecase</a:t>
+            </a:r>
+            <a:r>
+              <a:rPr lang="fr-FR" b="1" u="sng" dirty="0">
+                <a:solidFill>
+                  <a:srgbClr val="8F1919"/>
+                </a:solidFill>
+              </a:rPr>
+              <a:t>:</a:t>
+            </a:r>
+            <a:r>
+              <a:rPr lang="fr-FR" b="1" dirty="0">
+                <a:solidFill>
+                  <a:srgbClr val="8F1919"/>
+                </a:solidFill>
+              </a:rPr>
+              <a:t>  </a:t>
+            </a:r>
+            <a:r>
+              <a:rPr lang="fr-FR" dirty="0">
+                <a:solidFill>
+                  <a:schemeClr val="bg1"/>
+                </a:solidFill>
+              </a:rPr>
+              <a:t>définie les interactions entre les acteurs et le système</a:t>
+            </a:r>
+            <a:endParaRPr lang="fr-FR" b="1" u="sng" dirty="0">
+              <a:solidFill>
+                <a:srgbClr val="8F1919"/>
+              </a:solidFill>
+            </a:endParaRPr>
+          </a:p>
+        </p:txBody>
+      </p:sp>
+      <p:sp>
+        <p:nvSpPr>
+          <p:cNvPr id="7" name="ZoneTexte 6">
+            <a:extLst>
+              <a:ext uri="{FF2B5EF4-FFF2-40B4-BE49-F238E27FC236}">
+                <a16:creationId xmlns:a16="http://schemas.microsoft.com/office/drawing/2014/main" id="{AE857B4E-8153-4529-C16D-2C07F4B75BA2}"/>
+              </a:ext>
+            </a:extLst>
+          </p:cNvPr>
+          <p:cNvSpPr txBox="1"/>
+          <p:nvPr/>
+        </p:nvSpPr>
+        <p:spPr>
+          <a:xfrm>
+            <a:off x="6852062" y="1033153"/>
+            <a:ext cx="4714504" cy="4832092"/>
+          </a:xfrm>
+          <a:prstGeom prst="rect">
+            <a:avLst/>
+          </a:prstGeom>
+          <a:noFill/>
+        </p:spPr>
+        <p:txBody>
+          <a:bodyPr wrap="square" rtlCol="0">
+            <a:spAutoFit/>
+          </a:bodyPr>
+          <a:lstStyle/>
+          <a:p>
+            <a:r>
+              <a:rPr lang="fr-FR" sz="1400" dirty="0">
+                <a:solidFill>
+                  <a:schemeClr val="bg1"/>
+                </a:solidFill>
+              </a:rPr>
+              <a:t>3 acteurs: Le visiteur, l’acteur connexion et l’administrateur.</a:t>
+            </a:r>
+          </a:p>
+          <a:p>
+            <a:endParaRPr lang="fr-FR" sz="1400" dirty="0">
+              <a:solidFill>
+                <a:schemeClr val="bg1"/>
+              </a:solidFill>
+            </a:endParaRPr>
+          </a:p>
+          <a:p>
+            <a:r>
+              <a:rPr lang="fr-FR" sz="1400" dirty="0">
+                <a:solidFill>
+                  <a:schemeClr val="bg1"/>
+                </a:solidFill>
+              </a:rPr>
+              <a:t>Le visiteur doit pouvoir :</a:t>
+            </a:r>
+          </a:p>
+          <a:p>
+            <a:r>
+              <a:rPr lang="fr-FR" sz="1400" dirty="0">
+                <a:solidFill>
+                  <a:schemeClr val="bg1"/>
+                </a:solidFill>
+              </a:rPr>
+              <a:t>-     Naviguer entre les pages du site</a:t>
+            </a:r>
+          </a:p>
+          <a:p>
+            <a:pPr marL="285750" indent="-285750">
+              <a:buFontTx/>
+              <a:buChar char="-"/>
+            </a:pPr>
+            <a:r>
+              <a:rPr lang="fr-FR" sz="1400" dirty="0">
+                <a:solidFill>
+                  <a:schemeClr val="bg1"/>
+                </a:solidFill>
+              </a:rPr>
+              <a:t>Déposer un avis sur le dernier tableau</a:t>
+            </a:r>
+          </a:p>
+          <a:p>
+            <a:pPr marL="285750" indent="-285750">
+              <a:buFontTx/>
+              <a:buChar char="-"/>
+            </a:pPr>
+            <a:r>
+              <a:rPr lang="fr-FR" sz="1400" dirty="0">
+                <a:solidFill>
+                  <a:schemeClr val="bg1"/>
+                </a:solidFill>
+              </a:rPr>
+              <a:t>Agrandir le dernier tableau</a:t>
+            </a:r>
+          </a:p>
+          <a:p>
+            <a:pPr marL="285750" indent="-285750">
+              <a:buFontTx/>
+              <a:buChar char="-"/>
+            </a:pPr>
+            <a:r>
+              <a:rPr lang="fr-FR" sz="1400" dirty="0">
+                <a:solidFill>
+                  <a:schemeClr val="bg1"/>
+                </a:solidFill>
+              </a:rPr>
+              <a:t>Se rendre sur Facebook</a:t>
+            </a:r>
+          </a:p>
+          <a:p>
+            <a:pPr marL="285750" indent="-285750">
+              <a:buFontTx/>
+              <a:buChar char="-"/>
+            </a:pPr>
+            <a:r>
+              <a:rPr lang="fr-FR" sz="1400" dirty="0">
+                <a:solidFill>
+                  <a:schemeClr val="bg1"/>
+                </a:solidFill>
+              </a:rPr>
+              <a:t>Effectuer une demande de contact dans un formulaire</a:t>
+            </a:r>
+          </a:p>
+          <a:p>
+            <a:pPr marL="285750" indent="-285750">
+              <a:buFontTx/>
+              <a:buChar char="-"/>
+            </a:pPr>
+            <a:r>
+              <a:rPr lang="fr-FR" sz="1400" dirty="0">
+                <a:solidFill>
+                  <a:schemeClr val="bg1"/>
+                </a:solidFill>
+              </a:rPr>
+              <a:t>Visualiser les différents tableaux dans la galerie</a:t>
+            </a:r>
+          </a:p>
+          <a:p>
+            <a:endParaRPr lang="fr-FR" sz="1400" dirty="0">
+              <a:solidFill>
+                <a:schemeClr val="bg1"/>
+              </a:solidFill>
+            </a:endParaRPr>
+          </a:p>
+          <a:p>
+            <a:r>
+              <a:rPr lang="fr-FR" sz="1400" dirty="0">
+                <a:solidFill>
+                  <a:schemeClr val="bg1"/>
+                </a:solidFill>
+              </a:rPr>
+              <a:t>L’acteur connexion :</a:t>
+            </a:r>
+          </a:p>
+          <a:p>
+            <a:pPr marL="285750" indent="-285750">
+              <a:buFontTx/>
+              <a:buChar char="-"/>
+            </a:pPr>
+            <a:r>
+              <a:rPr lang="fr-FR" sz="1400" dirty="0">
+                <a:solidFill>
+                  <a:schemeClr val="bg1"/>
+                </a:solidFill>
+              </a:rPr>
+              <a:t>Se connecte</a:t>
+            </a:r>
+          </a:p>
+          <a:p>
+            <a:pPr marL="285750" indent="-285750">
+              <a:buFontTx/>
+              <a:buChar char="-"/>
+            </a:pPr>
+            <a:r>
+              <a:rPr lang="fr-FR" sz="1400" dirty="0">
+                <a:solidFill>
+                  <a:schemeClr val="bg1"/>
+                </a:solidFill>
+              </a:rPr>
+              <a:t>Se déconnecte</a:t>
+            </a:r>
+          </a:p>
+          <a:p>
+            <a:endParaRPr lang="fr-FR" sz="1400" dirty="0">
+              <a:solidFill>
+                <a:schemeClr val="bg1"/>
+              </a:solidFill>
+            </a:endParaRPr>
+          </a:p>
+          <a:p>
+            <a:r>
+              <a:rPr lang="fr-FR" sz="1400" dirty="0">
+                <a:solidFill>
+                  <a:schemeClr val="bg1"/>
+                </a:solidFill>
+              </a:rPr>
+              <a:t>L’administrateur quant a lui doit pouvoir :</a:t>
+            </a:r>
+          </a:p>
+          <a:p>
+            <a:pPr marL="285750" indent="-285750">
+              <a:buFontTx/>
+              <a:buChar char="-"/>
+            </a:pPr>
+            <a:r>
+              <a:rPr lang="fr-FR" sz="1400">
+                <a:solidFill>
+                  <a:schemeClr val="bg1"/>
+                </a:solidFill>
+              </a:rPr>
+              <a:t>Récupère </a:t>
+            </a:r>
+            <a:r>
+              <a:rPr lang="fr-FR" sz="1400" dirty="0">
+                <a:solidFill>
+                  <a:schemeClr val="bg1"/>
+                </a:solidFill>
+              </a:rPr>
+              <a:t>les droits de l’acteur connexion</a:t>
+            </a:r>
+          </a:p>
+          <a:p>
+            <a:pPr marL="285750" indent="-285750">
+              <a:buFontTx/>
+              <a:buChar char="-"/>
+            </a:pPr>
+            <a:r>
+              <a:rPr lang="fr-FR" sz="1400" dirty="0">
+                <a:solidFill>
+                  <a:schemeClr val="bg1"/>
+                </a:solidFill>
+              </a:rPr>
+              <a:t>Ajouter, supprimer des titres et les tableaux</a:t>
+            </a:r>
+          </a:p>
+          <a:p>
+            <a:pPr marL="285750" indent="-285750">
+              <a:buFontTx/>
+              <a:buChar char="-"/>
+            </a:pPr>
+            <a:r>
+              <a:rPr lang="fr-FR" sz="1400" dirty="0">
+                <a:solidFill>
+                  <a:schemeClr val="bg1"/>
+                </a:solidFill>
+              </a:rPr>
+              <a:t>Supprimer les avis</a:t>
+            </a:r>
+          </a:p>
+          <a:p>
+            <a:pPr marL="285750" indent="-285750">
+              <a:buFontTx/>
+              <a:buChar char="-"/>
+            </a:pPr>
+            <a:r>
+              <a:rPr lang="fr-FR" sz="1400" dirty="0">
+                <a:solidFill>
+                  <a:schemeClr val="bg1"/>
+                </a:solidFill>
+              </a:rPr>
+              <a:t>Changer le dernier tableau</a:t>
+            </a:r>
+          </a:p>
+          <a:p>
+            <a:pPr marL="285750" indent="-285750">
+              <a:buFontTx/>
+              <a:buChar char="-"/>
+            </a:pPr>
+            <a:r>
+              <a:rPr lang="fr-FR" sz="1400" dirty="0">
+                <a:solidFill>
+                  <a:schemeClr val="bg1"/>
+                </a:solidFill>
+              </a:rPr>
+              <a:t>Recevoir les demandes de contact</a:t>
+            </a:r>
+          </a:p>
+        </p:txBody>
+      </p:sp>
+      <p:sp>
+        <p:nvSpPr>
+          <p:cNvPr id="3" name="Espace réservé du numéro de diapositive 2"/>
+          <p:cNvSpPr>
+            <a:spLocks noGrp="1"/>
+          </p:cNvSpPr>
+          <p:nvPr>
+            <p:ph type="sldNum" sz="quarter" idx="12"/>
+          </p:nvPr>
+        </p:nvSpPr>
+        <p:spPr/>
+        <p:txBody>
+          <a:bodyPr/>
+          <a:lstStyle/>
+          <a:p>
+            <a:fld id="{D57F1E4F-1CFF-5643-939E-217C01CDF565}" type="slidenum">
+              <a:rPr lang="en-US" smtClean="0"/>
+              <a:pPr/>
+              <a:t>11</a:t>
+            </a:fld>
+            <a:endParaRPr lang="en-US" dirty="0"/>
+          </a:p>
+        </p:txBody>
+      </p:sp>
+      <p:pic>
+        <p:nvPicPr>
+          <p:cNvPr id="9" name="Image 8"/>
+          <p:cNvPicPr>
+            <a:picLocks noChangeAspect="1"/>
+          </p:cNvPicPr>
+          <p:nvPr/>
+        </p:nvPicPr>
+        <p:blipFill>
+          <a:blip r:embed="rId2">
+            <a:extLst>
+              <a:ext uri="{28A0092B-C50C-407E-A947-70E740481C1C}">
+                <a14:useLocalDpi xmlns:a14="http://schemas.microsoft.com/office/drawing/2010/main" val="0"/>
+              </a:ext>
+            </a:extLst>
+          </a:blip>
+          <a:stretch>
+            <a:fillRect/>
+          </a:stretch>
+        </p:blipFill>
+        <p:spPr>
+          <a:xfrm>
+            <a:off x="256616" y="1033153"/>
+            <a:ext cx="6155838" cy="4401205"/>
+          </a:xfrm>
+          <a:prstGeom prst="rect">
+            <a:avLst/>
+          </a:prstGeom>
+        </p:spPr>
+      </p:pic>
+    </p:spTree>
+    <p:extLst>
+      <p:ext uri="{BB962C8B-B14F-4D97-AF65-F5344CB8AC3E}">
+        <p14:creationId xmlns:p14="http://schemas.microsoft.com/office/powerpoint/2010/main" val="672800375"/>
+      </p:ext>
+    </p:extLst>
+  </p:cSld>
+  <p:clrMapOvr>
+    <a:masterClrMapping/>
+  </p:clrMapOvr>
+</p:sld>
+</file>
+
+<file path=ppt/slides/slide12.xml><?xml version="1.0" encoding="utf-8"?>
+<p:sld xmlns:a="http://schemas.openxmlformats.org/drawingml/2006/main" xmlns:r="http://schemas.openxmlformats.org/officeDocument/2006/relationships" xmlns:p="http://schemas.openxmlformats.org/presentationml/2006/main">
+  <p:cSld>
+    <p:spTree>
+      <p:nvGrpSpPr>
+        <p:cNvPr id="1" name=""/>
+        <p:cNvGrpSpPr/>
+        <p:nvPr/>
+      </p:nvGrpSpPr>
+      <p:grpSpPr>
+        <a:xfrm>
+          <a:off x="0" y="0"/>
+          <a:ext cx="0" cy="0"/>
+          <a:chOff x="0" y="0"/>
+          <a:chExt cx="0" cy="0"/>
+        </a:xfrm>
+      </p:grpSpPr>
       <p:pic>
         <p:nvPicPr>
           <p:cNvPr id="5" name="Image 4">
@@ -6161,7 +6737,7 @@
             <a:fld id="{D57F1E4F-1CFF-5643-939E-217C01CDF565}" type="slidenum">
               <a:rPr lang="en-US" smtClean="0"/>
               <a:pPr/>
-              <a:t>10</a:t>
+              <a:t>12</a:t>
             </a:fld>
             <a:endParaRPr lang="en-US" dirty="0"/>
           </a:p>
@@ -6180,7 +6756,7 @@
 </p:sld>
 </file>
 
-<file path=ppt/slides/slide11.xml><?xml version="1.0" encoding="utf-8"?>
+<file path=ppt/slides/slide13.xml><?xml version="1.0" encoding="utf-8"?>
 <p:sld xmlns:a="http://schemas.openxmlformats.org/drawingml/2006/main" xmlns:r="http://schemas.openxmlformats.org/officeDocument/2006/relationships" xmlns:p="http://schemas.openxmlformats.org/presentationml/2006/main">
   <p:cSld>
     <p:spTree>
@@ -6344,7 +6920,7 @@
             <a:fld id="{D57F1E4F-1CFF-5643-939E-217C01CDF565}" type="slidenum">
               <a:rPr lang="en-US" smtClean="0"/>
               <a:pPr/>
-              <a:t>11</a:t>
+              <a:t>13</a:t>
             </a:fld>
             <a:endParaRPr lang="en-US" dirty="0"/>
           </a:p>
@@ -6363,7 +6939,185 @@
 </p:sld>
 </file>
 
-<file path=ppt/slides/slide12.xml><?xml version="1.0" encoding="utf-8"?>
+<file path=ppt/slides/slide14.xml><?xml version="1.0" encoding="utf-8"?>
+<p:sld xmlns:a="http://schemas.openxmlformats.org/drawingml/2006/main" xmlns:r="http://schemas.openxmlformats.org/officeDocument/2006/relationships" xmlns:p="http://schemas.openxmlformats.org/presentationml/2006/main">
+  <p:cSld>
+    <p:spTree>
+      <p:nvGrpSpPr>
+        <p:cNvPr id="1" name=""/>
+        <p:cNvGrpSpPr/>
+        <p:nvPr/>
+      </p:nvGrpSpPr>
+      <p:grpSpPr>
+        <a:xfrm>
+          <a:off x="0" y="0"/>
+          <a:ext cx="0" cy="0"/>
+          <a:chOff x="0" y="0"/>
+          <a:chExt cx="0" cy="0"/>
+        </a:xfrm>
+      </p:grpSpPr>
+      <p:sp>
+        <p:nvSpPr>
+          <p:cNvPr id="4" name="Espace réservé du numéro de diapositive 3">
+            <a:extLst>
+              <a:ext uri="{FF2B5EF4-FFF2-40B4-BE49-F238E27FC236}">
+                <a16:creationId xmlns:a16="http://schemas.microsoft.com/office/drawing/2014/main" id="{AE7BD7B4-5738-E3CD-2CD9-C2DE1702723A}"/>
+              </a:ext>
+            </a:extLst>
+          </p:cNvPr>
+          <p:cNvSpPr>
+            <a:spLocks noGrp="1"/>
+          </p:cNvSpPr>
+          <p:nvPr>
+            <p:ph type="sldNum" sz="quarter" idx="12"/>
+          </p:nvPr>
+        </p:nvSpPr>
+        <p:spPr/>
+        <p:txBody>
+          <a:bodyPr/>
+          <a:lstStyle/>
+          <a:p>
+            <a:fld id="{D57F1E4F-1CFF-5643-939E-217C01CDF565}" type="slidenum">
+              <a:rPr lang="en-US" smtClean="0"/>
+              <a:pPr/>
+              <a:t>14</a:t>
+            </a:fld>
+            <a:endParaRPr lang="en-US" dirty="0"/>
+          </a:p>
+        </p:txBody>
+      </p:sp>
+      <p:sp>
+        <p:nvSpPr>
+          <p:cNvPr id="5" name="ZoneTexte 4">
+            <a:extLst>
+              <a:ext uri="{FF2B5EF4-FFF2-40B4-BE49-F238E27FC236}">
+                <a16:creationId xmlns:a16="http://schemas.microsoft.com/office/drawing/2014/main" id="{32441E65-13E0-DAFD-5F1F-4C6E895004DE}"/>
+              </a:ext>
+            </a:extLst>
+          </p:cNvPr>
+          <p:cNvSpPr txBox="1"/>
+          <p:nvPr/>
+        </p:nvSpPr>
+        <p:spPr>
+          <a:xfrm>
+            <a:off x="789709" y="1276597"/>
+            <a:ext cx="9761005" cy="2308324"/>
+          </a:xfrm>
+          <a:prstGeom prst="rect">
+            <a:avLst/>
+          </a:prstGeom>
+          <a:noFill/>
+        </p:spPr>
+        <p:txBody>
+          <a:bodyPr wrap="none" rtlCol="0">
+            <a:spAutoFit/>
+          </a:bodyPr>
+          <a:lstStyle/>
+          <a:p>
+            <a:r>
+              <a:rPr lang="fr-FR" sz="1800" dirty="0">
+                <a:solidFill>
+                  <a:schemeClr val="bg1"/>
+                </a:solidFill>
+              </a:rPr>
+              <a:t> Maquettage :</a:t>
+            </a:r>
+          </a:p>
+          <a:p>
+            <a:r>
+              <a:rPr lang="fr-FR" sz="1800" dirty="0">
+                <a:solidFill>
+                  <a:schemeClr val="bg1"/>
+                </a:solidFill>
+              </a:rPr>
+              <a:t>		1.charte graphique…………………………………………………………………..16</a:t>
+            </a:r>
+          </a:p>
+          <a:p>
+            <a:r>
+              <a:rPr lang="fr-FR" sz="1800" dirty="0">
+                <a:solidFill>
+                  <a:schemeClr val="bg1"/>
+                </a:solidFill>
+              </a:rPr>
+              <a:t>		2.Elements a conserver…………………………………………………………...…16</a:t>
+            </a:r>
+          </a:p>
+          <a:p>
+            <a:r>
+              <a:rPr lang="fr-FR" sz="1800" dirty="0">
+                <a:solidFill>
+                  <a:schemeClr val="bg1"/>
+                </a:solidFill>
+              </a:rPr>
+              <a:t>		3.Zoning…………………………………………………………………………..…….17</a:t>
+            </a:r>
+          </a:p>
+          <a:p>
+            <a:r>
+              <a:rPr lang="fr-FR" sz="1800" dirty="0">
+                <a:solidFill>
+                  <a:schemeClr val="bg1"/>
+                </a:solidFill>
+              </a:rPr>
+              <a:t>		4.Wireframe……………………………………………………………………………18/19</a:t>
+            </a:r>
+          </a:p>
+          <a:p>
+            <a:r>
+              <a:rPr lang="fr-FR" sz="1800" dirty="0">
+                <a:solidFill>
+                  <a:schemeClr val="bg1"/>
+                </a:solidFill>
+              </a:rPr>
+              <a:t>		5.Style </a:t>
+            </a:r>
+            <a:r>
+              <a:rPr lang="fr-FR" sz="1800" dirty="0" err="1">
+                <a:solidFill>
+                  <a:schemeClr val="bg1"/>
+                </a:solidFill>
+              </a:rPr>
+              <a:t>title</a:t>
+            </a:r>
+            <a:r>
+              <a:rPr lang="fr-FR" sz="1800" dirty="0">
+                <a:solidFill>
+                  <a:schemeClr val="bg1"/>
+                </a:solidFill>
+              </a:rPr>
+              <a:t>……………………………………………………………………………...20</a:t>
+            </a:r>
+          </a:p>
+          <a:p>
+            <a:r>
+              <a:rPr lang="fr-FR" sz="1800" dirty="0">
+                <a:solidFill>
+                  <a:schemeClr val="bg1"/>
+                </a:solidFill>
+              </a:rPr>
+              <a:t>		6.Mokup………………………………………………………………………………...21/22</a:t>
+            </a:r>
+          </a:p>
+          <a:p>
+            <a:endParaRPr lang="fr-FR" dirty="0"/>
+          </a:p>
+        </p:txBody>
+      </p:sp>
+    </p:spTree>
+    <p:extLst>
+      <p:ext uri="{BB962C8B-B14F-4D97-AF65-F5344CB8AC3E}">
+        <p14:creationId xmlns:p14="http://schemas.microsoft.com/office/powerpoint/2010/main" val="768176839"/>
+      </p:ext>
+    </p:extLst>
+  </p:cSld>
+  <p:clrMapOvr>
+    <a:masterClrMapping/>
+  </p:clrMapOvr>
+</p:sld>
+</file>
+
+<file path=ppt/slides/slide15.xml><?xml version="1.0" encoding="utf-8"?>
 <p:sld xmlns:a="http://schemas.openxmlformats.org/drawingml/2006/main" xmlns:r="http://schemas.openxmlformats.org/officeDocument/2006/relationships" xmlns:p="http://schemas.openxmlformats.org/presentationml/2006/main">
   <p:cSld>
     <p:spTree>
@@ -6468,7 +7222,7 @@
             <a:fld id="{D57F1E4F-1CFF-5643-939E-217C01CDF565}" type="slidenum">
               <a:rPr lang="en-US" smtClean="0"/>
               <a:pPr/>
-              <a:t>12</a:t>
+              <a:t>15</a:t>
             </a:fld>
             <a:endParaRPr lang="en-US" dirty="0"/>
           </a:p>
@@ -6487,7 +7241,7 @@
 </p:sld>
 </file>
 
-<file path=ppt/slides/slide13.xml><?xml version="1.0" encoding="utf-8"?>
+<file path=ppt/slides/slide16.xml><?xml version="1.0" encoding="utf-8"?>
 <p:sld xmlns:a="http://schemas.openxmlformats.org/drawingml/2006/main" xmlns:r="http://schemas.openxmlformats.org/officeDocument/2006/relationships" xmlns:p="http://schemas.openxmlformats.org/presentationml/2006/main">
   <p:cSld>
     <p:spTree>
@@ -6874,7 +7628,7 @@
             <a:fld id="{D57F1E4F-1CFF-5643-939E-217C01CDF565}" type="slidenum">
               <a:rPr lang="en-US" smtClean="0"/>
               <a:pPr/>
-              <a:t>13</a:t>
+              <a:t>16</a:t>
             </a:fld>
             <a:endParaRPr lang="en-US" dirty="0"/>
           </a:p>
@@ -6893,7 +7647,7 @@
 </p:sld>
 </file>
 
-<file path=ppt/slides/slide14.xml><?xml version="1.0" encoding="utf-8"?>
+<file path=ppt/slides/slide17.xml><?xml version="1.0" encoding="utf-8"?>
 <p:sld xmlns:a="http://schemas.openxmlformats.org/drawingml/2006/main" xmlns:r="http://schemas.openxmlformats.org/officeDocument/2006/relationships" xmlns:p="http://schemas.openxmlformats.org/presentationml/2006/main">
   <p:cSld>
     <p:spTree>
@@ -7035,7 +7789,7 @@
             <a:fld id="{D57F1E4F-1CFF-5643-939E-217C01CDF565}" type="slidenum">
               <a:rPr lang="en-US" smtClean="0"/>
               <a:pPr/>
-              <a:t>14</a:t>
+              <a:t>17</a:t>
             </a:fld>
             <a:endParaRPr lang="en-US" dirty="0"/>
           </a:p>
@@ -7054,7 +7808,7 @@
 </p:sld>
 </file>
 
-<file path=ppt/slides/slide15.xml><?xml version="1.0" encoding="utf-8"?>
+<file path=ppt/slides/slide18.xml><?xml version="1.0" encoding="utf-8"?>
 <p:sld xmlns:a="http://schemas.openxmlformats.org/drawingml/2006/main" xmlns:r="http://schemas.openxmlformats.org/officeDocument/2006/relationships" xmlns:p="http://schemas.openxmlformats.org/presentationml/2006/main">
   <p:cSld>
     <p:spTree>
@@ -7158,7 +7912,7 @@
             <a:fld id="{D57F1E4F-1CFF-5643-939E-217C01CDF565}" type="slidenum">
               <a:rPr lang="en-US" smtClean="0"/>
               <a:pPr/>
-              <a:t>15</a:t>
+              <a:t>18</a:t>
             </a:fld>
             <a:endParaRPr lang="en-US" dirty="0"/>
           </a:p>
@@ -7177,7 +7931,7 @@
 </p:sld>
 </file>
 
-<file path=ppt/slides/slide16.xml><?xml version="1.0" encoding="utf-8"?>
+<file path=ppt/slides/slide19.xml><?xml version="1.0" encoding="utf-8"?>
 <p:sld xmlns:a="http://schemas.openxmlformats.org/drawingml/2006/main" xmlns:r="http://schemas.openxmlformats.org/officeDocument/2006/relationships" xmlns:p="http://schemas.openxmlformats.org/presentationml/2006/main">
   <p:cSld>
     <p:spTree>
@@ -7281,7 +8035,7 @@
             <a:fld id="{D57F1E4F-1CFF-5643-939E-217C01CDF565}" type="slidenum">
               <a:rPr lang="en-US" smtClean="0"/>
               <a:pPr/>
-              <a:t>16</a:t>
+              <a:t>19</a:t>
             </a:fld>
             <a:endParaRPr lang="en-US" dirty="0"/>
           </a:p>
@@ -7300,7 +8054,194 @@
 </p:sld>
 </file>
 
-<file path=ppt/slides/slide17.xml><?xml version="1.0" encoding="utf-8"?>
+<file path=ppt/slides/slide2.xml><?xml version="1.0" encoding="utf-8"?>
+<p:sld xmlns:a="http://schemas.openxmlformats.org/drawingml/2006/main" xmlns:r="http://schemas.openxmlformats.org/officeDocument/2006/relationships" xmlns:p="http://schemas.openxmlformats.org/presentationml/2006/main">
+  <p:cSld>
+    <p:spTree>
+      <p:nvGrpSpPr>
+        <p:cNvPr id="1" name=""/>
+        <p:cNvGrpSpPr/>
+        <p:nvPr/>
+      </p:nvGrpSpPr>
+      <p:grpSpPr>
+        <a:xfrm>
+          <a:off x="0" y="0"/>
+          <a:ext cx="0" cy="0"/>
+          <a:chOff x="0" y="0"/>
+          <a:chExt cx="0" cy="0"/>
+        </a:xfrm>
+      </p:grpSpPr>
+      <p:sp>
+        <p:nvSpPr>
+          <p:cNvPr id="4" name="Espace réservé du numéro de diapositive 3"/>
+          <p:cNvSpPr>
+            <a:spLocks noGrp="1"/>
+          </p:cNvSpPr>
+          <p:nvPr>
+            <p:ph type="sldNum" sz="quarter" idx="12"/>
+          </p:nvPr>
+        </p:nvSpPr>
+        <p:spPr/>
+        <p:txBody>
+          <a:bodyPr/>
+          <a:lstStyle/>
+          <a:p>
+            <a:fld id="{D57F1E4F-1CFF-5643-939E-217C01CDF565}" type="slidenum">
+              <a:rPr lang="en-US" smtClean="0"/>
+              <a:pPr/>
+              <a:t>2</a:t>
+            </a:fld>
+            <a:endParaRPr lang="en-US" dirty="0"/>
+          </a:p>
+        </p:txBody>
+      </p:sp>
+      <p:sp>
+        <p:nvSpPr>
+          <p:cNvPr id="5" name="ZoneTexte 4"/>
+          <p:cNvSpPr txBox="1"/>
+          <p:nvPr/>
+        </p:nvSpPr>
+        <p:spPr>
+          <a:xfrm>
+            <a:off x="435824" y="755270"/>
+            <a:ext cx="5311833" cy="369332"/>
+          </a:xfrm>
+          <a:prstGeom prst="rect">
+            <a:avLst/>
+          </a:prstGeom>
+          <a:noFill/>
+        </p:spPr>
+        <p:txBody>
+          <a:bodyPr wrap="square" rtlCol="0">
+            <a:spAutoFit/>
+          </a:bodyPr>
+          <a:lstStyle/>
+          <a:p>
+            <a:r>
+              <a:rPr lang="fr-FR" b="1" u="sng" dirty="0">
+                <a:solidFill>
+                  <a:srgbClr val="8F1919"/>
+                </a:solidFill>
+              </a:rPr>
+              <a:t>Sommaire:</a:t>
+            </a:r>
+          </a:p>
+        </p:txBody>
+      </p:sp>
+      <p:sp>
+        <p:nvSpPr>
+          <p:cNvPr id="7" name="ZoneTexte 6"/>
+          <p:cNvSpPr txBox="1"/>
+          <p:nvPr/>
+        </p:nvSpPr>
+        <p:spPr>
+          <a:xfrm>
+            <a:off x="802773" y="1384702"/>
+            <a:ext cx="10294718" cy="2000548"/>
+          </a:xfrm>
+          <a:prstGeom prst="rect">
+            <a:avLst/>
+          </a:prstGeom>
+          <a:noFill/>
+        </p:spPr>
+        <p:txBody>
+          <a:bodyPr wrap="square" rtlCol="0">
+            <a:spAutoFit/>
+          </a:bodyPr>
+          <a:lstStyle/>
+          <a:p>
+            <a:r>
+              <a:rPr lang="fr-FR" sz="1600" dirty="0">
+                <a:solidFill>
+                  <a:schemeClr val="bg1"/>
+                </a:solidFill>
+              </a:rPr>
+              <a:t>1. Analyse du besoin…………………………………………………………………………………………3</a:t>
+            </a:r>
+          </a:p>
+          <a:p>
+            <a:r>
+              <a:rPr lang="fr-FR" sz="1600" dirty="0">
+                <a:solidFill>
+                  <a:schemeClr val="bg1"/>
+                </a:solidFill>
+              </a:rPr>
+              <a:t>2. Spécifications fonctionnelles…………………………………………………...……………………….10</a:t>
+            </a:r>
+          </a:p>
+          <a:p>
+            <a:r>
+              <a:rPr lang="fr-FR" sz="1600" dirty="0">
+                <a:solidFill>
+                  <a:schemeClr val="bg1"/>
+                </a:solidFill>
+              </a:rPr>
+              <a:t>3. Conception……………………………………………………………………………….………………...23</a:t>
+            </a:r>
+          </a:p>
+          <a:p>
+            <a:r>
+              <a:rPr lang="fr-FR" sz="1600" dirty="0">
+                <a:solidFill>
+                  <a:schemeClr val="bg1"/>
+                </a:solidFill>
+              </a:rPr>
+              <a:t>4. Outils techniques………………………………………………………………………..………….………27</a:t>
+            </a:r>
+          </a:p>
+          <a:p>
+            <a:r>
+              <a:rPr lang="fr-FR" sz="1600" dirty="0">
+                <a:solidFill>
+                  <a:schemeClr val="bg1"/>
+                </a:solidFill>
+              </a:rPr>
+              <a:t>5. Fonctionnalité front………………………………………………………………...……..………….……28</a:t>
+            </a:r>
+          </a:p>
+          <a:p>
+            <a:r>
+              <a:rPr lang="fr-FR" sz="1600" dirty="0">
+                <a:solidFill>
+                  <a:schemeClr val="bg1"/>
+                </a:solidFill>
+              </a:rPr>
+              <a:t>6. Remerciements……………………………………………………………………………..….…………..30</a:t>
+            </a:r>
+          </a:p>
+          <a:p>
+            <a:r>
+              <a:rPr lang="fr-FR" sz="1400" dirty="0">
+                <a:solidFill>
+                  <a:schemeClr val="bg1"/>
+                </a:solidFill>
+              </a:rPr>
+              <a:t>	</a:t>
+            </a:r>
+          </a:p>
+          <a:p>
+            <a:endParaRPr lang="fr-FR" sz="1400" dirty="0">
+              <a:solidFill>
+                <a:schemeClr val="bg1"/>
+              </a:solidFill>
+            </a:endParaRPr>
+          </a:p>
+        </p:txBody>
+      </p:sp>
+    </p:spTree>
+    <p:extLst>
+      <p:ext uri="{BB962C8B-B14F-4D97-AF65-F5344CB8AC3E}">
+        <p14:creationId xmlns:p14="http://schemas.microsoft.com/office/powerpoint/2010/main" val="645838372"/>
+      </p:ext>
+    </p:extLst>
+  </p:cSld>
+  <p:clrMapOvr>
+    <a:masterClrMapping/>
+  </p:clrMapOvr>
+</p:sld>
+</file>
+
+<file path=ppt/slides/slide20.xml><?xml version="1.0" encoding="utf-8"?>
 <p:sld xmlns:a="http://schemas.openxmlformats.org/drawingml/2006/main" xmlns:r="http://schemas.openxmlformats.org/officeDocument/2006/relationships" xmlns:p="http://schemas.openxmlformats.org/presentationml/2006/main">
   <p:cSld>
     <p:spTree>
@@ -7420,7 +8361,7 @@
             <a:fld id="{D57F1E4F-1CFF-5643-939E-217C01CDF565}" type="slidenum">
               <a:rPr lang="en-US" smtClean="0"/>
               <a:pPr/>
-              <a:t>17</a:t>
+              <a:t>20</a:t>
             </a:fld>
             <a:endParaRPr lang="en-US" dirty="0"/>
           </a:p>
@@ -7439,7 +8380,7 @@
 </p:sld>
 </file>
 
-<file path=ppt/slides/slide18.xml><?xml version="1.0" encoding="utf-8"?>
+<file path=ppt/slides/slide21.xml><?xml version="1.0" encoding="utf-8"?>
 <p:sld xmlns:a="http://schemas.openxmlformats.org/drawingml/2006/main" xmlns:r="http://schemas.openxmlformats.org/officeDocument/2006/relationships" xmlns:p="http://schemas.openxmlformats.org/presentationml/2006/main">
   <p:cSld>
     <p:spTree>
@@ -7551,7 +8492,7 @@
             <a:fld id="{D57F1E4F-1CFF-5643-939E-217C01CDF565}" type="slidenum">
               <a:rPr lang="en-US" smtClean="0"/>
               <a:pPr/>
-              <a:t>18</a:t>
+              <a:t>21</a:t>
             </a:fld>
             <a:endParaRPr lang="en-US" dirty="0"/>
           </a:p>
@@ -7570,7 +8511,7 @@
 </p:sld>
 </file>
 
-<file path=ppt/slides/slide19.xml><?xml version="1.0" encoding="utf-8"?>
+<file path=ppt/slides/slide22.xml><?xml version="1.0" encoding="utf-8"?>
 <p:sld xmlns:a="http://schemas.openxmlformats.org/drawingml/2006/main" xmlns:r="http://schemas.openxmlformats.org/officeDocument/2006/relationships" xmlns:p="http://schemas.openxmlformats.org/presentationml/2006/main">
   <p:cSld>
     <p:spTree>
@@ -7682,7 +8623,7 @@
             <a:fld id="{D57F1E4F-1CFF-5643-939E-217C01CDF565}" type="slidenum">
               <a:rPr lang="en-US" smtClean="0"/>
               <a:pPr/>
-              <a:t>19</a:t>
+              <a:t>22</a:t>
             </a:fld>
             <a:endParaRPr lang="en-US" dirty="0"/>
           </a:p>
@@ -7701,7 +8642,7 @@
 </p:sld>
 </file>
 
-<file path=ppt/slides/slide2.xml><?xml version="1.0" encoding="utf-8"?>
+<file path=ppt/slides/slide23.xml><?xml version="1.0" encoding="utf-8"?>
 <p:sld xmlns:a="http://schemas.openxmlformats.org/drawingml/2006/main" xmlns:r="http://schemas.openxmlformats.org/officeDocument/2006/relationships" xmlns:p="http://schemas.openxmlformats.org/presentationml/2006/main">
   <p:cSld>
     <p:spTree>
@@ -7720,7 +8661,13 @@
       </p:grpSpPr>
       <p:sp>
         <p:nvSpPr>
-          <p:cNvPr id="4" name="Espace réservé du numéro de diapositive 3"/>
+          <p:cNvPr id="4" name="Espace réservé du numéro de diapositive 3">
+            <a:extLst>
+              <a:ext uri="{FF2B5EF4-FFF2-40B4-BE49-F238E27FC236}">
+                <a16:creationId xmlns:a16="http://schemas.microsoft.com/office/drawing/2014/main" id="{C75116E3-1E11-48D0-4771-1936623D3A12}"/>
+              </a:ext>
+            </a:extLst>
+          </p:cNvPr>
           <p:cNvSpPr>
             <a:spLocks noGrp="1"/>
           </p:cNvSpPr>
@@ -7736,7 +8683,7 @@
             <a:fld id="{D57F1E4F-1CFF-5643-939E-217C01CDF565}" type="slidenum">
               <a:rPr lang="en-US" smtClean="0"/>
               <a:pPr/>
-              <a:t>2</a:t>
+              <a:t>23</a:t>
             </a:fld>
             <a:endParaRPr lang="en-US" dirty="0"/>
           </a:p>
@@ -7744,14 +8691,20 @@
       </p:sp>
       <p:sp>
         <p:nvSpPr>
-          <p:cNvPr id="5" name="ZoneTexte 4"/>
+          <p:cNvPr id="5" name="ZoneTexte 4">
+            <a:extLst>
+              <a:ext uri="{FF2B5EF4-FFF2-40B4-BE49-F238E27FC236}">
+                <a16:creationId xmlns:a16="http://schemas.microsoft.com/office/drawing/2014/main" id="{D7F9055F-E2C3-9997-A54A-D8E004579CC9}"/>
+              </a:ext>
+            </a:extLst>
+          </p:cNvPr>
           <p:cNvSpPr txBox="1"/>
           <p:nvPr/>
         </p:nvSpPr>
         <p:spPr>
           <a:xfrm>
-            <a:off x="483325" y="143691"/>
-            <a:ext cx="5311833" cy="369332"/>
+            <a:off x="480951" y="1181595"/>
+            <a:ext cx="9591087" cy="1477328"/>
           </a:xfrm>
           <a:prstGeom prst="rect">
             <a:avLst/>
@@ -7759,352 +8712,64 @@
           <a:noFill/>
         </p:spPr>
         <p:txBody>
-          <a:bodyPr wrap="square" rtlCol="0">
+          <a:bodyPr wrap="none" rtlCol="0">
             <a:spAutoFit/>
           </a:bodyPr>
           <a:lstStyle/>
           <a:p>
             <a:r>
-              <a:rPr lang="fr-FR" b="1" u="sng" dirty="0">
-                <a:solidFill>
-                  <a:srgbClr val="8F1919"/>
-                </a:solidFill>
-              </a:rPr>
-              <a:t>Sommaire:</a:t>
-            </a:r>
-          </a:p>
-        </p:txBody>
-      </p:sp>
-      <p:sp>
-        <p:nvSpPr>
-          <p:cNvPr id="7" name="ZoneTexte 6"/>
-          <p:cNvSpPr txBox="1"/>
-          <p:nvPr/>
-        </p:nvSpPr>
-        <p:spPr>
-          <a:xfrm>
-            <a:off x="1016528" y="517803"/>
-            <a:ext cx="8686800" cy="6340197"/>
-          </a:xfrm>
-          <a:prstGeom prst="rect">
-            <a:avLst/>
-          </a:prstGeom>
-          <a:noFill/>
-        </p:spPr>
-        <p:txBody>
-          <a:bodyPr wrap="square" rtlCol="0">
-            <a:spAutoFit/>
-          </a:bodyPr>
-          <a:lstStyle/>
-          <a:p>
-            <a:r>
-              <a:rPr lang="fr-FR" sz="1400" dirty="0">
+              <a:rPr lang="fr-FR" sz="1800" dirty="0">
                 <a:solidFill>
                   <a:schemeClr val="bg1"/>
                 </a:solidFill>
               </a:rPr>
-              <a:t>1.Analyse du besoin…………………………………………………………………………………………3</a:t>
-            </a:r>
-          </a:p>
-          <a:p>
-            <a:r>
-              <a:rPr lang="fr-FR" sz="1400" dirty="0">
+              <a:t>3. Conception :</a:t>
+            </a:r>
+          </a:p>
+          <a:p>
+            <a:r>
+              <a:rPr lang="fr-FR" sz="1800" dirty="0">
                 <a:solidFill>
                   <a:schemeClr val="bg1"/>
                 </a:solidFill>
               </a:rPr>
-              <a:t>	a. Présentation de l’entreprise……………………………………………………………..3</a:t>
-            </a:r>
-          </a:p>
-          <a:p>
-            <a:r>
-              <a:rPr lang="fr-FR" sz="1400" dirty="0">
+              <a:t>	a. MCD………………………………………………………………………..……………….24</a:t>
+            </a:r>
+          </a:p>
+          <a:p>
+            <a:r>
+              <a:rPr lang="fr-FR" sz="1800" dirty="0">
                 <a:solidFill>
                   <a:schemeClr val="bg1"/>
                 </a:solidFill>
               </a:rPr>
-              <a:t>	b. Intervenant principaux…………………………………………………………………...3</a:t>
-            </a:r>
-          </a:p>
-          <a:p>
-            <a:r>
-              <a:rPr lang="fr-FR" sz="1400" dirty="0">
+              <a:t>	b. MLD………………………………………………………………………………………….25</a:t>
+            </a:r>
+          </a:p>
+          <a:p>
+            <a:r>
+              <a:rPr lang="fr-FR" dirty="0">
                 <a:solidFill>
                   <a:schemeClr val="bg1"/>
                 </a:solidFill>
               </a:rPr>
-              <a:t>	c. Objectif du site……………………………………………………………………………..4</a:t>
-            </a:r>
-          </a:p>
-          <a:p>
-            <a:r>
-              <a:rPr lang="fr-FR" sz="1400" dirty="0">
-                <a:solidFill>
-                  <a:schemeClr val="bg1"/>
-                </a:solidFill>
-              </a:rPr>
-              <a:t>	d. Les cibles……………………………………………………………………………............4</a:t>
-            </a:r>
-          </a:p>
-          <a:p>
-            <a:r>
-              <a:rPr lang="fr-FR" sz="1400" dirty="0">
-                <a:solidFill>
-                  <a:schemeClr val="bg1"/>
-                </a:solidFill>
-              </a:rPr>
-              <a:t>	e. Le SWOT………………………………………………………………...…………………...5</a:t>
-            </a:r>
-          </a:p>
-          <a:p>
-            <a:r>
-              <a:rPr lang="fr-FR" sz="1400" dirty="0">
-                <a:solidFill>
-                  <a:schemeClr val="bg1"/>
-                </a:solidFill>
-              </a:rPr>
-              <a:t>	f. Les Besoins……………………………………………………………………………………6</a:t>
-            </a:r>
-          </a:p>
-          <a:p>
-            <a:r>
-              <a:rPr lang="fr-FR" sz="1400" dirty="0">
-                <a:solidFill>
-                  <a:schemeClr val="bg1"/>
-                </a:solidFill>
-              </a:rPr>
-              <a:t>	g. Les contraintes techniques……………………………………………………………....7</a:t>
-            </a:r>
-          </a:p>
-          <a:p>
-            <a:r>
-              <a:rPr lang="fr-FR" sz="1400" dirty="0">
-                <a:solidFill>
-                  <a:schemeClr val="bg1"/>
-                </a:solidFill>
-              </a:rPr>
-              <a:t>	h. Les contraintes légales……………………………………………………………………7</a:t>
-            </a:r>
-          </a:p>
-          <a:p>
-            <a:r>
-              <a:rPr lang="fr-FR" sz="1400" dirty="0">
-                <a:solidFill>
-                  <a:schemeClr val="bg1"/>
-                </a:solidFill>
-              </a:rPr>
-              <a:t>	i. Sites exemples……………………………………………………………………………….8</a:t>
-            </a:r>
-          </a:p>
-          <a:p>
-            <a:r>
-              <a:rPr lang="fr-FR" sz="1400" dirty="0">
-                <a:solidFill>
-                  <a:schemeClr val="bg1"/>
-                </a:solidFill>
-              </a:rPr>
-              <a:t>2.Spécifications fonctionnelles……………………………………………………………………………9</a:t>
-            </a:r>
-          </a:p>
-          <a:p>
-            <a:r>
-              <a:rPr lang="fr-FR" sz="1400" dirty="0">
-                <a:solidFill>
-                  <a:schemeClr val="bg1"/>
-                </a:solidFill>
-              </a:rPr>
-              <a:t>	a. Use case……………………………………………………………………………………..9</a:t>
-            </a:r>
-          </a:p>
-          <a:p>
-            <a:r>
-              <a:rPr lang="fr-FR" sz="1400" dirty="0">
-                <a:solidFill>
-                  <a:schemeClr val="bg1"/>
-                </a:solidFill>
-              </a:rPr>
-              <a:t>	b. Diagramme d’activité…………………………………………………………………..10</a:t>
-            </a:r>
-          </a:p>
-          <a:p>
-            <a:r>
-              <a:rPr lang="fr-FR" sz="1400" dirty="0">
-                <a:solidFill>
-                  <a:schemeClr val="bg1"/>
-                </a:solidFill>
-              </a:rPr>
-              <a:t>	c. Diagramme de séquence……………………………………………………………...11</a:t>
-            </a:r>
-          </a:p>
-          <a:p>
-            <a:r>
-              <a:rPr lang="fr-FR" sz="1400" dirty="0">
-                <a:solidFill>
-                  <a:schemeClr val="bg1"/>
-                </a:solidFill>
-              </a:rPr>
-              <a:t>	e. Maquettage……………………………………………………………………...……….12</a:t>
-            </a:r>
-          </a:p>
-          <a:p>
-            <a:r>
-              <a:rPr lang="fr-FR" sz="1400" dirty="0">
-                <a:solidFill>
-                  <a:schemeClr val="bg1"/>
-                </a:solidFill>
-              </a:rPr>
-              <a:t>		1.charte graphique…………………………………………………………………..13</a:t>
-            </a:r>
-          </a:p>
-          <a:p>
-            <a:r>
-              <a:rPr lang="fr-FR" sz="1400" dirty="0">
-                <a:solidFill>
-                  <a:schemeClr val="bg1"/>
-                </a:solidFill>
-              </a:rPr>
-              <a:t>		2.Elements a conserver…………………………………………………………...…13</a:t>
-            </a:r>
-          </a:p>
-          <a:p>
-            <a:r>
-              <a:rPr lang="fr-FR" sz="1400" dirty="0">
-                <a:solidFill>
-                  <a:schemeClr val="bg1"/>
-                </a:solidFill>
-              </a:rPr>
-              <a:t>		3.Zoning…………………………………………………………………………..…….14</a:t>
-            </a:r>
-          </a:p>
-          <a:p>
-            <a:r>
-              <a:rPr lang="fr-FR" sz="1400" dirty="0">
-                <a:solidFill>
-                  <a:schemeClr val="bg1"/>
-                </a:solidFill>
-              </a:rPr>
-              <a:t>		4.Wireframe……………………………………………………………………………15/16</a:t>
-            </a:r>
-          </a:p>
-          <a:p>
-            <a:r>
-              <a:rPr lang="fr-FR" sz="1400" dirty="0">
-                <a:solidFill>
-                  <a:schemeClr val="bg1"/>
-                </a:solidFill>
-              </a:rPr>
-              <a:t>		5.Style </a:t>
-            </a:r>
-            <a:r>
-              <a:rPr lang="fr-FR" sz="1400" dirty="0" err="1">
-                <a:solidFill>
-                  <a:schemeClr val="bg1"/>
-                </a:solidFill>
-              </a:rPr>
-              <a:t>title</a:t>
-            </a:r>
-            <a:r>
-              <a:rPr lang="fr-FR" sz="1400" dirty="0">
-                <a:solidFill>
-                  <a:schemeClr val="bg1"/>
-                </a:solidFill>
-              </a:rPr>
-              <a:t>……………………………………………………………………………...17</a:t>
-            </a:r>
-          </a:p>
-          <a:p>
-            <a:r>
-              <a:rPr lang="fr-FR" sz="1400" dirty="0">
-                <a:solidFill>
-                  <a:schemeClr val="bg1"/>
-                </a:solidFill>
-              </a:rPr>
-              <a:t>		6.Mokup………………………………………………………………………………..18/19</a:t>
-            </a:r>
-          </a:p>
-          <a:p>
-            <a:r>
-              <a:rPr lang="fr-FR" sz="1400" dirty="0">
-                <a:solidFill>
-                  <a:schemeClr val="bg1"/>
-                </a:solidFill>
-              </a:rPr>
-              <a:t>3.Conception……………………………………………………………………………….………………20</a:t>
-            </a:r>
-          </a:p>
-          <a:p>
-            <a:r>
-              <a:rPr lang="fr-FR" sz="1400" dirty="0">
-                <a:solidFill>
-                  <a:schemeClr val="bg1"/>
-                </a:solidFill>
-              </a:rPr>
-              <a:t>	a. MCD………………………………………………………………………..……………….20</a:t>
-            </a:r>
-          </a:p>
-          <a:p>
-            <a:r>
-              <a:rPr lang="fr-FR" sz="1400" dirty="0">
-                <a:solidFill>
-                  <a:schemeClr val="bg1"/>
-                </a:solidFill>
-              </a:rPr>
-              <a:t>	b. MLD………………………………………………………………………………………….21</a:t>
-            </a:r>
-          </a:p>
-          <a:p>
-            <a:r>
-              <a:rPr lang="fr-FR" sz="1400" dirty="0">
-                <a:solidFill>
-                  <a:schemeClr val="bg1"/>
-                </a:solidFill>
-              </a:rPr>
-              <a:t>4.Outils techniques………………………………………………………………………...………………22</a:t>
-            </a:r>
-          </a:p>
-          <a:p>
-            <a:r>
-              <a:rPr lang="fr-FR" sz="1400" dirty="0">
-                <a:solidFill>
-                  <a:schemeClr val="bg1"/>
-                </a:solidFill>
-              </a:rPr>
-              <a:t>5.Fonctionnalité front………………………………………………………………...……………………23/24</a:t>
-            </a:r>
-          </a:p>
-          <a:p>
-            <a:r>
-              <a:rPr lang="fr-FR" sz="1400" dirty="0">
-                <a:solidFill>
-                  <a:schemeClr val="bg1"/>
-                </a:solidFill>
-              </a:rPr>
-              <a:t>6.Récapitulatif………………………………………………………………………………………………25</a:t>
-            </a:r>
-          </a:p>
-          <a:p>
-            <a:r>
-              <a:rPr lang="fr-FR" sz="1400" dirty="0">
-                <a:solidFill>
-                  <a:schemeClr val="bg1"/>
-                </a:solidFill>
-              </a:rPr>
-              <a:t>	</a:t>
-            </a:r>
-          </a:p>
-          <a:p>
-            <a:endParaRPr lang="fr-FR" sz="1400" dirty="0">
+              <a:t>	c. SQL…………………………………………………………………………………………..26</a:t>
+            </a:r>
+            <a:endParaRPr lang="fr-FR" sz="1800" dirty="0">
               <a:solidFill>
                 <a:schemeClr val="bg1"/>
               </a:solidFill>
             </a:endParaRPr>
           </a:p>
+          <a:p>
+            <a:endParaRPr lang="fr-FR" dirty="0"/>
+          </a:p>
         </p:txBody>
       </p:sp>
     </p:spTree>
     <p:extLst>
       <p:ext uri="{BB962C8B-B14F-4D97-AF65-F5344CB8AC3E}">
-        <p14:creationId xmlns:p14="http://schemas.microsoft.com/office/powerpoint/2010/main" val="645838372"/>
+        <p14:creationId xmlns:p14="http://schemas.microsoft.com/office/powerpoint/2010/main" val="1000521212"/>
       </p:ext>
     </p:extLst>
   </p:cSld>
@@ -8114,7 +8779,7 @@
 </p:sld>
 </file>
 
-<file path=ppt/slides/slide20.xml><?xml version="1.0" encoding="utf-8"?>
+<file path=ppt/slides/slide24.xml><?xml version="1.0" encoding="utf-8"?>
 <p:sld xmlns:a="http://schemas.openxmlformats.org/drawingml/2006/main" xmlns:r="http://schemas.openxmlformats.org/officeDocument/2006/relationships" xmlns:p="http://schemas.openxmlformats.org/presentationml/2006/main">
   <p:cSld>
     <p:spTree>
@@ -8149,7 +8814,7 @@
             <a:fld id="{D57F1E4F-1CFF-5643-939E-217C01CDF565}" type="slidenum">
               <a:rPr lang="en-US" smtClean="0"/>
               <a:pPr/>
-              <a:t>20</a:t>
+              <a:t>24</a:t>
             </a:fld>
             <a:endParaRPr lang="en-US" dirty="0"/>
           </a:p>
@@ -8164,7 +8829,7 @@
         <p:spPr>
           <a:xfrm>
             <a:off x="1064029" y="207818"/>
-            <a:ext cx="4123113" cy="923330"/>
+            <a:ext cx="4123113" cy="1200329"/>
           </a:xfrm>
           <a:prstGeom prst="rect">
             <a:avLst/>
@@ -8199,7 +8864,7 @@
                   <a:schemeClr val="bg1"/>
                 </a:solidFill>
               </a:rPr>
-              <a:t>(modèle conceptuel des données)</a:t>
+              <a:t>(modèle conceptuel des données)représente la relation entre les bases de données.</a:t>
             </a:r>
           </a:p>
           <a:p>
@@ -8254,7 +8919,7 @@
 </p:sld>
 </file>
 
-<file path=ppt/slides/slide21.xml><?xml version="1.0" encoding="utf-8"?>
+<file path=ppt/slides/slide25.xml><?xml version="1.0" encoding="utf-8"?>
 <p:sld xmlns:a="http://schemas.openxmlformats.org/drawingml/2006/main" xmlns:r="http://schemas.openxmlformats.org/officeDocument/2006/relationships" xmlns:p="http://schemas.openxmlformats.org/presentationml/2006/main">
   <p:cSld>
     <p:spTree>
@@ -8289,7 +8954,7 @@
             <a:fld id="{D57F1E4F-1CFF-5643-939E-217C01CDF565}" type="slidenum">
               <a:rPr lang="en-US" smtClean="0"/>
               <a:pPr/>
-              <a:t>21</a:t>
+              <a:t>25</a:t>
             </a:fld>
             <a:endParaRPr lang="en-US" dirty="0"/>
           </a:p>
@@ -8394,7 +9059,7 @@
 </p:sld>
 </file>
 
-<file path=ppt/slides/slide22.xml><?xml version="1.0" encoding="utf-8"?>
+<file path=ppt/slides/slide26.xml><?xml version="1.0" encoding="utf-8"?>
 <p:sld xmlns:a="http://schemas.openxmlformats.org/drawingml/2006/main" xmlns:r="http://schemas.openxmlformats.org/officeDocument/2006/relationships" xmlns:p="http://schemas.openxmlformats.org/presentationml/2006/main">
   <p:cSld>
     <p:spTree>
@@ -8413,6 +9078,234 @@
       </p:grpSpPr>
       <p:sp>
         <p:nvSpPr>
+          <p:cNvPr id="6" name="ZoneTexte 5">
+            <a:extLst>
+              <a:ext uri="{FF2B5EF4-FFF2-40B4-BE49-F238E27FC236}">
+                <a16:creationId xmlns:a16="http://schemas.microsoft.com/office/drawing/2014/main" id="{796EA7EB-19A8-7888-826C-42B44EF06283}"/>
+              </a:ext>
+            </a:extLst>
+          </p:cNvPr>
+          <p:cNvSpPr txBox="1"/>
+          <p:nvPr/>
+        </p:nvSpPr>
+        <p:spPr>
+          <a:xfrm>
+            <a:off x="512123" y="311129"/>
+            <a:ext cx="6106884" cy="369332"/>
+          </a:xfrm>
+          <a:prstGeom prst="rect">
+            <a:avLst/>
+          </a:prstGeom>
+          <a:noFill/>
+        </p:spPr>
+        <p:txBody>
+          <a:bodyPr wrap="square">
+            <a:spAutoFit/>
+          </a:bodyPr>
+          <a:lstStyle/>
+          <a:p>
+            <a:r>
+              <a:rPr lang="fr-FR" b="1" u="sng" dirty="0">
+                <a:solidFill>
+                  <a:srgbClr val="8F1919"/>
+                </a:solidFill>
+              </a:rPr>
+              <a:t>SQL:</a:t>
+            </a:r>
+            <a:r>
+              <a:rPr lang="fr-FR" dirty="0">
+                <a:solidFill>
+                  <a:srgbClr val="8F1919"/>
+                </a:solidFill>
+              </a:rPr>
+              <a:t>  </a:t>
+            </a:r>
+            <a:r>
+              <a:rPr lang="fr-FR" dirty="0">
+                <a:solidFill>
+                  <a:schemeClr val="bg1"/>
+                </a:solidFill>
+              </a:rPr>
+              <a:t>(</a:t>
+            </a:r>
+            <a:r>
+              <a:rPr lang="fr-FR" dirty="0" err="1">
+                <a:solidFill>
+                  <a:schemeClr val="bg1"/>
+                </a:solidFill>
+              </a:rPr>
+              <a:t>Structured</a:t>
+            </a:r>
+            <a:r>
+              <a:rPr lang="fr-FR" dirty="0">
+                <a:solidFill>
+                  <a:schemeClr val="bg1"/>
+                </a:solidFill>
+              </a:rPr>
+              <a:t> </a:t>
+            </a:r>
+            <a:r>
+              <a:rPr lang="fr-FR" dirty="0" err="1">
+                <a:solidFill>
+                  <a:schemeClr val="bg1"/>
+                </a:solidFill>
+              </a:rPr>
+              <a:t>Query</a:t>
+            </a:r>
+            <a:r>
+              <a:rPr lang="fr-FR" dirty="0">
+                <a:solidFill>
+                  <a:schemeClr val="bg1"/>
+                </a:solidFill>
+              </a:rPr>
+              <a:t> </a:t>
+            </a:r>
+            <a:r>
+              <a:rPr lang="fr-FR" dirty="0" err="1">
+                <a:solidFill>
+                  <a:schemeClr val="bg1"/>
+                </a:solidFill>
+              </a:rPr>
+              <a:t>Language</a:t>
+            </a:r>
+            <a:r>
+              <a:rPr lang="fr-FR" dirty="0">
+                <a:solidFill>
+                  <a:schemeClr val="bg1"/>
+                </a:solidFill>
+              </a:rPr>
+              <a:t>)</a:t>
+            </a:r>
+          </a:p>
+        </p:txBody>
+      </p:sp>
+      <p:pic>
+        <p:nvPicPr>
+          <p:cNvPr id="14" name="Image 13">
+            <a:extLst>
+              <a:ext uri="{FF2B5EF4-FFF2-40B4-BE49-F238E27FC236}">
+                <a16:creationId xmlns:a16="http://schemas.microsoft.com/office/drawing/2014/main" id="{07D616D0-DE6D-2E44-263A-508B747198D3}"/>
+              </a:ext>
+            </a:extLst>
+          </p:cNvPr>
+          <p:cNvPicPr>
+            <a:picLocks noChangeAspect="1"/>
+          </p:cNvPicPr>
+          <p:nvPr/>
+        </p:nvPicPr>
+        <p:blipFill>
+          <a:blip r:embed="rId2"/>
+          <a:stretch>
+            <a:fillRect/>
+          </a:stretch>
+        </p:blipFill>
+        <p:spPr>
+          <a:xfrm>
+            <a:off x="5688644" y="211862"/>
+            <a:ext cx="6173061" cy="6335009"/>
+          </a:xfrm>
+          <a:prstGeom prst="rect">
+            <a:avLst/>
+          </a:prstGeom>
+        </p:spPr>
+      </p:pic>
+      <p:sp>
+        <p:nvSpPr>
+          <p:cNvPr id="4" name="Espace réservé du numéro de diapositive 3">
+            <a:extLst>
+              <a:ext uri="{FF2B5EF4-FFF2-40B4-BE49-F238E27FC236}">
+                <a16:creationId xmlns:a16="http://schemas.microsoft.com/office/drawing/2014/main" id="{D8B127FD-31F4-2A08-F75A-4AAB89A6A2DE}"/>
+              </a:ext>
+            </a:extLst>
+          </p:cNvPr>
+          <p:cNvSpPr>
+            <a:spLocks noGrp="1"/>
+          </p:cNvSpPr>
+          <p:nvPr>
+            <p:ph type="sldNum" sz="quarter" idx="12"/>
+          </p:nvPr>
+        </p:nvSpPr>
+        <p:spPr>
+          <a:xfrm>
+            <a:off x="10719460" y="5913437"/>
+            <a:ext cx="1142245" cy="669925"/>
+          </a:xfrm>
+        </p:spPr>
+        <p:txBody>
+          <a:bodyPr/>
+          <a:lstStyle/>
+          <a:p>
+            <a:fld id="{D57F1E4F-1CFF-5643-939E-217C01CDF565}" type="slidenum">
+              <a:rPr lang="en-US" smtClean="0"/>
+              <a:pPr/>
+              <a:t>26</a:t>
+            </a:fld>
+            <a:endParaRPr lang="en-US" dirty="0"/>
+          </a:p>
+        </p:txBody>
+      </p:sp>
+      <p:pic>
+        <p:nvPicPr>
+          <p:cNvPr id="12" name="Image 11">
+            <a:extLst>
+              <a:ext uri="{FF2B5EF4-FFF2-40B4-BE49-F238E27FC236}">
+                <a16:creationId xmlns:a16="http://schemas.microsoft.com/office/drawing/2014/main" id="{88994215-922B-7684-2E9E-C4B33420354A}"/>
+              </a:ext>
+            </a:extLst>
+          </p:cNvPr>
+          <p:cNvPicPr>
+            <a:picLocks noChangeAspect="1"/>
+          </p:cNvPicPr>
+          <p:nvPr/>
+        </p:nvPicPr>
+        <p:blipFill>
+          <a:blip r:embed="rId3"/>
+          <a:stretch>
+            <a:fillRect/>
+          </a:stretch>
+        </p:blipFill>
+        <p:spPr>
+          <a:xfrm>
+            <a:off x="267307" y="967012"/>
+            <a:ext cx="5106113" cy="4553585"/>
+          </a:xfrm>
+          <a:prstGeom prst="rect">
+            <a:avLst/>
+          </a:prstGeom>
+        </p:spPr>
+      </p:pic>
+    </p:spTree>
+    <p:extLst>
+      <p:ext uri="{BB962C8B-B14F-4D97-AF65-F5344CB8AC3E}">
+        <p14:creationId xmlns:p14="http://schemas.microsoft.com/office/powerpoint/2010/main" val="3916259861"/>
+      </p:ext>
+    </p:extLst>
+  </p:cSld>
+  <p:clrMapOvr>
+    <a:masterClrMapping/>
+  </p:clrMapOvr>
+</p:sld>
+</file>
+
+<file path=ppt/slides/slide27.xml><?xml version="1.0" encoding="utf-8"?>
+<p:sld xmlns:a="http://schemas.openxmlformats.org/drawingml/2006/main" xmlns:r="http://schemas.openxmlformats.org/officeDocument/2006/relationships" xmlns:p="http://schemas.openxmlformats.org/presentationml/2006/main">
+  <p:cSld>
+    <p:spTree>
+      <p:nvGrpSpPr>
+        <p:cNvPr id="1" name=""/>
+        <p:cNvGrpSpPr/>
+        <p:nvPr/>
+      </p:nvGrpSpPr>
+      <p:grpSpPr>
+        <a:xfrm>
+          <a:off x="0" y="0"/>
+          <a:ext cx="0" cy="0"/>
+          <a:chOff x="0" y="0"/>
+          <a:chExt cx="0" cy="0"/>
+        </a:xfrm>
+      </p:grpSpPr>
+      <p:sp>
+        <p:nvSpPr>
           <p:cNvPr id="4" name="ZoneTexte 3">
             <a:extLst>
               <a:ext uri="{FF2B5EF4-FFF2-40B4-BE49-F238E27FC236}">
@@ -8426,7 +9319,7 @@
         <p:spPr>
           <a:xfrm>
             <a:off x="1284789" y="868101"/>
-            <a:ext cx="10208871" cy="2031325"/>
+            <a:ext cx="10208871" cy="2308324"/>
           </a:xfrm>
           <a:prstGeom prst="rect">
             <a:avLst/>
@@ -8555,6 +9448,20 @@
                 <a:schemeClr val="bg1"/>
               </a:solidFill>
             </a:endParaRPr>
+          </a:p>
+          <a:p>
+            <a:pPr marL="285750" indent="-285750">
+              <a:buFontTx/>
+              <a:buChar char="-"/>
+            </a:pPr>
+            <a:r>
+              <a:rPr lang="fr-FR" dirty="0">
+                <a:solidFill>
+                  <a:schemeClr val="bg1"/>
+                </a:solidFill>
+              </a:rPr>
+              <a:t>Utilisation du langage SQL pour la création et l’exploitation de la base de données</a:t>
+            </a:r>
           </a:p>
           <a:p>
             <a:pPr marL="285750" indent="-285750">
@@ -8587,7 +9494,7 @@
             <a:fld id="{D57F1E4F-1CFF-5643-939E-217C01CDF565}" type="slidenum">
               <a:rPr lang="en-US" smtClean="0"/>
               <a:pPr/>
-              <a:t>22</a:t>
+              <a:t>27</a:t>
             </a:fld>
             <a:endParaRPr lang="en-US" dirty="0"/>
           </a:p>
@@ -8606,7 +9513,7 @@
 </p:sld>
 </file>
 
-<file path=ppt/slides/slide23.xml><?xml version="1.0" encoding="utf-8"?>
+<file path=ppt/slides/slide28.xml><?xml version="1.0" encoding="utf-8"?>
 <p:sld xmlns:a="http://schemas.openxmlformats.org/drawingml/2006/main" xmlns:r="http://schemas.openxmlformats.org/officeDocument/2006/relationships" xmlns:p="http://schemas.openxmlformats.org/presentationml/2006/main">
   <p:cSld>
     <p:spTree>
@@ -8787,7 +9694,7 @@
             <a:fld id="{D57F1E4F-1CFF-5643-939E-217C01CDF565}" type="slidenum">
               <a:rPr lang="en-US" smtClean="0"/>
               <a:pPr/>
-              <a:t>23</a:t>
+              <a:t>28</a:t>
             </a:fld>
             <a:endParaRPr lang="en-US" dirty="0"/>
           </a:p>
@@ -8806,7 +9713,7 @@
 </p:sld>
 </file>
 
-<file path=ppt/slides/slide24.xml><?xml version="1.0" encoding="utf-8"?>
+<file path=ppt/slides/slide29.xml><?xml version="1.0" encoding="utf-8"?>
 <p:sld xmlns:a="http://schemas.openxmlformats.org/drawingml/2006/main" xmlns:r="http://schemas.openxmlformats.org/officeDocument/2006/relationships" xmlns:p="http://schemas.openxmlformats.org/presentationml/2006/main">
   <p:cSld>
     <p:spTree>
@@ -8988,7 +9895,7 @@
             <a:fld id="{D57F1E4F-1CFF-5643-939E-217C01CDF565}" type="slidenum">
               <a:rPr lang="en-US" smtClean="0"/>
               <a:pPr/>
-              <a:t>24</a:t>
+              <a:t>29</a:t>
             </a:fld>
             <a:endParaRPr lang="en-US" dirty="0"/>
           </a:p>
@@ -9037,7 +9944,7 @@
 </p:sld>
 </file>
 
-<file path=ppt/slides/slide25.xml><?xml version="1.0" encoding="utf-8"?>
+<file path=ppt/slides/slide3.xml><?xml version="1.0" encoding="utf-8"?>
 <p:sld xmlns:a="http://schemas.openxmlformats.org/drawingml/2006/main" xmlns:r="http://schemas.openxmlformats.org/officeDocument/2006/relationships" xmlns:p="http://schemas.openxmlformats.org/presentationml/2006/main">
   <p:cSld>
     <p:spTree>
@@ -9056,10 +9963,10 @@
       </p:grpSpPr>
       <p:sp>
         <p:nvSpPr>
-          <p:cNvPr id="3" name="Espace réservé du contenu 2">
+          <p:cNvPr id="4" name="Espace réservé du numéro de diapositive 3">
             <a:extLst>
               <a:ext uri="{FF2B5EF4-FFF2-40B4-BE49-F238E27FC236}">
-                <a16:creationId xmlns:a16="http://schemas.microsoft.com/office/drawing/2014/main" id="{E209249B-AB26-E703-4BF8-BDB15EA80F2B}"/>
+                <a16:creationId xmlns:a16="http://schemas.microsoft.com/office/drawing/2014/main" id="{51AD324E-4DC1-4716-86DC-30E711159704}"/>
               </a:ext>
             </a:extLst>
           </p:cNvPr>
@@ -9067,53 +9974,6 @@
             <a:spLocks noGrp="1"/>
           </p:cNvSpPr>
           <p:nvPr>
-            <p:ph idx="1"/>
-          </p:nvPr>
-        </p:nvSpPr>
-        <p:spPr>
-          <a:xfrm>
-            <a:off x="1218602" y="2003961"/>
-            <a:ext cx="9053554" cy="2431473"/>
-          </a:xfrm>
-        </p:spPr>
-        <p:txBody>
-          <a:bodyPr/>
-          <a:lstStyle/>
-          <a:p>
-            <a:pPr marL="0" indent="0">
-              <a:buNone/>
-            </a:pPr>
-            <a:r>
-              <a:rPr lang="fr-FR" b="1" u="sng" dirty="0">
-                <a:solidFill>
-                  <a:srgbClr val="751515"/>
-                </a:solidFill>
-              </a:rPr>
-              <a:t>Récapitulatif:</a:t>
-            </a:r>
-          </a:p>
-          <a:p>
-            <a:pPr marL="457200" lvl="1" indent="0">
-              <a:buNone/>
-            </a:pPr>
-            <a:r>
-              <a:rPr lang="fr-FR" dirty="0"/>
-              <a:t>Nous livrons un site internet début juillet de style galerie, comprenant un nouveau logo, une page d’accueil contenant une bio  la dernière peinture et des commentaires, une page galerie contenant les peintures du client, une page de contact, une page de gestion des tableaux.	</a:t>
-            </a:r>
-          </a:p>
-          <a:p>
-            <a:pPr lvl="1"/>
-            <a:endParaRPr lang="fr-FR" dirty="0"/>
-          </a:p>
-        </p:txBody>
-      </p:sp>
-      <p:sp>
-        <p:nvSpPr>
-          <p:cNvPr id="4" name="Espace réservé du numéro de diapositive 3"/>
-          <p:cNvSpPr>
-            <a:spLocks noGrp="1"/>
-          </p:cNvSpPr>
-          <p:nvPr>
             <p:ph type="sldNum" sz="quarter" idx="12"/>
           </p:nvPr>
         </p:nvSpPr>
@@ -9125,16 +9985,148 @@
             <a:fld id="{D57F1E4F-1CFF-5643-939E-217C01CDF565}" type="slidenum">
               <a:rPr lang="en-US" smtClean="0"/>
               <a:pPr/>
-              <a:t>25</a:t>
+              <a:t>3</a:t>
             </a:fld>
             <a:endParaRPr lang="en-US" dirty="0"/>
+          </a:p>
+        </p:txBody>
+      </p:sp>
+      <p:sp>
+        <p:nvSpPr>
+          <p:cNvPr id="5" name="ZoneTexte 4">
+            <a:extLst>
+              <a:ext uri="{FF2B5EF4-FFF2-40B4-BE49-F238E27FC236}">
+                <a16:creationId xmlns:a16="http://schemas.microsoft.com/office/drawing/2014/main" id="{DEA8EFC4-5871-35B1-32CC-2E30D0CAA191}"/>
+              </a:ext>
+            </a:extLst>
+          </p:cNvPr>
+          <p:cNvSpPr txBox="1"/>
+          <p:nvPr/>
+        </p:nvSpPr>
+        <p:spPr>
+          <a:xfrm>
+            <a:off x="1145969" y="760021"/>
+            <a:ext cx="9880270" cy="3139321"/>
+          </a:xfrm>
+          <a:prstGeom prst="rect">
+            <a:avLst/>
+          </a:prstGeom>
+          <a:noFill/>
+        </p:spPr>
+        <p:txBody>
+          <a:bodyPr wrap="square" rtlCol="0">
+            <a:spAutoFit/>
+          </a:bodyPr>
+          <a:lstStyle/>
+          <a:p>
+            <a:r>
+              <a:rPr lang="fr-FR" sz="1800" dirty="0">
+                <a:solidFill>
+                  <a:schemeClr val="bg1"/>
+                </a:solidFill>
+              </a:rPr>
+              <a:t>1. Analyse du besoin :</a:t>
+            </a:r>
+          </a:p>
+          <a:p>
+            <a:r>
+              <a:rPr lang="fr-FR" sz="1800" dirty="0">
+                <a:solidFill>
+                  <a:schemeClr val="bg1"/>
+                </a:solidFill>
+              </a:rPr>
+              <a:t>	a. Présentation de l’entreprise ……………………………………………………………..4</a:t>
+            </a:r>
+          </a:p>
+          <a:p>
+            <a:r>
+              <a:rPr lang="fr-FR" sz="1800" dirty="0">
+                <a:solidFill>
+                  <a:schemeClr val="bg1"/>
+                </a:solidFill>
+              </a:rPr>
+              <a:t>	b. Intervenant principaux …………………………………………………………………...4</a:t>
+            </a:r>
+          </a:p>
+          <a:p>
+            <a:r>
+              <a:rPr lang="fr-FR" sz="1800" dirty="0">
+                <a:solidFill>
+                  <a:schemeClr val="bg1"/>
+                </a:solidFill>
+              </a:rPr>
+              <a:t>	c. Objectif du site ……………………………………………………………………………..5</a:t>
+            </a:r>
+          </a:p>
+          <a:p>
+            <a:r>
+              <a:rPr lang="fr-FR" sz="1800" dirty="0">
+                <a:solidFill>
+                  <a:schemeClr val="bg1"/>
+                </a:solidFill>
+              </a:rPr>
+              <a:t>	d. Les cibles ……………………………………………………………………………............5</a:t>
+            </a:r>
+          </a:p>
+          <a:p>
+            <a:r>
+              <a:rPr lang="fr-FR" sz="1800" dirty="0">
+                <a:solidFill>
+                  <a:schemeClr val="bg1"/>
+                </a:solidFill>
+              </a:rPr>
+              <a:t>	e. Le SWOT ………………………………………………………………...…………………...6</a:t>
+            </a:r>
+          </a:p>
+          <a:p>
+            <a:r>
+              <a:rPr lang="fr-FR" sz="1800" dirty="0">
+                <a:solidFill>
+                  <a:schemeClr val="bg1"/>
+                </a:solidFill>
+              </a:rPr>
+              <a:t>	 f. Les Besoins………………………………………………………………………………...…7</a:t>
+            </a:r>
+          </a:p>
+          <a:p>
+            <a:r>
+              <a:rPr lang="fr-FR" sz="1800" dirty="0">
+                <a:solidFill>
+                  <a:schemeClr val="bg1"/>
+                </a:solidFill>
+              </a:rPr>
+              <a:t>	g. Les contraintes techniques ………………………………………………………...…....8</a:t>
+            </a:r>
+          </a:p>
+          <a:p>
+            <a:r>
+              <a:rPr lang="fr-FR" sz="1800" dirty="0">
+                <a:solidFill>
+                  <a:schemeClr val="bg1"/>
+                </a:solidFill>
+              </a:rPr>
+              <a:t>	h. Les contraintes légales ……………………………………………………………………8</a:t>
+            </a:r>
+          </a:p>
+          <a:p>
+            <a:r>
+              <a:rPr lang="fr-FR" sz="1800" dirty="0">
+                <a:solidFill>
+                  <a:schemeClr val="bg1"/>
+                </a:solidFill>
+              </a:rPr>
+              <a:t>	 i. Sites exemples……………………………………………………………………………….9</a:t>
+            </a:r>
+          </a:p>
+          <a:p>
+            <a:endParaRPr lang="fr-FR" dirty="0"/>
           </a:p>
         </p:txBody>
       </p:sp>
     </p:spTree>
     <p:extLst>
       <p:ext uri="{BB962C8B-B14F-4D97-AF65-F5344CB8AC3E}">
-        <p14:creationId xmlns:p14="http://schemas.microsoft.com/office/powerpoint/2010/main" val="3690427952"/>
+        <p14:creationId xmlns:p14="http://schemas.microsoft.com/office/powerpoint/2010/main" val="4075235090"/>
       </p:ext>
     </p:extLst>
   </p:cSld>
@@ -9144,7 +10136,7 @@
 </p:sld>
 </file>
 
-<file path=ppt/slides/slide26.xml><?xml version="1.0" encoding="utf-8"?>
+<file path=ppt/slides/slide30.xml><?xml version="1.0" encoding="utf-8"?>
 <p:sld xmlns:a="http://schemas.openxmlformats.org/drawingml/2006/main" xmlns:r="http://schemas.openxmlformats.org/officeDocument/2006/relationships" xmlns:p="http://schemas.openxmlformats.org/presentationml/2006/main">
   <p:cSld>
     <p:spTree>
@@ -9163,93 +10155,68 @@
       </p:grpSpPr>
       <p:sp>
         <p:nvSpPr>
-          <p:cNvPr id="4" name="ZoneTexte 3">
+          <p:cNvPr id="3" name="Espace réservé du contenu 2">
             <a:extLst>
               <a:ext uri="{FF2B5EF4-FFF2-40B4-BE49-F238E27FC236}">
-                <a16:creationId xmlns:a16="http://schemas.microsoft.com/office/drawing/2014/main" id="{A36F338B-F922-DB62-2584-A41AD766EB27}"/>
+                <a16:creationId xmlns:a16="http://schemas.microsoft.com/office/drawing/2014/main" id="{E209249B-AB26-E703-4BF8-BDB15EA80F2B}"/>
               </a:ext>
             </a:extLst>
           </p:cNvPr>
-          <p:cNvSpPr txBox="1"/>
-          <p:nvPr/>
+          <p:cNvSpPr>
+            <a:spLocks noGrp="1"/>
+          </p:cNvSpPr>
+          <p:nvPr>
+            <p:ph idx="1"/>
+          </p:nvPr>
         </p:nvSpPr>
         <p:spPr>
           <a:xfrm>
-            <a:off x="1213659" y="2227811"/>
-            <a:ext cx="9077498" cy="2031325"/>
+            <a:off x="1218602" y="2003961"/>
+            <a:ext cx="9053554" cy="2431473"/>
           </a:xfrm>
-          <a:prstGeom prst="rect">
-            <a:avLst/>
-          </a:prstGeom>
-          <a:noFill/>
         </p:spPr>
         <p:txBody>
-          <a:bodyPr wrap="square" rtlCol="0">
-            <a:spAutoFit/>
-          </a:bodyPr>
-          <a:lstStyle/>
-          <a:p>
+          <a:bodyPr/>
+          <a:lstStyle/>
+          <a:p>
+            <a:pPr marL="0" indent="0">
+              <a:buNone/>
+            </a:pPr>
             <a:r>
               <a:rPr lang="fr-FR" b="1" u="sng" dirty="0">
                 <a:solidFill>
                   <a:srgbClr val="751515"/>
                 </a:solidFill>
               </a:rPr>
-              <a:t>Les coûts et délais:</a:t>
-            </a:r>
-          </a:p>
-          <a:p>
+              <a:t>Remerciements:</a:t>
+            </a:r>
+          </a:p>
+          <a:p>
+            <a:pPr lvl="1"/>
             <a:r>
               <a:rPr lang="fr-FR" dirty="0"/>
-              <a:t>	</a:t>
-            </a:r>
-            <a:r>
-              <a:rPr lang="fr-FR" dirty="0">
-                <a:solidFill>
-                  <a:schemeClr val="bg1"/>
-                </a:solidFill>
-              </a:rPr>
-              <a:t>- Site offert soit un gain de 150 euros/jour/développeur pour 10 jours.</a:t>
-            </a:r>
-          </a:p>
-          <a:p>
-            <a:r>
-              <a:rPr lang="fr-FR" dirty="0">
-                <a:solidFill>
-                  <a:schemeClr val="bg1"/>
-                </a:solidFill>
-              </a:rPr>
-              <a:t>	  comprenant le cahier des charges, le maquettage, la création d’un logo, 	  la création du site, la création de la base de données.</a:t>
-            </a:r>
-          </a:p>
-          <a:p>
-            <a:r>
-              <a:rPr lang="fr-FR" dirty="0">
-                <a:solidFill>
-                  <a:schemeClr val="bg1"/>
-                </a:solidFill>
-              </a:rPr>
-              <a:t>	  Les frais de  mise en ligne a  la charge du client.</a:t>
-            </a:r>
-          </a:p>
-          <a:p>
-            <a:r>
-              <a:rPr lang="fr-FR" dirty="0">
-                <a:solidFill>
-                  <a:schemeClr val="bg1"/>
-                </a:solidFill>
-              </a:rPr>
-              <a:t>	- Livraisons prévu début juillet 2023.</a:t>
-            </a:r>
-          </a:p>
-          <a:p>
-            <a:endParaRPr lang="fr-FR" dirty="0"/>
-          </a:p>
-        </p:txBody>
-      </p:sp>
-      <p:sp>
-        <p:nvSpPr>
-          <p:cNvPr id="3" name="Espace réservé du numéro de diapositive 2"/>
+              <a:t>A Mr. Soulier pour sa confiance et sa patience.</a:t>
+            </a:r>
+          </a:p>
+          <a:p>
+            <a:pPr lvl="1"/>
+            <a:r>
+              <a:rPr lang="fr-FR" dirty="0"/>
+              <a:t>A l’ADRAR pour m’avoir accueillie.</a:t>
+            </a:r>
+          </a:p>
+          <a:p>
+            <a:pPr lvl="1"/>
+            <a:r>
+              <a:rPr lang="fr-FR" dirty="0"/>
+              <a:t>A Mr Rodrigues pour avoir supporté toutes mes questions.</a:t>
+            </a:r>
+          </a:p>
+        </p:txBody>
+      </p:sp>
+      <p:sp>
+        <p:nvSpPr>
+          <p:cNvPr id="4" name="Espace réservé du numéro de diapositive 3"/>
           <p:cNvSpPr>
             <a:spLocks noGrp="1"/>
           </p:cNvSpPr>
@@ -9265,7 +10232,7 @@
             <a:fld id="{D57F1E4F-1CFF-5643-939E-217C01CDF565}" type="slidenum">
               <a:rPr lang="en-US" smtClean="0"/>
               <a:pPr/>
-              <a:t>26</a:t>
+              <a:t>30</a:t>
             </a:fld>
             <a:endParaRPr lang="en-US" dirty="0"/>
           </a:p>
@@ -9274,7 +10241,7 @@
     </p:spTree>
     <p:extLst>
       <p:ext uri="{BB962C8B-B14F-4D97-AF65-F5344CB8AC3E}">
-        <p14:creationId xmlns:p14="http://schemas.microsoft.com/office/powerpoint/2010/main" val="1317641096"/>
+        <p14:creationId xmlns:p14="http://schemas.microsoft.com/office/powerpoint/2010/main" val="3690427952"/>
       </p:ext>
     </p:extLst>
   </p:cSld>
@@ -9284,133 +10251,7 @@
 </p:sld>
 </file>
 
-<file path=ppt/slides/slide27.xml><?xml version="1.0" encoding="utf-8"?>
-<p:sld xmlns:a="http://schemas.openxmlformats.org/drawingml/2006/main" xmlns:r="http://schemas.openxmlformats.org/officeDocument/2006/relationships" xmlns:p="http://schemas.openxmlformats.org/presentationml/2006/main">
-  <p:cSld>
-    <p:spTree>
-      <p:nvGrpSpPr>
-        <p:cNvPr id="1" name=""/>
-        <p:cNvGrpSpPr/>
-        <p:nvPr/>
-      </p:nvGrpSpPr>
-      <p:grpSpPr>
-        <a:xfrm>
-          <a:off x="0" y="0"/>
-          <a:ext cx="0" cy="0"/>
-          <a:chOff x="0" y="0"/>
-          <a:chExt cx="0" cy="0"/>
-        </a:xfrm>
-      </p:grpSpPr>
-      <p:sp>
-        <p:nvSpPr>
-          <p:cNvPr id="4" name="ZoneTexte 3">
-            <a:extLst>
-              <a:ext uri="{FF2B5EF4-FFF2-40B4-BE49-F238E27FC236}">
-                <a16:creationId xmlns:a16="http://schemas.microsoft.com/office/drawing/2014/main" id="{2A66F914-04BA-DAC5-3CB8-39C1C8CBFE25}"/>
-              </a:ext>
-            </a:extLst>
-          </p:cNvPr>
-          <p:cNvSpPr txBox="1"/>
-          <p:nvPr/>
-        </p:nvSpPr>
-        <p:spPr>
-          <a:xfrm>
-            <a:off x="950026" y="528452"/>
-            <a:ext cx="2844140" cy="646331"/>
-          </a:xfrm>
-          <a:prstGeom prst="rect">
-            <a:avLst/>
-          </a:prstGeom>
-          <a:noFill/>
-        </p:spPr>
-        <p:txBody>
-          <a:bodyPr wrap="square" rtlCol="0">
-            <a:spAutoFit/>
-          </a:bodyPr>
-          <a:lstStyle/>
-          <a:p>
-            <a:r>
-              <a:rPr lang="fr-FR" b="1" u="sng" dirty="0">
-                <a:solidFill>
-                  <a:srgbClr val="751515"/>
-                </a:solidFill>
-              </a:rPr>
-              <a:t>Planning:</a:t>
-            </a:r>
-          </a:p>
-          <a:p>
-            <a:endParaRPr lang="fr-FR" dirty="0"/>
-          </a:p>
-        </p:txBody>
-      </p:sp>
-      <p:pic>
-        <p:nvPicPr>
-          <p:cNvPr id="6" name="Image 5">
-            <a:extLst>
-              <a:ext uri="{FF2B5EF4-FFF2-40B4-BE49-F238E27FC236}">
-                <a16:creationId xmlns:a16="http://schemas.microsoft.com/office/drawing/2014/main" id="{1E25515D-80E7-CBC6-C036-7660A343731E}"/>
-              </a:ext>
-            </a:extLst>
-          </p:cNvPr>
-          <p:cNvPicPr>
-            <a:picLocks noChangeAspect="1"/>
-          </p:cNvPicPr>
-          <p:nvPr/>
-        </p:nvPicPr>
-        <p:blipFill>
-          <a:blip r:embed="rId2"/>
-          <a:stretch>
-            <a:fillRect/>
-          </a:stretch>
-        </p:blipFill>
-        <p:spPr>
-          <a:xfrm>
-            <a:off x="2600696" y="876504"/>
-            <a:ext cx="8390279" cy="5877509"/>
-          </a:xfrm>
-          <a:prstGeom prst="rect">
-            <a:avLst/>
-          </a:prstGeom>
-        </p:spPr>
-      </p:pic>
-      <p:sp>
-        <p:nvSpPr>
-          <p:cNvPr id="3" name="Espace réservé du numéro de diapositive 2"/>
-          <p:cNvSpPr>
-            <a:spLocks noGrp="1"/>
-          </p:cNvSpPr>
-          <p:nvPr>
-            <p:ph type="sldNum" sz="quarter" idx="12"/>
-          </p:nvPr>
-        </p:nvSpPr>
-        <p:spPr/>
-        <p:txBody>
-          <a:bodyPr/>
-          <a:lstStyle/>
-          <a:p>
-            <a:fld id="{D57F1E4F-1CFF-5643-939E-217C01CDF565}" type="slidenum">
-              <a:rPr lang="en-US" smtClean="0"/>
-              <a:pPr/>
-              <a:t>27</a:t>
-            </a:fld>
-            <a:endParaRPr lang="en-US" dirty="0"/>
-          </a:p>
-        </p:txBody>
-      </p:sp>
-    </p:spTree>
-    <p:extLst>
-      <p:ext uri="{BB962C8B-B14F-4D97-AF65-F5344CB8AC3E}">
-        <p14:creationId xmlns:p14="http://schemas.microsoft.com/office/powerpoint/2010/main" val="2368108637"/>
-      </p:ext>
-    </p:extLst>
-  </p:cSld>
-  <p:clrMapOvr>
-    <a:masterClrMapping/>
-  </p:clrMapOvr>
-</p:sld>
-</file>
-
-<file path=ppt/slides/slide3.xml><?xml version="1.0" encoding="utf-8"?>
+<file path=ppt/slides/slide4.xml><?xml version="1.0" encoding="utf-8"?>
 <p:sld xmlns:a="http://schemas.openxmlformats.org/drawingml/2006/main" xmlns:r="http://schemas.openxmlformats.org/officeDocument/2006/relationships" xmlns:p="http://schemas.openxmlformats.org/presentationml/2006/main">
   <p:cSld>
     <p:bg>
@@ -9624,7 +10465,7 @@
             <a:fld id="{D57F1E4F-1CFF-5643-939E-217C01CDF565}" type="slidenum">
               <a:rPr lang="en-US" smtClean="0"/>
               <a:pPr/>
-              <a:t>3</a:t>
+              <a:t>4</a:t>
             </a:fld>
             <a:endParaRPr lang="en-US" dirty="0"/>
           </a:p>
@@ -11056,7 +11897,7 @@
 </p:sld>
 </file>
 
-<file path=ppt/slides/slide4.xml><?xml version="1.0" encoding="utf-8"?>
+<file path=ppt/slides/slide5.xml><?xml version="1.0" encoding="utf-8"?>
 <p:sld xmlns:a="http://schemas.openxmlformats.org/drawingml/2006/main" xmlns:r="http://schemas.openxmlformats.org/officeDocument/2006/relationships" xmlns:p="http://schemas.openxmlformats.org/presentationml/2006/main">
   <p:cSld>
     <p:spTree>
@@ -11267,7 +12108,7 @@
             <a:fld id="{D57F1E4F-1CFF-5643-939E-217C01CDF565}" type="slidenum">
               <a:rPr lang="en-US" smtClean="0"/>
               <a:pPr/>
-              <a:t>4</a:t>
+              <a:t>5</a:t>
             </a:fld>
             <a:endParaRPr lang="en-US" dirty="0"/>
           </a:p>
@@ -11286,7 +12127,7 @@
 </p:sld>
 </file>
 
-<file path=ppt/slides/slide5.xml><?xml version="1.0" encoding="utf-8"?>
+<file path=ppt/slides/slide6.xml><?xml version="1.0" encoding="utf-8"?>
 <p:sld xmlns:a="http://schemas.openxmlformats.org/drawingml/2006/main" xmlns:r="http://schemas.openxmlformats.org/officeDocument/2006/relationships" xmlns:p="http://schemas.openxmlformats.org/presentationml/2006/main">
   <p:cSld>
     <p:spTree>
@@ -11589,7 +12430,7 @@
             <a:fld id="{D57F1E4F-1CFF-5643-939E-217C01CDF565}" type="slidenum">
               <a:rPr lang="en-US" smtClean="0"/>
               <a:pPr/>
-              <a:t>5</a:t>
+              <a:t>6</a:t>
             </a:fld>
             <a:endParaRPr lang="en-US" dirty="0"/>
           </a:p>
@@ -11608,7 +12449,7 @@
 </p:sld>
 </file>
 
-<file path=ppt/slides/slide6.xml><?xml version="1.0" encoding="utf-8"?>
+<file path=ppt/slides/slide7.xml><?xml version="1.0" encoding="utf-8"?>
 <p:sld xmlns:a="http://schemas.openxmlformats.org/drawingml/2006/main" xmlns:r="http://schemas.openxmlformats.org/officeDocument/2006/relationships" xmlns:p="http://schemas.openxmlformats.org/presentationml/2006/main">
   <p:cSld>
     <p:spTree>
@@ -12301,7 +13142,7 @@
             <a:fld id="{D57F1E4F-1CFF-5643-939E-217C01CDF565}" type="slidenum">
               <a:rPr lang="en-US" smtClean="0"/>
               <a:pPr/>
-              <a:t>6</a:t>
+              <a:t>7</a:t>
             </a:fld>
             <a:endParaRPr lang="en-US" dirty="0"/>
           </a:p>
@@ -12320,7 +13161,7 @@
 </p:sld>
 </file>
 
-<file path=ppt/slides/slide7.xml><?xml version="1.0" encoding="utf-8"?>
+<file path=ppt/slides/slide8.xml><?xml version="1.0" encoding="utf-8"?>
 <p:sld xmlns:a="http://schemas.openxmlformats.org/drawingml/2006/main" xmlns:r="http://schemas.openxmlformats.org/officeDocument/2006/relationships" xmlns:p="http://schemas.openxmlformats.org/presentationml/2006/main">
   <p:cSld>
     <p:spTree>
@@ -12489,7 +13330,7 @@
             <a:fld id="{D57F1E4F-1CFF-5643-939E-217C01CDF565}" type="slidenum">
               <a:rPr lang="en-US" smtClean="0"/>
               <a:pPr/>
-              <a:t>7</a:t>
+              <a:t>8</a:t>
             </a:fld>
             <a:endParaRPr lang="en-US" dirty="0"/>
           </a:p>
@@ -12508,7 +13349,7 @@
 </p:sld>
 </file>
 
-<file path=ppt/slides/slide8.xml><?xml version="1.0" encoding="utf-8"?>
+<file path=ppt/slides/slide9.xml><?xml version="1.0" encoding="utf-8"?>
 <p:sld xmlns:a="http://schemas.openxmlformats.org/drawingml/2006/main" xmlns:r="http://schemas.openxmlformats.org/officeDocument/2006/relationships" xmlns:p="http://schemas.openxmlformats.org/presentationml/2006/main">
   <p:cSld>
     <p:spTree>
@@ -12668,7 +13509,7 @@
             <a:fld id="{D57F1E4F-1CFF-5643-939E-217C01CDF565}" type="slidenum">
               <a:rPr lang="en-US" smtClean="0"/>
               <a:pPr/>
-              <a:t>8</a:t>
+              <a:t>9</a:t>
             </a:fld>
             <a:endParaRPr lang="en-US" dirty="0"/>
           </a:p>
@@ -12678,434 +13519,6 @@
     <p:extLst>
       <p:ext uri="{BB962C8B-B14F-4D97-AF65-F5344CB8AC3E}">
         <p14:creationId xmlns:p14="http://schemas.microsoft.com/office/powerpoint/2010/main" val="1651569058"/>
-      </p:ext>
-    </p:extLst>
-  </p:cSld>
-  <p:clrMapOvr>
-    <a:masterClrMapping/>
-  </p:clrMapOvr>
-</p:sld>
-</file>
-
-<file path=ppt/slides/slide9.xml><?xml version="1.0" encoding="utf-8"?>
-<p:sld xmlns:a="http://schemas.openxmlformats.org/drawingml/2006/main" xmlns:r="http://schemas.openxmlformats.org/officeDocument/2006/relationships" xmlns:p="http://schemas.openxmlformats.org/presentationml/2006/main">
-  <p:cSld>
-    <p:spTree>
-      <p:nvGrpSpPr>
-        <p:cNvPr id="1" name=""/>
-        <p:cNvGrpSpPr/>
-        <p:nvPr/>
-      </p:nvGrpSpPr>
-      <p:grpSpPr>
-        <a:xfrm>
-          <a:off x="0" y="0"/>
-          <a:ext cx="0" cy="0"/>
-          <a:chOff x="0" y="0"/>
-          <a:chExt cx="0" cy="0"/>
-        </a:xfrm>
-      </p:grpSpPr>
-      <p:sp>
-        <p:nvSpPr>
-          <p:cNvPr id="6" name="ZoneTexte 5">
-            <a:extLst>
-              <a:ext uri="{FF2B5EF4-FFF2-40B4-BE49-F238E27FC236}">
-                <a16:creationId xmlns:a16="http://schemas.microsoft.com/office/drawing/2014/main" id="{59101B24-B94B-C392-C424-D95FDA322356}"/>
-              </a:ext>
-            </a:extLst>
-          </p:cNvPr>
-          <p:cNvSpPr txBox="1"/>
-          <p:nvPr/>
-        </p:nvSpPr>
-        <p:spPr>
-          <a:xfrm>
-            <a:off x="748145" y="154379"/>
-            <a:ext cx="4399808" cy="646331"/>
-          </a:xfrm>
-          <a:prstGeom prst="rect">
-            <a:avLst/>
-          </a:prstGeom>
-          <a:noFill/>
-        </p:spPr>
-        <p:txBody>
-          <a:bodyPr wrap="square" rtlCol="0">
-            <a:spAutoFit/>
-          </a:bodyPr>
-          <a:lstStyle/>
-          <a:p>
-            <a:r>
-              <a:rPr lang="fr-FR" b="1" u="sng" dirty="0" err="1">
-                <a:solidFill>
-                  <a:srgbClr val="8F1919"/>
-                </a:solidFill>
-              </a:rPr>
-              <a:t>Usecase</a:t>
-            </a:r>
-            <a:r>
-              <a:rPr lang="fr-FR" b="1" u="sng" dirty="0">
-                <a:solidFill>
-                  <a:srgbClr val="8F1919"/>
-                </a:solidFill>
-              </a:rPr>
-              <a:t>:</a:t>
-            </a:r>
-            <a:r>
-              <a:rPr lang="fr-FR" b="1" dirty="0">
-                <a:solidFill>
-                  <a:srgbClr val="8F1919"/>
-                </a:solidFill>
-              </a:rPr>
-              <a:t>  </a:t>
-            </a:r>
-            <a:r>
-              <a:rPr lang="fr-FR" dirty="0">
-                <a:solidFill>
-                  <a:schemeClr val="bg1"/>
-                </a:solidFill>
-              </a:rPr>
-              <a:t>définie les interactions entre les acteurs et le système</a:t>
-            </a:r>
-            <a:endParaRPr lang="fr-FR" b="1" u="sng" dirty="0">
-              <a:solidFill>
-                <a:srgbClr val="8F1919"/>
-              </a:solidFill>
-            </a:endParaRPr>
-          </a:p>
-        </p:txBody>
-      </p:sp>
-      <p:sp>
-        <p:nvSpPr>
-          <p:cNvPr id="7" name="ZoneTexte 6">
-            <a:extLst>
-              <a:ext uri="{FF2B5EF4-FFF2-40B4-BE49-F238E27FC236}">
-                <a16:creationId xmlns:a16="http://schemas.microsoft.com/office/drawing/2014/main" id="{AE857B4E-8153-4529-C16D-2C07F4B75BA2}"/>
-              </a:ext>
-            </a:extLst>
-          </p:cNvPr>
-          <p:cNvSpPr txBox="1"/>
-          <p:nvPr/>
-        </p:nvSpPr>
-        <p:spPr>
-          <a:xfrm>
-            <a:off x="6852062" y="1033153"/>
-            <a:ext cx="4714504" cy="4832092"/>
-          </a:xfrm>
-          <a:prstGeom prst="rect">
-            <a:avLst/>
-          </a:prstGeom>
-          <a:noFill/>
-        </p:spPr>
-        <p:txBody>
-          <a:bodyPr wrap="square" rtlCol="0">
-            <a:spAutoFit/>
-          </a:bodyPr>
-          <a:lstStyle/>
-          <a:p>
-            <a:r>
-              <a:rPr lang="fr-FR" sz="1400" dirty="0">
-                <a:solidFill>
-                  <a:schemeClr val="bg1"/>
-                </a:solidFill>
-              </a:rPr>
-              <a:t>3 acteurs: Le visiteur, l’acteur connexion et l’administrateur.</a:t>
-            </a:r>
-          </a:p>
-          <a:p>
-            <a:endParaRPr lang="fr-FR" sz="1400" dirty="0">
-              <a:solidFill>
-                <a:schemeClr val="bg1"/>
-              </a:solidFill>
-            </a:endParaRPr>
-          </a:p>
-          <a:p>
-            <a:r>
-              <a:rPr lang="fr-FR" sz="1400" dirty="0">
-                <a:solidFill>
-                  <a:schemeClr val="bg1"/>
-                </a:solidFill>
-              </a:rPr>
-              <a:t>Le visiteur doit pouvoir :</a:t>
-            </a:r>
-          </a:p>
-          <a:p>
-            <a:r>
-              <a:rPr lang="fr-FR" sz="1400" dirty="0">
-                <a:solidFill>
-                  <a:schemeClr val="bg1"/>
-                </a:solidFill>
-              </a:rPr>
-              <a:t>-     Naviguer entre les pages du site</a:t>
-            </a:r>
-          </a:p>
-          <a:p>
-            <a:pPr marL="285750" indent="-285750">
-              <a:buFontTx/>
-              <a:buChar char="-"/>
-            </a:pPr>
-            <a:r>
-              <a:rPr lang="fr-FR" sz="1400" dirty="0">
-                <a:solidFill>
-                  <a:schemeClr val="bg1"/>
-                </a:solidFill>
-              </a:rPr>
-              <a:t>Déposer un avis sur le dernier tableau</a:t>
-            </a:r>
-          </a:p>
-          <a:p>
-            <a:pPr marL="285750" indent="-285750">
-              <a:buFontTx/>
-              <a:buChar char="-"/>
-            </a:pPr>
-            <a:r>
-              <a:rPr lang="fr-FR" sz="1400" dirty="0">
-                <a:solidFill>
-                  <a:schemeClr val="bg1"/>
-                </a:solidFill>
-              </a:rPr>
-              <a:t>Agrandir le dernier tableau</a:t>
-            </a:r>
-          </a:p>
-          <a:p>
-            <a:pPr marL="285750" indent="-285750">
-              <a:buFontTx/>
-              <a:buChar char="-"/>
-            </a:pPr>
-            <a:r>
-              <a:rPr lang="fr-FR" sz="1400" dirty="0">
-                <a:solidFill>
-                  <a:schemeClr val="bg1"/>
-                </a:solidFill>
-              </a:rPr>
-              <a:t>Se rendre sur Facebook</a:t>
-            </a:r>
-          </a:p>
-          <a:p>
-            <a:pPr marL="285750" indent="-285750">
-              <a:buFontTx/>
-              <a:buChar char="-"/>
-            </a:pPr>
-            <a:r>
-              <a:rPr lang="fr-FR" sz="1400" dirty="0">
-                <a:solidFill>
-                  <a:schemeClr val="bg1"/>
-                </a:solidFill>
-              </a:rPr>
-              <a:t>Effectuer une demande de contact dans un formulaire</a:t>
-            </a:r>
-          </a:p>
-          <a:p>
-            <a:pPr marL="285750" indent="-285750">
-              <a:buFontTx/>
-              <a:buChar char="-"/>
-            </a:pPr>
-            <a:r>
-              <a:rPr lang="fr-FR" sz="1400" dirty="0">
-                <a:solidFill>
-                  <a:schemeClr val="bg1"/>
-                </a:solidFill>
-              </a:rPr>
-              <a:t>Visualiser les différents tableaux dans la galerie</a:t>
-            </a:r>
-          </a:p>
-          <a:p>
-            <a:endParaRPr lang="fr-FR" sz="1400" dirty="0">
-              <a:solidFill>
-                <a:schemeClr val="bg1"/>
-              </a:solidFill>
-            </a:endParaRPr>
-          </a:p>
-          <a:p>
-            <a:r>
-              <a:rPr lang="fr-FR" sz="1400" dirty="0">
-                <a:solidFill>
-                  <a:schemeClr val="bg1"/>
-                </a:solidFill>
-              </a:rPr>
-              <a:t>L’acteur connexion :</a:t>
-            </a:r>
-          </a:p>
-          <a:p>
-            <a:pPr marL="285750" indent="-285750">
-              <a:buFontTx/>
-              <a:buChar char="-"/>
-            </a:pPr>
-            <a:r>
-              <a:rPr lang="fr-FR" sz="1400" dirty="0">
-                <a:solidFill>
-                  <a:schemeClr val="bg1"/>
-                </a:solidFill>
-              </a:rPr>
-              <a:t>Se connecte</a:t>
-            </a:r>
-          </a:p>
-          <a:p>
-            <a:pPr marL="285750" indent="-285750">
-              <a:buFontTx/>
-              <a:buChar char="-"/>
-            </a:pPr>
-            <a:r>
-              <a:rPr lang="fr-FR" sz="1400" dirty="0">
-                <a:solidFill>
-                  <a:schemeClr val="bg1"/>
-                </a:solidFill>
-              </a:rPr>
-              <a:t>Se déconnecte</a:t>
-            </a:r>
-          </a:p>
-          <a:p>
-            <a:endParaRPr lang="fr-FR" sz="1400" dirty="0">
-              <a:solidFill>
-                <a:schemeClr val="bg1"/>
-              </a:solidFill>
-            </a:endParaRPr>
-          </a:p>
-          <a:p>
-            <a:r>
-              <a:rPr lang="fr-FR" sz="1400" dirty="0">
-                <a:solidFill>
-                  <a:schemeClr val="bg1"/>
-                </a:solidFill>
-              </a:rPr>
-              <a:t>L’administrateur quant a lui doit pouvoir :</a:t>
-            </a:r>
-          </a:p>
-          <a:p>
-            <a:pPr marL="285750" indent="-285750">
-              <a:buFontTx/>
-              <a:buChar char="-"/>
-            </a:pPr>
-            <a:r>
-              <a:rPr lang="fr-FR" sz="1400">
-                <a:solidFill>
-                  <a:schemeClr val="bg1"/>
-                </a:solidFill>
-              </a:rPr>
-              <a:t>Récupère </a:t>
-            </a:r>
-            <a:r>
-              <a:rPr lang="fr-FR" sz="1400" dirty="0">
-                <a:solidFill>
-                  <a:schemeClr val="bg1"/>
-                </a:solidFill>
-              </a:rPr>
-              <a:t>les droits de l’acteur connexion</a:t>
-            </a:r>
-          </a:p>
-          <a:p>
-            <a:pPr marL="285750" indent="-285750">
-              <a:buFontTx/>
-              <a:buChar char="-"/>
-            </a:pPr>
-            <a:r>
-              <a:rPr lang="fr-FR" sz="1400" dirty="0">
-                <a:solidFill>
-                  <a:schemeClr val="bg1"/>
-                </a:solidFill>
-              </a:rPr>
-              <a:t>Ajouter, supprimer des titres et les tableaux</a:t>
-            </a:r>
-          </a:p>
-          <a:p>
-            <a:pPr marL="285750" indent="-285750">
-              <a:buFontTx/>
-              <a:buChar char="-"/>
-            </a:pPr>
-            <a:r>
-              <a:rPr lang="fr-FR" sz="1400" dirty="0">
-                <a:solidFill>
-                  <a:schemeClr val="bg1"/>
-                </a:solidFill>
-              </a:rPr>
-              <a:t>Supprimer les avis</a:t>
-            </a:r>
-          </a:p>
-          <a:p>
-            <a:pPr marL="285750" indent="-285750">
-              <a:buFontTx/>
-              <a:buChar char="-"/>
-            </a:pPr>
-            <a:r>
-              <a:rPr lang="fr-FR" sz="1400" dirty="0">
-                <a:solidFill>
-                  <a:schemeClr val="bg1"/>
-                </a:solidFill>
-              </a:rPr>
-              <a:t>Changer le dernier tableau</a:t>
-            </a:r>
-          </a:p>
-          <a:p>
-            <a:pPr marL="285750" indent="-285750">
-              <a:buFontTx/>
-              <a:buChar char="-"/>
-            </a:pPr>
-            <a:r>
-              <a:rPr lang="fr-FR" sz="1400" dirty="0">
-                <a:solidFill>
-                  <a:schemeClr val="bg1"/>
-                </a:solidFill>
-              </a:rPr>
-              <a:t>Recevoir les demandes de contact</a:t>
-            </a:r>
-          </a:p>
-        </p:txBody>
-      </p:sp>
-      <p:sp>
-        <p:nvSpPr>
-          <p:cNvPr id="3" name="Espace réservé du numéro de diapositive 2"/>
-          <p:cNvSpPr>
-            <a:spLocks noGrp="1"/>
-          </p:cNvSpPr>
-          <p:nvPr>
-            <p:ph type="sldNum" sz="quarter" idx="12"/>
-          </p:nvPr>
-        </p:nvSpPr>
-        <p:spPr/>
-        <p:txBody>
-          <a:bodyPr/>
-          <a:lstStyle/>
-          <a:p>
-            <a:fld id="{D57F1E4F-1CFF-5643-939E-217C01CDF565}" type="slidenum">
-              <a:rPr lang="en-US" smtClean="0"/>
-              <a:pPr/>
-              <a:t>9</a:t>
-            </a:fld>
-            <a:endParaRPr lang="en-US" dirty="0"/>
-          </a:p>
-        </p:txBody>
-      </p:sp>
-      <p:pic>
-        <p:nvPicPr>
-          <p:cNvPr id="9" name="Image 8"/>
-          <p:cNvPicPr>
-            <a:picLocks noChangeAspect="1"/>
-          </p:cNvPicPr>
-          <p:nvPr/>
-        </p:nvPicPr>
-        <p:blipFill>
-          <a:blip r:embed="rId2">
-            <a:extLst>
-              <a:ext uri="{28A0092B-C50C-407E-A947-70E740481C1C}">
-                <a14:useLocalDpi xmlns:a14="http://schemas.microsoft.com/office/drawing/2010/main" val="0"/>
-              </a:ext>
-            </a:extLst>
-          </a:blip>
-          <a:stretch>
-            <a:fillRect/>
-          </a:stretch>
-        </p:blipFill>
-        <p:spPr>
-          <a:xfrm>
-            <a:off x="256616" y="1033153"/>
-            <a:ext cx="6155838" cy="4401205"/>
-          </a:xfrm>
-          <a:prstGeom prst="rect">
-            <a:avLst/>
-          </a:prstGeom>
-        </p:spPr>
-      </p:pic>
-    </p:spTree>
-    <p:extLst>
-      <p:ext uri="{BB962C8B-B14F-4D97-AF65-F5344CB8AC3E}">
-        <p14:creationId xmlns:p14="http://schemas.microsoft.com/office/powerpoint/2010/main" val="672800375"/>
       </p:ext>
     </p:extLst>
   </p:cSld>

</xml_diff>